<commit_message>
Atualização do slide da Apresentação. Já está praticamente finalizado, faltando algumas coisas e ajustes.
</commit_message>
<xml_diff>
--- a/documentacao/G4_Apresentacao2sem2014_Final.pptx
+++ b/documentacao/G4_Apresentacao2sem2014_Final.pptx
@@ -5,19 +5,27 @@
     <p:sldMasterId id="2147483648" r:id="rId1"/>
   </p:sldMasterIdLst>
   <p:notesMasterIdLst>
-    <p:notesMasterId r:id="rId12"/>
+    <p:notesMasterId r:id="rId20"/>
   </p:notesMasterIdLst>
   <p:sldIdLst>
     <p:sldId id="258" r:id="rId2"/>
     <p:sldId id="297" r:id="rId3"/>
-    <p:sldId id="395" r:id="rId4"/>
-    <p:sldId id="394" r:id="rId5"/>
-    <p:sldId id="389" r:id="rId6"/>
-    <p:sldId id="390" r:id="rId7"/>
-    <p:sldId id="392" r:id="rId8"/>
-    <p:sldId id="391" r:id="rId9"/>
-    <p:sldId id="384" r:id="rId10"/>
-    <p:sldId id="393" r:id="rId11"/>
+    <p:sldId id="405" r:id="rId4"/>
+    <p:sldId id="395" r:id="rId5"/>
+    <p:sldId id="404" r:id="rId6"/>
+    <p:sldId id="403" r:id="rId7"/>
+    <p:sldId id="396" r:id="rId8"/>
+    <p:sldId id="397" r:id="rId9"/>
+    <p:sldId id="398" r:id="rId10"/>
+    <p:sldId id="399" r:id="rId11"/>
+    <p:sldId id="400" r:id="rId12"/>
+    <p:sldId id="390" r:id="rId13"/>
+    <p:sldId id="392" r:id="rId14"/>
+    <p:sldId id="401" r:id="rId15"/>
+    <p:sldId id="391" r:id="rId16"/>
+    <p:sldId id="402" r:id="rId17"/>
+    <p:sldId id="384" r:id="rId18"/>
+    <p:sldId id="393" r:id="rId19"/>
   </p:sldIdLst>
   <p:sldSz cx="9144000" cy="6858000" type="screen4x3"/>
   <p:notesSz cx="6858000" cy="9144000"/>
@@ -123,17 +131,39 @@
           <p14:sldIdLst>
             <p14:sldId id="258"/>
             <p14:sldId id="297"/>
+            <p14:sldId id="405"/>
             <p14:sldId id="395"/>
-            <p14:sldId id="394"/>
-            <p14:sldId id="389"/>
+            <p14:sldId id="404"/>
+            <p14:sldId id="403"/>
+            <p14:sldId id="396"/>
+            <p14:sldId id="397"/>
+            <p14:sldId id="398"/>
+            <p14:sldId id="399"/>
+            <p14:sldId id="400"/>
             <p14:sldId id="390"/>
             <p14:sldId id="392"/>
+            <p14:sldId id="401"/>
             <p14:sldId id="391"/>
+            <p14:sldId id="402"/>
             <p14:sldId id="384"/>
             <p14:sldId id="393"/>
           </p14:sldIdLst>
         </p14:section>
       </p14:sectionLst>
+    </p:ext>
+    <p:ext uri="{EFAFB233-063F-42B5-8137-9DF3F51BA10A}">
+      <p15:sldGuideLst xmlns:p15="http://schemas.microsoft.com/office/powerpoint/2012/main">
+        <p15:guide id="1" orient="horz" pos="2160">
+          <p15:clr>
+            <a:srgbClr val="A4A3A4"/>
+          </p15:clr>
+        </p15:guide>
+        <p15:guide id="2" pos="2880">
+          <p15:clr>
+            <a:srgbClr val="A4A3A4"/>
+          </p15:clr>
+        </p15:guide>
+      </p15:sldGuideLst>
     </p:ext>
   </p:extLst>
 </p:presentation>
@@ -222,7 +252,7 @@
             <a:fld id="{44372743-0C2A-4DA9-BF19-A9026375E57C}" type="datetimeFigureOut">
               <a:rPr lang="pt-BR" smtClean="0"/>
               <a:pPr/>
-              <a:t>10/11/2014</a:t>
+              <a:t>15/11/2014</a:t>
             </a:fld>
             <a:endParaRPr lang="pt-BR"/>
           </a:p>
@@ -703,7 +733,7 @@
             <a:fld id="{94CDC042-039A-4E80-A826-4614F83E09D2}" type="datetimeFigureOut">
               <a:rPr lang="pt-BR" smtClean="0"/>
               <a:pPr/>
-              <a:t>10/11/2014</a:t>
+              <a:t>15/11/2014</a:t>
             </a:fld>
             <a:endParaRPr lang="pt-BR"/>
           </a:p>
@@ -916,7 +946,7 @@
             <a:fld id="{94CDC042-039A-4E80-A826-4614F83E09D2}" type="datetimeFigureOut">
               <a:rPr lang="pt-BR" smtClean="0"/>
               <a:pPr/>
-              <a:t>10/11/2014</a:t>
+              <a:t>15/11/2014</a:t>
             </a:fld>
             <a:endParaRPr lang="pt-BR"/>
           </a:p>
@@ -1639,7 +1669,7 @@
             <a:fld id="{94CDC042-039A-4E80-A826-4614F83E09D2}" type="datetimeFigureOut">
               <a:rPr lang="pt-BR" smtClean="0"/>
               <a:pPr/>
-              <a:t>10/11/2014</a:t>
+              <a:t>15/11/2014</a:t>
             </a:fld>
             <a:endParaRPr lang="pt-BR"/>
           </a:p>
@@ -2031,8 +2061,16 @@
           <a:lstStyle/>
           <a:p>
             <a:r>
-              <a:rPr lang="en-US" dirty="0" smtClean="0"/>
-              <a:t>“Nome do Sistema”</a:t>
+              <a:rPr lang="pt-BR" dirty="0" smtClean="0"/>
+              <a:t>SISTEMA DE </a:t>
+            </a:r>
+            <a:r>
+              <a:rPr lang="pt-BR" dirty="0"/>
+              <a:t>GERENCIAMENTO DE </a:t>
+            </a:r>
+            <a:r>
+              <a:rPr lang="pt-BR" dirty="0" smtClean="0"/>
+              <a:t>EXAMES</a:t>
             </a:r>
             <a:endParaRPr lang="pt-BR" dirty="0"/>
           </a:p>
@@ -2050,8 +2088,8 @@
         </p:nvSpPr>
         <p:spPr>
           <a:xfrm>
-            <a:off x="755576" y="2204864"/>
-            <a:ext cx="7632848" cy="1752600"/>
+            <a:off x="251520" y="2924944"/>
+            <a:ext cx="4020507" cy="1752600"/>
           </a:xfrm>
         </p:spPr>
         <p:txBody>
@@ -2062,34 +2100,51 @@
           <a:p>
             <a:r>
               <a:rPr lang="pt-BR" dirty="0"/>
-              <a:t>Grupo x: </a:t>
+              <a:t>Grupo </a:t>
+            </a:r>
+            <a:r>
+              <a:rPr lang="pt-BR" dirty="0"/>
+              <a:t>4</a:t>
+            </a:r>
+            <a:r>
+              <a:rPr lang="pt-BR" smtClean="0"/>
+              <a:t>:  Danilo </a:t>
             </a:r>
             <a:r>
               <a:rPr lang="pt-BR" dirty="0" smtClean="0"/>
-              <a:t>integrante </a:t>
-            </a:r>
-            <a:r>
-              <a:rPr lang="pt-BR" dirty="0"/>
-              <a:t>1</a:t>
-            </a:r>
-          </a:p>
-          <a:p>
-            <a:r>
-              <a:rPr lang="pt-BR" dirty="0"/>
-              <a:t>                integrante 2</a:t>
-            </a:r>
-          </a:p>
-          <a:p>
-            <a:r>
-              <a:rPr lang="pt-BR" dirty="0"/>
-              <a:t>                integrante 3</a:t>
-            </a:r>
-          </a:p>
-          <a:p>
-            <a:r>
-              <a:rPr lang="pt-BR" dirty="0"/>
-              <a:t>                integrante 4</a:t>
-            </a:r>
+              <a:t>Missio</a:t>
+            </a:r>
+          </a:p>
+          <a:p>
+            <a:r>
+              <a:rPr lang="pt-BR" dirty="0" smtClean="0"/>
+              <a:t>                    </a:t>
+            </a:r>
+            <a:r>
+              <a:rPr lang="pt-BR" dirty="0" smtClean="0"/>
+              <a:t>Gabriel Piccolo</a:t>
+            </a:r>
+          </a:p>
+          <a:p>
+            <a:r>
+              <a:rPr lang="pt-BR" dirty="0" smtClean="0"/>
+              <a:t>                     </a:t>
+            </a:r>
+            <a:r>
+              <a:rPr lang="pt-BR" dirty="0" smtClean="0"/>
+              <a:t>Pedro Gimenes</a:t>
+            </a:r>
+          </a:p>
+          <a:p>
+            <a:r>
+              <a:rPr lang="pt-BR" dirty="0" smtClean="0"/>
+              <a:t>                     </a:t>
+            </a:r>
+            <a:r>
+              <a:rPr lang="pt-BR" dirty="0" smtClean="0"/>
+              <a:t>Vinícius Romão</a:t>
+            </a:r>
+            <a:endParaRPr lang="pt-BR" dirty="0"/>
           </a:p>
         </p:txBody>
       </p:sp>
@@ -2132,6 +2187,830 @@
       </p:grpSpPr>
       <p:sp>
         <p:nvSpPr>
+          <p:cNvPr id="2" name="Title 1"/>
+          <p:cNvSpPr>
+            <a:spLocks noGrp="1"/>
+          </p:cNvSpPr>
+          <p:nvPr>
+            <p:ph type="title"/>
+          </p:nvPr>
+        </p:nvSpPr>
+        <p:spPr/>
+        <p:txBody>
+          <a:bodyPr/>
+          <a:lstStyle/>
+          <a:p>
+            <a:r>
+              <a:rPr lang="pt-BR" dirty="0" smtClean="0"/>
+              <a:t>Casos de Uso</a:t>
+            </a:r>
+            <a:endParaRPr lang="pt-BR" dirty="0"/>
+          </a:p>
+        </p:txBody>
+      </p:sp>
+      <p:pic>
+        <p:nvPicPr>
+          <p:cNvPr id="5" name="Imagem 4"/>
+          <p:cNvPicPr>
+            <a:picLocks noChangeAspect="1"/>
+          </p:cNvPicPr>
+          <p:nvPr/>
+        </p:nvPicPr>
+        <p:blipFill>
+          <a:blip r:embed="rId2">
+            <a:extLst>
+              <a:ext uri="{28A0092B-C50C-407E-A947-70E740481C1C}">
+                <a14:useLocalDpi xmlns:a14="http://schemas.microsoft.com/office/drawing/2010/main" val="0"/>
+              </a:ext>
+            </a:extLst>
+          </a:blip>
+          <a:stretch>
+            <a:fillRect/>
+          </a:stretch>
+        </p:blipFill>
+        <p:spPr>
+          <a:xfrm>
+            <a:off x="2087493" y="1417638"/>
+            <a:ext cx="4969014" cy="4997654"/>
+          </a:xfrm>
+          <a:prstGeom prst="rect">
+            <a:avLst/>
+          </a:prstGeom>
+        </p:spPr>
+      </p:pic>
+      <p:sp>
+        <p:nvSpPr>
+          <p:cNvPr id="7" name="Retângulo 6"/>
+          <p:cNvSpPr/>
+          <p:nvPr/>
+        </p:nvSpPr>
+        <p:spPr>
+          <a:xfrm>
+            <a:off x="5004048" y="1772816"/>
+            <a:ext cx="3863400" cy="1015663"/>
+          </a:xfrm>
+          <a:prstGeom prst="rect">
+            <a:avLst/>
+          </a:prstGeom>
+        </p:spPr>
+        <p:txBody>
+          <a:bodyPr wrap="square">
+            <a:spAutoFit/>
+          </a:bodyPr>
+          <a:lstStyle/>
+          <a:p>
+            <a:r>
+              <a:rPr lang="pt-BR" dirty="0">
+                <a:solidFill>
+                  <a:srgbClr val="FF0000"/>
+                </a:solidFill>
+              </a:rPr>
+              <a:t>*</a:t>
+            </a:r>
+            <a:r>
+              <a:rPr lang="pt-BR" sz="2000" dirty="0">
+                <a:solidFill>
+                  <a:srgbClr val="FF0000"/>
+                </a:solidFill>
+              </a:rPr>
+              <a:t>Os casos de uso do gestor podem ser melhor visualizados nos slides anterior.</a:t>
+            </a:r>
+          </a:p>
+        </p:txBody>
+      </p:sp>
+    </p:spTree>
+    <p:extLst>
+      <p:ext uri="{BB962C8B-B14F-4D97-AF65-F5344CB8AC3E}">
+        <p14:creationId xmlns:p14="http://schemas.microsoft.com/office/powerpoint/2010/main" val="2953681110"/>
+      </p:ext>
+    </p:extLst>
+  </p:cSld>
+  <p:clrMapOvr>
+    <a:masterClrMapping/>
+  </p:clrMapOvr>
+  <p:timing>
+    <p:tnLst>
+      <p:par>
+        <p:cTn id="1" dur="indefinite" restart="never" nodeType="tmRoot"/>
+      </p:par>
+    </p:tnLst>
+  </p:timing>
+</p:sld>
+</file>
+
+<file path=ppt/slides/slide11.xml><?xml version="1.0" encoding="utf-8"?>
+<p:sld xmlns:a="http://schemas.openxmlformats.org/drawingml/2006/main" xmlns:r="http://schemas.openxmlformats.org/officeDocument/2006/relationships" xmlns:p="http://schemas.openxmlformats.org/presentationml/2006/main">
+  <p:cSld>
+    <p:spTree>
+      <p:nvGrpSpPr>
+        <p:cNvPr id="1" name=""/>
+        <p:cNvGrpSpPr/>
+        <p:nvPr/>
+      </p:nvGrpSpPr>
+      <p:grpSpPr>
+        <a:xfrm>
+          <a:off x="0" y="0"/>
+          <a:ext cx="0" cy="0"/>
+          <a:chOff x="0" y="0"/>
+          <a:chExt cx="0" cy="0"/>
+        </a:xfrm>
+      </p:grpSpPr>
+      <p:sp>
+        <p:nvSpPr>
+          <p:cNvPr id="2" name="Title 1"/>
+          <p:cNvSpPr>
+            <a:spLocks noGrp="1"/>
+          </p:cNvSpPr>
+          <p:nvPr>
+            <p:ph type="title"/>
+          </p:nvPr>
+        </p:nvSpPr>
+        <p:spPr/>
+        <p:txBody>
+          <a:bodyPr/>
+          <a:lstStyle/>
+          <a:p>
+            <a:r>
+              <a:rPr lang="pt-BR" dirty="0" smtClean="0"/>
+              <a:t>Escopo do Sistema</a:t>
+            </a:r>
+            <a:endParaRPr lang="pt-BR" dirty="0"/>
+          </a:p>
+        </p:txBody>
+      </p:sp>
+      <p:pic>
+        <p:nvPicPr>
+          <p:cNvPr id="14" name="Imagem 13"/>
+          <p:cNvPicPr>
+            <a:picLocks noChangeAspect="1"/>
+          </p:cNvPicPr>
+          <p:nvPr/>
+        </p:nvPicPr>
+        <p:blipFill>
+          <a:blip r:embed="rId2">
+            <a:extLst>
+              <a:ext uri="{28A0092B-C50C-407E-A947-70E740481C1C}">
+                <a14:useLocalDpi xmlns:a14="http://schemas.microsoft.com/office/drawing/2010/main" val="0"/>
+              </a:ext>
+            </a:extLst>
+          </a:blip>
+          <a:stretch>
+            <a:fillRect/>
+          </a:stretch>
+        </p:blipFill>
+        <p:spPr>
+          <a:xfrm>
+            <a:off x="31794" y="1186090"/>
+            <a:ext cx="9112206" cy="4979214"/>
+          </a:xfrm>
+          <a:prstGeom prst="rect">
+            <a:avLst/>
+          </a:prstGeom>
+        </p:spPr>
+      </p:pic>
+    </p:spTree>
+    <p:extLst>
+      <p:ext uri="{BB962C8B-B14F-4D97-AF65-F5344CB8AC3E}">
+        <p14:creationId xmlns:p14="http://schemas.microsoft.com/office/powerpoint/2010/main" val="28993515"/>
+      </p:ext>
+    </p:extLst>
+  </p:cSld>
+  <p:clrMapOvr>
+    <a:masterClrMapping/>
+  </p:clrMapOvr>
+  <p:timing>
+    <p:tnLst>
+      <p:par>
+        <p:cTn id="1" dur="indefinite" restart="never" nodeType="tmRoot"/>
+      </p:par>
+    </p:tnLst>
+  </p:timing>
+</p:sld>
+</file>
+
+<file path=ppt/slides/slide12.xml><?xml version="1.0" encoding="utf-8"?>
+<p:sld xmlns:a="http://schemas.openxmlformats.org/drawingml/2006/main" xmlns:r="http://schemas.openxmlformats.org/officeDocument/2006/relationships" xmlns:p="http://schemas.openxmlformats.org/presentationml/2006/main">
+  <p:cSld>
+    <p:spTree>
+      <p:nvGrpSpPr>
+        <p:cNvPr id="1" name=""/>
+        <p:cNvGrpSpPr/>
+        <p:nvPr/>
+      </p:nvGrpSpPr>
+      <p:grpSpPr>
+        <a:xfrm>
+          <a:off x="0" y="0"/>
+          <a:ext cx="0" cy="0"/>
+          <a:chOff x="0" y="0"/>
+          <a:chExt cx="0" cy="0"/>
+        </a:xfrm>
+      </p:grpSpPr>
+      <p:sp>
+        <p:nvSpPr>
+          <p:cNvPr id="2" name="Title 1"/>
+          <p:cNvSpPr>
+            <a:spLocks noGrp="1"/>
+          </p:cNvSpPr>
+          <p:nvPr>
+            <p:ph type="title"/>
+          </p:nvPr>
+        </p:nvSpPr>
+        <p:spPr/>
+        <p:txBody>
+          <a:bodyPr/>
+          <a:lstStyle/>
+          <a:p>
+            <a:r>
+              <a:rPr lang="pt-BR" dirty="0" smtClean="0"/>
+              <a:t>Interface do Usuário</a:t>
+            </a:r>
+            <a:endParaRPr lang="pt-BR" dirty="0"/>
+          </a:p>
+        </p:txBody>
+      </p:sp>
+      <p:sp>
+        <p:nvSpPr>
+          <p:cNvPr id="3" name="Content Placeholder 2"/>
+          <p:cNvSpPr>
+            <a:spLocks noGrp="1"/>
+          </p:cNvSpPr>
+          <p:nvPr>
+            <p:ph idx="1"/>
+          </p:nvPr>
+        </p:nvSpPr>
+        <p:spPr/>
+        <p:txBody>
+          <a:bodyPr/>
+          <a:lstStyle/>
+          <a:p>
+            <a:r>
+              <a:rPr lang="pt-BR" dirty="0" smtClean="0"/>
+              <a:t>Citar </a:t>
+            </a:r>
+            <a:r>
+              <a:rPr lang="pt-BR" dirty="0" err="1" smtClean="0"/>
+              <a:t>Guidelines</a:t>
+            </a:r>
+            <a:r>
+              <a:rPr lang="pt-BR" dirty="0" smtClean="0"/>
+              <a:t>.</a:t>
+            </a:r>
+          </a:p>
+          <a:p>
+            <a:r>
+              <a:rPr lang="pt-BR" dirty="0" smtClean="0"/>
+              <a:t>Mostrar os protótipos de baixa fidelidade.</a:t>
+            </a:r>
+          </a:p>
+          <a:p>
+            <a:r>
+              <a:rPr lang="pt-BR" dirty="0" smtClean="0"/>
+              <a:t>Mostrar os protótipos de alta fidelidade.</a:t>
+            </a:r>
+            <a:endParaRPr lang="pt-BR" dirty="0"/>
+          </a:p>
+        </p:txBody>
+      </p:sp>
+    </p:spTree>
+    <p:extLst>
+      <p:ext uri="{BB962C8B-B14F-4D97-AF65-F5344CB8AC3E}">
+        <p14:creationId xmlns:p14="http://schemas.microsoft.com/office/powerpoint/2010/main" val="2991806747"/>
+      </p:ext>
+    </p:extLst>
+  </p:cSld>
+  <p:clrMapOvr>
+    <a:masterClrMapping/>
+  </p:clrMapOvr>
+  <p:timing>
+    <p:tnLst>
+      <p:par>
+        <p:cTn id="1" dur="indefinite" restart="never" nodeType="tmRoot"/>
+      </p:par>
+    </p:tnLst>
+  </p:timing>
+</p:sld>
+</file>
+
+<file path=ppt/slides/slide13.xml><?xml version="1.0" encoding="utf-8"?>
+<p:sld xmlns:a="http://schemas.openxmlformats.org/drawingml/2006/main" xmlns:r="http://schemas.openxmlformats.org/officeDocument/2006/relationships" xmlns:p="http://schemas.openxmlformats.org/presentationml/2006/main">
+  <p:cSld>
+    <p:spTree>
+      <p:nvGrpSpPr>
+        <p:cNvPr id="1" name=""/>
+        <p:cNvGrpSpPr/>
+        <p:nvPr/>
+      </p:nvGrpSpPr>
+      <p:grpSpPr>
+        <a:xfrm>
+          <a:off x="0" y="0"/>
+          <a:ext cx="0" cy="0"/>
+          <a:chOff x="0" y="0"/>
+          <a:chExt cx="0" cy="0"/>
+        </a:xfrm>
+      </p:grpSpPr>
+      <p:sp>
+        <p:nvSpPr>
+          <p:cNvPr id="2" name="Title 1"/>
+          <p:cNvSpPr>
+            <a:spLocks noGrp="1"/>
+          </p:cNvSpPr>
+          <p:nvPr>
+            <p:ph type="title"/>
+          </p:nvPr>
+        </p:nvSpPr>
+        <p:spPr/>
+        <p:txBody>
+          <a:bodyPr/>
+          <a:lstStyle/>
+          <a:p>
+            <a:r>
+              <a:rPr lang="pt-BR" dirty="0" smtClean="0"/>
+              <a:t>Banco de Dados</a:t>
+            </a:r>
+            <a:endParaRPr lang="pt-BR" dirty="0"/>
+          </a:p>
+        </p:txBody>
+      </p:sp>
+      <p:pic>
+        <p:nvPicPr>
+          <p:cNvPr id="5" name="Imagem 4"/>
+          <p:cNvPicPr>
+            <a:picLocks noChangeAspect="1"/>
+          </p:cNvPicPr>
+          <p:nvPr/>
+        </p:nvPicPr>
+        <p:blipFill>
+          <a:blip r:embed="rId2">
+            <a:extLst>
+              <a:ext uri="{28A0092B-C50C-407E-A947-70E740481C1C}">
+                <a14:useLocalDpi xmlns:a14="http://schemas.microsoft.com/office/drawing/2010/main" val="0"/>
+              </a:ext>
+            </a:extLst>
+          </a:blip>
+          <a:stretch>
+            <a:fillRect/>
+          </a:stretch>
+        </p:blipFill>
+        <p:spPr>
+          <a:xfrm>
+            <a:off x="0" y="1417638"/>
+            <a:ext cx="9144000" cy="4691790"/>
+          </a:xfrm>
+          <a:prstGeom prst="rect">
+            <a:avLst/>
+          </a:prstGeom>
+        </p:spPr>
+      </p:pic>
+    </p:spTree>
+    <p:extLst>
+      <p:ext uri="{BB962C8B-B14F-4D97-AF65-F5344CB8AC3E}">
+        <p14:creationId xmlns:p14="http://schemas.microsoft.com/office/powerpoint/2010/main" val="3218491669"/>
+      </p:ext>
+    </p:extLst>
+  </p:cSld>
+  <p:clrMapOvr>
+    <a:masterClrMapping/>
+  </p:clrMapOvr>
+  <p:timing>
+    <p:tnLst>
+      <p:par>
+        <p:cTn id="1" dur="indefinite" restart="never" nodeType="tmRoot"/>
+      </p:par>
+    </p:tnLst>
+  </p:timing>
+</p:sld>
+</file>
+
+<file path=ppt/slides/slide14.xml><?xml version="1.0" encoding="utf-8"?>
+<p:sld xmlns:a="http://schemas.openxmlformats.org/drawingml/2006/main" xmlns:r="http://schemas.openxmlformats.org/officeDocument/2006/relationships" xmlns:p="http://schemas.openxmlformats.org/presentationml/2006/main">
+  <p:cSld>
+    <p:spTree>
+      <p:nvGrpSpPr>
+        <p:cNvPr id="1" name=""/>
+        <p:cNvGrpSpPr/>
+        <p:nvPr/>
+      </p:nvGrpSpPr>
+      <p:grpSpPr>
+        <a:xfrm>
+          <a:off x="0" y="0"/>
+          <a:ext cx="0" cy="0"/>
+          <a:chOff x="0" y="0"/>
+          <a:chExt cx="0" cy="0"/>
+        </a:xfrm>
+      </p:grpSpPr>
+      <p:sp>
+        <p:nvSpPr>
+          <p:cNvPr id="2" name="Title 1"/>
+          <p:cNvSpPr>
+            <a:spLocks noGrp="1"/>
+          </p:cNvSpPr>
+          <p:nvPr>
+            <p:ph type="title"/>
+          </p:nvPr>
+        </p:nvSpPr>
+        <p:spPr/>
+        <p:txBody>
+          <a:bodyPr/>
+          <a:lstStyle/>
+          <a:p>
+            <a:r>
+              <a:rPr lang="pt-BR" dirty="0" smtClean="0"/>
+              <a:t>Banco de Dados</a:t>
+            </a:r>
+            <a:endParaRPr lang="pt-BR" dirty="0"/>
+          </a:p>
+        </p:txBody>
+      </p:sp>
+      <p:pic>
+        <p:nvPicPr>
+          <p:cNvPr id="3" name="Imagem 2"/>
+          <p:cNvPicPr>
+            <a:picLocks noChangeAspect="1"/>
+          </p:cNvPicPr>
+          <p:nvPr/>
+        </p:nvPicPr>
+        <p:blipFill>
+          <a:blip r:embed="rId2">
+            <a:extLst>
+              <a:ext uri="{28A0092B-C50C-407E-A947-70E740481C1C}">
+                <a14:useLocalDpi xmlns:a14="http://schemas.microsoft.com/office/drawing/2010/main" val="0"/>
+              </a:ext>
+            </a:extLst>
+          </a:blip>
+          <a:stretch>
+            <a:fillRect/>
+          </a:stretch>
+        </p:blipFill>
+        <p:spPr>
+          <a:xfrm>
+            <a:off x="0" y="1241612"/>
+            <a:ext cx="9144000" cy="4923692"/>
+          </a:xfrm>
+          <a:prstGeom prst="rect">
+            <a:avLst/>
+          </a:prstGeom>
+        </p:spPr>
+      </p:pic>
+    </p:spTree>
+    <p:extLst>
+      <p:ext uri="{BB962C8B-B14F-4D97-AF65-F5344CB8AC3E}">
+        <p14:creationId xmlns:p14="http://schemas.microsoft.com/office/powerpoint/2010/main" val="3016240961"/>
+      </p:ext>
+    </p:extLst>
+  </p:cSld>
+  <p:clrMapOvr>
+    <a:masterClrMapping/>
+  </p:clrMapOvr>
+  <p:timing>
+    <p:tnLst>
+      <p:par>
+        <p:cTn id="1" dur="indefinite" restart="never" nodeType="tmRoot"/>
+      </p:par>
+    </p:tnLst>
+  </p:timing>
+</p:sld>
+</file>
+
+<file path=ppt/slides/slide15.xml><?xml version="1.0" encoding="utf-8"?>
+<p:sld xmlns:a="http://schemas.openxmlformats.org/drawingml/2006/main" xmlns:r="http://schemas.openxmlformats.org/officeDocument/2006/relationships" xmlns:p="http://schemas.openxmlformats.org/presentationml/2006/main">
+  <p:cSld>
+    <p:spTree>
+      <p:nvGrpSpPr>
+        <p:cNvPr id="1" name=""/>
+        <p:cNvGrpSpPr/>
+        <p:nvPr/>
+      </p:nvGrpSpPr>
+      <p:grpSpPr>
+        <a:xfrm>
+          <a:off x="0" y="0"/>
+          <a:ext cx="0" cy="0"/>
+          <a:chOff x="0" y="0"/>
+          <a:chExt cx="0" cy="0"/>
+        </a:xfrm>
+      </p:grpSpPr>
+      <p:sp>
+        <p:nvSpPr>
+          <p:cNvPr id="2" name="Title 1"/>
+          <p:cNvSpPr>
+            <a:spLocks noGrp="1"/>
+          </p:cNvSpPr>
+          <p:nvPr>
+            <p:ph type="title"/>
+          </p:nvPr>
+        </p:nvSpPr>
+        <p:spPr/>
+        <p:txBody>
+          <a:bodyPr/>
+          <a:lstStyle/>
+          <a:p>
+            <a:r>
+              <a:rPr lang="pt-BR" dirty="0" smtClean="0"/>
+              <a:t>Arquitetura do Software</a:t>
+            </a:r>
+            <a:endParaRPr lang="pt-BR" dirty="0"/>
+          </a:p>
+        </p:txBody>
+      </p:sp>
+      <p:sp>
+        <p:nvSpPr>
+          <p:cNvPr id="3" name="Content Placeholder 2"/>
+          <p:cNvSpPr>
+            <a:spLocks noGrp="1"/>
+          </p:cNvSpPr>
+          <p:nvPr>
+            <p:ph idx="1"/>
+          </p:nvPr>
+        </p:nvSpPr>
+        <p:spPr>
+          <a:xfrm>
+            <a:off x="323528" y="1600199"/>
+            <a:ext cx="6203032" cy="4525963"/>
+          </a:xfrm>
+        </p:spPr>
+        <p:txBody>
+          <a:bodyPr>
+            <a:normAutofit fontScale="92500"/>
+          </a:bodyPr>
+          <a:lstStyle/>
+          <a:p>
+            <a:pPr algn="just"/>
+            <a:r>
+              <a:rPr lang="pt-BR" sz="2800" dirty="0" smtClean="0"/>
+              <a:t>A aplicação é iniciada com uma pagina JSP para montar o layout juntamente com as paginas HTML. </a:t>
+            </a:r>
+            <a:r>
+              <a:rPr lang="pt-BR" sz="2800" dirty="0"/>
+              <a:t>Com o surgimento de uma requisição de dados os SERVLET’S são chamados para atender os processos, utilizando os dados presentes no VO, que armazenam as informações contidas no Banco de Dados e as transportam, para atender as requisições solicitadas, enviando novamente às páginas JSP para ser exibida ao cliente.</a:t>
+            </a:r>
+          </a:p>
+          <a:p>
+            <a:endParaRPr lang="pt-BR" dirty="0"/>
+          </a:p>
+        </p:txBody>
+      </p:sp>
+      <p:sp>
+        <p:nvSpPr>
+          <p:cNvPr id="4" name="Rectangle 2"/>
+          <p:cNvSpPr>
+            <a:spLocks noChangeArrowheads="1"/>
+          </p:cNvSpPr>
+          <p:nvPr/>
+        </p:nvSpPr>
+        <p:spPr bwMode="auto">
+          <a:xfrm>
+            <a:off x="5198780" y="2652346"/>
+            <a:ext cx="7077059" cy="0"/>
+          </a:xfrm>
+          <a:prstGeom prst="rect">
+            <a:avLst/>
+          </a:prstGeom>
+          <a:noFill/>
+          <a:ln>
+            <a:noFill/>
+          </a:ln>
+          <a:effectLst/>
+          <a:extLst>
+            <a:ext uri="{909E8E84-426E-40DD-AFC4-6F175D3DCCD1}">
+              <a14:hiddenFill xmlns:a14="http://schemas.microsoft.com/office/drawing/2010/main">
+                <a:solidFill>
+                  <a:schemeClr val="accent1"/>
+                </a:solidFill>
+              </a14:hiddenFill>
+            </a:ext>
+            <a:ext uri="{91240B29-F687-4F45-9708-019B960494DF}">
+              <a14:hiddenLine xmlns:a14="http://schemas.microsoft.com/office/drawing/2010/main" w="9525">
+                <a:solidFill>
+                  <a:schemeClr val="tx1"/>
+                </a:solidFill>
+                <a:miter lim="800000"/>
+                <a:headEnd/>
+                <a:tailEnd/>
+              </a14:hiddenLine>
+            </a:ext>
+            <a:ext uri="{AF507438-7753-43E0-B8FC-AC1667EBCBE1}">
+              <a14:hiddenEffects xmlns:a14="http://schemas.microsoft.com/office/drawing/2010/main">
+                <a:effectLst>
+                  <a:outerShdw dist="35921" dir="2700000" algn="ctr" rotWithShape="0">
+                    <a:schemeClr val="bg2"/>
+                  </a:outerShdw>
+                </a:effectLst>
+              </a14:hiddenEffects>
+            </a:ext>
+          </a:extLst>
+        </p:spPr>
+        <p:txBody>
+          <a:bodyPr vert="horz" wrap="square" lIns="91440" tIns="45720" rIns="91440" bIns="45720" numCol="1" anchor="ctr" anchorCtr="0" compatLnSpc="1">
+            <a:prstTxWarp prst="textNoShape">
+              <a:avLst/>
+            </a:prstTxWarp>
+            <a:spAutoFit/>
+          </a:bodyPr>
+          <a:lstStyle/>
+          <a:p>
+            <a:endParaRPr lang="pt-BR"/>
+          </a:p>
+        </p:txBody>
+      </p:sp>
+      <p:pic>
+        <p:nvPicPr>
+          <p:cNvPr id="1025" name="Picture 1" descr="diagramabunito"/>
+          <p:cNvPicPr>
+            <a:picLocks noChangeAspect="1" noChangeArrowheads="1"/>
+          </p:cNvPicPr>
+          <p:nvPr/>
+        </p:nvPicPr>
+        <p:blipFill>
+          <a:blip r:embed="rId2">
+            <a:extLst>
+              <a:ext uri="{28A0092B-C50C-407E-A947-70E740481C1C}">
+                <a14:useLocalDpi xmlns:a14="http://schemas.microsoft.com/office/drawing/2010/main" val="0"/>
+              </a:ext>
+            </a:extLst>
+          </a:blip>
+          <a:srcRect/>
+          <a:stretch>
+            <a:fillRect/>
+          </a:stretch>
+        </p:blipFill>
+        <p:spPr bwMode="auto">
+          <a:xfrm>
+            <a:off x="6853039" y="2203946"/>
+            <a:ext cx="2290961" cy="3318468"/>
+          </a:xfrm>
+          <a:prstGeom prst="rect">
+            <a:avLst/>
+          </a:prstGeom>
+          <a:noFill/>
+          <a:extLst>
+            <a:ext uri="{909E8E84-426E-40DD-AFC4-6F175D3DCCD1}">
+              <a14:hiddenFill xmlns:a14="http://schemas.microsoft.com/office/drawing/2010/main">
+                <a:solidFill>
+                  <a:srgbClr val="FFFFFF"/>
+                </a:solidFill>
+              </a14:hiddenFill>
+            </a:ext>
+          </a:extLst>
+        </p:spPr>
+      </p:pic>
+    </p:spTree>
+    <p:extLst>
+      <p:ext uri="{BB962C8B-B14F-4D97-AF65-F5344CB8AC3E}">
+        <p14:creationId xmlns:p14="http://schemas.microsoft.com/office/powerpoint/2010/main" val="2341494487"/>
+      </p:ext>
+    </p:extLst>
+  </p:cSld>
+  <p:clrMapOvr>
+    <a:masterClrMapping/>
+  </p:clrMapOvr>
+  <p:timing>
+    <p:tnLst>
+      <p:par>
+        <p:cTn id="1" dur="indefinite" restart="never" nodeType="tmRoot"/>
+      </p:par>
+    </p:tnLst>
+  </p:timing>
+</p:sld>
+</file>
+
+<file path=ppt/slides/slide16.xml><?xml version="1.0" encoding="utf-8"?>
+<p:sld xmlns:a="http://schemas.openxmlformats.org/drawingml/2006/main" xmlns:r="http://schemas.openxmlformats.org/officeDocument/2006/relationships" xmlns:p="http://schemas.openxmlformats.org/presentationml/2006/main">
+  <p:cSld>
+    <p:spTree>
+      <p:nvGrpSpPr>
+        <p:cNvPr id="1" name=""/>
+        <p:cNvGrpSpPr/>
+        <p:nvPr/>
+      </p:nvGrpSpPr>
+      <p:grpSpPr>
+        <a:xfrm>
+          <a:off x="0" y="0"/>
+          <a:ext cx="0" cy="0"/>
+          <a:chOff x="0" y="0"/>
+          <a:chExt cx="0" cy="0"/>
+        </a:xfrm>
+      </p:grpSpPr>
+      <p:sp>
+        <p:nvSpPr>
+          <p:cNvPr id="2" name="Title 1"/>
+          <p:cNvSpPr>
+            <a:spLocks noGrp="1"/>
+          </p:cNvSpPr>
+          <p:nvPr>
+            <p:ph type="title"/>
+          </p:nvPr>
+        </p:nvSpPr>
+        <p:spPr/>
+        <p:txBody>
+          <a:bodyPr/>
+          <a:lstStyle/>
+          <a:p>
+            <a:r>
+              <a:rPr lang="pt-BR" dirty="0" smtClean="0"/>
+              <a:t>Arquitetura do Software</a:t>
+            </a:r>
+            <a:endParaRPr lang="pt-BR" dirty="0"/>
+          </a:p>
+        </p:txBody>
+      </p:sp>
+      <p:pic>
+        <p:nvPicPr>
+          <p:cNvPr id="4" name="Imagem 3"/>
+          <p:cNvPicPr>
+            <a:picLocks noChangeAspect="1"/>
+          </p:cNvPicPr>
+          <p:nvPr/>
+        </p:nvPicPr>
+        <p:blipFill>
+          <a:blip r:embed="rId2">
+            <a:extLst>
+              <a:ext uri="{28A0092B-C50C-407E-A947-70E740481C1C}">
+                <a14:useLocalDpi xmlns:a14="http://schemas.microsoft.com/office/drawing/2010/main" val="0"/>
+              </a:ext>
+            </a:extLst>
+          </a:blip>
+          <a:stretch>
+            <a:fillRect/>
+          </a:stretch>
+        </p:blipFill>
+        <p:spPr>
+          <a:xfrm>
+            <a:off x="0" y="1628800"/>
+            <a:ext cx="9144000" cy="4531429"/>
+          </a:xfrm>
+          <a:prstGeom prst="rect">
+            <a:avLst/>
+          </a:prstGeom>
+        </p:spPr>
+      </p:pic>
+      <p:sp>
+        <p:nvSpPr>
+          <p:cNvPr id="5" name="Content Placeholder 2"/>
+          <p:cNvSpPr>
+            <a:spLocks noGrp="1"/>
+          </p:cNvSpPr>
+          <p:nvPr>
+            <p:ph idx="1"/>
+          </p:nvPr>
+        </p:nvSpPr>
+        <p:spPr>
+          <a:xfrm>
+            <a:off x="107504" y="1151310"/>
+            <a:ext cx="7139136" cy="532656"/>
+          </a:xfrm>
+        </p:spPr>
+        <p:txBody>
+          <a:bodyPr>
+            <a:normAutofit lnSpcReduction="10000"/>
+          </a:bodyPr>
+          <a:lstStyle/>
+          <a:p>
+            <a:r>
+              <a:rPr lang="pt-BR" dirty="0" smtClean="0"/>
+              <a:t>Caso de Uso: UC02 – Cadastrar Paciente</a:t>
+            </a:r>
+            <a:endParaRPr lang="pt-BR" dirty="0"/>
+          </a:p>
+        </p:txBody>
+      </p:sp>
+    </p:spTree>
+    <p:extLst>
+      <p:ext uri="{BB962C8B-B14F-4D97-AF65-F5344CB8AC3E}">
+        <p14:creationId xmlns:p14="http://schemas.microsoft.com/office/powerpoint/2010/main" val="3938777000"/>
+      </p:ext>
+    </p:extLst>
+  </p:cSld>
+  <p:clrMapOvr>
+    <a:masterClrMapping/>
+  </p:clrMapOvr>
+  <p:timing>
+    <p:tnLst>
+      <p:par>
+        <p:cTn id="1" dur="indefinite" restart="never" nodeType="tmRoot"/>
+      </p:par>
+    </p:tnLst>
+  </p:timing>
+</p:sld>
+</file>
+
+<file path=ppt/slides/slide17.xml><?xml version="1.0" encoding="utf-8"?>
+<p:sld xmlns:a="http://schemas.openxmlformats.org/drawingml/2006/main" xmlns:r="http://schemas.openxmlformats.org/officeDocument/2006/relationships" xmlns:p="http://schemas.openxmlformats.org/presentationml/2006/main">
+  <p:cSld>
+    <p:spTree>
+      <p:nvGrpSpPr>
+        <p:cNvPr id="1" name=""/>
+        <p:cNvGrpSpPr/>
+        <p:nvPr/>
+      </p:nvGrpSpPr>
+      <p:grpSpPr>
+        <a:xfrm>
+          <a:off x="0" y="0"/>
+          <a:ext cx="0" cy="0"/>
+          <a:chOff x="0" y="0"/>
+          <a:chExt cx="0" cy="0"/>
+        </a:xfrm>
+      </p:grpSpPr>
+      <p:sp>
+        <p:nvSpPr>
           <p:cNvPr id="2" name="Título 1"/>
           <p:cNvSpPr>
             <a:spLocks noGrp="1"/>
@@ -2149,7 +3028,7 @@
           <a:p>
             <a:r>
               <a:rPr lang="pt-BR" dirty="0" smtClean="0"/>
-              <a:t>Conclusão</a:t>
+              <a:t>Inspeção de Usabilidade</a:t>
             </a:r>
             <a:endParaRPr lang="pt-BR" dirty="0"/>
           </a:p>
@@ -2174,25 +3053,137 @@
           <a:p>
             <a:r>
               <a:rPr lang="pt-BR" dirty="0" smtClean="0"/>
-              <a:t>Conclusão e trabalhos futuros</a:t>
-            </a:r>
+              <a:t>Descrever os resultados da inspeção de usabilidade.</a:t>
+            </a:r>
+          </a:p>
+          <a:p>
             <a:r>
               <a:rPr lang="pt-BR" dirty="0" smtClean="0"/>
+              <a:t>No caso de terem sido usadas heurísticas, citar as heurísticas utilizadas.</a:t>
+            </a:r>
+          </a:p>
+          <a:p>
+            <a:endParaRPr lang="pt-BR" dirty="0"/>
+          </a:p>
+          <a:p>
+            <a:r>
+              <a:rPr lang="pt-BR" dirty="0"/>
+              <a:t>Máximo 2 </a:t>
+            </a:r>
+            <a:r>
+              <a:rPr lang="pt-BR" dirty="0" smtClean="0"/>
+              <a:t>slides</a:t>
+            </a:r>
+            <a:endParaRPr lang="pt-BR" dirty="0"/>
+          </a:p>
+        </p:txBody>
+      </p:sp>
+    </p:spTree>
+    <p:extLst>
+      <p:ext uri="{BB962C8B-B14F-4D97-AF65-F5344CB8AC3E}">
+        <p14:creationId xmlns:p14="http://schemas.microsoft.com/office/powerpoint/2010/main" val="403771080"/>
+      </p:ext>
+    </p:extLst>
+  </p:cSld>
+  <p:clrMapOvr>
+    <a:masterClrMapping/>
+  </p:clrMapOvr>
+</p:sld>
+</file>
+
+<file path=ppt/slides/slide18.xml><?xml version="1.0" encoding="utf-8"?>
+<p:sld xmlns:a="http://schemas.openxmlformats.org/drawingml/2006/main" xmlns:r="http://schemas.openxmlformats.org/officeDocument/2006/relationships" xmlns:p="http://schemas.openxmlformats.org/presentationml/2006/main">
+  <p:cSld>
+    <p:spTree>
+      <p:nvGrpSpPr>
+        <p:cNvPr id="1" name=""/>
+        <p:cNvGrpSpPr/>
+        <p:nvPr/>
+      </p:nvGrpSpPr>
+      <p:grpSpPr>
+        <a:xfrm>
+          <a:off x="0" y="0"/>
+          <a:ext cx="0" cy="0"/>
+          <a:chOff x="0" y="0"/>
+          <a:chExt cx="0" cy="0"/>
+        </a:xfrm>
+      </p:grpSpPr>
+      <p:sp>
+        <p:nvSpPr>
+          <p:cNvPr id="2" name="Título 1"/>
+          <p:cNvSpPr>
+            <a:spLocks noGrp="1"/>
+          </p:cNvSpPr>
+          <p:nvPr>
+            <p:ph type="title"/>
+          </p:nvPr>
+        </p:nvSpPr>
+        <p:spPr/>
+        <p:txBody>
+          <a:bodyPr>
+            <a:normAutofit/>
+          </a:bodyPr>
+          <a:lstStyle/>
+          <a:p>
+            <a:r>
+              <a:rPr lang="pt-BR" dirty="0" smtClean="0"/>
+              <a:t>Conclusão</a:t>
+            </a:r>
+            <a:endParaRPr lang="pt-BR" dirty="0"/>
+          </a:p>
+        </p:txBody>
+      </p:sp>
+      <p:sp>
+        <p:nvSpPr>
+          <p:cNvPr id="3" name="Espaço Reservado para Conteúdo 2"/>
+          <p:cNvSpPr>
+            <a:spLocks noGrp="1"/>
+          </p:cNvSpPr>
+          <p:nvPr>
+            <p:ph idx="1"/>
+          </p:nvPr>
+        </p:nvSpPr>
+        <p:spPr>
+          <a:xfrm>
+            <a:off x="457200" y="1417638"/>
+            <a:ext cx="8229600" cy="4525963"/>
+          </a:xfrm>
+        </p:spPr>
+        <p:txBody>
+          <a:bodyPr>
+            <a:noAutofit/>
+          </a:bodyPr>
+          <a:lstStyle/>
+          <a:p>
+            <a:r>
+              <a:rPr lang="pt-BR" sz="2400" dirty="0"/>
+              <a:t>O ponto principal do sistema é a possibilidade de controle e gestão de exames para uma clínica, além de facilidade para o paciente que for realizar um exame</a:t>
+            </a:r>
+            <a:r>
+              <a:rPr lang="pt-BR" sz="2400" dirty="0" smtClean="0"/>
               <a:t>.</a:t>
             </a:r>
           </a:p>
           <a:p>
-            <a:endParaRPr lang="pt-BR" dirty="0"/>
-          </a:p>
-          <a:p>
-            <a:r>
-              <a:rPr lang="pt-BR" dirty="0" smtClean="0"/>
-              <a:t>1 slide</a:t>
-            </a:r>
-            <a:endParaRPr lang="pt-BR" dirty="0"/>
-          </a:p>
-          <a:p>
-            <a:endParaRPr lang="pt-BR" dirty="0"/>
+            <a:endParaRPr lang="pt-BR" sz="2400" dirty="0"/>
+          </a:p>
+          <a:p>
+            <a:r>
+              <a:rPr lang="pt-BR" sz="2400" dirty="0" smtClean="0"/>
+              <a:t>Neste primeiro momento foram selecionadas apenas algumas funcionalidades com o objetivo de validar o sistema junto com o usuário final. No trabalho futuro serão incluídas novas funcionalidades.</a:t>
+            </a:r>
+          </a:p>
+          <a:p>
+            <a:pPr marL="0" indent="0">
+              <a:buNone/>
+            </a:pPr>
+            <a:endParaRPr lang="pt-BR" sz="2400" dirty="0" smtClean="0"/>
+          </a:p>
+          <a:p>
+            <a:r>
+              <a:rPr lang="pt-BR" sz="2400" dirty="0"/>
+              <a:t>No futuro poderá ser acrescentado uma funcionalidade de coleta domiciliar, agendamento de exames online no website da clínica e o ajuste do website para dispositivos mobile.</a:t>
+            </a:r>
           </a:p>
         </p:txBody>
       </p:sp>
@@ -2267,35 +3258,26 @@
           <a:lstStyle/>
           <a:p>
             <a:r>
-              <a:rPr lang="pt-BR" dirty="0" smtClean="0"/>
-              <a:t>Descrever de forma sucinta o projeto</a:t>
-            </a:r>
-            <a:r>
-              <a:rPr lang="pt-BR" dirty="0" smtClean="0"/>
-              <a:t>.</a:t>
-            </a:r>
-          </a:p>
-          <a:p>
-            <a:r>
               <a:rPr lang="pt-BR" dirty="0"/>
-              <a:t>Descrever brevemente o problema e contextualização que fundamentaram o projeto</a:t>
-            </a:r>
-            <a:r>
-              <a:rPr lang="pt-BR" dirty="0" smtClean="0"/>
-              <a:t>.</a:t>
-            </a:r>
-          </a:p>
-          <a:p>
-            <a:endParaRPr lang="pt-BR" dirty="0"/>
-          </a:p>
-          <a:p>
-            <a:r>
-              <a:rPr lang="pt-BR" dirty="0" smtClean="0"/>
-              <a:t>Máximo 2 slides</a:t>
-            </a:r>
-            <a:endParaRPr lang="pt-BR" dirty="0" smtClean="0"/>
-          </a:p>
-          <a:p>
+              <a:t>Sistema de gerenciamento, gestão e controle de exames, visando facilidade e praticidade para o paciente.</a:t>
+            </a:r>
+          </a:p>
+          <a:p>
+            <a:r>
+              <a:rPr lang="pt-BR" dirty="0"/>
+              <a:t>Usuários: Paciente, Gestor e Administrador.</a:t>
+            </a:r>
+          </a:p>
+          <a:p>
+            <a:r>
+              <a:rPr lang="pt-BR" dirty="0"/>
+              <a:t>Ambientes: WebSite.</a:t>
+            </a:r>
+          </a:p>
+          <a:p>
+            <a:pPr marL="0" indent="0">
+              <a:buNone/>
+            </a:pPr>
             <a:endParaRPr lang="pt-BR" dirty="0"/>
           </a:p>
         </p:txBody>
@@ -2339,7 +3321,7 @@
       </p:grpSpPr>
       <p:sp>
         <p:nvSpPr>
-          <p:cNvPr id="2" name="Título 1"/>
+          <p:cNvPr id="2" name="Title 1"/>
           <p:cNvSpPr>
             <a:spLocks noGrp="1"/>
           </p:cNvSpPr>
@@ -2354,7 +3336,7 @@
           <a:p>
             <a:r>
               <a:rPr lang="pt-BR" dirty="0" smtClean="0"/>
-              <a:t>Visão do Sistema</a:t>
+              <a:t>Apresentação do Projeto</a:t>
             </a:r>
             <a:endParaRPr lang="pt-BR" dirty="0"/>
           </a:p>
@@ -2362,7 +3344,7 @@
       </p:sp>
       <p:sp>
         <p:nvSpPr>
-          <p:cNvPr id="3" name="Marcador de Posição de Conteúdo 2"/>
+          <p:cNvPr id="3" name="Content Placeholder 2"/>
           <p:cNvSpPr>
             <a:spLocks noGrp="1"/>
           </p:cNvSpPr>
@@ -2372,47 +3354,44 @@
         </p:nvSpPr>
         <p:spPr/>
         <p:txBody>
-          <a:bodyPr/>
+          <a:bodyPr>
+            <a:normAutofit/>
+          </a:bodyPr>
           <a:lstStyle/>
           <a:p>
-            <a:r>
-              <a:rPr lang="pt-BR" dirty="0" smtClean="0"/>
-              <a:t>Citar </a:t>
-            </a:r>
-            <a:r>
-              <a:rPr lang="pt-BR" dirty="0"/>
-              <a:t>os usuários e o ambiente do usuário.</a:t>
-            </a:r>
-          </a:p>
-          <a:p>
-            <a:r>
-              <a:rPr lang="pt-BR" dirty="0"/>
-              <a:t>Para estes dar destaque para as necessidades </a:t>
-            </a:r>
-            <a:r>
-              <a:rPr lang="pt-BR" dirty="0" smtClean="0"/>
-              <a:t>dos </a:t>
-            </a:r>
-            <a:r>
-              <a:rPr lang="pt-BR" dirty="0"/>
-              <a:t>usuário mais </a:t>
-            </a:r>
-            <a:r>
-              <a:rPr lang="pt-BR" dirty="0" smtClean="0"/>
-              <a:t>importantes.</a:t>
-            </a:r>
-          </a:p>
-          <a:p>
-            <a:endParaRPr lang="pt-BR" dirty="0"/>
-          </a:p>
-          <a:p>
-            <a:r>
-              <a:rPr lang="pt-BR" dirty="0"/>
-              <a:t>Máximo 2 slides</a:t>
-            </a:r>
-          </a:p>
-          <a:p>
-            <a:endParaRPr lang="pt-BR" dirty="0"/>
+            <a:pPr marL="342900" lvl="2" indent="-342900"/>
+            <a:r>
+              <a:rPr lang="pt-BR" sz="2800" dirty="0" smtClean="0">
+                <a:latin typeface="Tahoma" panose="020B0604030504040204" pitchFamily="34" charset="0"/>
+                <a:ea typeface="Tahoma" panose="020B0604030504040204" pitchFamily="34" charset="0"/>
+                <a:cs typeface="Tahoma" panose="020B0604030504040204" pitchFamily="34" charset="0"/>
+              </a:rPr>
+              <a:t>Analisando </a:t>
+            </a:r>
+            <a:r>
+              <a:rPr lang="pt-BR" sz="2800" dirty="0">
+                <a:latin typeface="Tahoma" panose="020B0604030504040204" pitchFamily="34" charset="0"/>
+                <a:ea typeface="Tahoma" panose="020B0604030504040204" pitchFamily="34" charset="0"/>
+                <a:cs typeface="Tahoma" panose="020B0604030504040204" pitchFamily="34" charset="0"/>
+              </a:rPr>
+              <a:t>outros sistemas e interfaces (web) de gerenciamento de exames pudemos constatar que existem muitas falhas e </a:t>
+            </a:r>
+            <a:r>
+              <a:rPr lang="pt-BR" sz="2800" dirty="0" smtClean="0">
+                <a:latin typeface="Tahoma" panose="020B0604030504040204" pitchFamily="34" charset="0"/>
+                <a:ea typeface="Tahoma" panose="020B0604030504040204" pitchFamily="34" charset="0"/>
+                <a:cs typeface="Tahoma" panose="020B0604030504040204" pitchFamily="34" charset="0"/>
+              </a:rPr>
+              <a:t>com isso </a:t>
+            </a:r>
+            <a:r>
+              <a:rPr lang="pt-BR" sz="2800" dirty="0">
+                <a:latin typeface="Tahoma" panose="020B0604030504040204" pitchFamily="34" charset="0"/>
+                <a:ea typeface="Tahoma" panose="020B0604030504040204" pitchFamily="34" charset="0"/>
+                <a:cs typeface="Tahoma" panose="020B0604030504040204" pitchFamily="34" charset="0"/>
+              </a:rPr>
+              <a:t>resolvemos desenvolver um sistema que auxiliasse a resolução dessas falhas. O paciente poderá ter acesso ao sistema via website para verificar o andamento e resultado de exames.</a:t>
+            </a:r>
           </a:p>
           <a:p>
             <a:endParaRPr lang="pt-BR" dirty="0"/>
@@ -2422,13 +3401,20 @@
     </p:spTree>
     <p:extLst>
       <p:ext uri="{BB962C8B-B14F-4D97-AF65-F5344CB8AC3E}">
-        <p14:creationId xmlns:p14="http://schemas.microsoft.com/office/powerpoint/2010/main" val="183051565"/>
+        <p14:creationId xmlns:p14="http://schemas.microsoft.com/office/powerpoint/2010/main" val="4094789528"/>
       </p:ext>
     </p:extLst>
   </p:cSld>
   <p:clrMapOvr>
     <a:masterClrMapping/>
   </p:clrMapOvr>
+  <p:timing>
+    <p:tnLst>
+      <p:par>
+        <p:cTn id="1" dur="indefinite" restart="never" nodeType="tmRoot"/>
+      </p:par>
+    </p:tnLst>
+  </p:timing>
 </p:sld>
 </file>
 
@@ -2451,7 +3437,7 @@
       </p:grpSpPr>
       <p:sp>
         <p:nvSpPr>
-          <p:cNvPr id="2" name="Title 1"/>
+          <p:cNvPr id="2" name="Título 1"/>
           <p:cNvSpPr>
             <a:spLocks noGrp="1"/>
           </p:cNvSpPr>
@@ -2466,7 +3452,7 @@
           <a:p>
             <a:r>
               <a:rPr lang="pt-BR" dirty="0" smtClean="0"/>
-              <a:t>Alternativas e Concorrências</a:t>
+              <a:t>Visão do Sistema</a:t>
             </a:r>
             <a:endParaRPr lang="pt-BR" dirty="0"/>
           </a:p>
@@ -2474,7 +3460,7 @@
       </p:sp>
       <p:sp>
         <p:nvSpPr>
-          <p:cNvPr id="3" name="Content Placeholder 2"/>
+          <p:cNvPr id="3" name="Marcador de Posição de Conteúdo 2"/>
           <p:cNvSpPr>
             <a:spLocks noGrp="1"/>
           </p:cNvSpPr>
@@ -2488,18 +3474,30 @@
           <a:lstStyle/>
           <a:p>
             <a:r>
+              <a:rPr lang="pt-BR" dirty="0"/>
+              <a:t>Usuários: Atendente do Balcão, Analista de exames e Executor.</a:t>
+            </a:r>
+          </a:p>
+          <a:p>
+            <a:r>
               <a:rPr lang="pt-BR" dirty="0" smtClean="0"/>
-              <a:t>Citar as alternativas e </a:t>
+              <a:t>Para </a:t>
+            </a:r>
+            <a:r>
+              <a:rPr lang="pt-BR" dirty="0"/>
+              <a:t>estes dar destaque para as necessidades </a:t>
             </a:r>
             <a:r>
               <a:rPr lang="pt-BR" dirty="0" smtClean="0"/>
-              <a:t>concorrências</a:t>
-            </a:r>
-          </a:p>
-          <a:p>
+              <a:t>dos </a:t>
+            </a:r>
+            <a:r>
+              <a:rPr lang="pt-BR" dirty="0"/>
+              <a:t>usuário mais </a:t>
+            </a:r>
             <a:r>
               <a:rPr lang="pt-BR" dirty="0" smtClean="0"/>
-              <a:t>Aqui deve-se falar as justificativas para desenvolvimento do seu trabalho.</a:t>
+              <a:t>importantes.</a:t>
             </a:r>
           </a:p>
           <a:p>
@@ -2507,9 +3505,14 @@
           </a:p>
           <a:p>
             <a:r>
-              <a:rPr lang="pt-BR" dirty="0" smtClean="0"/>
-              <a:t>1 slide</a:t>
-            </a:r>
+              <a:rPr lang="pt-BR" dirty="0"/>
+              <a:t>Máximo 2 slides</a:t>
+            </a:r>
+          </a:p>
+          <a:p>
+            <a:endParaRPr lang="pt-BR" dirty="0"/>
+          </a:p>
+          <a:p>
             <a:endParaRPr lang="pt-BR" dirty="0"/>
           </a:p>
         </p:txBody>
@@ -2517,20 +3520,13 @@
     </p:spTree>
     <p:extLst>
       <p:ext uri="{BB962C8B-B14F-4D97-AF65-F5344CB8AC3E}">
-        <p14:creationId xmlns:p14="http://schemas.microsoft.com/office/powerpoint/2010/main" val="1224710287"/>
+        <p14:creationId xmlns:p14="http://schemas.microsoft.com/office/powerpoint/2010/main" val="183051565"/>
       </p:ext>
     </p:extLst>
   </p:cSld>
   <p:clrMapOvr>
     <a:masterClrMapping/>
   </p:clrMapOvr>
-  <p:timing>
-    <p:tnLst>
-      <p:par>
-        <p:cTn id="1" dur="indefinite" restart="never" nodeType="tmRoot"/>
-      </p:par>
-    </p:tnLst>
-  </p:timing>
 </p:sld>
 </file>
 
@@ -2553,7 +3549,7 @@
       </p:grpSpPr>
       <p:sp>
         <p:nvSpPr>
-          <p:cNvPr id="2" name="Title 1"/>
+          <p:cNvPr id="2" name="Título 1"/>
           <p:cNvSpPr>
             <a:spLocks noGrp="1"/>
           </p:cNvSpPr>
@@ -2568,7 +3564,7 @@
           <a:p>
             <a:r>
               <a:rPr lang="pt-BR" dirty="0" smtClean="0"/>
-              <a:t>Casos de Uso</a:t>
+              <a:t>Visão do Sistema</a:t>
             </a:r>
             <a:endParaRPr lang="pt-BR" dirty="0"/>
           </a:p>
@@ -2576,7 +3572,7 @@
       </p:sp>
       <p:sp>
         <p:nvSpPr>
-          <p:cNvPr id="3" name="Content Placeholder 2"/>
+          <p:cNvPr id="3" name="Marcador de Posição de Conteúdo 2"/>
           <p:cNvSpPr>
             <a:spLocks noGrp="1"/>
           </p:cNvSpPr>
@@ -2586,37 +3582,12 @@
         </p:nvSpPr>
         <p:spPr/>
         <p:txBody>
-          <a:bodyPr>
-            <a:normAutofit/>
-          </a:bodyPr>
+          <a:bodyPr/>
           <a:lstStyle/>
           <a:p>
-            <a:r>
-              <a:rPr lang="pt-BR" dirty="0" smtClean="0"/>
-              <a:t>Identificar os atores e descrever os casos de uso do sistema.</a:t>
-            </a:r>
-          </a:p>
-          <a:p>
-            <a:r>
-              <a:rPr lang="pt-BR" dirty="0" smtClean="0"/>
-              <a:t>Aqui pode-se colocar os diagramas.</a:t>
-            </a:r>
-          </a:p>
-          <a:p>
-            <a:r>
-              <a:rPr lang="pt-BR" dirty="0" smtClean="0"/>
-              <a:t>Caso necessário dividir em vários diagramas.</a:t>
-            </a:r>
-          </a:p>
-          <a:p>
-            <a:r>
-              <a:rPr lang="pt-BR" dirty="0" smtClean="0"/>
-              <a:t>Finalizar mostrando o escopo do sistema e a razão de ter escolhido cada caso de uso presente no escopo</a:t>
-            </a:r>
-            <a:r>
-              <a:rPr lang="pt-BR" dirty="0" smtClean="0"/>
-              <a:t>.</a:t>
-            </a:r>
+            <a:endParaRPr lang="pt-BR" dirty="0"/>
+          </a:p>
+          <a:p>
             <a:endParaRPr lang="pt-BR" dirty="0"/>
           </a:p>
         </p:txBody>
@@ -2624,20 +3595,13 @@
     </p:spTree>
     <p:extLst>
       <p:ext uri="{BB962C8B-B14F-4D97-AF65-F5344CB8AC3E}">
-        <p14:creationId xmlns:p14="http://schemas.microsoft.com/office/powerpoint/2010/main" val="4219396603"/>
+        <p14:creationId xmlns:p14="http://schemas.microsoft.com/office/powerpoint/2010/main" val="3340355780"/>
       </p:ext>
     </p:extLst>
   </p:cSld>
   <p:clrMapOvr>
     <a:masterClrMapping/>
   </p:clrMapOvr>
-  <p:timing>
-    <p:tnLst>
-      <p:par>
-        <p:cTn id="1" dur="indefinite" restart="never" nodeType="tmRoot"/>
-      </p:par>
-    </p:tnLst>
-  </p:timing>
 </p:sld>
 </file>
 
@@ -2675,7 +3639,7 @@
           <a:p>
             <a:r>
               <a:rPr lang="pt-BR" dirty="0" smtClean="0"/>
-              <a:t>Interface do Usuário</a:t>
+              <a:t>Alternativas e Concorrências</a:t>
             </a:r>
             <a:endParaRPr lang="pt-BR" dirty="0"/>
           </a:p>
@@ -2683,7 +3647,7 @@
       </p:sp>
       <p:sp>
         <p:nvSpPr>
-          <p:cNvPr id="3" name="Content Placeholder 2"/>
+          <p:cNvPr id="4" name="Espaço Reservado para Conteúdo 3"/>
           <p:cNvSpPr>
             <a:spLocks noGrp="1"/>
           </p:cNvSpPr>
@@ -2693,33 +3657,70 @@
         </p:nvSpPr>
         <p:spPr/>
         <p:txBody>
-          <a:bodyPr/>
+          <a:bodyPr>
+            <a:normAutofit/>
+          </a:bodyPr>
           <a:lstStyle/>
           <a:p>
-            <a:r>
-              <a:rPr lang="pt-BR" dirty="0" smtClean="0"/>
-              <a:t>Citar </a:t>
-            </a:r>
-            <a:r>
-              <a:rPr lang="pt-BR" dirty="0" err="1" smtClean="0"/>
-              <a:t>Guidelines</a:t>
-            </a:r>
-            <a:r>
-              <a:rPr lang="pt-BR" dirty="0" smtClean="0"/>
-              <a:t>.</a:t>
-            </a:r>
-          </a:p>
-          <a:p>
-            <a:r>
-              <a:rPr lang="pt-BR" dirty="0" smtClean="0"/>
-              <a:t>Mostrar os protótipos de baixa fidelidade.</a:t>
-            </a:r>
-          </a:p>
-          <a:p>
-            <a:r>
-              <a:rPr lang="pt-BR" dirty="0" smtClean="0"/>
-              <a:t>Mostrar os protótipos de alta fidelidade.</a:t>
-            </a:r>
+            <a:pPr lvl="0"/>
+            <a:r>
+              <a:rPr lang="pt-BR" sz="2400" dirty="0"/>
+              <a:t>Concorrente analisado: Confiance Medicina </a:t>
+            </a:r>
+            <a:r>
+              <a:rPr lang="pt-BR" sz="2400" dirty="0" smtClean="0"/>
+              <a:t>Diagnóstica</a:t>
+            </a:r>
+          </a:p>
+          <a:p>
+            <a:pPr lvl="1"/>
+            <a:r>
+              <a:rPr lang="pt-BR" sz="2400" dirty="0" smtClean="0"/>
+              <a:t>Botões </a:t>
+            </a:r>
+            <a:r>
+              <a:rPr lang="pt-BR" sz="2400" dirty="0"/>
+              <a:t>não trabalham da forma que deveriam e não atendem as expectativas do </a:t>
+            </a:r>
+            <a:r>
+              <a:rPr lang="pt-BR" sz="2400" dirty="0" smtClean="0"/>
+              <a:t>usuário</a:t>
+            </a:r>
+            <a:endParaRPr lang="pt-BR" sz="2400" dirty="0"/>
+          </a:p>
+          <a:p>
+            <a:pPr lvl="1"/>
+            <a:r>
+              <a:rPr lang="pt-BR" sz="2400" dirty="0"/>
+              <a:t>Falta de </a:t>
+            </a:r>
+            <a:r>
+              <a:rPr lang="pt-BR" sz="2400" dirty="0" smtClean="0"/>
+              <a:t>usabilidade</a:t>
+            </a:r>
+            <a:endParaRPr lang="pt-BR" sz="2400" dirty="0"/>
+          </a:p>
+          <a:p>
+            <a:pPr lvl="1"/>
+            <a:r>
+              <a:rPr lang="pt-BR" sz="2400" dirty="0"/>
+              <a:t>Problema de compatibilidade com os navegadores existentes, pois só funciona bem no Internet Explorer, dificultando o acesso e realização das tarefas do paciente</a:t>
+            </a:r>
+          </a:p>
+          <a:p>
+            <a:pPr lvl="1"/>
+            <a:r>
+              <a:rPr lang="pt-BR" sz="2400" dirty="0"/>
+              <a:t>Não apresenta um sistema de prontuários digitais nem de fluxo de exames para o acompanhamento</a:t>
+            </a:r>
+          </a:p>
+          <a:p>
+            <a:pPr marL="0" lvl="0" indent="0">
+              <a:buNone/>
+            </a:pPr>
+            <a:endParaRPr lang="pt-BR" dirty="0"/>
+          </a:p>
+          <a:p>
             <a:endParaRPr lang="pt-BR" dirty="0"/>
           </a:p>
         </p:txBody>
@@ -2727,7 +3728,7 @@
     </p:spTree>
     <p:extLst>
       <p:ext uri="{BB962C8B-B14F-4D97-AF65-F5344CB8AC3E}">
-        <p14:creationId xmlns:p14="http://schemas.microsoft.com/office/powerpoint/2010/main" val="2991806747"/>
+        <p14:creationId xmlns:p14="http://schemas.microsoft.com/office/powerpoint/2010/main" val="2892943908"/>
       </p:ext>
     </p:extLst>
   </p:cSld>
@@ -2778,39 +3779,46 @@
           <a:p>
             <a:r>
               <a:rPr lang="pt-BR" dirty="0" smtClean="0"/>
-              <a:t>Banco de Dados</a:t>
+              <a:t>Casos de Uso</a:t>
             </a:r>
             <a:endParaRPr lang="pt-BR" dirty="0"/>
           </a:p>
         </p:txBody>
       </p:sp>
-      <p:sp>
-        <p:nvSpPr>
-          <p:cNvPr id="3" name="Content Placeholder 2"/>
-          <p:cNvSpPr>
-            <a:spLocks noGrp="1"/>
-          </p:cNvSpPr>
-          <p:nvPr>
-            <p:ph idx="1"/>
-          </p:nvPr>
-        </p:nvSpPr>
-        <p:spPr/>
-        <p:txBody>
-          <a:bodyPr/>
-          <a:lstStyle/>
-          <a:p>
-            <a:r>
-              <a:rPr lang="pt-BR" dirty="0" smtClean="0"/>
-              <a:t>Modelo conceitual e lógico do banco de dados.</a:t>
-            </a:r>
-            <a:endParaRPr lang="pt-BR" dirty="0"/>
-          </a:p>
-        </p:txBody>
-      </p:sp>
+      <p:pic>
+        <p:nvPicPr>
+          <p:cNvPr id="4" name="Imagem 3"/>
+          <p:cNvPicPr>
+            <a:picLocks noChangeAspect="1"/>
+          </p:cNvPicPr>
+          <p:nvPr/>
+        </p:nvPicPr>
+        <p:blipFill>
+          <a:blip r:embed="rId2">
+            <a:extLst>
+              <a:ext uri="{28A0092B-C50C-407E-A947-70E740481C1C}">
+                <a14:useLocalDpi xmlns:a14="http://schemas.microsoft.com/office/drawing/2010/main" val="0"/>
+              </a:ext>
+            </a:extLst>
+          </a:blip>
+          <a:stretch>
+            <a:fillRect/>
+          </a:stretch>
+        </p:blipFill>
+        <p:spPr>
+          <a:xfrm>
+            <a:off x="2306904" y="1417638"/>
+            <a:ext cx="4530192" cy="4868789"/>
+          </a:xfrm>
+          <a:prstGeom prst="rect">
+            <a:avLst/>
+          </a:prstGeom>
+        </p:spPr>
+      </p:pic>
     </p:spTree>
     <p:extLst>
       <p:ext uri="{BB962C8B-B14F-4D97-AF65-F5344CB8AC3E}">
-        <p14:creationId xmlns:p14="http://schemas.microsoft.com/office/powerpoint/2010/main" val="3218491669"/>
+        <p14:creationId xmlns:p14="http://schemas.microsoft.com/office/powerpoint/2010/main" val="372089285"/>
       </p:ext>
     </p:extLst>
   </p:cSld>
@@ -2861,76 +3869,46 @@
           <a:p>
             <a:r>
               <a:rPr lang="pt-BR" dirty="0" smtClean="0"/>
-              <a:t>Arquitetura do Software</a:t>
+              <a:t>Casos de Uso</a:t>
             </a:r>
             <a:endParaRPr lang="pt-BR" dirty="0"/>
           </a:p>
         </p:txBody>
       </p:sp>
-      <p:sp>
-        <p:nvSpPr>
-          <p:cNvPr id="3" name="Content Placeholder 2"/>
-          <p:cNvSpPr>
-            <a:spLocks noGrp="1"/>
-          </p:cNvSpPr>
-          <p:nvPr>
-            <p:ph idx="1"/>
-          </p:nvPr>
-        </p:nvSpPr>
-        <p:spPr/>
-        <p:txBody>
-          <a:bodyPr>
-            <a:normAutofit fontScale="92500" lnSpcReduction="10000"/>
-          </a:bodyPr>
-          <a:lstStyle/>
-          <a:p>
-            <a:r>
-              <a:rPr lang="pt-BR" dirty="0" smtClean="0"/>
-              <a:t>Descrever a arquitetura do software.</a:t>
-            </a:r>
-          </a:p>
-          <a:p>
-            <a:r>
-              <a:rPr lang="pt-BR" dirty="0" smtClean="0"/>
-              <a:t>Descrever, em linhas gerais como os casos de uso foram realizados nesta arquitetura.</a:t>
-            </a:r>
-          </a:p>
-          <a:p>
-            <a:r>
-              <a:rPr lang="pt-BR" dirty="0" smtClean="0"/>
-              <a:t>Não precisa colocar cada diagrama de realização de caso de uso.</a:t>
-            </a:r>
-          </a:p>
-          <a:p>
-            <a:r>
-              <a:rPr lang="pt-BR" dirty="0" smtClean="0"/>
-              <a:t>Apenas coloque um para explicar como funciona sua arquitetura</a:t>
-            </a:r>
-            <a:r>
-              <a:rPr lang="pt-BR" dirty="0" smtClean="0"/>
-              <a:t>.</a:t>
-            </a:r>
-          </a:p>
-          <a:p>
-            <a:endParaRPr lang="pt-BR" dirty="0"/>
-          </a:p>
-          <a:p>
-            <a:r>
-              <a:rPr lang="pt-BR" dirty="0"/>
-              <a:t>Máximo 2 </a:t>
-            </a:r>
-            <a:r>
-              <a:rPr lang="pt-BR" dirty="0" smtClean="0"/>
-              <a:t>slides</a:t>
-            </a:r>
-            <a:endParaRPr lang="pt-BR" dirty="0"/>
-          </a:p>
-        </p:txBody>
-      </p:sp>
+      <p:pic>
+        <p:nvPicPr>
+          <p:cNvPr id="5" name="Imagem 4"/>
+          <p:cNvPicPr>
+            <a:picLocks noChangeAspect="1"/>
+          </p:cNvPicPr>
+          <p:nvPr/>
+        </p:nvPicPr>
+        <p:blipFill>
+          <a:blip r:embed="rId2">
+            <a:extLst>
+              <a:ext uri="{28A0092B-C50C-407E-A947-70E740481C1C}">
+                <a14:useLocalDpi xmlns:a14="http://schemas.microsoft.com/office/drawing/2010/main" val="0"/>
+              </a:ext>
+            </a:extLst>
+          </a:blip>
+          <a:stretch>
+            <a:fillRect/>
+          </a:stretch>
+        </p:blipFill>
+        <p:spPr>
+          <a:xfrm>
+            <a:off x="0" y="2348880"/>
+            <a:ext cx="9140623" cy="2402246"/>
+          </a:xfrm>
+          <a:prstGeom prst="rect">
+            <a:avLst/>
+          </a:prstGeom>
+        </p:spPr>
+      </p:pic>
     </p:spTree>
     <p:extLst>
       <p:ext uri="{BB962C8B-B14F-4D97-AF65-F5344CB8AC3E}">
-        <p14:creationId xmlns:p14="http://schemas.microsoft.com/office/powerpoint/2010/main" val="2341494487"/>
+        <p14:creationId xmlns:p14="http://schemas.microsoft.com/office/powerpoint/2010/main" val="3047569295"/>
       </p:ext>
     </p:extLst>
   </p:cSld>
@@ -2966,7 +3944,7 @@
       </p:grpSpPr>
       <p:sp>
         <p:nvSpPr>
-          <p:cNvPr id="2" name="Título 1"/>
+          <p:cNvPr id="2" name="Title 1"/>
           <p:cNvSpPr>
             <a:spLocks noGrp="1"/>
           </p:cNvSpPr>
@@ -2976,77 +3954,109 @@
         </p:nvSpPr>
         <p:spPr/>
         <p:txBody>
-          <a:bodyPr>
-            <a:normAutofit/>
+          <a:bodyPr/>
+          <a:lstStyle/>
+          <a:p>
+            <a:r>
+              <a:rPr lang="pt-BR" dirty="0" smtClean="0"/>
+              <a:t>Casos de Uso</a:t>
+            </a:r>
+            <a:endParaRPr lang="pt-BR" dirty="0"/>
+          </a:p>
+        </p:txBody>
+      </p:sp>
+      <p:pic>
+        <p:nvPicPr>
+          <p:cNvPr id="4" name="Imagem 3"/>
+          <p:cNvPicPr>
+            <a:picLocks noChangeAspect="1"/>
+          </p:cNvPicPr>
+          <p:nvPr/>
+        </p:nvPicPr>
+        <p:blipFill>
+          <a:blip r:embed="rId2">
+            <a:extLst>
+              <a:ext uri="{28A0092B-C50C-407E-A947-70E740481C1C}">
+                <a14:useLocalDpi xmlns:a14="http://schemas.microsoft.com/office/drawing/2010/main" val="0"/>
+              </a:ext>
+            </a:extLst>
+          </a:blip>
+          <a:stretch>
+            <a:fillRect/>
+          </a:stretch>
+        </p:blipFill>
+        <p:spPr>
+          <a:xfrm>
+            <a:off x="0" y="1196752"/>
+            <a:ext cx="9144000" cy="4993722"/>
+          </a:xfrm>
+          <a:prstGeom prst="rect">
+            <a:avLst/>
+          </a:prstGeom>
+        </p:spPr>
+      </p:pic>
+      <p:sp>
+        <p:nvSpPr>
+          <p:cNvPr id="6" name="Retângulo 5"/>
+          <p:cNvSpPr/>
+          <p:nvPr/>
+        </p:nvSpPr>
+        <p:spPr>
+          <a:xfrm>
+            <a:off x="683568" y="6093296"/>
+            <a:ext cx="8136904" cy="461665"/>
+          </a:xfrm>
+          <a:prstGeom prst="rect">
+            <a:avLst/>
+          </a:prstGeom>
+        </p:spPr>
+        <p:txBody>
+          <a:bodyPr wrap="square">
+            <a:spAutoFit/>
           </a:bodyPr>
           <a:lstStyle/>
           <a:p>
-            <a:r>
-              <a:rPr lang="pt-BR" dirty="0" smtClean="0"/>
-              <a:t>Inspeção de Usabilidade</a:t>
-            </a:r>
-            <a:endParaRPr lang="pt-BR" dirty="0"/>
-          </a:p>
-        </p:txBody>
-      </p:sp>
-      <p:sp>
-        <p:nvSpPr>
-          <p:cNvPr id="3" name="Espaço Reservado para Conteúdo 2"/>
-          <p:cNvSpPr>
-            <a:spLocks noGrp="1"/>
-          </p:cNvSpPr>
-          <p:nvPr>
-            <p:ph idx="1"/>
-          </p:nvPr>
-        </p:nvSpPr>
-        <p:spPr/>
-        <p:txBody>
-          <a:bodyPr>
-            <a:normAutofit/>
-          </a:bodyPr>
-          <a:lstStyle/>
-          <a:p>
-            <a:r>
-              <a:rPr lang="pt-BR" dirty="0" smtClean="0"/>
-              <a:t>Descrever os resultados da inspeção de usabilidade.</a:t>
-            </a:r>
-          </a:p>
-          <a:p>
-            <a:r>
-              <a:rPr lang="pt-BR" dirty="0" smtClean="0"/>
-              <a:t>No caso de terem sido usadas heurísticas, citar as heurísticas utilizadas</a:t>
-            </a:r>
-            <a:r>
-              <a:rPr lang="pt-BR" dirty="0" smtClean="0"/>
-              <a:t>.</a:t>
-            </a:r>
-          </a:p>
-          <a:p>
-            <a:endParaRPr lang="pt-BR" dirty="0"/>
-          </a:p>
-          <a:p>
-            <a:r>
-              <a:rPr lang="pt-BR" dirty="0"/>
-              <a:t>Máximo 2 </a:t>
-            </a:r>
-            <a:r>
-              <a:rPr lang="pt-BR" dirty="0" smtClean="0"/>
-              <a:t>slides</a:t>
-            </a:r>
-            <a:endParaRPr lang="pt-BR" dirty="0"/>
+            <a:pPr>
+              <a:buClr>
+                <a:schemeClr val="bg2"/>
+              </a:buClr>
+            </a:pPr>
+            <a:r>
+              <a:rPr lang="pt-BR" sz="2400" dirty="0" smtClean="0">
+                <a:solidFill>
+                  <a:srgbClr val="FF0000"/>
+                </a:solidFill>
+              </a:rPr>
+              <a:t>*Continuação </a:t>
+            </a:r>
+            <a:r>
+              <a:rPr lang="pt-BR" sz="2400" dirty="0">
+                <a:solidFill>
+                  <a:srgbClr val="FF0000"/>
+                </a:solidFill>
+              </a:rPr>
+              <a:t>da ligação de herança no slide seguinte</a:t>
+            </a:r>
           </a:p>
         </p:txBody>
       </p:sp>
     </p:spTree>
     <p:extLst>
       <p:ext uri="{BB962C8B-B14F-4D97-AF65-F5344CB8AC3E}">
-        <p14:creationId xmlns:p14="http://schemas.microsoft.com/office/powerpoint/2010/main" val="403771080"/>
+        <p14:creationId xmlns:p14="http://schemas.microsoft.com/office/powerpoint/2010/main" val="33625712"/>
       </p:ext>
     </p:extLst>
   </p:cSld>
   <p:clrMapOvr>
     <a:masterClrMapping/>
   </p:clrMapOvr>
+  <p:timing>
+    <p:tnLst>
+      <p:par>
+        <p:cTn id="1" dur="indefinite" restart="never" nodeType="tmRoot"/>
+      </p:par>
+    </p:tnLst>
+  </p:timing>
 </p:sld>
 </file>
 

</xml_diff>

<commit_message>
Atualização dos prototipos de alta fidelidade do Slide da apresentação. E atualização do topico de conclusão da documentação.
</commit_message>
<xml_diff>
--- a/documentacao/G4_Apresentacao2sem2014_Final.pptx
+++ b/documentacao/G4_Apresentacao2sem2014_Final.pptx
@@ -5,7 +5,7 @@
     <p:sldMasterId id="2147483648" r:id="rId1"/>
   </p:sldMasterIdLst>
   <p:notesMasterIdLst>
-    <p:notesMasterId r:id="rId20"/>
+    <p:notesMasterId r:id="rId37"/>
   </p:notesMasterIdLst>
   <p:sldIdLst>
     <p:sldId id="258" r:id="rId2"/>
@@ -20,12 +20,29 @@
     <p:sldId id="399" r:id="rId11"/>
     <p:sldId id="400" r:id="rId12"/>
     <p:sldId id="390" r:id="rId13"/>
-    <p:sldId id="392" r:id="rId14"/>
-    <p:sldId id="401" r:id="rId15"/>
-    <p:sldId id="391" r:id="rId16"/>
-    <p:sldId id="402" r:id="rId17"/>
-    <p:sldId id="384" r:id="rId18"/>
-    <p:sldId id="393" r:id="rId19"/>
+    <p:sldId id="406" r:id="rId14"/>
+    <p:sldId id="407" r:id="rId15"/>
+    <p:sldId id="408" r:id="rId16"/>
+    <p:sldId id="409" r:id="rId17"/>
+    <p:sldId id="410" r:id="rId18"/>
+    <p:sldId id="411" r:id="rId19"/>
+    <p:sldId id="412" r:id="rId20"/>
+    <p:sldId id="413" r:id="rId21"/>
+    <p:sldId id="414" r:id="rId22"/>
+    <p:sldId id="415" r:id="rId23"/>
+    <p:sldId id="416" r:id="rId24"/>
+    <p:sldId id="417" r:id="rId25"/>
+    <p:sldId id="418" r:id="rId26"/>
+    <p:sldId id="419" r:id="rId27"/>
+    <p:sldId id="420" r:id="rId28"/>
+    <p:sldId id="421" r:id="rId29"/>
+    <p:sldId id="422" r:id="rId30"/>
+    <p:sldId id="392" r:id="rId31"/>
+    <p:sldId id="401" r:id="rId32"/>
+    <p:sldId id="391" r:id="rId33"/>
+    <p:sldId id="402" r:id="rId34"/>
+    <p:sldId id="384" r:id="rId35"/>
+    <p:sldId id="393" r:id="rId36"/>
   </p:sldIdLst>
   <p:sldSz cx="9144000" cy="6858000" type="screen4x3"/>
   <p:notesSz cx="6858000" cy="9144000"/>
@@ -141,6 +158,23 @@
             <p14:sldId id="399"/>
             <p14:sldId id="400"/>
             <p14:sldId id="390"/>
+            <p14:sldId id="406"/>
+            <p14:sldId id="407"/>
+            <p14:sldId id="408"/>
+            <p14:sldId id="409"/>
+            <p14:sldId id="410"/>
+            <p14:sldId id="411"/>
+            <p14:sldId id="412"/>
+            <p14:sldId id="413"/>
+            <p14:sldId id="414"/>
+            <p14:sldId id="415"/>
+            <p14:sldId id="416"/>
+            <p14:sldId id="417"/>
+            <p14:sldId id="418"/>
+            <p14:sldId id="419"/>
+            <p14:sldId id="420"/>
+            <p14:sldId id="421"/>
+            <p14:sldId id="422"/>
             <p14:sldId id="392"/>
             <p14:sldId id="401"/>
             <p14:sldId id="391"/>
@@ -252,7 +286,7 @@
             <a:fld id="{44372743-0C2A-4DA9-BF19-A9026375E57C}" type="datetimeFigureOut">
               <a:rPr lang="pt-BR" smtClean="0"/>
               <a:pPr/>
-              <a:t>15/11/2014</a:t>
+              <a:t>16/11/2014</a:t>
             </a:fld>
             <a:endParaRPr lang="pt-BR"/>
           </a:p>
@@ -733,7 +767,7 @@
             <a:fld id="{94CDC042-039A-4E80-A826-4614F83E09D2}" type="datetimeFigureOut">
               <a:rPr lang="pt-BR" smtClean="0"/>
               <a:pPr/>
-              <a:t>15/11/2014</a:t>
+              <a:t>16/11/2014</a:t>
             </a:fld>
             <a:endParaRPr lang="pt-BR"/>
           </a:p>
@@ -946,7 +980,7 @@
             <a:fld id="{94CDC042-039A-4E80-A826-4614F83E09D2}" type="datetimeFigureOut">
               <a:rPr lang="pt-BR" smtClean="0"/>
               <a:pPr/>
-              <a:t>15/11/2014</a:t>
+              <a:t>16/11/2014</a:t>
             </a:fld>
             <a:endParaRPr lang="pt-BR"/>
           </a:p>
@@ -1669,7 +1703,7 @@
             <a:fld id="{94CDC042-039A-4E80-A826-4614F83E09D2}" type="datetimeFigureOut">
               <a:rPr lang="pt-BR" smtClean="0"/>
               <a:pPr/>
-              <a:t>15/11/2014</a:t>
+              <a:t>16/11/2014</a:t>
             </a:fld>
             <a:endParaRPr lang="pt-BR"/>
           </a:p>
@@ -2100,11 +2134,7 @@
           <a:p>
             <a:r>
               <a:rPr lang="pt-BR" dirty="0"/>
-              <a:t>Grupo </a:t>
-            </a:r>
-            <a:r>
-              <a:rPr lang="pt-BR" dirty="0"/>
-              <a:t>4</a:t>
+              <a:t>Grupo 4</a:t>
             </a:r>
             <a:r>
               <a:rPr lang="pt-BR" smtClean="0"/>
@@ -2118,31 +2148,19 @@
           <a:p>
             <a:r>
               <a:rPr lang="pt-BR" dirty="0" smtClean="0"/>
-              <a:t>                    </a:t>
-            </a:r>
+              <a:t>                    Gabriel Piccolo</a:t>
+            </a:r>
+          </a:p>
+          <a:p>
             <a:r>
               <a:rPr lang="pt-BR" dirty="0" smtClean="0"/>
-              <a:t>Gabriel Piccolo</a:t>
+              <a:t>                     Pedro Gimenes</a:t>
             </a:r>
           </a:p>
           <a:p>
             <a:r>
               <a:rPr lang="pt-BR" dirty="0" smtClean="0"/>
-              <a:t>                     </a:t>
-            </a:r>
-            <a:r>
-              <a:rPr lang="pt-BR" dirty="0" smtClean="0"/>
-              <a:t>Pedro Gimenes</a:t>
-            </a:r>
-          </a:p>
-          <a:p>
-            <a:r>
-              <a:rPr lang="pt-BR" dirty="0" smtClean="0"/>
-              <a:t>                     </a:t>
-            </a:r>
-            <a:r>
-              <a:rPr lang="pt-BR" dirty="0" smtClean="0"/>
-              <a:t>Vinícius Romão</a:t>
+              <a:t>                     Vinícius Romão</a:t>
             </a:r>
             <a:endParaRPr lang="pt-BR" dirty="0"/>
           </a:p>
@@ -2525,7 +2543,7 @@
           <a:p>
             <a:r>
               <a:rPr lang="pt-BR" dirty="0" smtClean="0"/>
-              <a:t>Banco de Dados</a:t>
+              <a:t>Interface do Usuário</a:t>
             </a:r>
             <a:endParaRPr lang="pt-BR" dirty="0"/>
           </a:p>
@@ -2533,7 +2551,7 @@
       </p:sp>
       <p:pic>
         <p:nvPicPr>
-          <p:cNvPr id="5" name="Imagem 4"/>
+          <p:cNvPr id="4" name="Imagem 3"/>
           <p:cNvPicPr>
             <a:picLocks noChangeAspect="1"/>
           </p:cNvPicPr>
@@ -2553,18 +2571,55 @@
         </p:blipFill>
         <p:spPr>
           <a:xfrm>
-            <a:off x="0" y="1417638"/>
-            <a:ext cx="9144000" cy="4691790"/>
+            <a:off x="1292575" y="1124744"/>
+            <a:ext cx="6558849" cy="5105940"/>
           </a:xfrm>
           <a:prstGeom prst="rect">
             <a:avLst/>
           </a:prstGeom>
         </p:spPr>
       </p:pic>
+      <p:sp>
+        <p:nvSpPr>
+          <p:cNvPr id="5" name="Retângulo 4"/>
+          <p:cNvSpPr/>
+          <p:nvPr/>
+        </p:nvSpPr>
+        <p:spPr>
+          <a:xfrm>
+            <a:off x="0" y="1217583"/>
+            <a:ext cx="1872208" cy="400110"/>
+          </a:xfrm>
+          <a:prstGeom prst="rect">
+            <a:avLst/>
+          </a:prstGeom>
+        </p:spPr>
+        <p:txBody>
+          <a:bodyPr wrap="square">
+            <a:spAutoFit/>
+          </a:bodyPr>
+          <a:lstStyle/>
+          <a:p>
+            <a:r>
+              <a:rPr lang="pt-BR" sz="2000" dirty="0" smtClean="0">
+                <a:solidFill>
+                  <a:srgbClr val="FF0000"/>
+                </a:solidFill>
+              </a:rPr>
+              <a:t>*Visão Paciente</a:t>
+            </a:r>
+            <a:endParaRPr lang="pt-BR" sz="2400" dirty="0">
+              <a:solidFill>
+                <a:srgbClr val="FF0000"/>
+              </a:solidFill>
+            </a:endParaRPr>
+          </a:p>
+        </p:txBody>
+      </p:sp>
     </p:spTree>
     <p:extLst>
       <p:ext uri="{BB962C8B-B14F-4D97-AF65-F5344CB8AC3E}">
-        <p14:creationId xmlns:p14="http://schemas.microsoft.com/office/powerpoint/2010/main" val="3218491669"/>
+        <p14:creationId xmlns:p14="http://schemas.microsoft.com/office/powerpoint/2010/main" val="3768844573"/>
       </p:ext>
     </p:extLst>
   </p:cSld>
@@ -2615,7 +2670,7 @@
           <a:p>
             <a:r>
               <a:rPr lang="pt-BR" dirty="0" smtClean="0"/>
-              <a:t>Banco de Dados</a:t>
+              <a:t>Interface do Usuário</a:t>
             </a:r>
             <a:endParaRPr lang="pt-BR" dirty="0"/>
           </a:p>
@@ -2643,6 +2698,2346 @@
         </p:blipFill>
         <p:spPr>
           <a:xfrm>
+            <a:off x="1293307" y="1124744"/>
+            <a:ext cx="6557385" cy="5104800"/>
+          </a:xfrm>
+          <a:prstGeom prst="rect">
+            <a:avLst/>
+          </a:prstGeom>
+        </p:spPr>
+      </p:pic>
+      <p:sp>
+        <p:nvSpPr>
+          <p:cNvPr id="5" name="Retângulo 4"/>
+          <p:cNvSpPr/>
+          <p:nvPr/>
+        </p:nvSpPr>
+        <p:spPr>
+          <a:xfrm>
+            <a:off x="0" y="1217583"/>
+            <a:ext cx="1872208" cy="400110"/>
+          </a:xfrm>
+          <a:prstGeom prst="rect">
+            <a:avLst/>
+          </a:prstGeom>
+        </p:spPr>
+        <p:txBody>
+          <a:bodyPr wrap="square">
+            <a:spAutoFit/>
+          </a:bodyPr>
+          <a:lstStyle/>
+          <a:p>
+            <a:r>
+              <a:rPr lang="pt-BR" sz="2000" dirty="0" smtClean="0">
+                <a:solidFill>
+                  <a:srgbClr val="FF0000"/>
+                </a:solidFill>
+              </a:rPr>
+              <a:t>*Visão Paciente</a:t>
+            </a:r>
+            <a:endParaRPr lang="pt-BR" sz="2400" dirty="0">
+              <a:solidFill>
+                <a:srgbClr val="FF0000"/>
+              </a:solidFill>
+            </a:endParaRPr>
+          </a:p>
+        </p:txBody>
+      </p:sp>
+    </p:spTree>
+    <p:extLst>
+      <p:ext uri="{BB962C8B-B14F-4D97-AF65-F5344CB8AC3E}">
+        <p14:creationId xmlns:p14="http://schemas.microsoft.com/office/powerpoint/2010/main" val="3573421326"/>
+      </p:ext>
+    </p:extLst>
+  </p:cSld>
+  <p:clrMapOvr>
+    <a:masterClrMapping/>
+  </p:clrMapOvr>
+  <p:timing>
+    <p:tnLst>
+      <p:par>
+        <p:cTn id="1" dur="indefinite" restart="never" nodeType="tmRoot"/>
+      </p:par>
+    </p:tnLst>
+  </p:timing>
+</p:sld>
+</file>
+
+<file path=ppt/slides/slide15.xml><?xml version="1.0" encoding="utf-8"?>
+<p:sld xmlns:a="http://schemas.openxmlformats.org/drawingml/2006/main" xmlns:r="http://schemas.openxmlformats.org/officeDocument/2006/relationships" xmlns:p="http://schemas.openxmlformats.org/presentationml/2006/main">
+  <p:cSld>
+    <p:spTree>
+      <p:nvGrpSpPr>
+        <p:cNvPr id="1" name=""/>
+        <p:cNvGrpSpPr/>
+        <p:nvPr/>
+      </p:nvGrpSpPr>
+      <p:grpSpPr>
+        <a:xfrm>
+          <a:off x="0" y="0"/>
+          <a:ext cx="0" cy="0"/>
+          <a:chOff x="0" y="0"/>
+          <a:chExt cx="0" cy="0"/>
+        </a:xfrm>
+      </p:grpSpPr>
+      <p:sp>
+        <p:nvSpPr>
+          <p:cNvPr id="2" name="Title 1"/>
+          <p:cNvSpPr>
+            <a:spLocks noGrp="1"/>
+          </p:cNvSpPr>
+          <p:nvPr>
+            <p:ph type="title"/>
+          </p:nvPr>
+        </p:nvSpPr>
+        <p:spPr/>
+        <p:txBody>
+          <a:bodyPr/>
+          <a:lstStyle/>
+          <a:p>
+            <a:r>
+              <a:rPr lang="pt-BR" dirty="0" smtClean="0"/>
+              <a:t>Interface do Usuário</a:t>
+            </a:r>
+            <a:endParaRPr lang="pt-BR" dirty="0"/>
+          </a:p>
+        </p:txBody>
+      </p:sp>
+      <p:pic>
+        <p:nvPicPr>
+          <p:cNvPr id="4" name="Imagem 3"/>
+          <p:cNvPicPr>
+            <a:picLocks noChangeAspect="1"/>
+          </p:cNvPicPr>
+          <p:nvPr/>
+        </p:nvPicPr>
+        <p:blipFill>
+          <a:blip r:embed="rId2">
+            <a:extLst>
+              <a:ext uri="{28A0092B-C50C-407E-A947-70E740481C1C}">
+                <a14:useLocalDpi xmlns:a14="http://schemas.microsoft.com/office/drawing/2010/main" val="0"/>
+              </a:ext>
+            </a:extLst>
+          </a:blip>
+          <a:stretch>
+            <a:fillRect/>
+          </a:stretch>
+        </p:blipFill>
+        <p:spPr>
+          <a:xfrm>
+            <a:off x="1293307" y="1124744"/>
+            <a:ext cx="6557385" cy="5104800"/>
+          </a:xfrm>
+          <a:prstGeom prst="rect">
+            <a:avLst/>
+          </a:prstGeom>
+        </p:spPr>
+      </p:pic>
+      <p:sp>
+        <p:nvSpPr>
+          <p:cNvPr id="5" name="Retângulo 4"/>
+          <p:cNvSpPr/>
+          <p:nvPr/>
+        </p:nvSpPr>
+        <p:spPr>
+          <a:xfrm>
+            <a:off x="0" y="1217583"/>
+            <a:ext cx="1872208" cy="400110"/>
+          </a:xfrm>
+          <a:prstGeom prst="rect">
+            <a:avLst/>
+          </a:prstGeom>
+        </p:spPr>
+        <p:txBody>
+          <a:bodyPr wrap="square">
+            <a:spAutoFit/>
+          </a:bodyPr>
+          <a:lstStyle/>
+          <a:p>
+            <a:r>
+              <a:rPr lang="pt-BR" sz="2000" dirty="0" smtClean="0">
+                <a:solidFill>
+                  <a:srgbClr val="FF0000"/>
+                </a:solidFill>
+              </a:rPr>
+              <a:t>*Visão Paciente</a:t>
+            </a:r>
+            <a:endParaRPr lang="pt-BR" sz="2400" dirty="0">
+              <a:solidFill>
+                <a:srgbClr val="FF0000"/>
+              </a:solidFill>
+            </a:endParaRPr>
+          </a:p>
+        </p:txBody>
+      </p:sp>
+    </p:spTree>
+    <p:extLst>
+      <p:ext uri="{BB962C8B-B14F-4D97-AF65-F5344CB8AC3E}">
+        <p14:creationId xmlns:p14="http://schemas.microsoft.com/office/powerpoint/2010/main" val="2342771231"/>
+      </p:ext>
+    </p:extLst>
+  </p:cSld>
+  <p:clrMapOvr>
+    <a:masterClrMapping/>
+  </p:clrMapOvr>
+  <p:timing>
+    <p:tnLst>
+      <p:par>
+        <p:cTn id="1" dur="indefinite" restart="never" nodeType="tmRoot"/>
+      </p:par>
+    </p:tnLst>
+  </p:timing>
+</p:sld>
+</file>
+
+<file path=ppt/slides/slide16.xml><?xml version="1.0" encoding="utf-8"?>
+<p:sld xmlns:a="http://schemas.openxmlformats.org/drawingml/2006/main" xmlns:r="http://schemas.openxmlformats.org/officeDocument/2006/relationships" xmlns:p="http://schemas.openxmlformats.org/presentationml/2006/main">
+  <p:cSld>
+    <p:spTree>
+      <p:nvGrpSpPr>
+        <p:cNvPr id="1" name=""/>
+        <p:cNvGrpSpPr/>
+        <p:nvPr/>
+      </p:nvGrpSpPr>
+      <p:grpSpPr>
+        <a:xfrm>
+          <a:off x="0" y="0"/>
+          <a:ext cx="0" cy="0"/>
+          <a:chOff x="0" y="0"/>
+          <a:chExt cx="0" cy="0"/>
+        </a:xfrm>
+      </p:grpSpPr>
+      <p:sp>
+        <p:nvSpPr>
+          <p:cNvPr id="2" name="Title 1"/>
+          <p:cNvSpPr>
+            <a:spLocks noGrp="1"/>
+          </p:cNvSpPr>
+          <p:nvPr>
+            <p:ph type="title"/>
+          </p:nvPr>
+        </p:nvSpPr>
+        <p:spPr/>
+        <p:txBody>
+          <a:bodyPr/>
+          <a:lstStyle/>
+          <a:p>
+            <a:r>
+              <a:rPr lang="pt-BR" dirty="0" smtClean="0"/>
+              <a:t>Interface do Usuário</a:t>
+            </a:r>
+            <a:endParaRPr lang="pt-BR" dirty="0"/>
+          </a:p>
+        </p:txBody>
+      </p:sp>
+      <p:pic>
+        <p:nvPicPr>
+          <p:cNvPr id="3" name="Imagem 2"/>
+          <p:cNvPicPr>
+            <a:picLocks noChangeAspect="1"/>
+          </p:cNvPicPr>
+          <p:nvPr/>
+        </p:nvPicPr>
+        <p:blipFill>
+          <a:blip r:embed="rId2">
+            <a:extLst>
+              <a:ext uri="{28A0092B-C50C-407E-A947-70E740481C1C}">
+                <a14:useLocalDpi xmlns:a14="http://schemas.microsoft.com/office/drawing/2010/main" val="0"/>
+              </a:ext>
+            </a:extLst>
+          </a:blip>
+          <a:stretch>
+            <a:fillRect/>
+          </a:stretch>
+        </p:blipFill>
+        <p:spPr>
+          <a:xfrm>
+            <a:off x="1293307" y="1124744"/>
+            <a:ext cx="6557385" cy="5104800"/>
+          </a:xfrm>
+          <a:prstGeom prst="rect">
+            <a:avLst/>
+          </a:prstGeom>
+        </p:spPr>
+      </p:pic>
+      <p:sp>
+        <p:nvSpPr>
+          <p:cNvPr id="5" name="Retângulo 4"/>
+          <p:cNvSpPr/>
+          <p:nvPr/>
+        </p:nvSpPr>
+        <p:spPr>
+          <a:xfrm>
+            <a:off x="0" y="1217583"/>
+            <a:ext cx="1872208" cy="400110"/>
+          </a:xfrm>
+          <a:prstGeom prst="rect">
+            <a:avLst/>
+          </a:prstGeom>
+        </p:spPr>
+        <p:txBody>
+          <a:bodyPr wrap="square">
+            <a:spAutoFit/>
+          </a:bodyPr>
+          <a:lstStyle/>
+          <a:p>
+            <a:r>
+              <a:rPr lang="pt-BR" sz="2000" dirty="0" smtClean="0">
+                <a:solidFill>
+                  <a:srgbClr val="FF0000"/>
+                </a:solidFill>
+              </a:rPr>
+              <a:t>*Visão Paciente</a:t>
+            </a:r>
+            <a:endParaRPr lang="pt-BR" sz="2400" dirty="0">
+              <a:solidFill>
+                <a:srgbClr val="FF0000"/>
+              </a:solidFill>
+            </a:endParaRPr>
+          </a:p>
+        </p:txBody>
+      </p:sp>
+    </p:spTree>
+    <p:extLst>
+      <p:ext uri="{BB962C8B-B14F-4D97-AF65-F5344CB8AC3E}">
+        <p14:creationId xmlns:p14="http://schemas.microsoft.com/office/powerpoint/2010/main" val="3781886261"/>
+      </p:ext>
+    </p:extLst>
+  </p:cSld>
+  <p:clrMapOvr>
+    <a:masterClrMapping/>
+  </p:clrMapOvr>
+  <p:timing>
+    <p:tnLst>
+      <p:par>
+        <p:cTn id="1" dur="indefinite" restart="never" nodeType="tmRoot"/>
+      </p:par>
+    </p:tnLst>
+  </p:timing>
+</p:sld>
+</file>
+
+<file path=ppt/slides/slide17.xml><?xml version="1.0" encoding="utf-8"?>
+<p:sld xmlns:a="http://schemas.openxmlformats.org/drawingml/2006/main" xmlns:r="http://schemas.openxmlformats.org/officeDocument/2006/relationships" xmlns:p="http://schemas.openxmlformats.org/presentationml/2006/main">
+  <p:cSld>
+    <p:spTree>
+      <p:nvGrpSpPr>
+        <p:cNvPr id="1" name=""/>
+        <p:cNvGrpSpPr/>
+        <p:nvPr/>
+      </p:nvGrpSpPr>
+      <p:grpSpPr>
+        <a:xfrm>
+          <a:off x="0" y="0"/>
+          <a:ext cx="0" cy="0"/>
+          <a:chOff x="0" y="0"/>
+          <a:chExt cx="0" cy="0"/>
+        </a:xfrm>
+      </p:grpSpPr>
+      <p:sp>
+        <p:nvSpPr>
+          <p:cNvPr id="2" name="Title 1"/>
+          <p:cNvSpPr>
+            <a:spLocks noGrp="1"/>
+          </p:cNvSpPr>
+          <p:nvPr>
+            <p:ph type="title"/>
+          </p:nvPr>
+        </p:nvSpPr>
+        <p:spPr/>
+        <p:txBody>
+          <a:bodyPr/>
+          <a:lstStyle/>
+          <a:p>
+            <a:r>
+              <a:rPr lang="pt-BR" dirty="0" smtClean="0"/>
+              <a:t>Interface do Usuário</a:t>
+            </a:r>
+            <a:endParaRPr lang="pt-BR" dirty="0"/>
+          </a:p>
+        </p:txBody>
+      </p:sp>
+      <p:pic>
+        <p:nvPicPr>
+          <p:cNvPr id="4" name="Imagem 3"/>
+          <p:cNvPicPr>
+            <a:picLocks noChangeAspect="1"/>
+          </p:cNvPicPr>
+          <p:nvPr/>
+        </p:nvPicPr>
+        <p:blipFill>
+          <a:blip r:embed="rId2">
+            <a:extLst>
+              <a:ext uri="{28A0092B-C50C-407E-A947-70E740481C1C}">
+                <a14:useLocalDpi xmlns:a14="http://schemas.microsoft.com/office/drawing/2010/main" val="0"/>
+              </a:ext>
+            </a:extLst>
+          </a:blip>
+          <a:stretch>
+            <a:fillRect/>
+          </a:stretch>
+        </p:blipFill>
+        <p:spPr>
+          <a:xfrm>
+            <a:off x="1293307" y="1124744"/>
+            <a:ext cx="6557385" cy="5104800"/>
+          </a:xfrm>
+          <a:prstGeom prst="rect">
+            <a:avLst/>
+          </a:prstGeom>
+        </p:spPr>
+      </p:pic>
+      <p:sp>
+        <p:nvSpPr>
+          <p:cNvPr id="5" name="Retângulo 4"/>
+          <p:cNvSpPr/>
+          <p:nvPr/>
+        </p:nvSpPr>
+        <p:spPr>
+          <a:xfrm>
+            <a:off x="0" y="1217583"/>
+            <a:ext cx="1872208" cy="400110"/>
+          </a:xfrm>
+          <a:prstGeom prst="rect">
+            <a:avLst/>
+          </a:prstGeom>
+        </p:spPr>
+        <p:txBody>
+          <a:bodyPr wrap="square">
+            <a:spAutoFit/>
+          </a:bodyPr>
+          <a:lstStyle/>
+          <a:p>
+            <a:r>
+              <a:rPr lang="pt-BR" sz="2000" dirty="0" smtClean="0">
+                <a:solidFill>
+                  <a:srgbClr val="FF0000"/>
+                </a:solidFill>
+              </a:rPr>
+              <a:t>*Visão Paciente</a:t>
+            </a:r>
+            <a:endParaRPr lang="pt-BR" sz="2400" dirty="0">
+              <a:solidFill>
+                <a:srgbClr val="FF0000"/>
+              </a:solidFill>
+            </a:endParaRPr>
+          </a:p>
+        </p:txBody>
+      </p:sp>
+    </p:spTree>
+    <p:extLst>
+      <p:ext uri="{BB962C8B-B14F-4D97-AF65-F5344CB8AC3E}">
+        <p14:creationId xmlns:p14="http://schemas.microsoft.com/office/powerpoint/2010/main" val="193298628"/>
+      </p:ext>
+    </p:extLst>
+  </p:cSld>
+  <p:clrMapOvr>
+    <a:masterClrMapping/>
+  </p:clrMapOvr>
+  <p:timing>
+    <p:tnLst>
+      <p:par>
+        <p:cTn id="1" dur="indefinite" restart="never" nodeType="tmRoot"/>
+      </p:par>
+    </p:tnLst>
+  </p:timing>
+</p:sld>
+</file>
+
+<file path=ppt/slides/slide18.xml><?xml version="1.0" encoding="utf-8"?>
+<p:sld xmlns:a="http://schemas.openxmlformats.org/drawingml/2006/main" xmlns:r="http://schemas.openxmlformats.org/officeDocument/2006/relationships" xmlns:p="http://schemas.openxmlformats.org/presentationml/2006/main">
+  <p:cSld>
+    <p:spTree>
+      <p:nvGrpSpPr>
+        <p:cNvPr id="1" name=""/>
+        <p:cNvGrpSpPr/>
+        <p:nvPr/>
+      </p:nvGrpSpPr>
+      <p:grpSpPr>
+        <a:xfrm>
+          <a:off x="0" y="0"/>
+          <a:ext cx="0" cy="0"/>
+          <a:chOff x="0" y="0"/>
+          <a:chExt cx="0" cy="0"/>
+        </a:xfrm>
+      </p:grpSpPr>
+      <p:sp>
+        <p:nvSpPr>
+          <p:cNvPr id="2" name="Title 1"/>
+          <p:cNvSpPr>
+            <a:spLocks noGrp="1"/>
+          </p:cNvSpPr>
+          <p:nvPr>
+            <p:ph type="title"/>
+          </p:nvPr>
+        </p:nvSpPr>
+        <p:spPr/>
+        <p:txBody>
+          <a:bodyPr/>
+          <a:lstStyle/>
+          <a:p>
+            <a:r>
+              <a:rPr lang="pt-BR" dirty="0" smtClean="0"/>
+              <a:t>Interface do Usuário</a:t>
+            </a:r>
+            <a:endParaRPr lang="pt-BR" dirty="0"/>
+          </a:p>
+        </p:txBody>
+      </p:sp>
+      <p:pic>
+        <p:nvPicPr>
+          <p:cNvPr id="3" name="Imagem 2"/>
+          <p:cNvPicPr>
+            <a:picLocks noChangeAspect="1"/>
+          </p:cNvPicPr>
+          <p:nvPr/>
+        </p:nvPicPr>
+        <p:blipFill>
+          <a:blip r:embed="rId2">
+            <a:extLst>
+              <a:ext uri="{28A0092B-C50C-407E-A947-70E740481C1C}">
+                <a14:useLocalDpi xmlns:a14="http://schemas.microsoft.com/office/drawing/2010/main" val="0"/>
+              </a:ext>
+            </a:extLst>
+          </a:blip>
+          <a:stretch>
+            <a:fillRect/>
+          </a:stretch>
+        </p:blipFill>
+        <p:spPr>
+          <a:xfrm>
+            <a:off x="1293307" y="1124744"/>
+            <a:ext cx="6557385" cy="5104800"/>
+          </a:xfrm>
+          <a:prstGeom prst="rect">
+            <a:avLst/>
+          </a:prstGeom>
+        </p:spPr>
+      </p:pic>
+      <p:sp>
+        <p:nvSpPr>
+          <p:cNvPr id="5" name="Retângulo 4"/>
+          <p:cNvSpPr/>
+          <p:nvPr/>
+        </p:nvSpPr>
+        <p:spPr>
+          <a:xfrm>
+            <a:off x="0" y="1217583"/>
+            <a:ext cx="1872208" cy="400110"/>
+          </a:xfrm>
+          <a:prstGeom prst="rect">
+            <a:avLst/>
+          </a:prstGeom>
+        </p:spPr>
+        <p:txBody>
+          <a:bodyPr wrap="square">
+            <a:spAutoFit/>
+          </a:bodyPr>
+          <a:lstStyle/>
+          <a:p>
+            <a:r>
+              <a:rPr lang="pt-BR" sz="2000" dirty="0" smtClean="0">
+                <a:solidFill>
+                  <a:srgbClr val="FF0000"/>
+                </a:solidFill>
+              </a:rPr>
+              <a:t>*Visão Paciente</a:t>
+            </a:r>
+            <a:endParaRPr lang="pt-BR" sz="2400" dirty="0">
+              <a:solidFill>
+                <a:srgbClr val="FF0000"/>
+              </a:solidFill>
+            </a:endParaRPr>
+          </a:p>
+        </p:txBody>
+      </p:sp>
+    </p:spTree>
+    <p:extLst>
+      <p:ext uri="{BB962C8B-B14F-4D97-AF65-F5344CB8AC3E}">
+        <p14:creationId xmlns:p14="http://schemas.microsoft.com/office/powerpoint/2010/main" val="2235056424"/>
+      </p:ext>
+    </p:extLst>
+  </p:cSld>
+  <p:clrMapOvr>
+    <a:masterClrMapping/>
+  </p:clrMapOvr>
+  <p:timing>
+    <p:tnLst>
+      <p:par>
+        <p:cTn id="1" dur="indefinite" restart="never" nodeType="tmRoot"/>
+      </p:par>
+    </p:tnLst>
+  </p:timing>
+</p:sld>
+</file>
+
+<file path=ppt/slides/slide19.xml><?xml version="1.0" encoding="utf-8"?>
+<p:sld xmlns:a="http://schemas.openxmlformats.org/drawingml/2006/main" xmlns:r="http://schemas.openxmlformats.org/officeDocument/2006/relationships" xmlns:p="http://schemas.openxmlformats.org/presentationml/2006/main">
+  <p:cSld>
+    <p:spTree>
+      <p:nvGrpSpPr>
+        <p:cNvPr id="1" name=""/>
+        <p:cNvGrpSpPr/>
+        <p:nvPr/>
+      </p:nvGrpSpPr>
+      <p:grpSpPr>
+        <a:xfrm>
+          <a:off x="0" y="0"/>
+          <a:ext cx="0" cy="0"/>
+          <a:chOff x="0" y="0"/>
+          <a:chExt cx="0" cy="0"/>
+        </a:xfrm>
+      </p:grpSpPr>
+      <p:sp>
+        <p:nvSpPr>
+          <p:cNvPr id="2" name="Title 1"/>
+          <p:cNvSpPr>
+            <a:spLocks noGrp="1"/>
+          </p:cNvSpPr>
+          <p:nvPr>
+            <p:ph type="title"/>
+          </p:nvPr>
+        </p:nvSpPr>
+        <p:spPr/>
+        <p:txBody>
+          <a:bodyPr/>
+          <a:lstStyle/>
+          <a:p>
+            <a:r>
+              <a:rPr lang="pt-BR" dirty="0" smtClean="0"/>
+              <a:t>Interface do Usuário</a:t>
+            </a:r>
+            <a:endParaRPr lang="pt-BR" dirty="0"/>
+          </a:p>
+        </p:txBody>
+      </p:sp>
+      <p:pic>
+        <p:nvPicPr>
+          <p:cNvPr id="4" name="Imagem 3"/>
+          <p:cNvPicPr>
+            <a:picLocks noChangeAspect="1"/>
+          </p:cNvPicPr>
+          <p:nvPr/>
+        </p:nvPicPr>
+        <p:blipFill>
+          <a:blip r:embed="rId2">
+            <a:extLst>
+              <a:ext uri="{28A0092B-C50C-407E-A947-70E740481C1C}">
+                <a14:useLocalDpi xmlns:a14="http://schemas.microsoft.com/office/drawing/2010/main" val="0"/>
+              </a:ext>
+            </a:extLst>
+          </a:blip>
+          <a:stretch>
+            <a:fillRect/>
+          </a:stretch>
+        </p:blipFill>
+        <p:spPr>
+          <a:xfrm>
+            <a:off x="1293307" y="1124744"/>
+            <a:ext cx="6557385" cy="5104800"/>
+          </a:xfrm>
+          <a:prstGeom prst="rect">
+            <a:avLst/>
+          </a:prstGeom>
+        </p:spPr>
+      </p:pic>
+      <p:sp>
+        <p:nvSpPr>
+          <p:cNvPr id="6" name="Retângulo 5"/>
+          <p:cNvSpPr/>
+          <p:nvPr/>
+        </p:nvSpPr>
+        <p:spPr>
+          <a:xfrm>
+            <a:off x="0" y="1217583"/>
+            <a:ext cx="1872208" cy="400110"/>
+          </a:xfrm>
+          <a:prstGeom prst="rect">
+            <a:avLst/>
+          </a:prstGeom>
+        </p:spPr>
+        <p:txBody>
+          <a:bodyPr wrap="square">
+            <a:spAutoFit/>
+          </a:bodyPr>
+          <a:lstStyle/>
+          <a:p>
+            <a:r>
+              <a:rPr lang="pt-BR" sz="2000" dirty="0" smtClean="0">
+                <a:solidFill>
+                  <a:srgbClr val="FF0000"/>
+                </a:solidFill>
+              </a:rPr>
+              <a:t>*Visão Gestor</a:t>
+            </a:r>
+            <a:endParaRPr lang="pt-BR" sz="2400" dirty="0">
+              <a:solidFill>
+                <a:srgbClr val="FF0000"/>
+              </a:solidFill>
+            </a:endParaRPr>
+          </a:p>
+        </p:txBody>
+      </p:sp>
+    </p:spTree>
+    <p:extLst>
+      <p:ext uri="{BB962C8B-B14F-4D97-AF65-F5344CB8AC3E}">
+        <p14:creationId xmlns:p14="http://schemas.microsoft.com/office/powerpoint/2010/main" val="3316813918"/>
+      </p:ext>
+    </p:extLst>
+  </p:cSld>
+  <p:clrMapOvr>
+    <a:masterClrMapping/>
+  </p:clrMapOvr>
+  <p:timing>
+    <p:tnLst>
+      <p:par>
+        <p:cTn id="1" dur="indefinite" restart="never" nodeType="tmRoot"/>
+      </p:par>
+    </p:tnLst>
+  </p:timing>
+</p:sld>
+</file>
+
+<file path=ppt/slides/slide2.xml><?xml version="1.0" encoding="utf-8"?>
+<p:sld xmlns:a="http://schemas.openxmlformats.org/drawingml/2006/main" xmlns:r="http://schemas.openxmlformats.org/officeDocument/2006/relationships" xmlns:p="http://schemas.openxmlformats.org/presentationml/2006/main">
+  <p:cSld>
+    <p:spTree>
+      <p:nvGrpSpPr>
+        <p:cNvPr id="1" name=""/>
+        <p:cNvGrpSpPr/>
+        <p:nvPr/>
+      </p:nvGrpSpPr>
+      <p:grpSpPr>
+        <a:xfrm>
+          <a:off x="0" y="0"/>
+          <a:ext cx="0" cy="0"/>
+          <a:chOff x="0" y="0"/>
+          <a:chExt cx="0" cy="0"/>
+        </a:xfrm>
+      </p:grpSpPr>
+      <p:sp>
+        <p:nvSpPr>
+          <p:cNvPr id="2" name="Title 1"/>
+          <p:cNvSpPr>
+            <a:spLocks noGrp="1"/>
+          </p:cNvSpPr>
+          <p:nvPr>
+            <p:ph type="title"/>
+          </p:nvPr>
+        </p:nvSpPr>
+        <p:spPr/>
+        <p:txBody>
+          <a:bodyPr/>
+          <a:lstStyle/>
+          <a:p>
+            <a:r>
+              <a:rPr lang="pt-BR" dirty="0" smtClean="0"/>
+              <a:t>Apresentação do Projeto</a:t>
+            </a:r>
+            <a:endParaRPr lang="pt-BR" dirty="0"/>
+          </a:p>
+        </p:txBody>
+      </p:sp>
+      <p:sp>
+        <p:nvSpPr>
+          <p:cNvPr id="3" name="Content Placeholder 2"/>
+          <p:cNvSpPr>
+            <a:spLocks noGrp="1"/>
+          </p:cNvSpPr>
+          <p:nvPr>
+            <p:ph idx="1"/>
+          </p:nvPr>
+        </p:nvSpPr>
+        <p:spPr/>
+        <p:txBody>
+          <a:bodyPr>
+            <a:normAutofit/>
+          </a:bodyPr>
+          <a:lstStyle/>
+          <a:p>
+            <a:r>
+              <a:rPr lang="pt-BR" dirty="0"/>
+              <a:t>Sistema de gerenciamento, gestão e controle de exames, visando facilidade e praticidade para o paciente.</a:t>
+            </a:r>
+          </a:p>
+          <a:p>
+            <a:r>
+              <a:rPr lang="pt-BR" dirty="0"/>
+              <a:t>Usuários: Paciente, Gestor e Administrador.</a:t>
+            </a:r>
+          </a:p>
+          <a:p>
+            <a:r>
+              <a:rPr lang="pt-BR" dirty="0"/>
+              <a:t>Ambientes: WebSite.</a:t>
+            </a:r>
+          </a:p>
+          <a:p>
+            <a:pPr marL="0" indent="0">
+              <a:buNone/>
+            </a:pPr>
+            <a:endParaRPr lang="pt-BR" dirty="0"/>
+          </a:p>
+        </p:txBody>
+      </p:sp>
+    </p:spTree>
+    <p:extLst>
+      <p:ext uri="{BB962C8B-B14F-4D97-AF65-F5344CB8AC3E}">
+        <p14:creationId xmlns:p14="http://schemas.microsoft.com/office/powerpoint/2010/main" val="300583781"/>
+      </p:ext>
+    </p:extLst>
+  </p:cSld>
+  <p:clrMapOvr>
+    <a:masterClrMapping/>
+  </p:clrMapOvr>
+  <p:timing>
+    <p:tnLst>
+      <p:par>
+        <p:cTn id="1" dur="indefinite" restart="never" nodeType="tmRoot"/>
+      </p:par>
+    </p:tnLst>
+  </p:timing>
+</p:sld>
+</file>
+
+<file path=ppt/slides/slide20.xml><?xml version="1.0" encoding="utf-8"?>
+<p:sld xmlns:a="http://schemas.openxmlformats.org/drawingml/2006/main" xmlns:r="http://schemas.openxmlformats.org/officeDocument/2006/relationships" xmlns:p="http://schemas.openxmlformats.org/presentationml/2006/main">
+  <p:cSld>
+    <p:spTree>
+      <p:nvGrpSpPr>
+        <p:cNvPr id="1" name=""/>
+        <p:cNvGrpSpPr/>
+        <p:nvPr/>
+      </p:nvGrpSpPr>
+      <p:grpSpPr>
+        <a:xfrm>
+          <a:off x="0" y="0"/>
+          <a:ext cx="0" cy="0"/>
+          <a:chOff x="0" y="0"/>
+          <a:chExt cx="0" cy="0"/>
+        </a:xfrm>
+      </p:grpSpPr>
+      <p:sp>
+        <p:nvSpPr>
+          <p:cNvPr id="2" name="Title 1"/>
+          <p:cNvSpPr>
+            <a:spLocks noGrp="1"/>
+          </p:cNvSpPr>
+          <p:nvPr>
+            <p:ph type="title"/>
+          </p:nvPr>
+        </p:nvSpPr>
+        <p:spPr/>
+        <p:txBody>
+          <a:bodyPr/>
+          <a:lstStyle/>
+          <a:p>
+            <a:r>
+              <a:rPr lang="pt-BR" dirty="0" smtClean="0"/>
+              <a:t>Interface do Usuário</a:t>
+            </a:r>
+            <a:endParaRPr lang="pt-BR" dirty="0"/>
+          </a:p>
+        </p:txBody>
+      </p:sp>
+      <p:pic>
+        <p:nvPicPr>
+          <p:cNvPr id="3" name="Imagem 2"/>
+          <p:cNvPicPr>
+            <a:picLocks noChangeAspect="1"/>
+          </p:cNvPicPr>
+          <p:nvPr/>
+        </p:nvPicPr>
+        <p:blipFill>
+          <a:blip r:embed="rId2">
+            <a:extLst>
+              <a:ext uri="{28A0092B-C50C-407E-A947-70E740481C1C}">
+                <a14:useLocalDpi xmlns:a14="http://schemas.microsoft.com/office/drawing/2010/main" val="0"/>
+              </a:ext>
+            </a:extLst>
+          </a:blip>
+          <a:stretch>
+            <a:fillRect/>
+          </a:stretch>
+        </p:blipFill>
+        <p:spPr>
+          <a:xfrm>
+            <a:off x="1293307" y="1124744"/>
+            <a:ext cx="6557385" cy="5104800"/>
+          </a:xfrm>
+          <a:prstGeom prst="rect">
+            <a:avLst/>
+          </a:prstGeom>
+        </p:spPr>
+      </p:pic>
+      <p:sp>
+        <p:nvSpPr>
+          <p:cNvPr id="7" name="Retângulo 6"/>
+          <p:cNvSpPr/>
+          <p:nvPr/>
+        </p:nvSpPr>
+        <p:spPr>
+          <a:xfrm>
+            <a:off x="0" y="1217583"/>
+            <a:ext cx="1872208" cy="400110"/>
+          </a:xfrm>
+          <a:prstGeom prst="rect">
+            <a:avLst/>
+          </a:prstGeom>
+        </p:spPr>
+        <p:txBody>
+          <a:bodyPr wrap="square">
+            <a:spAutoFit/>
+          </a:bodyPr>
+          <a:lstStyle/>
+          <a:p>
+            <a:r>
+              <a:rPr lang="pt-BR" sz="2000" dirty="0" smtClean="0">
+                <a:solidFill>
+                  <a:srgbClr val="FF0000"/>
+                </a:solidFill>
+              </a:rPr>
+              <a:t>*Visão Gestor</a:t>
+            </a:r>
+            <a:endParaRPr lang="pt-BR" sz="2400" dirty="0">
+              <a:solidFill>
+                <a:srgbClr val="FF0000"/>
+              </a:solidFill>
+            </a:endParaRPr>
+          </a:p>
+        </p:txBody>
+      </p:sp>
+    </p:spTree>
+    <p:extLst>
+      <p:ext uri="{BB962C8B-B14F-4D97-AF65-F5344CB8AC3E}">
+        <p14:creationId xmlns:p14="http://schemas.microsoft.com/office/powerpoint/2010/main" val="576134621"/>
+      </p:ext>
+    </p:extLst>
+  </p:cSld>
+  <p:clrMapOvr>
+    <a:masterClrMapping/>
+  </p:clrMapOvr>
+  <p:timing>
+    <p:tnLst>
+      <p:par>
+        <p:cTn id="1" dur="indefinite" restart="never" nodeType="tmRoot"/>
+      </p:par>
+    </p:tnLst>
+  </p:timing>
+</p:sld>
+</file>
+
+<file path=ppt/slides/slide21.xml><?xml version="1.0" encoding="utf-8"?>
+<p:sld xmlns:a="http://schemas.openxmlformats.org/drawingml/2006/main" xmlns:r="http://schemas.openxmlformats.org/officeDocument/2006/relationships" xmlns:p="http://schemas.openxmlformats.org/presentationml/2006/main">
+  <p:cSld>
+    <p:spTree>
+      <p:nvGrpSpPr>
+        <p:cNvPr id="1" name=""/>
+        <p:cNvGrpSpPr/>
+        <p:nvPr/>
+      </p:nvGrpSpPr>
+      <p:grpSpPr>
+        <a:xfrm>
+          <a:off x="0" y="0"/>
+          <a:ext cx="0" cy="0"/>
+          <a:chOff x="0" y="0"/>
+          <a:chExt cx="0" cy="0"/>
+        </a:xfrm>
+      </p:grpSpPr>
+      <p:sp>
+        <p:nvSpPr>
+          <p:cNvPr id="2" name="Title 1"/>
+          <p:cNvSpPr>
+            <a:spLocks noGrp="1"/>
+          </p:cNvSpPr>
+          <p:nvPr>
+            <p:ph type="title"/>
+          </p:nvPr>
+        </p:nvSpPr>
+        <p:spPr/>
+        <p:txBody>
+          <a:bodyPr/>
+          <a:lstStyle/>
+          <a:p>
+            <a:r>
+              <a:rPr lang="pt-BR" dirty="0" smtClean="0"/>
+              <a:t>Interface do Usuário</a:t>
+            </a:r>
+            <a:endParaRPr lang="pt-BR" dirty="0"/>
+          </a:p>
+        </p:txBody>
+      </p:sp>
+      <p:pic>
+        <p:nvPicPr>
+          <p:cNvPr id="4" name="Imagem 3"/>
+          <p:cNvPicPr>
+            <a:picLocks noChangeAspect="1"/>
+          </p:cNvPicPr>
+          <p:nvPr/>
+        </p:nvPicPr>
+        <p:blipFill>
+          <a:blip r:embed="rId2">
+            <a:extLst>
+              <a:ext uri="{28A0092B-C50C-407E-A947-70E740481C1C}">
+                <a14:useLocalDpi xmlns:a14="http://schemas.microsoft.com/office/drawing/2010/main" val="0"/>
+              </a:ext>
+            </a:extLst>
+          </a:blip>
+          <a:stretch>
+            <a:fillRect/>
+          </a:stretch>
+        </p:blipFill>
+        <p:spPr>
+          <a:xfrm>
+            <a:off x="1293307" y="1124744"/>
+            <a:ext cx="6557385" cy="5104800"/>
+          </a:xfrm>
+          <a:prstGeom prst="rect">
+            <a:avLst/>
+          </a:prstGeom>
+        </p:spPr>
+      </p:pic>
+      <p:sp>
+        <p:nvSpPr>
+          <p:cNvPr id="5" name="Retângulo 4"/>
+          <p:cNvSpPr/>
+          <p:nvPr/>
+        </p:nvSpPr>
+        <p:spPr>
+          <a:xfrm>
+            <a:off x="0" y="1217583"/>
+            <a:ext cx="1872208" cy="400110"/>
+          </a:xfrm>
+          <a:prstGeom prst="rect">
+            <a:avLst/>
+          </a:prstGeom>
+        </p:spPr>
+        <p:txBody>
+          <a:bodyPr wrap="square">
+            <a:spAutoFit/>
+          </a:bodyPr>
+          <a:lstStyle/>
+          <a:p>
+            <a:r>
+              <a:rPr lang="pt-BR" sz="2000" dirty="0" smtClean="0">
+                <a:solidFill>
+                  <a:srgbClr val="FF0000"/>
+                </a:solidFill>
+              </a:rPr>
+              <a:t>*Visão Gestor</a:t>
+            </a:r>
+            <a:endParaRPr lang="pt-BR" sz="2400" dirty="0">
+              <a:solidFill>
+                <a:srgbClr val="FF0000"/>
+              </a:solidFill>
+            </a:endParaRPr>
+          </a:p>
+        </p:txBody>
+      </p:sp>
+    </p:spTree>
+    <p:extLst>
+      <p:ext uri="{BB962C8B-B14F-4D97-AF65-F5344CB8AC3E}">
+        <p14:creationId xmlns:p14="http://schemas.microsoft.com/office/powerpoint/2010/main" val="2122406983"/>
+      </p:ext>
+    </p:extLst>
+  </p:cSld>
+  <p:clrMapOvr>
+    <a:masterClrMapping/>
+  </p:clrMapOvr>
+  <p:timing>
+    <p:tnLst>
+      <p:par>
+        <p:cTn id="1" dur="indefinite" restart="never" nodeType="tmRoot"/>
+      </p:par>
+    </p:tnLst>
+  </p:timing>
+</p:sld>
+</file>
+
+<file path=ppt/slides/slide22.xml><?xml version="1.0" encoding="utf-8"?>
+<p:sld xmlns:a="http://schemas.openxmlformats.org/drawingml/2006/main" xmlns:r="http://schemas.openxmlformats.org/officeDocument/2006/relationships" xmlns:p="http://schemas.openxmlformats.org/presentationml/2006/main">
+  <p:cSld>
+    <p:spTree>
+      <p:nvGrpSpPr>
+        <p:cNvPr id="1" name=""/>
+        <p:cNvGrpSpPr/>
+        <p:nvPr/>
+      </p:nvGrpSpPr>
+      <p:grpSpPr>
+        <a:xfrm>
+          <a:off x="0" y="0"/>
+          <a:ext cx="0" cy="0"/>
+          <a:chOff x="0" y="0"/>
+          <a:chExt cx="0" cy="0"/>
+        </a:xfrm>
+      </p:grpSpPr>
+      <p:sp>
+        <p:nvSpPr>
+          <p:cNvPr id="2" name="Title 1"/>
+          <p:cNvSpPr>
+            <a:spLocks noGrp="1"/>
+          </p:cNvSpPr>
+          <p:nvPr>
+            <p:ph type="title"/>
+          </p:nvPr>
+        </p:nvSpPr>
+        <p:spPr/>
+        <p:txBody>
+          <a:bodyPr/>
+          <a:lstStyle/>
+          <a:p>
+            <a:r>
+              <a:rPr lang="pt-BR" dirty="0" smtClean="0"/>
+              <a:t>Interface do Usuário</a:t>
+            </a:r>
+            <a:endParaRPr lang="pt-BR" dirty="0"/>
+          </a:p>
+        </p:txBody>
+      </p:sp>
+      <p:pic>
+        <p:nvPicPr>
+          <p:cNvPr id="3" name="Imagem 2"/>
+          <p:cNvPicPr>
+            <a:picLocks noChangeAspect="1"/>
+          </p:cNvPicPr>
+          <p:nvPr/>
+        </p:nvPicPr>
+        <p:blipFill>
+          <a:blip r:embed="rId2">
+            <a:extLst>
+              <a:ext uri="{28A0092B-C50C-407E-A947-70E740481C1C}">
+                <a14:useLocalDpi xmlns:a14="http://schemas.microsoft.com/office/drawing/2010/main" val="0"/>
+              </a:ext>
+            </a:extLst>
+          </a:blip>
+          <a:stretch>
+            <a:fillRect/>
+          </a:stretch>
+        </p:blipFill>
+        <p:spPr>
+          <a:xfrm>
+            <a:off x="1293307" y="1124744"/>
+            <a:ext cx="6557385" cy="5104800"/>
+          </a:xfrm>
+          <a:prstGeom prst="rect">
+            <a:avLst/>
+          </a:prstGeom>
+        </p:spPr>
+      </p:pic>
+      <p:sp>
+        <p:nvSpPr>
+          <p:cNvPr id="5" name="Retângulo 4"/>
+          <p:cNvSpPr/>
+          <p:nvPr/>
+        </p:nvSpPr>
+        <p:spPr>
+          <a:xfrm>
+            <a:off x="0" y="1217583"/>
+            <a:ext cx="1872208" cy="400110"/>
+          </a:xfrm>
+          <a:prstGeom prst="rect">
+            <a:avLst/>
+          </a:prstGeom>
+        </p:spPr>
+        <p:txBody>
+          <a:bodyPr wrap="square">
+            <a:spAutoFit/>
+          </a:bodyPr>
+          <a:lstStyle/>
+          <a:p>
+            <a:r>
+              <a:rPr lang="pt-BR" sz="2000" dirty="0" smtClean="0">
+                <a:solidFill>
+                  <a:srgbClr val="FF0000"/>
+                </a:solidFill>
+              </a:rPr>
+              <a:t>*Visão Gestor</a:t>
+            </a:r>
+            <a:endParaRPr lang="pt-BR" sz="2400" dirty="0">
+              <a:solidFill>
+                <a:srgbClr val="FF0000"/>
+              </a:solidFill>
+            </a:endParaRPr>
+          </a:p>
+        </p:txBody>
+      </p:sp>
+    </p:spTree>
+    <p:extLst>
+      <p:ext uri="{BB962C8B-B14F-4D97-AF65-F5344CB8AC3E}">
+        <p14:creationId xmlns:p14="http://schemas.microsoft.com/office/powerpoint/2010/main" val="2598367640"/>
+      </p:ext>
+    </p:extLst>
+  </p:cSld>
+  <p:clrMapOvr>
+    <a:masterClrMapping/>
+  </p:clrMapOvr>
+  <p:timing>
+    <p:tnLst>
+      <p:par>
+        <p:cTn id="1" dur="indefinite" restart="never" nodeType="tmRoot"/>
+      </p:par>
+    </p:tnLst>
+  </p:timing>
+</p:sld>
+</file>
+
+<file path=ppt/slides/slide23.xml><?xml version="1.0" encoding="utf-8"?>
+<p:sld xmlns:a="http://schemas.openxmlformats.org/drawingml/2006/main" xmlns:r="http://schemas.openxmlformats.org/officeDocument/2006/relationships" xmlns:p="http://schemas.openxmlformats.org/presentationml/2006/main">
+  <p:cSld>
+    <p:spTree>
+      <p:nvGrpSpPr>
+        <p:cNvPr id="1" name=""/>
+        <p:cNvGrpSpPr/>
+        <p:nvPr/>
+      </p:nvGrpSpPr>
+      <p:grpSpPr>
+        <a:xfrm>
+          <a:off x="0" y="0"/>
+          <a:ext cx="0" cy="0"/>
+          <a:chOff x="0" y="0"/>
+          <a:chExt cx="0" cy="0"/>
+        </a:xfrm>
+      </p:grpSpPr>
+      <p:sp>
+        <p:nvSpPr>
+          <p:cNvPr id="2" name="Title 1"/>
+          <p:cNvSpPr>
+            <a:spLocks noGrp="1"/>
+          </p:cNvSpPr>
+          <p:nvPr>
+            <p:ph type="title"/>
+          </p:nvPr>
+        </p:nvSpPr>
+        <p:spPr/>
+        <p:txBody>
+          <a:bodyPr/>
+          <a:lstStyle/>
+          <a:p>
+            <a:r>
+              <a:rPr lang="pt-BR" dirty="0" smtClean="0"/>
+              <a:t>Interface do Usuário</a:t>
+            </a:r>
+            <a:endParaRPr lang="pt-BR" dirty="0"/>
+          </a:p>
+        </p:txBody>
+      </p:sp>
+      <p:pic>
+        <p:nvPicPr>
+          <p:cNvPr id="4" name="Imagem 3"/>
+          <p:cNvPicPr>
+            <a:picLocks noChangeAspect="1"/>
+          </p:cNvPicPr>
+          <p:nvPr/>
+        </p:nvPicPr>
+        <p:blipFill>
+          <a:blip r:embed="rId2">
+            <a:extLst>
+              <a:ext uri="{28A0092B-C50C-407E-A947-70E740481C1C}">
+                <a14:useLocalDpi xmlns:a14="http://schemas.microsoft.com/office/drawing/2010/main" val="0"/>
+              </a:ext>
+            </a:extLst>
+          </a:blip>
+          <a:stretch>
+            <a:fillRect/>
+          </a:stretch>
+        </p:blipFill>
+        <p:spPr>
+          <a:xfrm>
+            <a:off x="1293307" y="1124744"/>
+            <a:ext cx="6557385" cy="5104800"/>
+          </a:xfrm>
+          <a:prstGeom prst="rect">
+            <a:avLst/>
+          </a:prstGeom>
+        </p:spPr>
+      </p:pic>
+      <p:sp>
+        <p:nvSpPr>
+          <p:cNvPr id="5" name="Retângulo 4"/>
+          <p:cNvSpPr/>
+          <p:nvPr/>
+        </p:nvSpPr>
+        <p:spPr>
+          <a:xfrm>
+            <a:off x="0" y="1217583"/>
+            <a:ext cx="1872208" cy="400110"/>
+          </a:xfrm>
+          <a:prstGeom prst="rect">
+            <a:avLst/>
+          </a:prstGeom>
+        </p:spPr>
+        <p:txBody>
+          <a:bodyPr wrap="square">
+            <a:spAutoFit/>
+          </a:bodyPr>
+          <a:lstStyle/>
+          <a:p>
+            <a:r>
+              <a:rPr lang="pt-BR" sz="2000" dirty="0" smtClean="0">
+                <a:solidFill>
+                  <a:srgbClr val="FF0000"/>
+                </a:solidFill>
+              </a:rPr>
+              <a:t>*Visão Gestor</a:t>
+            </a:r>
+            <a:endParaRPr lang="pt-BR" sz="2400" dirty="0">
+              <a:solidFill>
+                <a:srgbClr val="FF0000"/>
+              </a:solidFill>
+            </a:endParaRPr>
+          </a:p>
+        </p:txBody>
+      </p:sp>
+    </p:spTree>
+    <p:extLst>
+      <p:ext uri="{BB962C8B-B14F-4D97-AF65-F5344CB8AC3E}">
+        <p14:creationId xmlns:p14="http://schemas.microsoft.com/office/powerpoint/2010/main" val="2510664707"/>
+      </p:ext>
+    </p:extLst>
+  </p:cSld>
+  <p:clrMapOvr>
+    <a:masterClrMapping/>
+  </p:clrMapOvr>
+  <p:timing>
+    <p:tnLst>
+      <p:par>
+        <p:cTn id="1" dur="indefinite" restart="never" nodeType="tmRoot"/>
+      </p:par>
+    </p:tnLst>
+  </p:timing>
+</p:sld>
+</file>
+
+<file path=ppt/slides/slide24.xml><?xml version="1.0" encoding="utf-8"?>
+<p:sld xmlns:a="http://schemas.openxmlformats.org/drawingml/2006/main" xmlns:r="http://schemas.openxmlformats.org/officeDocument/2006/relationships" xmlns:p="http://schemas.openxmlformats.org/presentationml/2006/main">
+  <p:cSld>
+    <p:spTree>
+      <p:nvGrpSpPr>
+        <p:cNvPr id="1" name=""/>
+        <p:cNvGrpSpPr/>
+        <p:nvPr/>
+      </p:nvGrpSpPr>
+      <p:grpSpPr>
+        <a:xfrm>
+          <a:off x="0" y="0"/>
+          <a:ext cx="0" cy="0"/>
+          <a:chOff x="0" y="0"/>
+          <a:chExt cx="0" cy="0"/>
+        </a:xfrm>
+      </p:grpSpPr>
+      <p:sp>
+        <p:nvSpPr>
+          <p:cNvPr id="2" name="Title 1"/>
+          <p:cNvSpPr>
+            <a:spLocks noGrp="1"/>
+          </p:cNvSpPr>
+          <p:nvPr>
+            <p:ph type="title"/>
+          </p:nvPr>
+        </p:nvSpPr>
+        <p:spPr/>
+        <p:txBody>
+          <a:bodyPr/>
+          <a:lstStyle/>
+          <a:p>
+            <a:r>
+              <a:rPr lang="pt-BR" dirty="0" smtClean="0"/>
+              <a:t>Interface do Usuário</a:t>
+            </a:r>
+            <a:endParaRPr lang="pt-BR" dirty="0"/>
+          </a:p>
+        </p:txBody>
+      </p:sp>
+      <p:pic>
+        <p:nvPicPr>
+          <p:cNvPr id="3" name="Imagem 2"/>
+          <p:cNvPicPr>
+            <a:picLocks noChangeAspect="1"/>
+          </p:cNvPicPr>
+          <p:nvPr/>
+        </p:nvPicPr>
+        <p:blipFill>
+          <a:blip r:embed="rId2">
+            <a:extLst>
+              <a:ext uri="{28A0092B-C50C-407E-A947-70E740481C1C}">
+                <a14:useLocalDpi xmlns:a14="http://schemas.microsoft.com/office/drawing/2010/main" val="0"/>
+              </a:ext>
+            </a:extLst>
+          </a:blip>
+          <a:stretch>
+            <a:fillRect/>
+          </a:stretch>
+        </p:blipFill>
+        <p:spPr>
+          <a:xfrm>
+            <a:off x="1293307" y="1124744"/>
+            <a:ext cx="6557385" cy="5104800"/>
+          </a:xfrm>
+          <a:prstGeom prst="rect">
+            <a:avLst/>
+          </a:prstGeom>
+        </p:spPr>
+      </p:pic>
+      <p:sp>
+        <p:nvSpPr>
+          <p:cNvPr id="5" name="Retângulo 4"/>
+          <p:cNvSpPr/>
+          <p:nvPr/>
+        </p:nvSpPr>
+        <p:spPr>
+          <a:xfrm>
+            <a:off x="0" y="1217583"/>
+            <a:ext cx="1872208" cy="400110"/>
+          </a:xfrm>
+          <a:prstGeom prst="rect">
+            <a:avLst/>
+          </a:prstGeom>
+        </p:spPr>
+        <p:txBody>
+          <a:bodyPr wrap="square">
+            <a:spAutoFit/>
+          </a:bodyPr>
+          <a:lstStyle/>
+          <a:p>
+            <a:r>
+              <a:rPr lang="pt-BR" sz="2000" dirty="0" smtClean="0">
+                <a:solidFill>
+                  <a:srgbClr val="FF0000"/>
+                </a:solidFill>
+              </a:rPr>
+              <a:t>*Visão Gestor</a:t>
+            </a:r>
+            <a:endParaRPr lang="pt-BR" sz="2400" dirty="0">
+              <a:solidFill>
+                <a:srgbClr val="FF0000"/>
+              </a:solidFill>
+            </a:endParaRPr>
+          </a:p>
+        </p:txBody>
+      </p:sp>
+    </p:spTree>
+    <p:extLst>
+      <p:ext uri="{BB962C8B-B14F-4D97-AF65-F5344CB8AC3E}">
+        <p14:creationId xmlns:p14="http://schemas.microsoft.com/office/powerpoint/2010/main" val="3784726794"/>
+      </p:ext>
+    </p:extLst>
+  </p:cSld>
+  <p:clrMapOvr>
+    <a:masterClrMapping/>
+  </p:clrMapOvr>
+  <p:timing>
+    <p:tnLst>
+      <p:par>
+        <p:cTn id="1" dur="indefinite" restart="never" nodeType="tmRoot"/>
+      </p:par>
+    </p:tnLst>
+  </p:timing>
+</p:sld>
+</file>
+
+<file path=ppt/slides/slide25.xml><?xml version="1.0" encoding="utf-8"?>
+<p:sld xmlns:a="http://schemas.openxmlformats.org/drawingml/2006/main" xmlns:r="http://schemas.openxmlformats.org/officeDocument/2006/relationships" xmlns:p="http://schemas.openxmlformats.org/presentationml/2006/main">
+  <p:cSld>
+    <p:spTree>
+      <p:nvGrpSpPr>
+        <p:cNvPr id="1" name=""/>
+        <p:cNvGrpSpPr/>
+        <p:nvPr/>
+      </p:nvGrpSpPr>
+      <p:grpSpPr>
+        <a:xfrm>
+          <a:off x="0" y="0"/>
+          <a:ext cx="0" cy="0"/>
+          <a:chOff x="0" y="0"/>
+          <a:chExt cx="0" cy="0"/>
+        </a:xfrm>
+      </p:grpSpPr>
+      <p:sp>
+        <p:nvSpPr>
+          <p:cNvPr id="2" name="Title 1"/>
+          <p:cNvSpPr>
+            <a:spLocks noGrp="1"/>
+          </p:cNvSpPr>
+          <p:nvPr>
+            <p:ph type="title"/>
+          </p:nvPr>
+        </p:nvSpPr>
+        <p:spPr/>
+        <p:txBody>
+          <a:bodyPr/>
+          <a:lstStyle/>
+          <a:p>
+            <a:r>
+              <a:rPr lang="pt-BR" dirty="0" smtClean="0"/>
+              <a:t>Interface do Usuário</a:t>
+            </a:r>
+            <a:endParaRPr lang="pt-BR" dirty="0"/>
+          </a:p>
+        </p:txBody>
+      </p:sp>
+      <p:pic>
+        <p:nvPicPr>
+          <p:cNvPr id="5" name="Imagem 4"/>
+          <p:cNvPicPr>
+            <a:picLocks noChangeAspect="1"/>
+          </p:cNvPicPr>
+          <p:nvPr/>
+        </p:nvPicPr>
+        <p:blipFill>
+          <a:blip r:embed="rId2">
+            <a:extLst>
+              <a:ext uri="{28A0092B-C50C-407E-A947-70E740481C1C}">
+                <a14:useLocalDpi xmlns:a14="http://schemas.microsoft.com/office/drawing/2010/main" val="0"/>
+              </a:ext>
+            </a:extLst>
+          </a:blip>
+          <a:stretch>
+            <a:fillRect/>
+          </a:stretch>
+        </p:blipFill>
+        <p:spPr>
+          <a:xfrm>
+            <a:off x="1293307" y="1124744"/>
+            <a:ext cx="6557385" cy="5104800"/>
+          </a:xfrm>
+          <a:prstGeom prst="rect">
+            <a:avLst/>
+          </a:prstGeom>
+        </p:spPr>
+      </p:pic>
+      <p:sp>
+        <p:nvSpPr>
+          <p:cNvPr id="6" name="Retângulo 5"/>
+          <p:cNvSpPr/>
+          <p:nvPr/>
+        </p:nvSpPr>
+        <p:spPr>
+          <a:xfrm>
+            <a:off x="0" y="1217583"/>
+            <a:ext cx="1872208" cy="400110"/>
+          </a:xfrm>
+          <a:prstGeom prst="rect">
+            <a:avLst/>
+          </a:prstGeom>
+        </p:spPr>
+        <p:txBody>
+          <a:bodyPr wrap="square">
+            <a:spAutoFit/>
+          </a:bodyPr>
+          <a:lstStyle/>
+          <a:p>
+            <a:r>
+              <a:rPr lang="pt-BR" sz="2000" dirty="0" smtClean="0">
+                <a:solidFill>
+                  <a:srgbClr val="FF0000"/>
+                </a:solidFill>
+              </a:rPr>
+              <a:t>*Visão Gestor</a:t>
+            </a:r>
+            <a:endParaRPr lang="pt-BR" sz="2400" dirty="0">
+              <a:solidFill>
+                <a:srgbClr val="FF0000"/>
+              </a:solidFill>
+            </a:endParaRPr>
+          </a:p>
+        </p:txBody>
+      </p:sp>
+    </p:spTree>
+    <p:extLst>
+      <p:ext uri="{BB962C8B-B14F-4D97-AF65-F5344CB8AC3E}">
+        <p14:creationId xmlns:p14="http://schemas.microsoft.com/office/powerpoint/2010/main" val="2428608338"/>
+      </p:ext>
+    </p:extLst>
+  </p:cSld>
+  <p:clrMapOvr>
+    <a:masterClrMapping/>
+  </p:clrMapOvr>
+  <p:timing>
+    <p:tnLst>
+      <p:par>
+        <p:cTn id="1" dur="indefinite" restart="never" nodeType="tmRoot"/>
+      </p:par>
+    </p:tnLst>
+  </p:timing>
+</p:sld>
+</file>
+
+<file path=ppt/slides/slide26.xml><?xml version="1.0" encoding="utf-8"?>
+<p:sld xmlns:a="http://schemas.openxmlformats.org/drawingml/2006/main" xmlns:r="http://schemas.openxmlformats.org/officeDocument/2006/relationships" xmlns:p="http://schemas.openxmlformats.org/presentationml/2006/main">
+  <p:cSld>
+    <p:spTree>
+      <p:nvGrpSpPr>
+        <p:cNvPr id="1" name=""/>
+        <p:cNvGrpSpPr/>
+        <p:nvPr/>
+      </p:nvGrpSpPr>
+      <p:grpSpPr>
+        <a:xfrm>
+          <a:off x="0" y="0"/>
+          <a:ext cx="0" cy="0"/>
+          <a:chOff x="0" y="0"/>
+          <a:chExt cx="0" cy="0"/>
+        </a:xfrm>
+      </p:grpSpPr>
+      <p:sp>
+        <p:nvSpPr>
+          <p:cNvPr id="2" name="Title 1"/>
+          <p:cNvSpPr>
+            <a:spLocks noGrp="1"/>
+          </p:cNvSpPr>
+          <p:nvPr>
+            <p:ph type="title"/>
+          </p:nvPr>
+        </p:nvSpPr>
+        <p:spPr/>
+        <p:txBody>
+          <a:bodyPr/>
+          <a:lstStyle/>
+          <a:p>
+            <a:r>
+              <a:rPr lang="pt-BR" dirty="0" smtClean="0"/>
+              <a:t>Interface do Usuário</a:t>
+            </a:r>
+            <a:endParaRPr lang="pt-BR" dirty="0"/>
+          </a:p>
+        </p:txBody>
+      </p:sp>
+      <p:pic>
+        <p:nvPicPr>
+          <p:cNvPr id="5" name="Imagem 4"/>
+          <p:cNvPicPr>
+            <a:picLocks noChangeAspect="1"/>
+          </p:cNvPicPr>
+          <p:nvPr/>
+        </p:nvPicPr>
+        <p:blipFill>
+          <a:blip r:embed="rId2">
+            <a:extLst>
+              <a:ext uri="{28A0092B-C50C-407E-A947-70E740481C1C}">
+                <a14:useLocalDpi xmlns:a14="http://schemas.microsoft.com/office/drawing/2010/main" val="0"/>
+              </a:ext>
+            </a:extLst>
+          </a:blip>
+          <a:stretch>
+            <a:fillRect/>
+          </a:stretch>
+        </p:blipFill>
+        <p:spPr>
+          <a:xfrm>
+            <a:off x="1293307" y="1124744"/>
+            <a:ext cx="6557385" cy="5104800"/>
+          </a:xfrm>
+          <a:prstGeom prst="rect">
+            <a:avLst/>
+          </a:prstGeom>
+        </p:spPr>
+      </p:pic>
+      <p:sp>
+        <p:nvSpPr>
+          <p:cNvPr id="6" name="Retângulo 5"/>
+          <p:cNvSpPr/>
+          <p:nvPr/>
+        </p:nvSpPr>
+        <p:spPr>
+          <a:xfrm>
+            <a:off x="0" y="1217583"/>
+            <a:ext cx="1872208" cy="400110"/>
+          </a:xfrm>
+          <a:prstGeom prst="rect">
+            <a:avLst/>
+          </a:prstGeom>
+        </p:spPr>
+        <p:txBody>
+          <a:bodyPr wrap="square">
+            <a:spAutoFit/>
+          </a:bodyPr>
+          <a:lstStyle/>
+          <a:p>
+            <a:r>
+              <a:rPr lang="pt-BR" sz="2000" dirty="0" smtClean="0">
+                <a:solidFill>
+                  <a:srgbClr val="FF0000"/>
+                </a:solidFill>
+              </a:rPr>
+              <a:t>*Visão Gestor</a:t>
+            </a:r>
+            <a:endParaRPr lang="pt-BR" sz="2400" dirty="0">
+              <a:solidFill>
+                <a:srgbClr val="FF0000"/>
+              </a:solidFill>
+            </a:endParaRPr>
+          </a:p>
+        </p:txBody>
+      </p:sp>
+    </p:spTree>
+    <p:extLst>
+      <p:ext uri="{BB962C8B-B14F-4D97-AF65-F5344CB8AC3E}">
+        <p14:creationId xmlns:p14="http://schemas.microsoft.com/office/powerpoint/2010/main" val="172973721"/>
+      </p:ext>
+    </p:extLst>
+  </p:cSld>
+  <p:clrMapOvr>
+    <a:masterClrMapping/>
+  </p:clrMapOvr>
+  <p:timing>
+    <p:tnLst>
+      <p:par>
+        <p:cTn id="1" dur="indefinite" restart="never" nodeType="tmRoot"/>
+      </p:par>
+    </p:tnLst>
+  </p:timing>
+</p:sld>
+</file>
+
+<file path=ppt/slides/slide27.xml><?xml version="1.0" encoding="utf-8"?>
+<p:sld xmlns:a="http://schemas.openxmlformats.org/drawingml/2006/main" xmlns:r="http://schemas.openxmlformats.org/officeDocument/2006/relationships" xmlns:p="http://schemas.openxmlformats.org/presentationml/2006/main">
+  <p:cSld>
+    <p:spTree>
+      <p:nvGrpSpPr>
+        <p:cNvPr id="1" name=""/>
+        <p:cNvGrpSpPr/>
+        <p:nvPr/>
+      </p:nvGrpSpPr>
+      <p:grpSpPr>
+        <a:xfrm>
+          <a:off x="0" y="0"/>
+          <a:ext cx="0" cy="0"/>
+          <a:chOff x="0" y="0"/>
+          <a:chExt cx="0" cy="0"/>
+        </a:xfrm>
+      </p:grpSpPr>
+      <p:sp>
+        <p:nvSpPr>
+          <p:cNvPr id="2" name="Title 1"/>
+          <p:cNvSpPr>
+            <a:spLocks noGrp="1"/>
+          </p:cNvSpPr>
+          <p:nvPr>
+            <p:ph type="title"/>
+          </p:nvPr>
+        </p:nvSpPr>
+        <p:spPr/>
+        <p:txBody>
+          <a:bodyPr/>
+          <a:lstStyle/>
+          <a:p>
+            <a:r>
+              <a:rPr lang="pt-BR" dirty="0" smtClean="0"/>
+              <a:t>Interface do Usuário</a:t>
+            </a:r>
+            <a:endParaRPr lang="pt-BR" dirty="0"/>
+          </a:p>
+        </p:txBody>
+      </p:sp>
+      <p:pic>
+        <p:nvPicPr>
+          <p:cNvPr id="3" name="Imagem 2"/>
+          <p:cNvPicPr>
+            <a:picLocks noChangeAspect="1"/>
+          </p:cNvPicPr>
+          <p:nvPr/>
+        </p:nvPicPr>
+        <p:blipFill>
+          <a:blip r:embed="rId2">
+            <a:extLst>
+              <a:ext uri="{28A0092B-C50C-407E-A947-70E740481C1C}">
+                <a14:useLocalDpi xmlns:a14="http://schemas.microsoft.com/office/drawing/2010/main" val="0"/>
+              </a:ext>
+            </a:extLst>
+          </a:blip>
+          <a:stretch>
+            <a:fillRect/>
+          </a:stretch>
+        </p:blipFill>
+        <p:spPr>
+          <a:xfrm>
+            <a:off x="1293307" y="1124744"/>
+            <a:ext cx="6557385" cy="5104800"/>
+          </a:xfrm>
+          <a:prstGeom prst="rect">
+            <a:avLst/>
+          </a:prstGeom>
+        </p:spPr>
+      </p:pic>
+      <p:sp>
+        <p:nvSpPr>
+          <p:cNvPr id="9" name="Retângulo 8"/>
+          <p:cNvSpPr/>
+          <p:nvPr/>
+        </p:nvSpPr>
+        <p:spPr>
+          <a:xfrm>
+            <a:off x="0" y="1217583"/>
+            <a:ext cx="1872208" cy="400110"/>
+          </a:xfrm>
+          <a:prstGeom prst="rect">
+            <a:avLst/>
+          </a:prstGeom>
+        </p:spPr>
+        <p:txBody>
+          <a:bodyPr wrap="square">
+            <a:spAutoFit/>
+          </a:bodyPr>
+          <a:lstStyle/>
+          <a:p>
+            <a:r>
+              <a:rPr lang="pt-BR" sz="2000" dirty="0" smtClean="0">
+                <a:solidFill>
+                  <a:srgbClr val="FF0000"/>
+                </a:solidFill>
+              </a:rPr>
+              <a:t>*Visão ADM</a:t>
+            </a:r>
+            <a:endParaRPr lang="pt-BR" sz="2400" dirty="0">
+              <a:solidFill>
+                <a:srgbClr val="FF0000"/>
+              </a:solidFill>
+            </a:endParaRPr>
+          </a:p>
+        </p:txBody>
+      </p:sp>
+    </p:spTree>
+    <p:extLst>
+      <p:ext uri="{BB962C8B-B14F-4D97-AF65-F5344CB8AC3E}">
+        <p14:creationId xmlns:p14="http://schemas.microsoft.com/office/powerpoint/2010/main" val="227153128"/>
+      </p:ext>
+    </p:extLst>
+  </p:cSld>
+  <p:clrMapOvr>
+    <a:masterClrMapping/>
+  </p:clrMapOvr>
+  <p:timing>
+    <p:tnLst>
+      <p:par>
+        <p:cTn id="1" dur="indefinite" restart="never" nodeType="tmRoot"/>
+      </p:par>
+    </p:tnLst>
+  </p:timing>
+</p:sld>
+</file>
+
+<file path=ppt/slides/slide28.xml><?xml version="1.0" encoding="utf-8"?>
+<p:sld xmlns:a="http://schemas.openxmlformats.org/drawingml/2006/main" xmlns:r="http://schemas.openxmlformats.org/officeDocument/2006/relationships" xmlns:p="http://schemas.openxmlformats.org/presentationml/2006/main">
+  <p:cSld>
+    <p:spTree>
+      <p:nvGrpSpPr>
+        <p:cNvPr id="1" name=""/>
+        <p:cNvGrpSpPr/>
+        <p:nvPr/>
+      </p:nvGrpSpPr>
+      <p:grpSpPr>
+        <a:xfrm>
+          <a:off x="0" y="0"/>
+          <a:ext cx="0" cy="0"/>
+          <a:chOff x="0" y="0"/>
+          <a:chExt cx="0" cy="0"/>
+        </a:xfrm>
+      </p:grpSpPr>
+      <p:sp>
+        <p:nvSpPr>
+          <p:cNvPr id="2" name="Title 1"/>
+          <p:cNvSpPr>
+            <a:spLocks noGrp="1"/>
+          </p:cNvSpPr>
+          <p:nvPr>
+            <p:ph type="title"/>
+          </p:nvPr>
+        </p:nvSpPr>
+        <p:spPr/>
+        <p:txBody>
+          <a:bodyPr/>
+          <a:lstStyle/>
+          <a:p>
+            <a:r>
+              <a:rPr lang="pt-BR" dirty="0" smtClean="0"/>
+              <a:t>Interface do Usuário</a:t>
+            </a:r>
+            <a:endParaRPr lang="pt-BR" dirty="0"/>
+          </a:p>
+        </p:txBody>
+      </p:sp>
+      <p:pic>
+        <p:nvPicPr>
+          <p:cNvPr id="4" name="Imagem 3"/>
+          <p:cNvPicPr>
+            <a:picLocks noChangeAspect="1"/>
+          </p:cNvPicPr>
+          <p:nvPr/>
+        </p:nvPicPr>
+        <p:blipFill>
+          <a:blip r:embed="rId2">
+            <a:extLst>
+              <a:ext uri="{28A0092B-C50C-407E-A947-70E740481C1C}">
+                <a14:useLocalDpi xmlns:a14="http://schemas.microsoft.com/office/drawing/2010/main" val="0"/>
+              </a:ext>
+            </a:extLst>
+          </a:blip>
+          <a:stretch>
+            <a:fillRect/>
+          </a:stretch>
+        </p:blipFill>
+        <p:spPr>
+          <a:xfrm>
+            <a:off x="1293307" y="1124744"/>
+            <a:ext cx="6557385" cy="5104800"/>
+          </a:xfrm>
+          <a:prstGeom prst="rect">
+            <a:avLst/>
+          </a:prstGeom>
+        </p:spPr>
+      </p:pic>
+      <p:sp>
+        <p:nvSpPr>
+          <p:cNvPr id="8" name="Retângulo 7"/>
+          <p:cNvSpPr/>
+          <p:nvPr/>
+        </p:nvSpPr>
+        <p:spPr>
+          <a:xfrm>
+            <a:off x="0" y="1217583"/>
+            <a:ext cx="1872208" cy="400110"/>
+          </a:xfrm>
+          <a:prstGeom prst="rect">
+            <a:avLst/>
+          </a:prstGeom>
+        </p:spPr>
+        <p:txBody>
+          <a:bodyPr wrap="square">
+            <a:spAutoFit/>
+          </a:bodyPr>
+          <a:lstStyle/>
+          <a:p>
+            <a:r>
+              <a:rPr lang="pt-BR" sz="2000" dirty="0" smtClean="0">
+                <a:solidFill>
+                  <a:srgbClr val="FF0000"/>
+                </a:solidFill>
+              </a:rPr>
+              <a:t>*Visão ADM</a:t>
+            </a:r>
+            <a:endParaRPr lang="pt-BR" sz="2400" dirty="0">
+              <a:solidFill>
+                <a:srgbClr val="FF0000"/>
+              </a:solidFill>
+            </a:endParaRPr>
+          </a:p>
+        </p:txBody>
+      </p:sp>
+    </p:spTree>
+    <p:extLst>
+      <p:ext uri="{BB962C8B-B14F-4D97-AF65-F5344CB8AC3E}">
+        <p14:creationId xmlns:p14="http://schemas.microsoft.com/office/powerpoint/2010/main" val="38583560"/>
+      </p:ext>
+    </p:extLst>
+  </p:cSld>
+  <p:clrMapOvr>
+    <a:masterClrMapping/>
+  </p:clrMapOvr>
+  <p:timing>
+    <p:tnLst>
+      <p:par>
+        <p:cTn id="1" dur="indefinite" restart="never" nodeType="tmRoot"/>
+      </p:par>
+    </p:tnLst>
+  </p:timing>
+</p:sld>
+</file>
+
+<file path=ppt/slides/slide29.xml><?xml version="1.0" encoding="utf-8"?>
+<p:sld xmlns:a="http://schemas.openxmlformats.org/drawingml/2006/main" xmlns:r="http://schemas.openxmlformats.org/officeDocument/2006/relationships" xmlns:p="http://schemas.openxmlformats.org/presentationml/2006/main">
+  <p:cSld>
+    <p:spTree>
+      <p:nvGrpSpPr>
+        <p:cNvPr id="1" name=""/>
+        <p:cNvGrpSpPr/>
+        <p:nvPr/>
+      </p:nvGrpSpPr>
+      <p:grpSpPr>
+        <a:xfrm>
+          <a:off x="0" y="0"/>
+          <a:ext cx="0" cy="0"/>
+          <a:chOff x="0" y="0"/>
+          <a:chExt cx="0" cy="0"/>
+        </a:xfrm>
+      </p:grpSpPr>
+      <p:sp>
+        <p:nvSpPr>
+          <p:cNvPr id="2" name="Title 1"/>
+          <p:cNvSpPr>
+            <a:spLocks noGrp="1"/>
+          </p:cNvSpPr>
+          <p:nvPr>
+            <p:ph type="title"/>
+          </p:nvPr>
+        </p:nvSpPr>
+        <p:spPr/>
+        <p:txBody>
+          <a:bodyPr/>
+          <a:lstStyle/>
+          <a:p>
+            <a:r>
+              <a:rPr lang="pt-BR" dirty="0" smtClean="0"/>
+              <a:t>Interface do Usuário</a:t>
+            </a:r>
+            <a:endParaRPr lang="pt-BR" dirty="0"/>
+          </a:p>
+        </p:txBody>
+      </p:sp>
+      <p:pic>
+        <p:nvPicPr>
+          <p:cNvPr id="3" name="Imagem 2"/>
+          <p:cNvPicPr>
+            <a:picLocks noChangeAspect="1"/>
+          </p:cNvPicPr>
+          <p:nvPr/>
+        </p:nvPicPr>
+        <p:blipFill>
+          <a:blip r:embed="rId2">
+            <a:extLst>
+              <a:ext uri="{28A0092B-C50C-407E-A947-70E740481C1C}">
+                <a14:useLocalDpi xmlns:a14="http://schemas.microsoft.com/office/drawing/2010/main" val="0"/>
+              </a:ext>
+            </a:extLst>
+          </a:blip>
+          <a:stretch>
+            <a:fillRect/>
+          </a:stretch>
+        </p:blipFill>
+        <p:spPr>
+          <a:xfrm>
+            <a:off x="1293307" y="1124744"/>
+            <a:ext cx="6557385" cy="5104800"/>
+          </a:xfrm>
+          <a:prstGeom prst="rect">
+            <a:avLst/>
+          </a:prstGeom>
+        </p:spPr>
+      </p:pic>
+      <p:sp>
+        <p:nvSpPr>
+          <p:cNvPr id="8" name="Retângulo 7"/>
+          <p:cNvSpPr/>
+          <p:nvPr/>
+        </p:nvSpPr>
+        <p:spPr>
+          <a:xfrm>
+            <a:off x="0" y="1217583"/>
+            <a:ext cx="1835696" cy="400110"/>
+          </a:xfrm>
+          <a:prstGeom prst="rect">
+            <a:avLst/>
+          </a:prstGeom>
+        </p:spPr>
+        <p:txBody>
+          <a:bodyPr wrap="square">
+            <a:spAutoFit/>
+          </a:bodyPr>
+          <a:lstStyle/>
+          <a:p>
+            <a:r>
+              <a:rPr lang="pt-BR" sz="2000" dirty="0" smtClean="0">
+                <a:solidFill>
+                  <a:srgbClr val="FF0000"/>
+                </a:solidFill>
+              </a:rPr>
+              <a:t>*Visão ADM</a:t>
+            </a:r>
+            <a:endParaRPr lang="pt-BR" sz="2400" dirty="0">
+              <a:solidFill>
+                <a:srgbClr val="FF0000"/>
+              </a:solidFill>
+            </a:endParaRPr>
+          </a:p>
+        </p:txBody>
+      </p:sp>
+    </p:spTree>
+    <p:extLst>
+      <p:ext uri="{BB962C8B-B14F-4D97-AF65-F5344CB8AC3E}">
+        <p14:creationId xmlns:p14="http://schemas.microsoft.com/office/powerpoint/2010/main" val="1225680612"/>
+      </p:ext>
+    </p:extLst>
+  </p:cSld>
+  <p:clrMapOvr>
+    <a:masterClrMapping/>
+  </p:clrMapOvr>
+  <p:timing>
+    <p:tnLst>
+      <p:par>
+        <p:cTn id="1" dur="indefinite" restart="never" nodeType="tmRoot"/>
+      </p:par>
+    </p:tnLst>
+  </p:timing>
+</p:sld>
+</file>
+
+<file path=ppt/slides/slide3.xml><?xml version="1.0" encoding="utf-8"?>
+<p:sld xmlns:a="http://schemas.openxmlformats.org/drawingml/2006/main" xmlns:r="http://schemas.openxmlformats.org/officeDocument/2006/relationships" xmlns:p="http://schemas.openxmlformats.org/presentationml/2006/main">
+  <p:cSld>
+    <p:spTree>
+      <p:nvGrpSpPr>
+        <p:cNvPr id="1" name=""/>
+        <p:cNvGrpSpPr/>
+        <p:nvPr/>
+      </p:nvGrpSpPr>
+      <p:grpSpPr>
+        <a:xfrm>
+          <a:off x="0" y="0"/>
+          <a:ext cx="0" cy="0"/>
+          <a:chOff x="0" y="0"/>
+          <a:chExt cx="0" cy="0"/>
+        </a:xfrm>
+      </p:grpSpPr>
+      <p:sp>
+        <p:nvSpPr>
+          <p:cNvPr id="2" name="Title 1"/>
+          <p:cNvSpPr>
+            <a:spLocks noGrp="1"/>
+          </p:cNvSpPr>
+          <p:nvPr>
+            <p:ph type="title"/>
+          </p:nvPr>
+        </p:nvSpPr>
+        <p:spPr/>
+        <p:txBody>
+          <a:bodyPr/>
+          <a:lstStyle/>
+          <a:p>
+            <a:r>
+              <a:rPr lang="pt-BR" dirty="0" smtClean="0"/>
+              <a:t>Apresentação do Projeto</a:t>
+            </a:r>
+            <a:endParaRPr lang="pt-BR" dirty="0"/>
+          </a:p>
+        </p:txBody>
+      </p:sp>
+      <p:sp>
+        <p:nvSpPr>
+          <p:cNvPr id="3" name="Content Placeholder 2"/>
+          <p:cNvSpPr>
+            <a:spLocks noGrp="1"/>
+          </p:cNvSpPr>
+          <p:nvPr>
+            <p:ph idx="1"/>
+          </p:nvPr>
+        </p:nvSpPr>
+        <p:spPr/>
+        <p:txBody>
+          <a:bodyPr>
+            <a:normAutofit/>
+          </a:bodyPr>
+          <a:lstStyle/>
+          <a:p>
+            <a:pPr marL="342900" lvl="2" indent="-342900"/>
+            <a:r>
+              <a:rPr lang="pt-BR" sz="2800" dirty="0" smtClean="0">
+                <a:latin typeface="Tahoma" panose="020B0604030504040204" pitchFamily="34" charset="0"/>
+                <a:ea typeface="Tahoma" panose="020B0604030504040204" pitchFamily="34" charset="0"/>
+                <a:cs typeface="Tahoma" panose="020B0604030504040204" pitchFamily="34" charset="0"/>
+              </a:rPr>
+              <a:t>Analisando </a:t>
+            </a:r>
+            <a:r>
+              <a:rPr lang="pt-BR" sz="2800" dirty="0">
+                <a:latin typeface="Tahoma" panose="020B0604030504040204" pitchFamily="34" charset="0"/>
+                <a:ea typeface="Tahoma" panose="020B0604030504040204" pitchFamily="34" charset="0"/>
+                <a:cs typeface="Tahoma" panose="020B0604030504040204" pitchFamily="34" charset="0"/>
+              </a:rPr>
+              <a:t>outros sistemas e interfaces (web) de gerenciamento de exames pudemos constatar que existem muitas falhas e </a:t>
+            </a:r>
+            <a:r>
+              <a:rPr lang="pt-BR" sz="2800" dirty="0" smtClean="0">
+                <a:latin typeface="Tahoma" panose="020B0604030504040204" pitchFamily="34" charset="0"/>
+                <a:ea typeface="Tahoma" panose="020B0604030504040204" pitchFamily="34" charset="0"/>
+                <a:cs typeface="Tahoma" panose="020B0604030504040204" pitchFamily="34" charset="0"/>
+              </a:rPr>
+              <a:t>com isso </a:t>
+            </a:r>
+            <a:r>
+              <a:rPr lang="pt-BR" sz="2800" dirty="0">
+                <a:latin typeface="Tahoma" panose="020B0604030504040204" pitchFamily="34" charset="0"/>
+                <a:ea typeface="Tahoma" panose="020B0604030504040204" pitchFamily="34" charset="0"/>
+                <a:cs typeface="Tahoma" panose="020B0604030504040204" pitchFamily="34" charset="0"/>
+              </a:rPr>
+              <a:t>resolvemos desenvolver um sistema que auxiliasse a resolução dessas falhas. O paciente poderá ter acesso ao sistema via website para verificar o andamento e resultado de exames.</a:t>
+            </a:r>
+          </a:p>
+          <a:p>
+            <a:endParaRPr lang="pt-BR" dirty="0"/>
+          </a:p>
+        </p:txBody>
+      </p:sp>
+    </p:spTree>
+    <p:extLst>
+      <p:ext uri="{BB962C8B-B14F-4D97-AF65-F5344CB8AC3E}">
+        <p14:creationId xmlns:p14="http://schemas.microsoft.com/office/powerpoint/2010/main" val="4094789528"/>
+      </p:ext>
+    </p:extLst>
+  </p:cSld>
+  <p:clrMapOvr>
+    <a:masterClrMapping/>
+  </p:clrMapOvr>
+  <p:timing>
+    <p:tnLst>
+      <p:par>
+        <p:cTn id="1" dur="indefinite" restart="never" nodeType="tmRoot"/>
+      </p:par>
+    </p:tnLst>
+  </p:timing>
+</p:sld>
+</file>
+
+<file path=ppt/slides/slide30.xml><?xml version="1.0" encoding="utf-8"?>
+<p:sld xmlns:a="http://schemas.openxmlformats.org/drawingml/2006/main" xmlns:r="http://schemas.openxmlformats.org/officeDocument/2006/relationships" xmlns:p="http://schemas.openxmlformats.org/presentationml/2006/main">
+  <p:cSld>
+    <p:spTree>
+      <p:nvGrpSpPr>
+        <p:cNvPr id="1" name=""/>
+        <p:cNvGrpSpPr/>
+        <p:nvPr/>
+      </p:nvGrpSpPr>
+      <p:grpSpPr>
+        <a:xfrm>
+          <a:off x="0" y="0"/>
+          <a:ext cx="0" cy="0"/>
+          <a:chOff x="0" y="0"/>
+          <a:chExt cx="0" cy="0"/>
+        </a:xfrm>
+      </p:grpSpPr>
+      <p:sp>
+        <p:nvSpPr>
+          <p:cNvPr id="2" name="Title 1"/>
+          <p:cNvSpPr>
+            <a:spLocks noGrp="1"/>
+          </p:cNvSpPr>
+          <p:nvPr>
+            <p:ph type="title"/>
+          </p:nvPr>
+        </p:nvSpPr>
+        <p:spPr/>
+        <p:txBody>
+          <a:bodyPr/>
+          <a:lstStyle/>
+          <a:p>
+            <a:r>
+              <a:rPr lang="pt-BR" dirty="0" smtClean="0"/>
+              <a:t>Banco de Dados</a:t>
+            </a:r>
+            <a:endParaRPr lang="pt-BR" dirty="0"/>
+          </a:p>
+        </p:txBody>
+      </p:sp>
+      <p:pic>
+        <p:nvPicPr>
+          <p:cNvPr id="5" name="Imagem 4"/>
+          <p:cNvPicPr>
+            <a:picLocks noChangeAspect="1"/>
+          </p:cNvPicPr>
+          <p:nvPr/>
+        </p:nvPicPr>
+        <p:blipFill>
+          <a:blip r:embed="rId2">
+            <a:extLst>
+              <a:ext uri="{28A0092B-C50C-407E-A947-70E740481C1C}">
+                <a14:useLocalDpi xmlns:a14="http://schemas.microsoft.com/office/drawing/2010/main" val="0"/>
+              </a:ext>
+            </a:extLst>
+          </a:blip>
+          <a:stretch>
+            <a:fillRect/>
+          </a:stretch>
+        </p:blipFill>
+        <p:spPr>
+          <a:xfrm>
+            <a:off x="0" y="1417638"/>
+            <a:ext cx="9144000" cy="4691790"/>
+          </a:xfrm>
+          <a:prstGeom prst="rect">
+            <a:avLst/>
+          </a:prstGeom>
+        </p:spPr>
+      </p:pic>
+    </p:spTree>
+    <p:extLst>
+      <p:ext uri="{BB962C8B-B14F-4D97-AF65-F5344CB8AC3E}">
+        <p14:creationId xmlns:p14="http://schemas.microsoft.com/office/powerpoint/2010/main" val="3218491669"/>
+      </p:ext>
+    </p:extLst>
+  </p:cSld>
+  <p:clrMapOvr>
+    <a:masterClrMapping/>
+  </p:clrMapOvr>
+  <p:timing>
+    <p:tnLst>
+      <p:par>
+        <p:cTn id="1" dur="indefinite" restart="never" nodeType="tmRoot"/>
+      </p:par>
+    </p:tnLst>
+  </p:timing>
+</p:sld>
+</file>
+
+<file path=ppt/slides/slide31.xml><?xml version="1.0" encoding="utf-8"?>
+<p:sld xmlns:a="http://schemas.openxmlformats.org/drawingml/2006/main" xmlns:r="http://schemas.openxmlformats.org/officeDocument/2006/relationships" xmlns:p="http://schemas.openxmlformats.org/presentationml/2006/main">
+  <p:cSld>
+    <p:spTree>
+      <p:nvGrpSpPr>
+        <p:cNvPr id="1" name=""/>
+        <p:cNvGrpSpPr/>
+        <p:nvPr/>
+      </p:nvGrpSpPr>
+      <p:grpSpPr>
+        <a:xfrm>
+          <a:off x="0" y="0"/>
+          <a:ext cx="0" cy="0"/>
+          <a:chOff x="0" y="0"/>
+          <a:chExt cx="0" cy="0"/>
+        </a:xfrm>
+      </p:grpSpPr>
+      <p:sp>
+        <p:nvSpPr>
+          <p:cNvPr id="2" name="Title 1"/>
+          <p:cNvSpPr>
+            <a:spLocks noGrp="1"/>
+          </p:cNvSpPr>
+          <p:nvPr>
+            <p:ph type="title"/>
+          </p:nvPr>
+        </p:nvSpPr>
+        <p:spPr/>
+        <p:txBody>
+          <a:bodyPr/>
+          <a:lstStyle/>
+          <a:p>
+            <a:r>
+              <a:rPr lang="pt-BR" dirty="0" smtClean="0"/>
+              <a:t>Banco de Dados</a:t>
+            </a:r>
+            <a:endParaRPr lang="pt-BR" dirty="0"/>
+          </a:p>
+        </p:txBody>
+      </p:sp>
+      <p:pic>
+        <p:nvPicPr>
+          <p:cNvPr id="3" name="Imagem 2"/>
+          <p:cNvPicPr>
+            <a:picLocks noChangeAspect="1"/>
+          </p:cNvPicPr>
+          <p:nvPr/>
+        </p:nvPicPr>
+        <p:blipFill>
+          <a:blip r:embed="rId2">
+            <a:extLst>
+              <a:ext uri="{28A0092B-C50C-407E-A947-70E740481C1C}">
+                <a14:useLocalDpi xmlns:a14="http://schemas.microsoft.com/office/drawing/2010/main" val="0"/>
+              </a:ext>
+            </a:extLst>
+          </a:blip>
+          <a:stretch>
+            <a:fillRect/>
+          </a:stretch>
+        </p:blipFill>
+        <p:spPr>
+          <a:xfrm>
             <a:off x="0" y="1241612"/>
             <a:ext cx="9144000" cy="4923692"/>
           </a:xfrm>
@@ -2671,7 +5066,7 @@
 </p:sld>
 </file>
 
-<file path=ppt/slides/slide15.xml><?xml version="1.0" encoding="utf-8"?>
+<file path=ppt/slides/slide32.xml><?xml version="1.0" encoding="utf-8"?>
 <p:sld xmlns:a="http://schemas.openxmlformats.org/drawingml/2006/main" xmlns:r="http://schemas.openxmlformats.org/officeDocument/2006/relationships" xmlns:p="http://schemas.openxmlformats.org/presentationml/2006/main">
   <p:cSld>
     <p:spTree>
@@ -2872,7 +5267,7 @@
 </p:sld>
 </file>
 
-<file path=ppt/slides/slide16.xml><?xml version="1.0" encoding="utf-8"?>
+<file path=ppt/slides/slide33.xml><?xml version="1.0" encoding="utf-8"?>
 <p:sld xmlns:a="http://schemas.openxmlformats.org/drawingml/2006/main" xmlns:r="http://schemas.openxmlformats.org/officeDocument/2006/relationships" xmlns:p="http://schemas.openxmlformats.org/presentationml/2006/main">
   <p:cSld>
     <p:spTree>
@@ -2992,7 +5387,7 @@
 </p:sld>
 </file>
 
-<file path=ppt/slides/slide17.xml><?xml version="1.0" encoding="utf-8"?>
+<file path=ppt/slides/slide34.xml><?xml version="1.0" encoding="utf-8"?>
 <p:sld xmlns:a="http://schemas.openxmlformats.org/drawingml/2006/main" xmlns:r="http://schemas.openxmlformats.org/officeDocument/2006/relationships" xmlns:p="http://schemas.openxmlformats.org/presentationml/2006/main">
   <p:cSld>
     <p:spTree>
@@ -3091,7 +5486,7 @@
 </p:sld>
 </file>
 
-<file path=ppt/slides/slide18.xml><?xml version="1.0" encoding="utf-8"?>
+<file path=ppt/slides/slide35.xml><?xml version="1.0" encoding="utf-8"?>
 <p:sld xmlns:a="http://schemas.openxmlformats.org/drawingml/2006/main" xmlns:r="http://schemas.openxmlformats.org/officeDocument/2006/relationships" xmlns:p="http://schemas.openxmlformats.org/presentationml/2006/main">
   <p:cSld>
     <p:spTree>
@@ -3197,224 +5592,6 @@
   <p:clrMapOvr>
     <a:masterClrMapping/>
   </p:clrMapOvr>
-</p:sld>
-</file>
-
-<file path=ppt/slides/slide2.xml><?xml version="1.0" encoding="utf-8"?>
-<p:sld xmlns:a="http://schemas.openxmlformats.org/drawingml/2006/main" xmlns:r="http://schemas.openxmlformats.org/officeDocument/2006/relationships" xmlns:p="http://schemas.openxmlformats.org/presentationml/2006/main">
-  <p:cSld>
-    <p:spTree>
-      <p:nvGrpSpPr>
-        <p:cNvPr id="1" name=""/>
-        <p:cNvGrpSpPr/>
-        <p:nvPr/>
-      </p:nvGrpSpPr>
-      <p:grpSpPr>
-        <a:xfrm>
-          <a:off x="0" y="0"/>
-          <a:ext cx="0" cy="0"/>
-          <a:chOff x="0" y="0"/>
-          <a:chExt cx="0" cy="0"/>
-        </a:xfrm>
-      </p:grpSpPr>
-      <p:sp>
-        <p:nvSpPr>
-          <p:cNvPr id="2" name="Title 1"/>
-          <p:cNvSpPr>
-            <a:spLocks noGrp="1"/>
-          </p:cNvSpPr>
-          <p:nvPr>
-            <p:ph type="title"/>
-          </p:nvPr>
-        </p:nvSpPr>
-        <p:spPr/>
-        <p:txBody>
-          <a:bodyPr/>
-          <a:lstStyle/>
-          <a:p>
-            <a:r>
-              <a:rPr lang="pt-BR" dirty="0" smtClean="0"/>
-              <a:t>Apresentação do Projeto</a:t>
-            </a:r>
-            <a:endParaRPr lang="pt-BR" dirty="0"/>
-          </a:p>
-        </p:txBody>
-      </p:sp>
-      <p:sp>
-        <p:nvSpPr>
-          <p:cNvPr id="3" name="Content Placeholder 2"/>
-          <p:cNvSpPr>
-            <a:spLocks noGrp="1"/>
-          </p:cNvSpPr>
-          <p:nvPr>
-            <p:ph idx="1"/>
-          </p:nvPr>
-        </p:nvSpPr>
-        <p:spPr/>
-        <p:txBody>
-          <a:bodyPr>
-            <a:normAutofit/>
-          </a:bodyPr>
-          <a:lstStyle/>
-          <a:p>
-            <a:r>
-              <a:rPr lang="pt-BR" dirty="0"/>
-              <a:t>Sistema de gerenciamento, gestão e controle de exames, visando facilidade e praticidade para o paciente.</a:t>
-            </a:r>
-          </a:p>
-          <a:p>
-            <a:r>
-              <a:rPr lang="pt-BR" dirty="0"/>
-              <a:t>Usuários: Paciente, Gestor e Administrador.</a:t>
-            </a:r>
-          </a:p>
-          <a:p>
-            <a:r>
-              <a:rPr lang="pt-BR" dirty="0"/>
-              <a:t>Ambientes: WebSite.</a:t>
-            </a:r>
-          </a:p>
-          <a:p>
-            <a:pPr marL="0" indent="0">
-              <a:buNone/>
-            </a:pPr>
-            <a:endParaRPr lang="pt-BR" dirty="0"/>
-          </a:p>
-        </p:txBody>
-      </p:sp>
-    </p:spTree>
-    <p:extLst>
-      <p:ext uri="{BB962C8B-B14F-4D97-AF65-F5344CB8AC3E}">
-        <p14:creationId xmlns:p14="http://schemas.microsoft.com/office/powerpoint/2010/main" val="300583781"/>
-      </p:ext>
-    </p:extLst>
-  </p:cSld>
-  <p:clrMapOvr>
-    <a:masterClrMapping/>
-  </p:clrMapOvr>
-  <p:timing>
-    <p:tnLst>
-      <p:par>
-        <p:cTn id="1" dur="indefinite" restart="never" nodeType="tmRoot"/>
-      </p:par>
-    </p:tnLst>
-  </p:timing>
-</p:sld>
-</file>
-
-<file path=ppt/slides/slide3.xml><?xml version="1.0" encoding="utf-8"?>
-<p:sld xmlns:a="http://schemas.openxmlformats.org/drawingml/2006/main" xmlns:r="http://schemas.openxmlformats.org/officeDocument/2006/relationships" xmlns:p="http://schemas.openxmlformats.org/presentationml/2006/main">
-  <p:cSld>
-    <p:spTree>
-      <p:nvGrpSpPr>
-        <p:cNvPr id="1" name=""/>
-        <p:cNvGrpSpPr/>
-        <p:nvPr/>
-      </p:nvGrpSpPr>
-      <p:grpSpPr>
-        <a:xfrm>
-          <a:off x="0" y="0"/>
-          <a:ext cx="0" cy="0"/>
-          <a:chOff x="0" y="0"/>
-          <a:chExt cx="0" cy="0"/>
-        </a:xfrm>
-      </p:grpSpPr>
-      <p:sp>
-        <p:nvSpPr>
-          <p:cNvPr id="2" name="Title 1"/>
-          <p:cNvSpPr>
-            <a:spLocks noGrp="1"/>
-          </p:cNvSpPr>
-          <p:nvPr>
-            <p:ph type="title"/>
-          </p:nvPr>
-        </p:nvSpPr>
-        <p:spPr/>
-        <p:txBody>
-          <a:bodyPr/>
-          <a:lstStyle/>
-          <a:p>
-            <a:r>
-              <a:rPr lang="pt-BR" dirty="0" smtClean="0"/>
-              <a:t>Apresentação do Projeto</a:t>
-            </a:r>
-            <a:endParaRPr lang="pt-BR" dirty="0"/>
-          </a:p>
-        </p:txBody>
-      </p:sp>
-      <p:sp>
-        <p:nvSpPr>
-          <p:cNvPr id="3" name="Content Placeholder 2"/>
-          <p:cNvSpPr>
-            <a:spLocks noGrp="1"/>
-          </p:cNvSpPr>
-          <p:nvPr>
-            <p:ph idx="1"/>
-          </p:nvPr>
-        </p:nvSpPr>
-        <p:spPr/>
-        <p:txBody>
-          <a:bodyPr>
-            <a:normAutofit/>
-          </a:bodyPr>
-          <a:lstStyle/>
-          <a:p>
-            <a:pPr marL="342900" lvl="2" indent="-342900"/>
-            <a:r>
-              <a:rPr lang="pt-BR" sz="2800" dirty="0" smtClean="0">
-                <a:latin typeface="Tahoma" panose="020B0604030504040204" pitchFamily="34" charset="0"/>
-                <a:ea typeface="Tahoma" panose="020B0604030504040204" pitchFamily="34" charset="0"/>
-                <a:cs typeface="Tahoma" panose="020B0604030504040204" pitchFamily="34" charset="0"/>
-              </a:rPr>
-              <a:t>Analisando </a:t>
-            </a:r>
-            <a:r>
-              <a:rPr lang="pt-BR" sz="2800" dirty="0">
-                <a:latin typeface="Tahoma" panose="020B0604030504040204" pitchFamily="34" charset="0"/>
-                <a:ea typeface="Tahoma" panose="020B0604030504040204" pitchFamily="34" charset="0"/>
-                <a:cs typeface="Tahoma" panose="020B0604030504040204" pitchFamily="34" charset="0"/>
-              </a:rPr>
-              <a:t>outros sistemas e interfaces (web) de gerenciamento de exames pudemos constatar que existem muitas falhas e </a:t>
-            </a:r>
-            <a:r>
-              <a:rPr lang="pt-BR" sz="2800" dirty="0" smtClean="0">
-                <a:latin typeface="Tahoma" panose="020B0604030504040204" pitchFamily="34" charset="0"/>
-                <a:ea typeface="Tahoma" panose="020B0604030504040204" pitchFamily="34" charset="0"/>
-                <a:cs typeface="Tahoma" panose="020B0604030504040204" pitchFamily="34" charset="0"/>
-              </a:rPr>
-              <a:t>com isso </a:t>
-            </a:r>
-            <a:r>
-              <a:rPr lang="pt-BR" sz="2800" dirty="0">
-                <a:latin typeface="Tahoma" panose="020B0604030504040204" pitchFamily="34" charset="0"/>
-                <a:ea typeface="Tahoma" panose="020B0604030504040204" pitchFamily="34" charset="0"/>
-                <a:cs typeface="Tahoma" panose="020B0604030504040204" pitchFamily="34" charset="0"/>
-              </a:rPr>
-              <a:t>resolvemos desenvolver um sistema que auxiliasse a resolução dessas falhas. O paciente poderá ter acesso ao sistema via website para verificar o andamento e resultado de exames.</a:t>
-            </a:r>
-          </a:p>
-          <a:p>
-            <a:endParaRPr lang="pt-BR" dirty="0"/>
-          </a:p>
-        </p:txBody>
-      </p:sp>
-    </p:spTree>
-    <p:extLst>
-      <p:ext uri="{BB962C8B-B14F-4D97-AF65-F5344CB8AC3E}">
-        <p14:creationId xmlns:p14="http://schemas.microsoft.com/office/powerpoint/2010/main" val="4094789528"/>
-      </p:ext>
-    </p:extLst>
-  </p:cSld>
-  <p:clrMapOvr>
-    <a:masterClrMapping/>
-  </p:clrMapOvr>
-  <p:timing>
-    <p:tnLst>
-      <p:par>
-        <p:cTn id="1" dur="indefinite" restart="never" nodeType="tmRoot"/>
-      </p:par>
-    </p:tnLst>
-  </p:timing>
 </p:sld>
 </file>
 

</xml_diff>

<commit_message>
Correção da apresentação: Visão do sistema
</commit_message>
<xml_diff>
--- a/documentacao/G4_Apresentacao2sem2014_Final.pptx
+++ b/documentacao/G4_Apresentacao2sem2014_Final.pptx
@@ -12,7 +12,7 @@
     <p:sldId id="297" r:id="rId3"/>
     <p:sldId id="405" r:id="rId4"/>
     <p:sldId id="395" r:id="rId5"/>
-    <p:sldId id="404" r:id="rId6"/>
+    <p:sldId id="423" r:id="rId6"/>
     <p:sldId id="403" r:id="rId7"/>
     <p:sldId id="396" r:id="rId8"/>
     <p:sldId id="397" r:id="rId9"/>
@@ -150,7 +150,7 @@
             <p14:sldId id="297"/>
             <p14:sldId id="405"/>
             <p14:sldId id="395"/>
-            <p14:sldId id="404"/>
+            <p14:sldId id="423"/>
             <p14:sldId id="403"/>
             <p14:sldId id="396"/>
             <p14:sldId id="397"/>
@@ -186,7 +186,7 @@
       </p14:sectionLst>
     </p:ext>
     <p:ext uri="{EFAFB233-063F-42B5-8137-9DF3F51BA10A}">
-      <p15:sldGuideLst xmlns:p15="http://schemas.microsoft.com/office/powerpoint/2012/main">
+      <p15:sldGuideLst xmlns:p15="http://schemas.microsoft.com/office/powerpoint/2012/main" xmlns="">
         <p15:guide id="1" orient="horz" pos="2160">
           <p15:clr>
             <a:srgbClr val="A4A3A4"/>
@@ -5652,41 +5652,25 @@
           <a:p>
             <a:r>
               <a:rPr lang="pt-BR" dirty="0"/>
-              <a:t>Usuários: Atendente do Balcão, Analista de exames e Executor.</a:t>
-            </a:r>
-          </a:p>
-          <a:p>
+              <a:t>Usuários: Atendente do Balcão, Analista de exames e </a:t>
+            </a:r>
             <a:r>
               <a:rPr lang="pt-BR" dirty="0" smtClean="0"/>
-              <a:t>Para </a:t>
-            </a:r>
-            <a:r>
-              <a:rPr lang="pt-BR" dirty="0"/>
-              <a:t>estes dar destaque para as necessidades </a:t>
-            </a:r>
+              <a:t>Executor de exames.</a:t>
+            </a:r>
+            <a:endParaRPr lang="pt-BR" dirty="0"/>
+          </a:p>
+          <a:p>
             <a:r>
               <a:rPr lang="pt-BR" dirty="0" smtClean="0"/>
-              <a:t>dos </a:t>
-            </a:r>
-            <a:r>
-              <a:rPr lang="pt-BR" dirty="0"/>
-              <a:t>usuário mais </a:t>
-            </a:r>
+              <a:t>Atendente de Balcão: Atende pacientes, coleta exames que serão analisados, atendimento do telefone.</a:t>
+            </a:r>
+          </a:p>
+          <a:p>
             <a:r>
               <a:rPr lang="pt-BR" dirty="0" smtClean="0"/>
-              <a:t>importantes.</a:t>
-            </a:r>
-          </a:p>
-          <a:p>
-            <a:endParaRPr lang="pt-BR" dirty="0"/>
-          </a:p>
-          <a:p>
-            <a:r>
-              <a:rPr lang="pt-BR" dirty="0"/>
-              <a:t>Máximo 2 slides</a:t>
-            </a:r>
-          </a:p>
-          <a:p>
+              <a:t>Analista de exames: Analisa dos exames que são disponibilizados na clinica, armazena os resultados dos exames em um local da clinica</a:t>
+            </a:r>
             <a:endParaRPr lang="pt-BR" dirty="0"/>
           </a:p>
           <a:p>
@@ -5762,6 +5746,28 @@
           <a:bodyPr/>
           <a:lstStyle/>
           <a:p>
+            <a:r>
+              <a:rPr lang="pt-BR" dirty="0" smtClean="0"/>
+              <a:t>Executor de exames: Realiza os exames, armazena os exames no local adequado.</a:t>
+            </a:r>
+          </a:p>
+          <a:p>
+            <a:pPr marL="0" indent="0">
+              <a:buNone/>
+            </a:pPr>
+            <a:endParaRPr lang="pt-BR" dirty="0" smtClean="0"/>
+          </a:p>
+          <a:p>
+            <a:r>
+              <a:rPr lang="pt-BR" dirty="0" smtClean="0"/>
+              <a:t>Tendo em vista todo o ambiente atual que estamos analisando para propor nosso sistema, iremos realizar somente o gerenciamento de exames e não da clínica como um todo.</a:t>
+            </a:r>
+            <a:endParaRPr lang="pt-BR" dirty="0"/>
+          </a:p>
+          <a:p>
+            <a:endParaRPr lang="pt-BR" dirty="0" smtClean="0"/>
+          </a:p>
+          <a:p>
             <a:endParaRPr lang="pt-BR" dirty="0"/>
           </a:p>
           <a:p>
@@ -5772,7 +5778,7 @@
     </p:spTree>
     <p:extLst>
       <p:ext uri="{BB962C8B-B14F-4D97-AF65-F5344CB8AC3E}">
-        <p14:creationId xmlns:p14="http://schemas.microsoft.com/office/powerpoint/2010/main" val="3340355780"/>
+        <p14:creationId xmlns:p14="http://schemas.microsoft.com/office/powerpoint/2010/main" val="1059535570"/>
       </p:ext>
     </p:extLst>
   </p:cSld>

</xml_diff>

<commit_message>
Correção da apresentação: guidelines e Inspeção de Usabilidade
</commit_message>
<xml_diff>
--- a/documentacao/G4_Apresentacao2sem2014_Final.pptx
+++ b/documentacao/G4_Apresentacao2sem2014_Final.pptx
@@ -5,7 +5,7 @@
     <p:sldMasterId id="2147483648" r:id="rId1"/>
   </p:sldMasterIdLst>
   <p:notesMasterIdLst>
-    <p:notesMasterId r:id="rId37"/>
+    <p:notesMasterId r:id="rId40"/>
   </p:notesMasterIdLst>
   <p:sldIdLst>
     <p:sldId id="258" r:id="rId2"/>
@@ -19,30 +19,33 @@
     <p:sldId id="398" r:id="rId10"/>
     <p:sldId id="399" r:id="rId11"/>
     <p:sldId id="400" r:id="rId12"/>
-    <p:sldId id="390" r:id="rId13"/>
-    <p:sldId id="406" r:id="rId14"/>
-    <p:sldId id="407" r:id="rId15"/>
-    <p:sldId id="408" r:id="rId16"/>
-    <p:sldId id="409" r:id="rId17"/>
-    <p:sldId id="410" r:id="rId18"/>
-    <p:sldId id="411" r:id="rId19"/>
-    <p:sldId id="412" r:id="rId20"/>
-    <p:sldId id="413" r:id="rId21"/>
-    <p:sldId id="414" r:id="rId22"/>
-    <p:sldId id="415" r:id="rId23"/>
-    <p:sldId id="416" r:id="rId24"/>
-    <p:sldId id="417" r:id="rId25"/>
-    <p:sldId id="418" r:id="rId26"/>
-    <p:sldId id="419" r:id="rId27"/>
-    <p:sldId id="420" r:id="rId28"/>
-    <p:sldId id="421" r:id="rId29"/>
-    <p:sldId id="422" r:id="rId30"/>
-    <p:sldId id="392" r:id="rId31"/>
-    <p:sldId id="401" r:id="rId32"/>
-    <p:sldId id="391" r:id="rId33"/>
-    <p:sldId id="402" r:id="rId34"/>
-    <p:sldId id="384" r:id="rId35"/>
-    <p:sldId id="393" r:id="rId36"/>
+    <p:sldId id="425" r:id="rId13"/>
+    <p:sldId id="426" r:id="rId14"/>
+    <p:sldId id="427" r:id="rId15"/>
+    <p:sldId id="406" r:id="rId16"/>
+    <p:sldId id="407" r:id="rId17"/>
+    <p:sldId id="408" r:id="rId18"/>
+    <p:sldId id="409" r:id="rId19"/>
+    <p:sldId id="410" r:id="rId20"/>
+    <p:sldId id="411" r:id="rId21"/>
+    <p:sldId id="412" r:id="rId22"/>
+    <p:sldId id="413" r:id="rId23"/>
+    <p:sldId id="414" r:id="rId24"/>
+    <p:sldId id="415" r:id="rId25"/>
+    <p:sldId id="416" r:id="rId26"/>
+    <p:sldId id="417" r:id="rId27"/>
+    <p:sldId id="418" r:id="rId28"/>
+    <p:sldId id="419" r:id="rId29"/>
+    <p:sldId id="420" r:id="rId30"/>
+    <p:sldId id="421" r:id="rId31"/>
+    <p:sldId id="422" r:id="rId32"/>
+    <p:sldId id="392" r:id="rId33"/>
+    <p:sldId id="401" r:id="rId34"/>
+    <p:sldId id="391" r:id="rId35"/>
+    <p:sldId id="402" r:id="rId36"/>
+    <p:sldId id="424" r:id="rId37"/>
+    <p:sldId id="384" r:id="rId38"/>
+    <p:sldId id="393" r:id="rId39"/>
   </p:sldIdLst>
   <p:sldSz cx="9144000" cy="6858000" type="screen4x3"/>
   <p:notesSz cx="6858000" cy="9144000"/>
@@ -157,7 +160,9 @@
             <p14:sldId id="398"/>
             <p14:sldId id="399"/>
             <p14:sldId id="400"/>
-            <p14:sldId id="390"/>
+            <p14:sldId id="425"/>
+            <p14:sldId id="426"/>
+            <p14:sldId id="427"/>
             <p14:sldId id="406"/>
             <p14:sldId id="407"/>
             <p14:sldId id="408"/>
@@ -179,6 +184,7 @@
             <p14:sldId id="401"/>
             <p14:sldId id="391"/>
             <p14:sldId id="402"/>
+            <p14:sldId id="424"/>
             <p14:sldId id="384"/>
             <p14:sldId id="393"/>
           </p14:sldIdLst>
@@ -186,7 +192,7 @@
       </p14:sectionLst>
     </p:ext>
     <p:ext uri="{EFAFB233-063F-42B5-8137-9DF3F51BA10A}">
-      <p15:sldGuideLst xmlns:p15="http://schemas.microsoft.com/office/powerpoint/2012/main" xmlns="">
+      <p15:sldGuideLst xmlns:p15="http://schemas.microsoft.com/office/powerpoint/2012/main">
         <p15:guide id="1" orient="horz" pos="2160">
           <p15:clr>
             <a:srgbClr val="A4A3A4"/>
@@ -553,6 +559,91 @@
     </a:lvl9pPr>
   </p:notesStyle>
 </p:notesMaster>
+</file>
+
+<file path=ppt/notesSlides/notesSlide1.xml><?xml version="1.0" encoding="utf-8"?>
+<p:notes xmlns:a="http://schemas.openxmlformats.org/drawingml/2006/main" xmlns:r="http://schemas.openxmlformats.org/officeDocument/2006/relationships" xmlns:p="http://schemas.openxmlformats.org/presentationml/2006/main">
+  <p:cSld>
+    <p:spTree>
+      <p:nvGrpSpPr>
+        <p:cNvPr id="1" name=""/>
+        <p:cNvGrpSpPr/>
+        <p:nvPr/>
+      </p:nvGrpSpPr>
+      <p:grpSpPr>
+        <a:xfrm>
+          <a:off x="0" y="0"/>
+          <a:ext cx="0" cy="0"/>
+          <a:chOff x="0" y="0"/>
+          <a:chExt cx="0" cy="0"/>
+        </a:xfrm>
+      </p:grpSpPr>
+      <p:sp>
+        <p:nvSpPr>
+          <p:cNvPr id="2" name="Espaço Reservado para Imagem de Slide 1"/>
+          <p:cNvSpPr>
+            <a:spLocks noGrp="1" noRot="1" noChangeAspect="1"/>
+          </p:cNvSpPr>
+          <p:nvPr>
+            <p:ph type="sldImg"/>
+          </p:nvPr>
+        </p:nvSpPr>
+        <p:spPr/>
+      </p:sp>
+      <p:sp>
+        <p:nvSpPr>
+          <p:cNvPr id="3" name="Espaço Reservado para Anotações 2"/>
+          <p:cNvSpPr>
+            <a:spLocks noGrp="1"/>
+          </p:cNvSpPr>
+          <p:nvPr>
+            <p:ph type="body" idx="1"/>
+          </p:nvPr>
+        </p:nvSpPr>
+        <p:spPr/>
+        <p:txBody>
+          <a:bodyPr/>
+          <a:lstStyle/>
+          <a:p>
+            <a:endParaRPr lang="pt-BR" dirty="0"/>
+          </a:p>
+        </p:txBody>
+      </p:sp>
+      <p:sp>
+        <p:nvSpPr>
+          <p:cNvPr id="4" name="Espaço Reservado para Número de Slide 3"/>
+          <p:cNvSpPr>
+            <a:spLocks noGrp="1"/>
+          </p:cNvSpPr>
+          <p:nvPr>
+            <p:ph type="sldNum" sz="quarter" idx="10"/>
+          </p:nvPr>
+        </p:nvSpPr>
+        <p:spPr/>
+        <p:txBody>
+          <a:bodyPr/>
+          <a:lstStyle/>
+          <a:p>
+            <a:fld id="{2C938334-6292-4E5A-8061-BB795ABB3EFC}" type="slidenum">
+              <a:rPr lang="pt-BR" smtClean="0"/>
+              <a:pPr/>
+              <a:t>37</a:t>
+            </a:fld>
+            <a:endParaRPr lang="pt-BR"/>
+          </a:p>
+        </p:txBody>
+      </p:sp>
+    </p:spTree>
+    <p:extLst>
+      <p:ext uri="{BB962C8B-B14F-4D97-AF65-F5344CB8AC3E}">
+        <p14:creationId xmlns:p14="http://schemas.microsoft.com/office/powerpoint/2010/main" val="3093926568"/>
+      </p:ext>
+    </p:extLst>
+  </p:cSld>
+  <p:clrMapOvr>
+    <a:masterClrMapping/>
+  </p:clrMapOvr>
+</p:notes>
 </file>
 
 <file path=ppt/slideLayouts/slideLayout1.xml><?xml version="1.0" encoding="utf-8"?>
@@ -2446,53 +2537,40 @@
           </a:p>
         </p:txBody>
       </p:sp>
-      <p:sp>
-        <p:nvSpPr>
-          <p:cNvPr id="3" name="Content Placeholder 2"/>
-          <p:cNvSpPr>
-            <a:spLocks noGrp="1"/>
-          </p:cNvSpPr>
-          <p:nvPr>
-            <p:ph idx="1"/>
-          </p:nvPr>
-        </p:nvSpPr>
-        <p:spPr/>
-        <p:txBody>
-          <a:bodyPr/>
-          <a:lstStyle/>
-          <a:p>
-            <a:r>
-              <a:rPr lang="pt-BR" dirty="0" smtClean="0"/>
-              <a:t>Citar </a:t>
-            </a:r>
-            <a:r>
-              <a:rPr lang="pt-BR" dirty="0" err="1" smtClean="0"/>
-              <a:t>Guidelines</a:t>
-            </a:r>
-            <a:r>
-              <a:rPr lang="pt-BR" dirty="0" smtClean="0"/>
-              <a:t>.</a:t>
-            </a:r>
-          </a:p>
-          <a:p>
-            <a:r>
-              <a:rPr lang="pt-BR" dirty="0" smtClean="0"/>
-              <a:t>Mostrar os protótipos de baixa fidelidade.</a:t>
-            </a:r>
-          </a:p>
-          <a:p>
-            <a:r>
-              <a:rPr lang="pt-BR" dirty="0" smtClean="0"/>
-              <a:t>Mostrar os protótipos de alta fidelidade.</a:t>
-            </a:r>
-            <a:endParaRPr lang="pt-BR" dirty="0"/>
-          </a:p>
-        </p:txBody>
-      </p:sp>
+      <p:pic>
+        <p:nvPicPr>
+          <p:cNvPr id="5" name="Imagem 4"/>
+          <p:cNvPicPr>
+            <a:picLocks noChangeAspect="1"/>
+          </p:cNvPicPr>
+          <p:nvPr/>
+        </p:nvPicPr>
+        <p:blipFill>
+          <a:blip r:embed="rId2">
+            <a:extLst>
+              <a:ext uri="{28A0092B-C50C-407E-A947-70E740481C1C}">
+                <a14:useLocalDpi xmlns:a14="http://schemas.microsoft.com/office/drawing/2010/main" val="0"/>
+              </a:ext>
+            </a:extLst>
+          </a:blip>
+          <a:stretch>
+            <a:fillRect/>
+          </a:stretch>
+        </p:blipFill>
+        <p:spPr>
+          <a:xfrm>
+            <a:off x="23410" y="1340768"/>
+            <a:ext cx="9144000" cy="4779468"/>
+          </a:xfrm>
+          <a:prstGeom prst="rect">
+            <a:avLst/>
+          </a:prstGeom>
+        </p:spPr>
+      </p:pic>
     </p:spTree>
     <p:extLst>
       <p:ext uri="{BB962C8B-B14F-4D97-AF65-F5344CB8AC3E}">
-        <p14:creationId xmlns:p14="http://schemas.microsoft.com/office/powerpoint/2010/main" val="2991806747"/>
+        <p14:creationId xmlns:p14="http://schemas.microsoft.com/office/powerpoint/2010/main" val="956289708"/>
       </p:ext>
     </p:extLst>
   </p:cSld>
@@ -2571,55 +2649,18 @@
         </p:blipFill>
         <p:spPr>
           <a:xfrm>
-            <a:off x="1292575" y="1124744"/>
-            <a:ext cx="6558849" cy="5105940"/>
+            <a:off x="0" y="1417638"/>
+            <a:ext cx="9144000" cy="4786793"/>
           </a:xfrm>
           <a:prstGeom prst="rect">
             <a:avLst/>
           </a:prstGeom>
         </p:spPr>
       </p:pic>
-      <p:sp>
-        <p:nvSpPr>
-          <p:cNvPr id="5" name="Retângulo 4"/>
-          <p:cNvSpPr/>
-          <p:nvPr/>
-        </p:nvSpPr>
-        <p:spPr>
-          <a:xfrm>
-            <a:off x="0" y="1217583"/>
-            <a:ext cx="1872208" cy="400110"/>
-          </a:xfrm>
-          <a:prstGeom prst="rect">
-            <a:avLst/>
-          </a:prstGeom>
-        </p:spPr>
-        <p:txBody>
-          <a:bodyPr wrap="square">
-            <a:spAutoFit/>
-          </a:bodyPr>
-          <a:lstStyle/>
-          <a:p>
-            <a:r>
-              <a:rPr lang="pt-BR" sz="2000" dirty="0" smtClean="0">
-                <a:solidFill>
-                  <a:srgbClr val="FF0000"/>
-                </a:solidFill>
-              </a:rPr>
-              <a:t>*Visão Paciente</a:t>
-            </a:r>
-            <a:endParaRPr lang="pt-BR" sz="2400" dirty="0">
-              <a:solidFill>
-                <a:srgbClr val="FF0000"/>
-              </a:solidFill>
-            </a:endParaRPr>
-          </a:p>
-        </p:txBody>
-      </p:sp>
     </p:spTree>
     <p:extLst>
       <p:ext uri="{BB962C8B-B14F-4D97-AF65-F5344CB8AC3E}">
-        <p14:creationId xmlns:p14="http://schemas.microsoft.com/office/powerpoint/2010/main" val="3768844573"/>
+        <p14:creationId xmlns:p14="http://schemas.microsoft.com/office/powerpoint/2010/main" val="3115689512"/>
       </p:ext>
     </p:extLst>
   </p:cSld>
@@ -2698,55 +2739,18 @@
         </p:blipFill>
         <p:spPr>
           <a:xfrm>
-            <a:off x="1293307" y="1124744"/>
-            <a:ext cx="6557385" cy="5104800"/>
+            <a:off x="0" y="1556792"/>
+            <a:ext cx="9132241" cy="4320960"/>
           </a:xfrm>
           <a:prstGeom prst="rect">
             <a:avLst/>
           </a:prstGeom>
         </p:spPr>
       </p:pic>
-      <p:sp>
-        <p:nvSpPr>
-          <p:cNvPr id="5" name="Retângulo 4"/>
-          <p:cNvSpPr/>
-          <p:nvPr/>
-        </p:nvSpPr>
-        <p:spPr>
-          <a:xfrm>
-            <a:off x="0" y="1217583"/>
-            <a:ext cx="1872208" cy="400110"/>
-          </a:xfrm>
-          <a:prstGeom prst="rect">
-            <a:avLst/>
-          </a:prstGeom>
-        </p:spPr>
-        <p:txBody>
-          <a:bodyPr wrap="square">
-            <a:spAutoFit/>
-          </a:bodyPr>
-          <a:lstStyle/>
-          <a:p>
-            <a:r>
-              <a:rPr lang="pt-BR" sz="2000" dirty="0" smtClean="0">
-                <a:solidFill>
-                  <a:srgbClr val="FF0000"/>
-                </a:solidFill>
-              </a:rPr>
-              <a:t>*Visão Paciente</a:t>
-            </a:r>
-            <a:endParaRPr lang="pt-BR" sz="2400" dirty="0">
-              <a:solidFill>
-                <a:srgbClr val="FF0000"/>
-              </a:solidFill>
-            </a:endParaRPr>
-          </a:p>
-        </p:txBody>
-      </p:sp>
     </p:spTree>
     <p:extLst>
       <p:ext uri="{BB962C8B-B14F-4D97-AF65-F5344CB8AC3E}">
-        <p14:creationId xmlns:p14="http://schemas.microsoft.com/office/powerpoint/2010/main" val="3573421326"/>
+        <p14:creationId xmlns:p14="http://schemas.microsoft.com/office/powerpoint/2010/main" val="459547614"/>
       </p:ext>
     </p:extLst>
   </p:cSld>
@@ -2825,8 +2829,8 @@
         </p:blipFill>
         <p:spPr>
           <a:xfrm>
-            <a:off x="1293307" y="1124744"/>
-            <a:ext cx="6557385" cy="5104800"/>
+            <a:off x="1292575" y="1124744"/>
+            <a:ext cx="6558849" cy="5105940"/>
           </a:xfrm>
           <a:prstGeom prst="rect">
             <a:avLst/>
@@ -2873,7 +2877,7 @@
     </p:spTree>
     <p:extLst>
       <p:ext uri="{BB962C8B-B14F-4D97-AF65-F5344CB8AC3E}">
-        <p14:creationId xmlns:p14="http://schemas.microsoft.com/office/powerpoint/2010/main" val="2342771231"/>
+        <p14:creationId xmlns:p14="http://schemas.microsoft.com/office/powerpoint/2010/main" val="3768844573"/>
       </p:ext>
     </p:extLst>
   </p:cSld>
@@ -3000,7 +3004,7 @@
     </p:spTree>
     <p:extLst>
       <p:ext uri="{BB962C8B-B14F-4D97-AF65-F5344CB8AC3E}">
-        <p14:creationId xmlns:p14="http://schemas.microsoft.com/office/powerpoint/2010/main" val="3781886261"/>
+        <p14:creationId xmlns:p14="http://schemas.microsoft.com/office/powerpoint/2010/main" val="3573421326"/>
       </p:ext>
     </p:extLst>
   </p:cSld>
@@ -3127,7 +3131,7 @@
     </p:spTree>
     <p:extLst>
       <p:ext uri="{BB962C8B-B14F-4D97-AF65-F5344CB8AC3E}">
-        <p14:creationId xmlns:p14="http://schemas.microsoft.com/office/powerpoint/2010/main" val="193298628"/>
+        <p14:creationId xmlns:p14="http://schemas.microsoft.com/office/powerpoint/2010/main" val="2342771231"/>
       </p:ext>
     </p:extLst>
   </p:cSld>
@@ -3254,7 +3258,7 @@
     </p:spTree>
     <p:extLst>
       <p:ext uri="{BB962C8B-B14F-4D97-AF65-F5344CB8AC3E}">
-        <p14:creationId xmlns:p14="http://schemas.microsoft.com/office/powerpoint/2010/main" val="2235056424"/>
+        <p14:creationId xmlns:p14="http://schemas.microsoft.com/office/powerpoint/2010/main" val="3781886261"/>
       </p:ext>
     </p:extLst>
   </p:cSld>
@@ -3343,7 +3347,7 @@
       </p:pic>
       <p:sp>
         <p:nvSpPr>
-          <p:cNvPr id="6" name="Retângulo 5"/>
+          <p:cNvPr id="5" name="Retângulo 4"/>
           <p:cNvSpPr/>
           <p:nvPr/>
         </p:nvSpPr>
@@ -3368,7 +3372,7 @@
                   <a:srgbClr val="FF0000"/>
                 </a:solidFill>
               </a:rPr>
-              <a:t>*Visão Gestor</a:t>
+              <a:t>*Visão Paciente</a:t>
             </a:r>
             <a:endParaRPr lang="pt-BR" sz="2400" dirty="0">
               <a:solidFill>
@@ -3381,7 +3385,7 @@
     </p:spTree>
     <p:extLst>
       <p:ext uri="{BB962C8B-B14F-4D97-AF65-F5344CB8AC3E}">
-        <p14:creationId xmlns:p14="http://schemas.microsoft.com/office/powerpoint/2010/main" val="3316813918"/>
+        <p14:creationId xmlns:p14="http://schemas.microsoft.com/office/powerpoint/2010/main" val="193298628"/>
       </p:ext>
     </p:extLst>
   </p:cSld>
@@ -3572,7 +3576,7 @@
       </p:pic>
       <p:sp>
         <p:nvSpPr>
-          <p:cNvPr id="7" name="Retângulo 6"/>
+          <p:cNvPr id="5" name="Retângulo 4"/>
           <p:cNvSpPr/>
           <p:nvPr/>
         </p:nvSpPr>
@@ -3597,7 +3601,7 @@
                   <a:srgbClr val="FF0000"/>
                 </a:solidFill>
               </a:rPr>
-              <a:t>*Visão Gestor</a:t>
+              <a:t>*Visão Paciente</a:t>
             </a:r>
             <a:endParaRPr lang="pt-BR" sz="2400" dirty="0">
               <a:solidFill>
@@ -3610,7 +3614,7 @@
     </p:spTree>
     <p:extLst>
       <p:ext uri="{BB962C8B-B14F-4D97-AF65-F5344CB8AC3E}">
-        <p14:creationId xmlns:p14="http://schemas.microsoft.com/office/powerpoint/2010/main" val="576134621"/>
+        <p14:creationId xmlns:p14="http://schemas.microsoft.com/office/powerpoint/2010/main" val="2235056424"/>
       </p:ext>
     </p:extLst>
   </p:cSld>
@@ -3699,7 +3703,7 @@
       </p:pic>
       <p:sp>
         <p:nvSpPr>
-          <p:cNvPr id="5" name="Retângulo 4"/>
+          <p:cNvPr id="6" name="Retângulo 5"/>
           <p:cNvSpPr/>
           <p:nvPr/>
         </p:nvSpPr>
@@ -3737,7 +3741,7 @@
     </p:spTree>
     <p:extLst>
       <p:ext uri="{BB962C8B-B14F-4D97-AF65-F5344CB8AC3E}">
-        <p14:creationId xmlns:p14="http://schemas.microsoft.com/office/powerpoint/2010/main" val="2122406983"/>
+        <p14:creationId xmlns:p14="http://schemas.microsoft.com/office/powerpoint/2010/main" val="3316813918"/>
       </p:ext>
     </p:extLst>
   </p:cSld>
@@ -3826,7 +3830,7 @@
       </p:pic>
       <p:sp>
         <p:nvSpPr>
-          <p:cNvPr id="5" name="Retângulo 4"/>
+          <p:cNvPr id="7" name="Retângulo 6"/>
           <p:cNvSpPr/>
           <p:nvPr/>
         </p:nvSpPr>
@@ -3864,7 +3868,7 @@
     </p:spTree>
     <p:extLst>
       <p:ext uri="{BB962C8B-B14F-4D97-AF65-F5344CB8AC3E}">
-        <p14:creationId xmlns:p14="http://schemas.microsoft.com/office/powerpoint/2010/main" val="2598367640"/>
+        <p14:creationId xmlns:p14="http://schemas.microsoft.com/office/powerpoint/2010/main" val="576134621"/>
       </p:ext>
     </p:extLst>
   </p:cSld>
@@ -3991,7 +3995,7 @@
     </p:spTree>
     <p:extLst>
       <p:ext uri="{BB962C8B-B14F-4D97-AF65-F5344CB8AC3E}">
-        <p14:creationId xmlns:p14="http://schemas.microsoft.com/office/powerpoint/2010/main" val="2510664707"/>
+        <p14:creationId xmlns:p14="http://schemas.microsoft.com/office/powerpoint/2010/main" val="2122406983"/>
       </p:ext>
     </p:extLst>
   </p:cSld>
@@ -4118,7 +4122,7 @@
     </p:spTree>
     <p:extLst>
       <p:ext uri="{BB962C8B-B14F-4D97-AF65-F5344CB8AC3E}">
-        <p14:creationId xmlns:p14="http://schemas.microsoft.com/office/powerpoint/2010/main" val="3784726794"/>
+        <p14:creationId xmlns:p14="http://schemas.microsoft.com/office/powerpoint/2010/main" val="2598367640"/>
       </p:ext>
     </p:extLst>
   </p:cSld>
@@ -4177,7 +4181,7 @@
       </p:sp>
       <p:pic>
         <p:nvPicPr>
-          <p:cNvPr id="5" name="Imagem 4"/>
+          <p:cNvPr id="4" name="Imagem 3"/>
           <p:cNvPicPr>
             <a:picLocks noChangeAspect="1"/>
           </p:cNvPicPr>
@@ -4207,7 +4211,7 @@
       </p:pic>
       <p:sp>
         <p:nvSpPr>
-          <p:cNvPr id="6" name="Retângulo 5"/>
+          <p:cNvPr id="5" name="Retângulo 4"/>
           <p:cNvSpPr/>
           <p:nvPr/>
         </p:nvSpPr>
@@ -4245,7 +4249,7 @@
     </p:spTree>
     <p:extLst>
       <p:ext uri="{BB962C8B-B14F-4D97-AF65-F5344CB8AC3E}">
-        <p14:creationId xmlns:p14="http://schemas.microsoft.com/office/powerpoint/2010/main" val="2428608338"/>
+        <p14:creationId xmlns:p14="http://schemas.microsoft.com/office/powerpoint/2010/main" val="2510664707"/>
       </p:ext>
     </p:extLst>
   </p:cSld>
@@ -4304,7 +4308,7 @@
       </p:sp>
       <p:pic>
         <p:nvPicPr>
-          <p:cNvPr id="5" name="Imagem 4"/>
+          <p:cNvPr id="3" name="Imagem 2"/>
           <p:cNvPicPr>
             <a:picLocks noChangeAspect="1"/>
           </p:cNvPicPr>
@@ -4334,7 +4338,7 @@
       </p:pic>
       <p:sp>
         <p:nvSpPr>
-          <p:cNvPr id="6" name="Retângulo 5"/>
+          <p:cNvPr id="5" name="Retângulo 4"/>
           <p:cNvSpPr/>
           <p:nvPr/>
         </p:nvSpPr>
@@ -4372,7 +4376,7 @@
     </p:spTree>
     <p:extLst>
       <p:ext uri="{BB962C8B-B14F-4D97-AF65-F5344CB8AC3E}">
-        <p14:creationId xmlns:p14="http://schemas.microsoft.com/office/powerpoint/2010/main" val="172973721"/>
+        <p14:creationId xmlns:p14="http://schemas.microsoft.com/office/powerpoint/2010/main" val="3784726794"/>
       </p:ext>
     </p:extLst>
   </p:cSld>
@@ -4431,7 +4435,7 @@
       </p:sp>
       <p:pic>
         <p:nvPicPr>
-          <p:cNvPr id="3" name="Imagem 2"/>
+          <p:cNvPr id="5" name="Imagem 4"/>
           <p:cNvPicPr>
             <a:picLocks noChangeAspect="1"/>
           </p:cNvPicPr>
@@ -4461,7 +4465,7 @@
       </p:pic>
       <p:sp>
         <p:nvSpPr>
-          <p:cNvPr id="9" name="Retângulo 8"/>
+          <p:cNvPr id="6" name="Retângulo 5"/>
           <p:cNvSpPr/>
           <p:nvPr/>
         </p:nvSpPr>
@@ -4486,7 +4490,7 @@
                   <a:srgbClr val="FF0000"/>
                 </a:solidFill>
               </a:rPr>
-              <a:t>*Visão ADM</a:t>
+              <a:t>*Visão Gestor</a:t>
             </a:r>
             <a:endParaRPr lang="pt-BR" sz="2400" dirty="0">
               <a:solidFill>
@@ -4499,7 +4503,7 @@
     </p:spTree>
     <p:extLst>
       <p:ext uri="{BB962C8B-B14F-4D97-AF65-F5344CB8AC3E}">
-        <p14:creationId xmlns:p14="http://schemas.microsoft.com/office/powerpoint/2010/main" val="227153128"/>
+        <p14:creationId xmlns:p14="http://schemas.microsoft.com/office/powerpoint/2010/main" val="2428608338"/>
       </p:ext>
     </p:extLst>
   </p:cSld>
@@ -4558,7 +4562,7 @@
       </p:sp>
       <p:pic>
         <p:nvPicPr>
-          <p:cNvPr id="4" name="Imagem 3"/>
+          <p:cNvPr id="5" name="Imagem 4"/>
           <p:cNvPicPr>
             <a:picLocks noChangeAspect="1"/>
           </p:cNvPicPr>
@@ -4588,7 +4592,7 @@
       </p:pic>
       <p:sp>
         <p:nvSpPr>
-          <p:cNvPr id="8" name="Retângulo 7"/>
+          <p:cNvPr id="6" name="Retângulo 5"/>
           <p:cNvSpPr/>
           <p:nvPr/>
         </p:nvSpPr>
@@ -4613,7 +4617,7 @@
                   <a:srgbClr val="FF0000"/>
                 </a:solidFill>
               </a:rPr>
-              <a:t>*Visão ADM</a:t>
+              <a:t>*Visão Gestor</a:t>
             </a:r>
             <a:endParaRPr lang="pt-BR" sz="2400" dirty="0">
               <a:solidFill>
@@ -4626,7 +4630,7 @@
     </p:spTree>
     <p:extLst>
       <p:ext uri="{BB962C8B-B14F-4D97-AF65-F5344CB8AC3E}">
-        <p14:creationId xmlns:p14="http://schemas.microsoft.com/office/powerpoint/2010/main" val="38583560"/>
+        <p14:creationId xmlns:p14="http://schemas.microsoft.com/office/powerpoint/2010/main" val="172973721"/>
       </p:ext>
     </p:extLst>
   </p:cSld>
@@ -4715,14 +4719,14 @@
       </p:pic>
       <p:sp>
         <p:nvSpPr>
-          <p:cNvPr id="8" name="Retângulo 7"/>
+          <p:cNvPr id="9" name="Retângulo 8"/>
           <p:cNvSpPr/>
           <p:nvPr/>
         </p:nvSpPr>
         <p:spPr>
           <a:xfrm>
             <a:off x="0" y="1217583"/>
-            <a:ext cx="1835696" cy="400110"/>
+            <a:ext cx="1872208" cy="400110"/>
           </a:xfrm>
           <a:prstGeom prst="rect">
             <a:avLst/>
@@ -4753,7 +4757,7 @@
     </p:spTree>
     <p:extLst>
       <p:ext uri="{BB962C8B-B14F-4D97-AF65-F5344CB8AC3E}">
-        <p14:creationId xmlns:p14="http://schemas.microsoft.com/office/powerpoint/2010/main" val="1225680612"/>
+        <p14:creationId xmlns:p14="http://schemas.microsoft.com/office/powerpoint/2010/main" val="227153128"/>
       </p:ext>
     </p:extLst>
   </p:cSld>
@@ -4830,7 +4834,6 @@
             <a:pPr marL="342900" lvl="2" indent="-342900"/>
             <a:r>
               <a:rPr lang="pt-BR" sz="2800" dirty="0" smtClean="0">
-                <a:latin typeface="Tahoma" panose="020B0604030504040204" pitchFamily="34" charset="0"/>
                 <a:ea typeface="Tahoma" panose="020B0604030504040204" pitchFamily="34" charset="0"/>
                 <a:cs typeface="Tahoma" panose="020B0604030504040204" pitchFamily="34" charset="0"/>
               </a:rPr>
@@ -4838,7 +4841,6 @@
             </a:r>
             <a:r>
               <a:rPr lang="pt-BR" sz="2800" dirty="0">
-                <a:latin typeface="Tahoma" panose="020B0604030504040204" pitchFamily="34" charset="0"/>
                 <a:ea typeface="Tahoma" panose="020B0604030504040204" pitchFamily="34" charset="0"/>
                 <a:cs typeface="Tahoma" panose="020B0604030504040204" pitchFamily="34" charset="0"/>
               </a:rPr>
@@ -4846,7 +4848,6 @@
             </a:r>
             <a:r>
               <a:rPr lang="pt-BR" sz="2800" dirty="0" smtClean="0">
-                <a:latin typeface="Tahoma" panose="020B0604030504040204" pitchFamily="34" charset="0"/>
                 <a:ea typeface="Tahoma" panose="020B0604030504040204" pitchFamily="34" charset="0"/>
                 <a:cs typeface="Tahoma" panose="020B0604030504040204" pitchFamily="34" charset="0"/>
               </a:rPr>
@@ -4854,7 +4855,6 @@
             </a:r>
             <a:r>
               <a:rPr lang="pt-BR" sz="2800" dirty="0">
-                <a:latin typeface="Tahoma" panose="020B0604030504040204" pitchFamily="34" charset="0"/>
                 <a:ea typeface="Tahoma" panose="020B0604030504040204" pitchFamily="34" charset="0"/>
                 <a:cs typeface="Tahoma" panose="020B0604030504040204" pitchFamily="34" charset="0"/>
               </a:rPr>
@@ -4920,7 +4920,7 @@
           <a:p>
             <a:r>
               <a:rPr lang="pt-BR" dirty="0" smtClean="0"/>
-              <a:t>Banco de Dados</a:t>
+              <a:t>Interface do Usuário</a:t>
             </a:r>
             <a:endParaRPr lang="pt-BR" dirty="0"/>
           </a:p>
@@ -4928,7 +4928,7 @@
       </p:sp>
       <p:pic>
         <p:nvPicPr>
-          <p:cNvPr id="5" name="Imagem 4"/>
+          <p:cNvPr id="4" name="Imagem 3"/>
           <p:cNvPicPr>
             <a:picLocks noChangeAspect="1"/>
           </p:cNvPicPr>
@@ -4948,18 +4948,55 @@
         </p:blipFill>
         <p:spPr>
           <a:xfrm>
-            <a:off x="0" y="1417638"/>
-            <a:ext cx="9144000" cy="4691790"/>
+            <a:off x="1293307" y="1124744"/>
+            <a:ext cx="6557385" cy="5104800"/>
           </a:xfrm>
           <a:prstGeom prst="rect">
             <a:avLst/>
           </a:prstGeom>
         </p:spPr>
       </p:pic>
+      <p:sp>
+        <p:nvSpPr>
+          <p:cNvPr id="8" name="Retângulo 7"/>
+          <p:cNvSpPr/>
+          <p:nvPr/>
+        </p:nvSpPr>
+        <p:spPr>
+          <a:xfrm>
+            <a:off x="0" y="1217583"/>
+            <a:ext cx="1872208" cy="400110"/>
+          </a:xfrm>
+          <a:prstGeom prst="rect">
+            <a:avLst/>
+          </a:prstGeom>
+        </p:spPr>
+        <p:txBody>
+          <a:bodyPr wrap="square">
+            <a:spAutoFit/>
+          </a:bodyPr>
+          <a:lstStyle/>
+          <a:p>
+            <a:r>
+              <a:rPr lang="pt-BR" sz="2000" dirty="0" smtClean="0">
+                <a:solidFill>
+                  <a:srgbClr val="FF0000"/>
+                </a:solidFill>
+              </a:rPr>
+              <a:t>*Visão ADM</a:t>
+            </a:r>
+            <a:endParaRPr lang="pt-BR" sz="2400" dirty="0">
+              <a:solidFill>
+                <a:srgbClr val="FF0000"/>
+              </a:solidFill>
+            </a:endParaRPr>
+          </a:p>
+        </p:txBody>
+      </p:sp>
     </p:spTree>
     <p:extLst>
       <p:ext uri="{BB962C8B-B14F-4D97-AF65-F5344CB8AC3E}">
-        <p14:creationId xmlns:p14="http://schemas.microsoft.com/office/powerpoint/2010/main" val="3218491669"/>
+        <p14:creationId xmlns:p14="http://schemas.microsoft.com/office/powerpoint/2010/main" val="38583560"/>
       </p:ext>
     </p:extLst>
   </p:cSld>
@@ -5010,7 +5047,7 @@
           <a:p>
             <a:r>
               <a:rPr lang="pt-BR" dirty="0" smtClean="0"/>
-              <a:t>Banco de Dados</a:t>
+              <a:t>Interface do Usuário</a:t>
             </a:r>
             <a:endParaRPr lang="pt-BR" dirty="0"/>
           </a:p>
@@ -5038,6 +5075,223 @@
         </p:blipFill>
         <p:spPr>
           <a:xfrm>
+            <a:off x="1293307" y="1124744"/>
+            <a:ext cx="6557385" cy="5104800"/>
+          </a:xfrm>
+          <a:prstGeom prst="rect">
+            <a:avLst/>
+          </a:prstGeom>
+        </p:spPr>
+      </p:pic>
+      <p:sp>
+        <p:nvSpPr>
+          <p:cNvPr id="8" name="Retângulo 7"/>
+          <p:cNvSpPr/>
+          <p:nvPr/>
+        </p:nvSpPr>
+        <p:spPr>
+          <a:xfrm>
+            <a:off x="0" y="1217583"/>
+            <a:ext cx="1835696" cy="400110"/>
+          </a:xfrm>
+          <a:prstGeom prst="rect">
+            <a:avLst/>
+          </a:prstGeom>
+        </p:spPr>
+        <p:txBody>
+          <a:bodyPr wrap="square">
+            <a:spAutoFit/>
+          </a:bodyPr>
+          <a:lstStyle/>
+          <a:p>
+            <a:r>
+              <a:rPr lang="pt-BR" sz="2000" dirty="0" smtClean="0">
+                <a:solidFill>
+                  <a:srgbClr val="FF0000"/>
+                </a:solidFill>
+              </a:rPr>
+              <a:t>*Visão ADM</a:t>
+            </a:r>
+            <a:endParaRPr lang="pt-BR" sz="2400" dirty="0">
+              <a:solidFill>
+                <a:srgbClr val="FF0000"/>
+              </a:solidFill>
+            </a:endParaRPr>
+          </a:p>
+        </p:txBody>
+      </p:sp>
+    </p:spTree>
+    <p:extLst>
+      <p:ext uri="{BB962C8B-B14F-4D97-AF65-F5344CB8AC3E}">
+        <p14:creationId xmlns:p14="http://schemas.microsoft.com/office/powerpoint/2010/main" val="1225680612"/>
+      </p:ext>
+    </p:extLst>
+  </p:cSld>
+  <p:clrMapOvr>
+    <a:masterClrMapping/>
+  </p:clrMapOvr>
+  <p:timing>
+    <p:tnLst>
+      <p:par>
+        <p:cTn id="1" dur="indefinite" restart="never" nodeType="tmRoot"/>
+      </p:par>
+    </p:tnLst>
+  </p:timing>
+</p:sld>
+</file>
+
+<file path=ppt/slides/slide32.xml><?xml version="1.0" encoding="utf-8"?>
+<p:sld xmlns:a="http://schemas.openxmlformats.org/drawingml/2006/main" xmlns:r="http://schemas.openxmlformats.org/officeDocument/2006/relationships" xmlns:p="http://schemas.openxmlformats.org/presentationml/2006/main">
+  <p:cSld>
+    <p:spTree>
+      <p:nvGrpSpPr>
+        <p:cNvPr id="1" name=""/>
+        <p:cNvGrpSpPr/>
+        <p:nvPr/>
+      </p:nvGrpSpPr>
+      <p:grpSpPr>
+        <a:xfrm>
+          <a:off x="0" y="0"/>
+          <a:ext cx="0" cy="0"/>
+          <a:chOff x="0" y="0"/>
+          <a:chExt cx="0" cy="0"/>
+        </a:xfrm>
+      </p:grpSpPr>
+      <p:sp>
+        <p:nvSpPr>
+          <p:cNvPr id="2" name="Title 1"/>
+          <p:cNvSpPr>
+            <a:spLocks noGrp="1"/>
+          </p:cNvSpPr>
+          <p:nvPr>
+            <p:ph type="title"/>
+          </p:nvPr>
+        </p:nvSpPr>
+        <p:spPr/>
+        <p:txBody>
+          <a:bodyPr/>
+          <a:lstStyle/>
+          <a:p>
+            <a:r>
+              <a:rPr lang="pt-BR" dirty="0" smtClean="0"/>
+              <a:t>Banco de Dados</a:t>
+            </a:r>
+            <a:endParaRPr lang="pt-BR" dirty="0"/>
+          </a:p>
+        </p:txBody>
+      </p:sp>
+      <p:pic>
+        <p:nvPicPr>
+          <p:cNvPr id="5" name="Imagem 4"/>
+          <p:cNvPicPr>
+            <a:picLocks noChangeAspect="1"/>
+          </p:cNvPicPr>
+          <p:nvPr/>
+        </p:nvPicPr>
+        <p:blipFill>
+          <a:blip r:embed="rId2">
+            <a:extLst>
+              <a:ext uri="{28A0092B-C50C-407E-A947-70E740481C1C}">
+                <a14:useLocalDpi xmlns:a14="http://schemas.microsoft.com/office/drawing/2010/main" val="0"/>
+              </a:ext>
+            </a:extLst>
+          </a:blip>
+          <a:stretch>
+            <a:fillRect/>
+          </a:stretch>
+        </p:blipFill>
+        <p:spPr>
+          <a:xfrm>
+            <a:off x="0" y="1417638"/>
+            <a:ext cx="9144000" cy="4691790"/>
+          </a:xfrm>
+          <a:prstGeom prst="rect">
+            <a:avLst/>
+          </a:prstGeom>
+        </p:spPr>
+      </p:pic>
+    </p:spTree>
+    <p:extLst>
+      <p:ext uri="{BB962C8B-B14F-4D97-AF65-F5344CB8AC3E}">
+        <p14:creationId xmlns:p14="http://schemas.microsoft.com/office/powerpoint/2010/main" val="3218491669"/>
+      </p:ext>
+    </p:extLst>
+  </p:cSld>
+  <p:clrMapOvr>
+    <a:masterClrMapping/>
+  </p:clrMapOvr>
+  <p:timing>
+    <p:tnLst>
+      <p:par>
+        <p:cTn id="1" dur="indefinite" restart="never" nodeType="tmRoot"/>
+      </p:par>
+    </p:tnLst>
+  </p:timing>
+</p:sld>
+</file>
+
+<file path=ppt/slides/slide33.xml><?xml version="1.0" encoding="utf-8"?>
+<p:sld xmlns:a="http://schemas.openxmlformats.org/drawingml/2006/main" xmlns:r="http://schemas.openxmlformats.org/officeDocument/2006/relationships" xmlns:p="http://schemas.openxmlformats.org/presentationml/2006/main">
+  <p:cSld>
+    <p:spTree>
+      <p:nvGrpSpPr>
+        <p:cNvPr id="1" name=""/>
+        <p:cNvGrpSpPr/>
+        <p:nvPr/>
+      </p:nvGrpSpPr>
+      <p:grpSpPr>
+        <a:xfrm>
+          <a:off x="0" y="0"/>
+          <a:ext cx="0" cy="0"/>
+          <a:chOff x="0" y="0"/>
+          <a:chExt cx="0" cy="0"/>
+        </a:xfrm>
+      </p:grpSpPr>
+      <p:sp>
+        <p:nvSpPr>
+          <p:cNvPr id="2" name="Title 1"/>
+          <p:cNvSpPr>
+            <a:spLocks noGrp="1"/>
+          </p:cNvSpPr>
+          <p:nvPr>
+            <p:ph type="title"/>
+          </p:nvPr>
+        </p:nvSpPr>
+        <p:spPr/>
+        <p:txBody>
+          <a:bodyPr/>
+          <a:lstStyle/>
+          <a:p>
+            <a:r>
+              <a:rPr lang="pt-BR" dirty="0" smtClean="0"/>
+              <a:t>Banco de Dados</a:t>
+            </a:r>
+            <a:endParaRPr lang="pt-BR" dirty="0"/>
+          </a:p>
+        </p:txBody>
+      </p:sp>
+      <p:pic>
+        <p:nvPicPr>
+          <p:cNvPr id="3" name="Imagem 2"/>
+          <p:cNvPicPr>
+            <a:picLocks noChangeAspect="1"/>
+          </p:cNvPicPr>
+          <p:nvPr/>
+        </p:nvPicPr>
+        <p:blipFill>
+          <a:blip r:embed="rId2">
+            <a:extLst>
+              <a:ext uri="{28A0092B-C50C-407E-A947-70E740481C1C}">
+                <a14:useLocalDpi xmlns:a14="http://schemas.microsoft.com/office/drawing/2010/main" val="0"/>
+              </a:ext>
+            </a:extLst>
+          </a:blip>
+          <a:stretch>
+            <a:fillRect/>
+          </a:stretch>
+        </p:blipFill>
+        <p:spPr>
+          <a:xfrm>
             <a:off x="0" y="1241612"/>
             <a:ext cx="9144000" cy="4923692"/>
           </a:xfrm>
@@ -5066,7 +5320,7 @@
 </p:sld>
 </file>
 
-<file path=ppt/slides/slide32.xml><?xml version="1.0" encoding="utf-8"?>
+<file path=ppt/slides/slide34.xml><?xml version="1.0" encoding="utf-8"?>
 <p:sld xmlns:a="http://schemas.openxmlformats.org/drawingml/2006/main" xmlns:r="http://schemas.openxmlformats.org/officeDocument/2006/relationships" xmlns:p="http://schemas.openxmlformats.org/presentationml/2006/main">
   <p:cSld>
     <p:spTree>
@@ -5267,7 +5521,7 @@
 </p:sld>
 </file>
 
-<file path=ppt/slides/slide33.xml><?xml version="1.0" encoding="utf-8"?>
+<file path=ppt/slides/slide35.xml><?xml version="1.0" encoding="utf-8"?>
 <p:sld xmlns:a="http://schemas.openxmlformats.org/drawingml/2006/main" xmlns:r="http://schemas.openxmlformats.org/officeDocument/2006/relationships" xmlns:p="http://schemas.openxmlformats.org/presentationml/2006/main">
   <p:cSld>
     <p:spTree>
@@ -5387,7 +5641,7 @@
 </p:sld>
 </file>
 
-<file path=ppt/slides/slide34.xml><?xml version="1.0" encoding="utf-8"?>
+<file path=ppt/slides/slide36.xml><?xml version="1.0" encoding="utf-8"?>
 <p:sld xmlns:a="http://schemas.openxmlformats.org/drawingml/2006/main" xmlns:r="http://schemas.openxmlformats.org/officeDocument/2006/relationships" xmlns:p="http://schemas.openxmlformats.org/presentationml/2006/main">
   <p:cSld>
     <p:spTree>
@@ -5429,14 +5683,74 @@
           </a:p>
         </p:txBody>
       </p:sp>
-      <p:sp>
-        <p:nvSpPr>
-          <p:cNvPr id="3" name="Espaço Reservado para Conteúdo 2"/>
-          <p:cNvSpPr>
-            <a:spLocks noGrp="1"/>
-          </p:cNvSpPr>
-          <p:nvPr>
-            <p:ph idx="1"/>
+      <p:pic>
+        <p:nvPicPr>
+          <p:cNvPr id="6" name="Imagem 5"/>
+          <p:cNvPicPr>
+            <a:picLocks noChangeAspect="1"/>
+          </p:cNvPicPr>
+          <p:nvPr/>
+        </p:nvPicPr>
+        <p:blipFill>
+          <a:blip r:embed="rId2">
+            <a:extLst>
+              <a:ext uri="{28A0092B-C50C-407E-A947-70E740481C1C}">
+                <a14:useLocalDpi xmlns:a14="http://schemas.microsoft.com/office/drawing/2010/main" val="0"/>
+              </a:ext>
+            </a:extLst>
+          </a:blip>
+          <a:stretch>
+            <a:fillRect/>
+          </a:stretch>
+        </p:blipFill>
+        <p:spPr>
+          <a:xfrm>
+            <a:off x="6896" y="1556792"/>
+            <a:ext cx="9158371" cy="4536504"/>
+          </a:xfrm>
+          <a:prstGeom prst="rect">
+            <a:avLst/>
+          </a:prstGeom>
+        </p:spPr>
+      </p:pic>
+    </p:spTree>
+    <p:extLst>
+      <p:ext uri="{BB962C8B-B14F-4D97-AF65-F5344CB8AC3E}">
+        <p14:creationId xmlns:p14="http://schemas.microsoft.com/office/powerpoint/2010/main" val="2751600512"/>
+      </p:ext>
+    </p:extLst>
+  </p:cSld>
+  <p:clrMapOvr>
+    <a:masterClrMapping/>
+  </p:clrMapOvr>
+</p:sld>
+</file>
+
+<file path=ppt/slides/slide37.xml><?xml version="1.0" encoding="utf-8"?>
+<p:sld xmlns:a="http://schemas.openxmlformats.org/drawingml/2006/main" xmlns:r="http://schemas.openxmlformats.org/officeDocument/2006/relationships" xmlns:p="http://schemas.openxmlformats.org/presentationml/2006/main">
+  <p:cSld>
+    <p:spTree>
+      <p:nvGrpSpPr>
+        <p:cNvPr id="1" name=""/>
+        <p:cNvGrpSpPr/>
+        <p:nvPr/>
+      </p:nvGrpSpPr>
+      <p:grpSpPr>
+        <a:xfrm>
+          <a:off x="0" y="0"/>
+          <a:ext cx="0" cy="0"/>
+          <a:chOff x="0" y="0"/>
+          <a:chExt cx="0" cy="0"/>
+        </a:xfrm>
+      </p:grpSpPr>
+      <p:sp>
+        <p:nvSpPr>
+          <p:cNvPr id="2" name="Título 1"/>
+          <p:cNvSpPr>
+            <a:spLocks noGrp="1"/>
+          </p:cNvSpPr>
+          <p:nvPr>
+            <p:ph type="title"/>
           </p:nvPr>
         </p:nvSpPr>
         <p:spPr/>
@@ -5448,28 +5762,137 @@
           <a:p>
             <a:r>
               <a:rPr lang="pt-BR" dirty="0" smtClean="0"/>
-              <a:t>Descrever os resultados da inspeção de usabilidade.</a:t>
-            </a:r>
-          </a:p>
-          <a:p>
-            <a:r>
-              <a:rPr lang="pt-BR" dirty="0" smtClean="0"/>
-              <a:t>No caso de terem sido usadas heurísticas, citar as heurísticas utilizadas.</a:t>
-            </a:r>
-          </a:p>
-          <a:p>
+              <a:t>Inspeção de Usabilidade</a:t>
+            </a:r>
             <a:endParaRPr lang="pt-BR" dirty="0"/>
           </a:p>
-          <a:p>
-            <a:r>
-              <a:rPr lang="pt-BR" dirty="0"/>
-              <a:t>Máximo 2 </a:t>
-            </a:r>
-            <a:r>
-              <a:rPr lang="pt-BR" dirty="0" smtClean="0"/>
-              <a:t>slides</a:t>
-            </a:r>
-            <a:endParaRPr lang="pt-BR" dirty="0"/>
+        </p:txBody>
+      </p:sp>
+      <p:sp>
+        <p:nvSpPr>
+          <p:cNvPr id="3" name="Espaço Reservado para Conteúdo 2"/>
+          <p:cNvSpPr>
+            <a:spLocks noGrp="1"/>
+          </p:cNvSpPr>
+          <p:nvPr>
+            <p:ph idx="1"/>
+          </p:nvPr>
+        </p:nvSpPr>
+        <p:spPr>
+          <a:xfrm>
+            <a:off x="308153" y="1340768"/>
+            <a:ext cx="8527694" cy="4027586"/>
+          </a:xfrm>
+        </p:spPr>
+        <p:txBody>
+          <a:bodyPr>
+            <a:normAutofit fontScale="25000" lnSpcReduction="20000"/>
+          </a:bodyPr>
+          <a:lstStyle/>
+          <a:p>
+            <a:r>
+              <a:rPr lang="pt-BR" sz="8000" dirty="0" smtClean="0"/>
+              <a:t>3 - </a:t>
+            </a:r>
+            <a:r>
+              <a:rPr lang="pt-BR" sz="8000" dirty="0"/>
+              <a:t>Controle do usuário e </a:t>
+            </a:r>
+            <a:r>
+              <a:rPr lang="pt-BR" sz="8000" dirty="0" smtClean="0"/>
+              <a:t>liberdade: </a:t>
+            </a:r>
+            <a:r>
+              <a:rPr lang="pt-BR" sz="8000" dirty="0"/>
+              <a:t>Os usuários podem escolher funções do sistema por engano e precisarão de uma "saída de emergência" bem marcada para deixar o estado não desejado sem ter que passar por um extenso diálogo</a:t>
+            </a:r>
+            <a:r>
+              <a:rPr lang="pt-BR" sz="8000" dirty="0" smtClean="0"/>
+              <a:t>.</a:t>
+            </a:r>
+          </a:p>
+          <a:p>
+            <a:endParaRPr lang="pt-BR" sz="8000" dirty="0" smtClean="0"/>
+          </a:p>
+          <a:p>
+            <a:r>
+              <a:rPr lang="pt-BR" sz="8000" dirty="0" smtClean="0"/>
+              <a:t>4 - Consistência </a:t>
+            </a:r>
+            <a:r>
+              <a:rPr lang="pt-BR" sz="8000" dirty="0"/>
+              <a:t>e </a:t>
+            </a:r>
+            <a:r>
+              <a:rPr lang="pt-BR" sz="8000" dirty="0" smtClean="0"/>
+              <a:t>padrões: </a:t>
+            </a:r>
+            <a:r>
+              <a:rPr lang="pt-BR" sz="8000" dirty="0"/>
+              <a:t>Usuários não devem ter que imaginar se palavras, situações, ou ações diferentes significam a mesma coisa. Devem se seguir as convenções da plataforma. Usar palavras de forma consistente no conteúdo e nos botões. Deve-se verificar os </a:t>
+            </a:r>
+            <a:r>
+              <a:rPr lang="pt-BR" sz="8000" dirty="0" smtClean="0"/>
+              <a:t>títulos e </a:t>
+            </a:r>
+            <a:r>
+              <a:rPr lang="pt-BR" sz="8000" dirty="0"/>
+              <a:t>cabeçalhos das páginas confrontando-os com os links que apontam para eles</a:t>
+            </a:r>
+            <a:r>
+              <a:rPr lang="pt-BR" sz="8000" dirty="0" smtClean="0"/>
+              <a:t>.</a:t>
+            </a:r>
+          </a:p>
+          <a:p>
+            <a:endParaRPr lang="pt-BR" sz="8000" dirty="0" smtClean="0"/>
+          </a:p>
+          <a:p>
+            <a:r>
+              <a:rPr lang="pt-BR" sz="8000" dirty="0" smtClean="0"/>
+              <a:t>5 - </a:t>
+            </a:r>
+            <a:r>
+              <a:rPr lang="pt-BR" sz="8000" dirty="0"/>
+              <a:t>Prevenção de </a:t>
+            </a:r>
+            <a:r>
+              <a:rPr lang="pt-BR" sz="8000" dirty="0" smtClean="0"/>
+              <a:t>erro: </a:t>
+            </a:r>
+            <a:r>
+              <a:rPr lang="pt-BR" sz="8000" dirty="0"/>
+              <a:t>Muito melhor que boas mensagens de erro é um projeto cuidadoso que, em primeiro lugar, previna a ocorrência de problemas através de orientação e apresentação de recursos que facilitem a navegação</a:t>
+            </a:r>
+            <a:r>
+              <a:rPr lang="pt-BR" sz="8000" dirty="0" smtClean="0"/>
+              <a:t>.</a:t>
+            </a:r>
+          </a:p>
+          <a:p>
+            <a:endParaRPr lang="pt-BR" sz="8000" dirty="0" smtClean="0"/>
+          </a:p>
+          <a:p>
+            <a:r>
+              <a:rPr lang="pt-BR" sz="8000" dirty="0" smtClean="0"/>
+              <a:t>9 - </a:t>
+            </a:r>
+            <a:r>
+              <a:rPr lang="pt-BR" sz="8000" dirty="0"/>
+              <a:t>Auxiliar usuários a reconhecer, diagnosticar e recuperar ações </a:t>
+            </a:r>
+            <a:r>
+              <a:rPr lang="pt-BR" sz="8000" dirty="0" smtClean="0"/>
+              <a:t>erradas: Mensagens </a:t>
+            </a:r>
+            <a:r>
+              <a:rPr lang="pt-BR" sz="8000" dirty="0"/>
+              <a:t>de erro devem ser expressas em linguagem clara (sem códigos), indicar precisamente o problema, e sugerir construtivamente uma solução.</a:t>
+            </a:r>
+            <a:endParaRPr lang="pt-BR" sz="8000" dirty="0" smtClean="0"/>
+          </a:p>
+          <a:p>
+            <a:endParaRPr lang="pt-BR" sz="1800" dirty="0"/>
           </a:p>
         </p:txBody>
       </p:sp>
@@ -5486,7 +5909,7 @@
 </p:sld>
 </file>
 
-<file path=ppt/slides/slide35.xml><?xml version="1.0" encoding="utf-8"?>
+<file path=ppt/slides/slide38.xml><?xml version="1.0" encoding="utf-8"?>
 <p:sld xmlns:a="http://schemas.openxmlformats.org/drawingml/2006/main" xmlns:r="http://schemas.openxmlformats.org/officeDocument/2006/relationships" xmlns:p="http://schemas.openxmlformats.org/presentationml/2006/main">
   <p:cSld>
     <p:spTree>

</xml_diff>

<commit_message>
Atualização de alguns slides da apresentação.
</commit_message>
<xml_diff>
--- a/documentacao/G4_Apresentacao2sem2014_Final.pptx
+++ b/documentacao/G4_Apresentacao2sem2014_Final.pptx
@@ -13,15 +13,15 @@
     <p:sldId id="405" r:id="rId4"/>
     <p:sldId id="395" r:id="rId5"/>
     <p:sldId id="423" r:id="rId6"/>
-    <p:sldId id="403" r:id="rId7"/>
-    <p:sldId id="396" r:id="rId8"/>
-    <p:sldId id="397" r:id="rId9"/>
-    <p:sldId id="398" r:id="rId10"/>
-    <p:sldId id="399" r:id="rId11"/>
-    <p:sldId id="400" r:id="rId12"/>
-    <p:sldId id="425" r:id="rId13"/>
-    <p:sldId id="426" r:id="rId14"/>
-    <p:sldId id="427" r:id="rId15"/>
+    <p:sldId id="429" r:id="rId7"/>
+    <p:sldId id="403" r:id="rId8"/>
+    <p:sldId id="396" r:id="rId9"/>
+    <p:sldId id="397" r:id="rId10"/>
+    <p:sldId id="398" r:id="rId11"/>
+    <p:sldId id="399" r:id="rId12"/>
+    <p:sldId id="400" r:id="rId13"/>
+    <p:sldId id="428" r:id="rId14"/>
+    <p:sldId id="425" r:id="rId15"/>
     <p:sldId id="406" r:id="rId16"/>
     <p:sldId id="407" r:id="rId17"/>
     <p:sldId id="408" r:id="rId18"/>
@@ -154,15 +154,15 @@
             <p14:sldId id="405"/>
             <p14:sldId id="395"/>
             <p14:sldId id="423"/>
+            <p14:sldId id="429"/>
             <p14:sldId id="403"/>
             <p14:sldId id="396"/>
             <p14:sldId id="397"/>
             <p14:sldId id="398"/>
             <p14:sldId id="399"/>
             <p14:sldId id="400"/>
+            <p14:sldId id="428"/>
             <p14:sldId id="425"/>
-            <p14:sldId id="426"/>
-            <p14:sldId id="427"/>
             <p14:sldId id="406"/>
             <p14:sldId id="407"/>
             <p14:sldId id="408"/>
@@ -192,7 +192,7 @@
       </p14:sectionLst>
     </p:ext>
     <p:ext uri="{EFAFB233-063F-42B5-8137-9DF3F51BA10A}">
-      <p15:sldGuideLst xmlns:p15="http://schemas.microsoft.com/office/powerpoint/2012/main" xmlns="">
+      <p15:sldGuideLst xmlns:p15="http://schemas.microsoft.com/office/powerpoint/2012/main">
         <p15:guide id="1" orient="horz" pos="2160">
           <p15:clr>
             <a:srgbClr val="A4A3A4"/>
@@ -237,15 +237,6 @@
 
 <file path=ppt/comments/comment3.xml><?xml version="1.0" encoding="utf-8"?>
 <p:cmLst xmlns:a="http://schemas.openxmlformats.org/drawingml/2006/main" xmlns:r="http://schemas.openxmlformats.org/officeDocument/2006/relationships" xmlns:p="http://schemas.openxmlformats.org/presentationml/2006/main">
-  <p:cm authorId="0" dt="2014-11-16T14:53:56.555" idx="3">
-    <p:pos x="5485" y="1143"/>
-    <p:text>Corrigir frase.</p:text>
-  </p:cm>
-</p:cmLst>
-</file>
-
-<file path=ppt/comments/comment4.xml><?xml version="1.0" encoding="utf-8"?>
-<p:cmLst xmlns:a="http://schemas.openxmlformats.org/drawingml/2006/main" xmlns:r="http://schemas.openxmlformats.org/officeDocument/2006/relationships" xmlns:p="http://schemas.openxmlformats.org/presentationml/2006/main">
   <p:cm authorId="0" dt="2014-11-16T14:55:02.790" idx="4">
     <p:pos x="4419" y="318"/>
     <p:text>Aqui só colocar os guidelines de forma geral e não toda a tabela.
@@ -255,7 +246,7 @@
 </p:cmLst>
 </file>
 
-<file path=ppt/comments/comment5.xml><?xml version="1.0" encoding="utf-8"?>
+<file path=ppt/comments/comment4.xml><?xml version="1.0" encoding="utf-8"?>
 <p:cmLst xmlns:a="http://schemas.openxmlformats.org/drawingml/2006/main" xmlns:r="http://schemas.openxmlformats.org/officeDocument/2006/relationships" xmlns:p="http://schemas.openxmlformats.org/presentationml/2006/main">
   <p:cm authorId="0" dt="2014-11-16T14:55:29.392" idx="5">
     <p:pos x="1118" y="791"/>
@@ -264,7 +255,7 @@
 </p:cmLst>
 </file>
 
-<file path=ppt/comments/comment6.xml><?xml version="1.0" encoding="utf-8"?>
+<file path=ppt/comments/comment5.xml><?xml version="1.0" encoding="utf-8"?>
 <p:cmLst xmlns:a="http://schemas.openxmlformats.org/drawingml/2006/main" xmlns:r="http://schemas.openxmlformats.org/officeDocument/2006/relationships" xmlns:p="http://schemas.openxmlformats.org/presentationml/2006/main">
   <p:cm authorId="0" dt="2014-11-16T14:57:06.708" idx="6">
     <p:pos x="4101" y="1032"/>
@@ -356,7 +347,7 @@
             <a:fld id="{44372743-0C2A-4DA9-BF19-A9026375E57C}" type="datetimeFigureOut">
               <a:rPr lang="pt-BR" smtClean="0"/>
               <a:pPr/>
-              <a:t>16/11/2014</a:t>
+              <a:t>21/11/2014</a:t>
             </a:fld>
             <a:endParaRPr lang="pt-BR"/>
           </a:p>
@@ -516,7 +507,7 @@
             <a:fld id="{2C938334-6292-4E5A-8061-BB795ABB3EFC}" type="slidenum">
               <a:rPr lang="pt-BR" smtClean="0"/>
               <a:pPr/>
-              <a:t>‹#›</a:t>
+              <a:t>‹nº›</a:t>
             </a:fld>
             <a:endParaRPr lang="pt-BR"/>
           </a:p>
@@ -922,7 +913,7 @@
             <a:fld id="{94CDC042-039A-4E80-A826-4614F83E09D2}" type="datetimeFigureOut">
               <a:rPr lang="pt-BR" smtClean="0"/>
               <a:pPr/>
-              <a:t>16/11/2014</a:t>
+              <a:t>21/11/2014</a:t>
             </a:fld>
             <a:endParaRPr lang="pt-BR"/>
           </a:p>
@@ -965,7 +956,7 @@
             <a:fld id="{FD633073-5C0F-4B13-B3E3-2ADA7DBEA4A8}" type="slidenum">
               <a:rPr lang="pt-BR" smtClean="0"/>
               <a:pPr/>
-              <a:t>‹#›</a:t>
+              <a:t>‹nº›</a:t>
             </a:fld>
             <a:endParaRPr lang="pt-BR"/>
           </a:p>
@@ -1135,7 +1126,7 @@
             <a:fld id="{94CDC042-039A-4E80-A826-4614F83E09D2}" type="datetimeFigureOut">
               <a:rPr lang="pt-BR" smtClean="0"/>
               <a:pPr/>
-              <a:t>16/11/2014</a:t>
+              <a:t>21/11/2014</a:t>
             </a:fld>
             <a:endParaRPr lang="pt-BR"/>
           </a:p>
@@ -1178,7 +1169,7 @@
             <a:fld id="{FD633073-5C0F-4B13-B3E3-2ADA7DBEA4A8}" type="slidenum">
               <a:rPr lang="pt-BR" smtClean="0"/>
               <a:pPr/>
-              <a:t>‹#›</a:t>
+              <a:t>‹nº›</a:t>
             </a:fld>
             <a:endParaRPr lang="pt-BR"/>
           </a:p>
@@ -1347,7 +1338,7 @@
               <a:pPr>
                 <a:defRPr/>
               </a:pPr>
-              <a:t>‹#›</a:t>
+              <a:t>‹nº›</a:t>
             </a:fld>
             <a:endParaRPr lang="en-US"/>
           </a:p>
@@ -1686,7 +1677,7 @@
               <a:pPr>
                 <a:defRPr/>
               </a:pPr>
-              <a:t>‹#›</a:t>
+              <a:t>‹nº›</a:t>
             </a:fld>
             <a:endParaRPr lang="en-US"/>
           </a:p>
@@ -1858,7 +1849,7 @@
             <a:fld id="{94CDC042-039A-4E80-A826-4614F83E09D2}" type="datetimeFigureOut">
               <a:rPr lang="pt-BR" smtClean="0"/>
               <a:pPr/>
-              <a:t>16/11/2014</a:t>
+              <a:t>21/11/2014</a:t>
             </a:fld>
             <a:endParaRPr lang="pt-BR"/>
           </a:p>
@@ -1937,7 +1928,7 @@
             <a:fld id="{FD633073-5C0F-4B13-B3E3-2ADA7DBEA4A8}" type="slidenum">
               <a:rPr lang="pt-BR" smtClean="0"/>
               <a:pPr/>
-              <a:t>‹#›</a:t>
+              <a:t>‹nº›</a:t>
             </a:fld>
             <a:endParaRPr lang="pt-BR"/>
           </a:p>
@@ -2383,7 +2374,7 @@
       </p:sp>
       <p:pic>
         <p:nvPicPr>
-          <p:cNvPr id="5" name="Imagem 4"/>
+          <p:cNvPr id="4" name="Imagem 3"/>
           <p:cNvPicPr>
             <a:picLocks noChangeAspect="1"/>
           </p:cNvPicPr>
@@ -2403,8 +2394,8 @@
         </p:blipFill>
         <p:spPr>
           <a:xfrm>
-            <a:off x="2087493" y="1417638"/>
-            <a:ext cx="4969014" cy="4997654"/>
+            <a:off x="0" y="1196752"/>
+            <a:ext cx="9144000" cy="4993722"/>
           </a:xfrm>
           <a:prstGeom prst="rect">
             <a:avLst/>
@@ -2413,14 +2404,14 @@
       </p:pic>
       <p:sp>
         <p:nvSpPr>
-          <p:cNvPr id="7" name="Retângulo 6"/>
+          <p:cNvPr id="6" name="Retângulo 5"/>
           <p:cNvSpPr/>
           <p:nvPr/>
         </p:nvSpPr>
         <p:spPr>
           <a:xfrm>
-            <a:off x="5004048" y="1772816"/>
-            <a:ext cx="3863400" cy="1015663"/>
+            <a:off x="683568" y="6093296"/>
+            <a:ext cx="8136904" cy="461665"/>
           </a:xfrm>
           <a:prstGeom prst="rect">
             <a:avLst/>
@@ -2432,21 +2423,26 @@
           </a:bodyPr>
           <a:lstStyle/>
           <a:p>
-            <a:r>
-              <a:rPr lang="pt-BR" dirty="0">
+            <a:pPr>
+              <a:buClr>
+                <a:schemeClr val="bg2"/>
+              </a:buClr>
+            </a:pPr>
+            <a:r>
+              <a:rPr lang="pt-BR" sz="2400" dirty="0" smtClean="0">
                 <a:solidFill>
                   <a:srgbClr val="FF0000"/>
                 </a:solidFill>
               </a:rPr>
-              <a:t>*</a:t>
-            </a:r>
-            <a:r>
-              <a:rPr lang="pt-BR" sz="2000" dirty="0">
+              <a:t>*Continuação </a:t>
+            </a:r>
+            <a:r>
+              <a:rPr lang="pt-BR" sz="2400" dirty="0">
                 <a:solidFill>
                   <a:srgbClr val="FF0000"/>
                 </a:solidFill>
               </a:rPr>
-              <a:t>Os casos de uso do gestor podem ser melhor visualizados nos slides anterior.</a:t>
+              <a:t>da ligação de herança no slide seguinte</a:t>
             </a:r>
           </a:p>
         </p:txBody>
@@ -2454,7 +2450,7 @@
     </p:spTree>
     <p:extLst>
       <p:ext uri="{BB962C8B-B14F-4D97-AF65-F5344CB8AC3E}">
-        <p14:creationId xmlns:p14="http://schemas.microsoft.com/office/powerpoint/2010/main" val="2953681110"/>
+        <p14:creationId xmlns:p14="http://schemas.microsoft.com/office/powerpoint/2010/main" val="33625712"/>
       </p:ext>
     </p:extLst>
   </p:cSld>
@@ -2505,7 +2501,7 @@
           <a:p>
             <a:r>
               <a:rPr lang="pt-BR" dirty="0" smtClean="0"/>
-              <a:t>Escopo do Sistema</a:t>
+              <a:t>Casos de Uso</a:t>
             </a:r>
             <a:endParaRPr lang="pt-BR" dirty="0"/>
           </a:p>
@@ -2513,7 +2509,7 @@
       </p:sp>
       <p:pic>
         <p:nvPicPr>
-          <p:cNvPr id="14" name="Imagem 13"/>
+          <p:cNvPr id="5" name="Imagem 4"/>
           <p:cNvPicPr>
             <a:picLocks noChangeAspect="1"/>
           </p:cNvPicPr>
@@ -2533,18 +2529,71 @@
         </p:blipFill>
         <p:spPr>
           <a:xfrm>
-            <a:off x="31794" y="1186090"/>
-            <a:ext cx="9112206" cy="4979214"/>
+            <a:off x="2087493" y="1417638"/>
+            <a:ext cx="4969014" cy="4997654"/>
           </a:xfrm>
           <a:prstGeom prst="rect">
             <a:avLst/>
           </a:prstGeom>
         </p:spPr>
       </p:pic>
+      <p:sp>
+        <p:nvSpPr>
+          <p:cNvPr id="7" name="Retângulo 6"/>
+          <p:cNvSpPr/>
+          <p:nvPr/>
+        </p:nvSpPr>
+        <p:spPr>
+          <a:xfrm>
+            <a:off x="5004048" y="1772816"/>
+            <a:ext cx="3863400" cy="707886"/>
+          </a:xfrm>
+          <a:prstGeom prst="rect">
+            <a:avLst/>
+          </a:prstGeom>
+        </p:spPr>
+        <p:txBody>
+          <a:bodyPr wrap="square">
+            <a:spAutoFit/>
+          </a:bodyPr>
+          <a:lstStyle/>
+          <a:p>
+            <a:r>
+              <a:rPr lang="pt-BR" dirty="0">
+                <a:solidFill>
+                  <a:srgbClr val="FF0000"/>
+                </a:solidFill>
+              </a:rPr>
+              <a:t>*</a:t>
+            </a:r>
+            <a:r>
+              <a:rPr lang="pt-BR" sz="2000" dirty="0">
+                <a:solidFill>
+                  <a:srgbClr val="FF0000"/>
+                </a:solidFill>
+              </a:rPr>
+              <a:t>Os casos de uso do gestor podem ser </a:t>
+            </a:r>
+            <a:r>
+              <a:rPr lang="pt-BR" sz="2000" dirty="0" smtClean="0">
+                <a:solidFill>
+                  <a:srgbClr val="FF0000"/>
+                </a:solidFill>
+              </a:rPr>
+              <a:t>visualizados no slide anterior.</a:t>
+            </a:r>
+            <a:endParaRPr lang="pt-BR" sz="2000" dirty="0">
+              <a:solidFill>
+                <a:srgbClr val="FF0000"/>
+              </a:solidFill>
+            </a:endParaRPr>
+          </a:p>
+        </p:txBody>
+      </p:sp>
     </p:spTree>
     <p:extLst>
       <p:ext uri="{BB962C8B-B14F-4D97-AF65-F5344CB8AC3E}">
-        <p14:creationId xmlns:p14="http://schemas.microsoft.com/office/powerpoint/2010/main" val="28993515"/>
+        <p14:creationId xmlns:p14="http://schemas.microsoft.com/office/powerpoint/2010/main" val="2953681110"/>
       </p:ext>
     </p:extLst>
   </p:cSld>
@@ -2595,46 +2644,1272 @@
           <a:p>
             <a:r>
               <a:rPr lang="pt-BR" dirty="0" smtClean="0"/>
-              <a:t>Interface do Usuário</a:t>
+              <a:t>Escopo do Sistema</a:t>
             </a:r>
             <a:endParaRPr lang="pt-BR" dirty="0"/>
           </a:p>
         </p:txBody>
       </p:sp>
-      <p:pic>
-        <p:nvPicPr>
-          <p:cNvPr id="5" name="Imagem 4"/>
-          <p:cNvPicPr>
-            <a:picLocks noChangeAspect="1"/>
-          </p:cNvPicPr>
-          <p:nvPr/>
-        </p:nvPicPr>
-        <p:blipFill>
-          <a:blip r:embed="rId2">
-            <a:extLst>
-              <a:ext uri="{28A0092B-C50C-407E-A947-70E740481C1C}">
-                <a14:useLocalDpi xmlns:a14="http://schemas.microsoft.com/office/drawing/2010/main" val="0"/>
-              </a:ext>
-            </a:extLst>
-          </a:blip>
-          <a:stretch>
-            <a:fillRect/>
-          </a:stretch>
-        </p:blipFill>
-        <p:spPr>
-          <a:xfrm>
-            <a:off x="23410" y="1340768"/>
-            <a:ext cx="9144000" cy="4779468"/>
-          </a:xfrm>
-          <a:prstGeom prst="rect">
-            <a:avLst/>
-          </a:prstGeom>
-        </p:spPr>
-      </p:pic>
+      <p:graphicFrame>
+        <p:nvGraphicFramePr>
+          <p:cNvPr id="4" name="Tabela 3"/>
+          <p:cNvGraphicFramePr>
+            <a:graphicFrameLocks noGrp="1"/>
+          </p:cNvGraphicFramePr>
+          <p:nvPr>
+            <p:extLst>
+              <p:ext uri="{D42A27DB-BD31-4B8C-83A1-F6EECF244321}">
+                <p14:modId xmlns:p14="http://schemas.microsoft.com/office/powerpoint/2010/main" val="1696765501"/>
+              </p:ext>
+            </p:extLst>
+          </p:nvPr>
+        </p:nvGraphicFramePr>
+        <p:xfrm>
+          <a:off x="0" y="1446964"/>
+          <a:ext cx="9144000" cy="4574326"/>
+        </p:xfrm>
+        <a:graphic>
+          <a:graphicData uri="http://schemas.openxmlformats.org/drawingml/2006/table">
+            <a:tbl>
+              <a:tblPr firstRow="1" bandRow="1">
+                <a:tableStyleId>{7E9639D4-E3E2-4D34-9284-5A2195B3D0D7}</a:tableStyleId>
+              </a:tblPr>
+              <a:tblGrid>
+                <a:gridCol w="3419872"/>
+                <a:gridCol w="5724128"/>
+              </a:tblGrid>
+              <a:tr h="347018">
+                <a:tc>
+                  <a:txBody>
+                    <a:bodyPr/>
+                    <a:lstStyle/>
+                    <a:p>
+                      <a:r>
+                        <a:rPr lang="pt-BR" sz="1600" dirty="0" smtClean="0"/>
+                        <a:t>Caso</a:t>
+                      </a:r>
+                      <a:r>
+                        <a:rPr lang="pt-BR" sz="1600" baseline="0" dirty="0" smtClean="0"/>
+                        <a:t> de Uso</a:t>
+                      </a:r>
+                      <a:endParaRPr lang="pt-BR" sz="1600" dirty="0"/>
+                    </a:p>
+                  </a:txBody>
+                  <a:tcPr>
+                    <a:lnL w="12700" cap="flat" cmpd="sng" algn="ctr">
+                      <a:solidFill>
+                        <a:schemeClr val="tx1"/>
+                      </a:solidFill>
+                      <a:prstDash val="solid"/>
+                      <a:round/>
+                      <a:headEnd type="none" w="med" len="med"/>
+                      <a:tailEnd type="none" w="med" len="med"/>
+                    </a:lnL>
+                    <a:lnR w="12700" cap="flat" cmpd="sng" algn="ctr">
+                      <a:solidFill>
+                        <a:schemeClr val="tx1"/>
+                      </a:solidFill>
+                      <a:prstDash val="solid"/>
+                      <a:round/>
+                      <a:headEnd type="none" w="med" len="med"/>
+                      <a:tailEnd type="none" w="med" len="med"/>
+                    </a:lnR>
+                    <a:lnT w="12700" cap="flat" cmpd="sng" algn="ctr">
+                      <a:solidFill>
+                        <a:schemeClr val="tx1"/>
+                      </a:solidFill>
+                      <a:prstDash val="solid"/>
+                      <a:round/>
+                      <a:headEnd type="none" w="med" len="med"/>
+                      <a:tailEnd type="none" w="med" len="med"/>
+                    </a:lnT>
+                    <a:lnB w="12700" cap="flat" cmpd="sng" algn="ctr">
+                      <a:solidFill>
+                        <a:schemeClr val="tx1"/>
+                      </a:solidFill>
+                      <a:prstDash val="solid"/>
+                      <a:round/>
+                      <a:headEnd type="none" w="med" len="med"/>
+                      <a:tailEnd type="none" w="med" len="med"/>
+                    </a:lnB>
+                  </a:tcPr>
+                </a:tc>
+                <a:tc>
+                  <a:txBody>
+                    <a:bodyPr/>
+                    <a:lstStyle/>
+                    <a:p>
+                      <a:r>
+                        <a:rPr lang="pt-BR" sz="1600" dirty="0" smtClean="0"/>
+                        <a:t>Razão da Escolha</a:t>
+                      </a:r>
+                      <a:endParaRPr lang="pt-BR" sz="1600" dirty="0"/>
+                    </a:p>
+                  </a:txBody>
+                  <a:tcPr>
+                    <a:lnL w="12700" cap="flat" cmpd="sng" algn="ctr">
+                      <a:solidFill>
+                        <a:schemeClr val="tx1"/>
+                      </a:solidFill>
+                      <a:prstDash val="solid"/>
+                      <a:round/>
+                      <a:headEnd type="none" w="med" len="med"/>
+                      <a:tailEnd type="none" w="med" len="med"/>
+                    </a:lnL>
+                    <a:lnR w="12700" cap="flat" cmpd="sng" algn="ctr">
+                      <a:solidFill>
+                        <a:schemeClr val="tx1"/>
+                      </a:solidFill>
+                      <a:prstDash val="solid"/>
+                      <a:round/>
+                      <a:headEnd type="none" w="med" len="med"/>
+                      <a:tailEnd type="none" w="med" len="med"/>
+                    </a:lnR>
+                    <a:lnT w="12700" cap="flat" cmpd="sng" algn="ctr">
+                      <a:solidFill>
+                        <a:schemeClr val="tx1"/>
+                      </a:solidFill>
+                      <a:prstDash val="solid"/>
+                      <a:round/>
+                      <a:headEnd type="none" w="med" len="med"/>
+                      <a:tailEnd type="none" w="med" len="med"/>
+                    </a:lnT>
+                    <a:lnB w="12700" cap="flat" cmpd="sng" algn="ctr">
+                      <a:solidFill>
+                        <a:schemeClr val="tx1"/>
+                      </a:solidFill>
+                      <a:prstDash val="solid"/>
+                      <a:round/>
+                      <a:headEnd type="none" w="med" len="med"/>
+                      <a:tailEnd type="none" w="med" len="med"/>
+                    </a:lnB>
+                  </a:tcPr>
+                </a:tc>
+              </a:tr>
+              <a:tr h="599394">
+                <a:tc>
+                  <a:txBody>
+                    <a:bodyPr/>
+                    <a:lstStyle/>
+                    <a:p>
+                      <a:r>
+                        <a:rPr lang="pt-BR" sz="1600" dirty="0" smtClean="0"/>
+                        <a:t>UC01- Verificar resultado do exame online</a:t>
+                      </a:r>
+                      <a:endParaRPr lang="pt-BR" sz="1600" dirty="0"/>
+                    </a:p>
+                  </a:txBody>
+                  <a:tcPr>
+                    <a:lnL w="12700" cap="flat" cmpd="sng" algn="ctr">
+                      <a:solidFill>
+                        <a:schemeClr val="tx1"/>
+                      </a:solidFill>
+                      <a:prstDash val="solid"/>
+                      <a:round/>
+                      <a:headEnd type="none" w="med" len="med"/>
+                      <a:tailEnd type="none" w="med" len="med"/>
+                    </a:lnL>
+                    <a:lnR w="12700" cap="flat" cmpd="sng" algn="ctr">
+                      <a:solidFill>
+                        <a:schemeClr val="tx1"/>
+                      </a:solidFill>
+                      <a:prstDash val="solid"/>
+                      <a:round/>
+                      <a:headEnd type="none" w="med" len="med"/>
+                      <a:tailEnd type="none" w="med" len="med"/>
+                    </a:lnR>
+                    <a:lnT w="12700" cap="flat" cmpd="sng" algn="ctr">
+                      <a:solidFill>
+                        <a:schemeClr val="tx1"/>
+                      </a:solidFill>
+                      <a:prstDash val="solid"/>
+                      <a:round/>
+                      <a:headEnd type="none" w="med" len="med"/>
+                      <a:tailEnd type="none" w="med" len="med"/>
+                    </a:lnT>
+                    <a:lnB w="12700" cap="flat" cmpd="sng" algn="ctr">
+                      <a:solidFill>
+                        <a:schemeClr val="tx1"/>
+                      </a:solidFill>
+                      <a:prstDash val="solid"/>
+                      <a:round/>
+                      <a:headEnd type="none" w="med" len="med"/>
+                      <a:tailEnd type="none" w="med" len="med"/>
+                    </a:lnB>
+                    <a:solidFill>
+                      <a:schemeClr val="bg1"/>
+                    </a:solidFill>
+                  </a:tcPr>
+                </a:tc>
+                <a:tc>
+                  <a:txBody>
+                    <a:bodyPr/>
+                    <a:lstStyle/>
+                    <a:p>
+                      <a:r>
+                        <a:rPr lang="pt-BR" sz="1600" dirty="0" smtClean="0"/>
+                        <a:t>Praticidade para o paciente.</a:t>
+                      </a:r>
+                      <a:endParaRPr lang="pt-BR" sz="1600" dirty="0"/>
+                    </a:p>
+                  </a:txBody>
+                  <a:tcPr>
+                    <a:lnL w="12700" cap="flat" cmpd="sng" algn="ctr">
+                      <a:solidFill>
+                        <a:schemeClr val="tx1"/>
+                      </a:solidFill>
+                      <a:prstDash val="solid"/>
+                      <a:round/>
+                      <a:headEnd type="none" w="med" len="med"/>
+                      <a:tailEnd type="none" w="med" len="med"/>
+                    </a:lnL>
+                    <a:lnR w="12700" cap="flat" cmpd="sng" algn="ctr">
+                      <a:solidFill>
+                        <a:schemeClr val="tx1"/>
+                      </a:solidFill>
+                      <a:prstDash val="solid"/>
+                      <a:round/>
+                      <a:headEnd type="none" w="med" len="med"/>
+                      <a:tailEnd type="none" w="med" len="med"/>
+                    </a:lnR>
+                    <a:lnT w="12700" cap="flat" cmpd="sng" algn="ctr">
+                      <a:solidFill>
+                        <a:schemeClr val="tx1"/>
+                      </a:solidFill>
+                      <a:prstDash val="solid"/>
+                      <a:round/>
+                      <a:headEnd type="none" w="med" len="med"/>
+                      <a:tailEnd type="none" w="med" len="med"/>
+                    </a:lnT>
+                    <a:lnB w="12700" cap="flat" cmpd="sng" algn="ctr">
+                      <a:solidFill>
+                        <a:schemeClr val="tx1"/>
+                      </a:solidFill>
+                      <a:prstDash val="solid"/>
+                      <a:round/>
+                      <a:headEnd type="none" w="med" len="med"/>
+                      <a:tailEnd type="none" w="med" len="med"/>
+                    </a:lnB>
+                    <a:solidFill>
+                      <a:schemeClr val="bg1"/>
+                    </a:solidFill>
+                  </a:tcPr>
+                </a:tc>
+              </a:tr>
+              <a:tr h="347018">
+                <a:tc>
+                  <a:txBody>
+                    <a:bodyPr/>
+                    <a:lstStyle/>
+                    <a:p>
+                      <a:r>
+                        <a:rPr lang="pt-BR" sz="1600" dirty="0" smtClean="0"/>
+                        <a:t>UC02 - Cadastrar pacientes no sistema</a:t>
+                      </a:r>
+                      <a:endParaRPr lang="pt-BR" sz="1600" dirty="0"/>
+                    </a:p>
+                  </a:txBody>
+                  <a:tcPr>
+                    <a:lnL w="12700" cap="flat" cmpd="sng" algn="ctr">
+                      <a:solidFill>
+                        <a:schemeClr val="tx1"/>
+                      </a:solidFill>
+                      <a:prstDash val="solid"/>
+                      <a:round/>
+                      <a:headEnd type="none" w="med" len="med"/>
+                      <a:tailEnd type="none" w="med" len="med"/>
+                    </a:lnL>
+                    <a:lnR w="12700" cap="flat" cmpd="sng" algn="ctr">
+                      <a:solidFill>
+                        <a:schemeClr val="tx1"/>
+                      </a:solidFill>
+                      <a:prstDash val="solid"/>
+                      <a:round/>
+                      <a:headEnd type="none" w="med" len="med"/>
+                      <a:tailEnd type="none" w="med" len="med"/>
+                    </a:lnR>
+                    <a:lnT w="12700" cap="flat" cmpd="sng" algn="ctr">
+                      <a:solidFill>
+                        <a:schemeClr val="tx1"/>
+                      </a:solidFill>
+                      <a:prstDash val="solid"/>
+                      <a:round/>
+                      <a:headEnd type="none" w="med" len="med"/>
+                      <a:tailEnd type="none" w="med" len="med"/>
+                    </a:lnT>
+                    <a:lnB w="12700" cap="flat" cmpd="sng" algn="ctr">
+                      <a:solidFill>
+                        <a:schemeClr val="tx1"/>
+                      </a:solidFill>
+                      <a:prstDash val="solid"/>
+                      <a:round/>
+                      <a:headEnd type="none" w="med" len="med"/>
+                      <a:tailEnd type="none" w="med" len="med"/>
+                    </a:lnB>
+                    <a:solidFill>
+                      <a:schemeClr val="bg1"/>
+                    </a:solidFill>
+                  </a:tcPr>
+                </a:tc>
+                <a:tc>
+                  <a:txBody>
+                    <a:bodyPr/>
+                    <a:lstStyle/>
+                    <a:p>
+                      <a:r>
+                        <a:rPr lang="pt-BR" sz="1600" kern="1200" dirty="0" smtClean="0">
+                          <a:solidFill>
+                            <a:schemeClr val="tx1"/>
+                          </a:solidFill>
+                          <a:effectLst/>
+                          <a:latin typeface="+mn-lt"/>
+                          <a:ea typeface="+mn-ea"/>
+                          <a:cs typeface="+mn-cs"/>
+                        </a:rPr>
+                        <a:t>Controle de pacientes para a clínica.</a:t>
+                      </a:r>
+                      <a:endParaRPr lang="pt-BR" sz="1200" dirty="0"/>
+                    </a:p>
+                  </a:txBody>
+                  <a:tcPr>
+                    <a:lnL w="12700" cap="flat" cmpd="sng" algn="ctr">
+                      <a:solidFill>
+                        <a:schemeClr val="tx1"/>
+                      </a:solidFill>
+                      <a:prstDash val="solid"/>
+                      <a:round/>
+                      <a:headEnd type="none" w="med" len="med"/>
+                      <a:tailEnd type="none" w="med" len="med"/>
+                    </a:lnL>
+                    <a:lnR w="12700" cap="flat" cmpd="sng" algn="ctr">
+                      <a:solidFill>
+                        <a:schemeClr val="tx1"/>
+                      </a:solidFill>
+                      <a:prstDash val="solid"/>
+                      <a:round/>
+                      <a:headEnd type="none" w="med" len="med"/>
+                      <a:tailEnd type="none" w="med" len="med"/>
+                    </a:lnR>
+                    <a:lnT w="12700" cap="flat" cmpd="sng" algn="ctr">
+                      <a:solidFill>
+                        <a:schemeClr val="tx1"/>
+                      </a:solidFill>
+                      <a:prstDash val="solid"/>
+                      <a:round/>
+                      <a:headEnd type="none" w="med" len="med"/>
+                      <a:tailEnd type="none" w="med" len="med"/>
+                    </a:lnT>
+                    <a:lnB w="12700" cap="flat" cmpd="sng" algn="ctr">
+                      <a:solidFill>
+                        <a:schemeClr val="tx1"/>
+                      </a:solidFill>
+                      <a:prstDash val="solid"/>
+                      <a:round/>
+                      <a:headEnd type="none" w="med" len="med"/>
+                      <a:tailEnd type="none" w="med" len="med"/>
+                    </a:lnB>
+                    <a:solidFill>
+                      <a:schemeClr val="bg1"/>
+                    </a:solidFill>
+                  </a:tcPr>
+                </a:tc>
+              </a:tr>
+              <a:tr h="347018">
+                <a:tc>
+                  <a:txBody>
+                    <a:bodyPr/>
+                    <a:lstStyle/>
+                    <a:p>
+                      <a:r>
+                        <a:rPr lang="pt-BR" sz="1600" dirty="0" smtClean="0"/>
+                        <a:t>UC05 - Cadastrar Gestores</a:t>
+                      </a:r>
+                      <a:endParaRPr lang="pt-BR" sz="1600" dirty="0"/>
+                    </a:p>
+                  </a:txBody>
+                  <a:tcPr>
+                    <a:lnL w="12700" cap="flat" cmpd="sng" algn="ctr">
+                      <a:solidFill>
+                        <a:schemeClr val="tx1"/>
+                      </a:solidFill>
+                      <a:prstDash val="solid"/>
+                      <a:round/>
+                      <a:headEnd type="none" w="med" len="med"/>
+                      <a:tailEnd type="none" w="med" len="med"/>
+                    </a:lnL>
+                    <a:lnR w="12700" cap="flat" cmpd="sng" algn="ctr">
+                      <a:solidFill>
+                        <a:schemeClr val="tx1"/>
+                      </a:solidFill>
+                      <a:prstDash val="solid"/>
+                      <a:round/>
+                      <a:headEnd type="none" w="med" len="med"/>
+                      <a:tailEnd type="none" w="med" len="med"/>
+                    </a:lnR>
+                    <a:lnT w="12700" cap="flat" cmpd="sng" algn="ctr">
+                      <a:solidFill>
+                        <a:schemeClr val="tx1"/>
+                      </a:solidFill>
+                      <a:prstDash val="solid"/>
+                      <a:round/>
+                      <a:headEnd type="none" w="med" len="med"/>
+                      <a:tailEnd type="none" w="med" len="med"/>
+                    </a:lnT>
+                    <a:lnB w="12700" cap="flat" cmpd="sng" algn="ctr">
+                      <a:solidFill>
+                        <a:schemeClr val="tx1"/>
+                      </a:solidFill>
+                      <a:prstDash val="solid"/>
+                      <a:round/>
+                      <a:headEnd type="none" w="med" len="med"/>
+                      <a:tailEnd type="none" w="med" len="med"/>
+                    </a:lnB>
+                    <a:solidFill>
+                      <a:schemeClr val="bg1"/>
+                    </a:solidFill>
+                  </a:tcPr>
+                </a:tc>
+                <a:tc>
+                  <a:txBody>
+                    <a:bodyPr/>
+                    <a:lstStyle/>
+                    <a:p>
+                      <a:r>
+                        <a:rPr lang="pt-BR" sz="1600" kern="1200" dirty="0" smtClean="0">
+                          <a:solidFill>
+                            <a:schemeClr val="tx1"/>
+                          </a:solidFill>
+                          <a:effectLst/>
+                          <a:latin typeface="+mn-lt"/>
+                          <a:ea typeface="+mn-ea"/>
+                          <a:cs typeface="+mn-cs"/>
+                        </a:rPr>
+                        <a:t>Permitir o acesso a funcionários.</a:t>
+                      </a:r>
+                      <a:endParaRPr lang="pt-BR" sz="1200" dirty="0"/>
+                    </a:p>
+                  </a:txBody>
+                  <a:tcPr>
+                    <a:lnL w="12700" cap="flat" cmpd="sng" algn="ctr">
+                      <a:solidFill>
+                        <a:schemeClr val="tx1"/>
+                      </a:solidFill>
+                      <a:prstDash val="solid"/>
+                      <a:round/>
+                      <a:headEnd type="none" w="med" len="med"/>
+                      <a:tailEnd type="none" w="med" len="med"/>
+                    </a:lnL>
+                    <a:lnR w="12700" cap="flat" cmpd="sng" algn="ctr">
+                      <a:solidFill>
+                        <a:schemeClr val="tx1"/>
+                      </a:solidFill>
+                      <a:prstDash val="solid"/>
+                      <a:round/>
+                      <a:headEnd type="none" w="med" len="med"/>
+                      <a:tailEnd type="none" w="med" len="med"/>
+                    </a:lnR>
+                    <a:lnT w="12700" cap="flat" cmpd="sng" algn="ctr">
+                      <a:solidFill>
+                        <a:schemeClr val="tx1"/>
+                      </a:solidFill>
+                      <a:prstDash val="solid"/>
+                      <a:round/>
+                      <a:headEnd type="none" w="med" len="med"/>
+                      <a:tailEnd type="none" w="med" len="med"/>
+                    </a:lnT>
+                    <a:lnB w="12700" cap="flat" cmpd="sng" algn="ctr">
+                      <a:solidFill>
+                        <a:schemeClr val="tx1"/>
+                      </a:solidFill>
+                      <a:prstDash val="solid"/>
+                      <a:round/>
+                      <a:headEnd type="none" w="med" len="med"/>
+                      <a:tailEnd type="none" w="med" len="med"/>
+                    </a:lnB>
+                    <a:solidFill>
+                      <a:schemeClr val="bg1"/>
+                    </a:solidFill>
+                  </a:tcPr>
+                </a:tc>
+              </a:tr>
+              <a:tr h="347018">
+                <a:tc>
+                  <a:txBody>
+                    <a:bodyPr/>
+                    <a:lstStyle/>
+                    <a:p>
+                      <a:r>
+                        <a:rPr lang="pt-BR" sz="1600" dirty="0" smtClean="0"/>
+                        <a:t>UC06 - Tirar duvidas</a:t>
+                      </a:r>
+                      <a:endParaRPr lang="pt-BR" sz="1600" dirty="0"/>
+                    </a:p>
+                  </a:txBody>
+                  <a:tcPr>
+                    <a:lnL w="12700" cap="flat" cmpd="sng" algn="ctr">
+                      <a:solidFill>
+                        <a:schemeClr val="tx1"/>
+                      </a:solidFill>
+                      <a:prstDash val="solid"/>
+                      <a:round/>
+                      <a:headEnd type="none" w="med" len="med"/>
+                      <a:tailEnd type="none" w="med" len="med"/>
+                    </a:lnL>
+                    <a:lnR w="12700" cap="flat" cmpd="sng" algn="ctr">
+                      <a:solidFill>
+                        <a:schemeClr val="tx1"/>
+                      </a:solidFill>
+                      <a:prstDash val="solid"/>
+                      <a:round/>
+                      <a:headEnd type="none" w="med" len="med"/>
+                      <a:tailEnd type="none" w="med" len="med"/>
+                    </a:lnR>
+                    <a:lnT w="12700" cap="flat" cmpd="sng" algn="ctr">
+                      <a:solidFill>
+                        <a:schemeClr val="tx1"/>
+                      </a:solidFill>
+                      <a:prstDash val="solid"/>
+                      <a:round/>
+                      <a:headEnd type="none" w="med" len="med"/>
+                      <a:tailEnd type="none" w="med" len="med"/>
+                    </a:lnT>
+                    <a:lnB w="12700" cap="flat" cmpd="sng" algn="ctr">
+                      <a:solidFill>
+                        <a:schemeClr val="tx1"/>
+                      </a:solidFill>
+                      <a:prstDash val="solid"/>
+                      <a:round/>
+                      <a:headEnd type="none" w="med" len="med"/>
+                      <a:tailEnd type="none" w="med" len="med"/>
+                    </a:lnB>
+                    <a:solidFill>
+                      <a:schemeClr val="bg1"/>
+                    </a:solidFill>
+                  </a:tcPr>
+                </a:tc>
+                <a:tc>
+                  <a:txBody>
+                    <a:bodyPr/>
+                    <a:lstStyle/>
+                    <a:p>
+                      <a:r>
+                        <a:rPr lang="pt-BR" sz="1600" dirty="0" smtClean="0"/>
+                        <a:t>Disponibilizar meio de contato para o cliente tirar as dúvidas.</a:t>
+                      </a:r>
+                      <a:endParaRPr lang="pt-BR" sz="1600" dirty="0"/>
+                    </a:p>
+                  </a:txBody>
+                  <a:tcPr>
+                    <a:lnL w="12700" cap="flat" cmpd="sng" algn="ctr">
+                      <a:solidFill>
+                        <a:schemeClr val="tx1"/>
+                      </a:solidFill>
+                      <a:prstDash val="solid"/>
+                      <a:round/>
+                      <a:headEnd type="none" w="med" len="med"/>
+                      <a:tailEnd type="none" w="med" len="med"/>
+                    </a:lnL>
+                    <a:lnR w="12700" cap="flat" cmpd="sng" algn="ctr">
+                      <a:solidFill>
+                        <a:schemeClr val="tx1"/>
+                      </a:solidFill>
+                      <a:prstDash val="solid"/>
+                      <a:round/>
+                      <a:headEnd type="none" w="med" len="med"/>
+                      <a:tailEnd type="none" w="med" len="med"/>
+                    </a:lnR>
+                    <a:lnT w="12700" cap="flat" cmpd="sng" algn="ctr">
+                      <a:solidFill>
+                        <a:schemeClr val="tx1"/>
+                      </a:solidFill>
+                      <a:prstDash val="solid"/>
+                      <a:round/>
+                      <a:headEnd type="none" w="med" len="med"/>
+                      <a:tailEnd type="none" w="med" len="med"/>
+                    </a:lnT>
+                    <a:lnB w="12700" cap="flat" cmpd="sng" algn="ctr">
+                      <a:solidFill>
+                        <a:schemeClr val="tx1"/>
+                      </a:solidFill>
+                      <a:prstDash val="solid"/>
+                      <a:round/>
+                      <a:headEnd type="none" w="med" len="med"/>
+                      <a:tailEnd type="none" w="med" len="med"/>
+                    </a:lnB>
+                    <a:solidFill>
+                      <a:schemeClr val="bg1"/>
+                    </a:solidFill>
+                  </a:tcPr>
+                </a:tc>
+              </a:tr>
+              <a:tr h="347018">
+                <a:tc>
+                  <a:txBody>
+                    <a:bodyPr/>
+                    <a:lstStyle/>
+                    <a:p>
+                      <a:r>
+                        <a:rPr lang="pt-BR" sz="1600" dirty="0" smtClean="0"/>
+                        <a:t>UC07 - Responder Duvidas</a:t>
+                      </a:r>
+                      <a:endParaRPr lang="pt-BR" sz="1600" dirty="0"/>
+                    </a:p>
+                  </a:txBody>
+                  <a:tcPr>
+                    <a:lnL w="12700" cap="flat" cmpd="sng" algn="ctr">
+                      <a:solidFill>
+                        <a:schemeClr val="tx1"/>
+                      </a:solidFill>
+                      <a:prstDash val="solid"/>
+                      <a:round/>
+                      <a:headEnd type="none" w="med" len="med"/>
+                      <a:tailEnd type="none" w="med" len="med"/>
+                    </a:lnL>
+                    <a:lnR w="12700" cap="flat" cmpd="sng" algn="ctr">
+                      <a:solidFill>
+                        <a:schemeClr val="tx1"/>
+                      </a:solidFill>
+                      <a:prstDash val="solid"/>
+                      <a:round/>
+                      <a:headEnd type="none" w="med" len="med"/>
+                      <a:tailEnd type="none" w="med" len="med"/>
+                    </a:lnR>
+                    <a:lnT w="12700" cap="flat" cmpd="sng" algn="ctr">
+                      <a:solidFill>
+                        <a:schemeClr val="tx1"/>
+                      </a:solidFill>
+                      <a:prstDash val="solid"/>
+                      <a:round/>
+                      <a:headEnd type="none" w="med" len="med"/>
+                      <a:tailEnd type="none" w="med" len="med"/>
+                    </a:lnT>
+                    <a:lnB w="12700" cap="flat" cmpd="sng" algn="ctr">
+                      <a:solidFill>
+                        <a:schemeClr val="tx1"/>
+                      </a:solidFill>
+                      <a:prstDash val="solid"/>
+                      <a:round/>
+                      <a:headEnd type="none" w="med" len="med"/>
+                      <a:tailEnd type="none" w="med" len="med"/>
+                    </a:lnB>
+                    <a:solidFill>
+                      <a:schemeClr val="bg1"/>
+                    </a:solidFill>
+                  </a:tcPr>
+                </a:tc>
+                <a:tc>
+                  <a:txBody>
+                    <a:bodyPr/>
+                    <a:lstStyle/>
+                    <a:p>
+                      <a:r>
+                        <a:rPr lang="pt-BR" sz="1600" dirty="0" smtClean="0"/>
+                        <a:t>Permitir aos gestores a consulta de dúvidas enviadas para resposta.</a:t>
+                      </a:r>
+                      <a:endParaRPr lang="pt-BR" sz="1600" dirty="0"/>
+                    </a:p>
+                  </a:txBody>
+                  <a:tcPr>
+                    <a:lnL w="12700" cap="flat" cmpd="sng" algn="ctr">
+                      <a:solidFill>
+                        <a:schemeClr val="tx1"/>
+                      </a:solidFill>
+                      <a:prstDash val="solid"/>
+                      <a:round/>
+                      <a:headEnd type="none" w="med" len="med"/>
+                      <a:tailEnd type="none" w="med" len="med"/>
+                    </a:lnL>
+                    <a:lnR w="12700" cap="flat" cmpd="sng" algn="ctr">
+                      <a:solidFill>
+                        <a:schemeClr val="tx1"/>
+                      </a:solidFill>
+                      <a:prstDash val="solid"/>
+                      <a:round/>
+                      <a:headEnd type="none" w="med" len="med"/>
+                      <a:tailEnd type="none" w="med" len="med"/>
+                    </a:lnR>
+                    <a:lnT w="12700" cap="flat" cmpd="sng" algn="ctr">
+                      <a:solidFill>
+                        <a:schemeClr val="tx1"/>
+                      </a:solidFill>
+                      <a:prstDash val="solid"/>
+                      <a:round/>
+                      <a:headEnd type="none" w="med" len="med"/>
+                      <a:tailEnd type="none" w="med" len="med"/>
+                    </a:lnT>
+                    <a:lnB w="12700" cap="flat" cmpd="sng" algn="ctr">
+                      <a:solidFill>
+                        <a:schemeClr val="tx1"/>
+                      </a:solidFill>
+                      <a:prstDash val="solid"/>
+                      <a:round/>
+                      <a:headEnd type="none" w="med" len="med"/>
+                      <a:tailEnd type="none" w="med" len="med"/>
+                    </a:lnB>
+                    <a:solidFill>
+                      <a:schemeClr val="bg1"/>
+                    </a:solidFill>
+                  </a:tcPr>
+                </a:tc>
+              </a:tr>
+              <a:tr h="599394">
+                <a:tc>
+                  <a:txBody>
+                    <a:bodyPr/>
+                    <a:lstStyle/>
+                    <a:p>
+                      <a:r>
+                        <a:rPr lang="pt-BR" sz="1600" dirty="0" smtClean="0"/>
+                        <a:t>UC08 - Gerar código de verificação de exame</a:t>
+                      </a:r>
+                      <a:endParaRPr lang="pt-BR" sz="1600" dirty="0"/>
+                    </a:p>
+                  </a:txBody>
+                  <a:tcPr>
+                    <a:lnL w="12700" cap="flat" cmpd="sng" algn="ctr">
+                      <a:solidFill>
+                        <a:schemeClr val="tx1"/>
+                      </a:solidFill>
+                      <a:prstDash val="solid"/>
+                      <a:round/>
+                      <a:headEnd type="none" w="med" len="med"/>
+                      <a:tailEnd type="none" w="med" len="med"/>
+                    </a:lnL>
+                    <a:lnR w="12700" cap="flat" cmpd="sng" algn="ctr">
+                      <a:solidFill>
+                        <a:schemeClr val="tx1"/>
+                      </a:solidFill>
+                      <a:prstDash val="solid"/>
+                      <a:round/>
+                      <a:headEnd type="none" w="med" len="med"/>
+                      <a:tailEnd type="none" w="med" len="med"/>
+                    </a:lnR>
+                    <a:lnT w="12700" cap="flat" cmpd="sng" algn="ctr">
+                      <a:solidFill>
+                        <a:schemeClr val="tx1"/>
+                      </a:solidFill>
+                      <a:prstDash val="solid"/>
+                      <a:round/>
+                      <a:headEnd type="none" w="med" len="med"/>
+                      <a:tailEnd type="none" w="med" len="med"/>
+                    </a:lnT>
+                    <a:lnB w="12700" cap="flat" cmpd="sng" algn="ctr">
+                      <a:solidFill>
+                        <a:schemeClr val="tx1"/>
+                      </a:solidFill>
+                      <a:prstDash val="solid"/>
+                      <a:round/>
+                      <a:headEnd type="none" w="med" len="med"/>
+                      <a:tailEnd type="none" w="med" len="med"/>
+                    </a:lnB>
+                    <a:solidFill>
+                      <a:schemeClr val="bg1"/>
+                    </a:solidFill>
+                  </a:tcPr>
+                </a:tc>
+                <a:tc>
+                  <a:txBody>
+                    <a:bodyPr/>
+                    <a:lstStyle/>
+                    <a:p>
+                      <a:r>
+                        <a:rPr lang="pt-BR" sz="1600" dirty="0" smtClean="0"/>
+                        <a:t>Permitir ao paciente acesso e acompanhamento online aos resultados de exames.</a:t>
+                      </a:r>
+                      <a:endParaRPr lang="pt-BR" sz="1600" dirty="0"/>
+                    </a:p>
+                  </a:txBody>
+                  <a:tcPr>
+                    <a:lnL w="12700" cap="flat" cmpd="sng" algn="ctr">
+                      <a:solidFill>
+                        <a:schemeClr val="tx1"/>
+                      </a:solidFill>
+                      <a:prstDash val="solid"/>
+                      <a:round/>
+                      <a:headEnd type="none" w="med" len="med"/>
+                      <a:tailEnd type="none" w="med" len="med"/>
+                    </a:lnL>
+                    <a:lnR w="12700" cap="flat" cmpd="sng" algn="ctr">
+                      <a:solidFill>
+                        <a:schemeClr val="tx1"/>
+                      </a:solidFill>
+                      <a:prstDash val="solid"/>
+                      <a:round/>
+                      <a:headEnd type="none" w="med" len="med"/>
+                      <a:tailEnd type="none" w="med" len="med"/>
+                    </a:lnR>
+                    <a:lnT w="12700" cap="flat" cmpd="sng" algn="ctr">
+                      <a:solidFill>
+                        <a:schemeClr val="tx1"/>
+                      </a:solidFill>
+                      <a:prstDash val="solid"/>
+                      <a:round/>
+                      <a:headEnd type="none" w="med" len="med"/>
+                      <a:tailEnd type="none" w="med" len="med"/>
+                    </a:lnT>
+                    <a:lnB w="12700" cap="flat" cmpd="sng" algn="ctr">
+                      <a:solidFill>
+                        <a:schemeClr val="tx1"/>
+                      </a:solidFill>
+                      <a:prstDash val="solid"/>
+                      <a:round/>
+                      <a:headEnd type="none" w="med" len="med"/>
+                      <a:tailEnd type="none" w="med" len="med"/>
+                    </a:lnB>
+                    <a:solidFill>
+                      <a:schemeClr val="bg1"/>
+                    </a:solidFill>
+                  </a:tcPr>
+                </a:tc>
+              </a:tr>
+              <a:tr h="347018">
+                <a:tc>
+                  <a:txBody>
+                    <a:bodyPr/>
+                    <a:lstStyle/>
+                    <a:p>
+                      <a:r>
+                        <a:rPr lang="pt-BR" sz="1600" dirty="0" smtClean="0"/>
+                        <a:t>UC09 - Login</a:t>
+                      </a:r>
+                      <a:endParaRPr lang="pt-BR" sz="1600" dirty="0"/>
+                    </a:p>
+                  </a:txBody>
+                  <a:tcPr>
+                    <a:lnL w="12700" cap="flat" cmpd="sng" algn="ctr">
+                      <a:solidFill>
+                        <a:schemeClr val="tx1"/>
+                      </a:solidFill>
+                      <a:prstDash val="solid"/>
+                      <a:round/>
+                      <a:headEnd type="none" w="med" len="med"/>
+                      <a:tailEnd type="none" w="med" len="med"/>
+                    </a:lnL>
+                    <a:lnR w="12700" cap="flat" cmpd="sng" algn="ctr">
+                      <a:solidFill>
+                        <a:schemeClr val="tx1"/>
+                      </a:solidFill>
+                      <a:prstDash val="solid"/>
+                      <a:round/>
+                      <a:headEnd type="none" w="med" len="med"/>
+                      <a:tailEnd type="none" w="med" len="med"/>
+                    </a:lnR>
+                    <a:lnT w="12700" cap="flat" cmpd="sng" algn="ctr">
+                      <a:solidFill>
+                        <a:schemeClr val="tx1"/>
+                      </a:solidFill>
+                      <a:prstDash val="solid"/>
+                      <a:round/>
+                      <a:headEnd type="none" w="med" len="med"/>
+                      <a:tailEnd type="none" w="med" len="med"/>
+                    </a:lnT>
+                    <a:lnB w="12700" cap="flat" cmpd="sng" algn="ctr">
+                      <a:solidFill>
+                        <a:schemeClr val="tx1"/>
+                      </a:solidFill>
+                      <a:prstDash val="solid"/>
+                      <a:round/>
+                      <a:headEnd type="none" w="med" len="med"/>
+                      <a:tailEnd type="none" w="med" len="med"/>
+                    </a:lnB>
+                    <a:solidFill>
+                      <a:schemeClr val="bg1"/>
+                    </a:solidFill>
+                  </a:tcPr>
+                </a:tc>
+                <a:tc>
+                  <a:txBody>
+                    <a:bodyPr/>
+                    <a:lstStyle/>
+                    <a:p>
+                      <a:r>
+                        <a:rPr lang="pt-BR" sz="1600" dirty="0" smtClean="0"/>
+                        <a:t>Logar no sistema.</a:t>
+                      </a:r>
+                      <a:endParaRPr lang="pt-BR" sz="1600" dirty="0"/>
+                    </a:p>
+                  </a:txBody>
+                  <a:tcPr>
+                    <a:lnL w="12700" cap="flat" cmpd="sng" algn="ctr">
+                      <a:solidFill>
+                        <a:schemeClr val="tx1"/>
+                      </a:solidFill>
+                      <a:prstDash val="solid"/>
+                      <a:round/>
+                      <a:headEnd type="none" w="med" len="med"/>
+                      <a:tailEnd type="none" w="med" len="med"/>
+                    </a:lnL>
+                    <a:lnR w="12700" cap="flat" cmpd="sng" algn="ctr">
+                      <a:solidFill>
+                        <a:schemeClr val="tx1"/>
+                      </a:solidFill>
+                      <a:prstDash val="solid"/>
+                      <a:round/>
+                      <a:headEnd type="none" w="med" len="med"/>
+                      <a:tailEnd type="none" w="med" len="med"/>
+                    </a:lnR>
+                    <a:lnT w="12700" cap="flat" cmpd="sng" algn="ctr">
+                      <a:solidFill>
+                        <a:schemeClr val="tx1"/>
+                      </a:solidFill>
+                      <a:prstDash val="solid"/>
+                      <a:round/>
+                      <a:headEnd type="none" w="med" len="med"/>
+                      <a:tailEnd type="none" w="med" len="med"/>
+                    </a:lnT>
+                    <a:lnB w="12700" cap="flat" cmpd="sng" algn="ctr">
+                      <a:solidFill>
+                        <a:schemeClr val="tx1"/>
+                      </a:solidFill>
+                      <a:prstDash val="solid"/>
+                      <a:round/>
+                      <a:headEnd type="none" w="med" len="med"/>
+                      <a:tailEnd type="none" w="med" len="med"/>
+                    </a:lnB>
+                    <a:solidFill>
+                      <a:schemeClr val="bg1"/>
+                    </a:solidFill>
+                  </a:tcPr>
+                </a:tc>
+              </a:tr>
+              <a:tr h="347018">
+                <a:tc>
+                  <a:txBody>
+                    <a:bodyPr/>
+                    <a:lstStyle/>
+                    <a:p>
+                      <a:r>
+                        <a:rPr lang="pt-BR" sz="1600" dirty="0" smtClean="0"/>
+                        <a:t>UC10 - Logout</a:t>
+                      </a:r>
+                      <a:endParaRPr lang="pt-BR" sz="1600" dirty="0"/>
+                    </a:p>
+                  </a:txBody>
+                  <a:tcPr>
+                    <a:lnL w="12700" cap="flat" cmpd="sng" algn="ctr">
+                      <a:solidFill>
+                        <a:schemeClr val="tx1"/>
+                      </a:solidFill>
+                      <a:prstDash val="solid"/>
+                      <a:round/>
+                      <a:headEnd type="none" w="med" len="med"/>
+                      <a:tailEnd type="none" w="med" len="med"/>
+                    </a:lnL>
+                    <a:lnR w="12700" cap="flat" cmpd="sng" algn="ctr">
+                      <a:solidFill>
+                        <a:schemeClr val="tx1"/>
+                      </a:solidFill>
+                      <a:prstDash val="solid"/>
+                      <a:round/>
+                      <a:headEnd type="none" w="med" len="med"/>
+                      <a:tailEnd type="none" w="med" len="med"/>
+                    </a:lnR>
+                    <a:lnT w="12700" cap="flat" cmpd="sng" algn="ctr">
+                      <a:solidFill>
+                        <a:schemeClr val="tx1"/>
+                      </a:solidFill>
+                      <a:prstDash val="solid"/>
+                      <a:round/>
+                      <a:headEnd type="none" w="med" len="med"/>
+                      <a:tailEnd type="none" w="med" len="med"/>
+                    </a:lnT>
+                    <a:lnB w="12700" cap="flat" cmpd="sng" algn="ctr">
+                      <a:solidFill>
+                        <a:schemeClr val="tx1"/>
+                      </a:solidFill>
+                      <a:prstDash val="solid"/>
+                      <a:round/>
+                      <a:headEnd type="none" w="med" len="med"/>
+                      <a:tailEnd type="none" w="med" len="med"/>
+                    </a:lnB>
+                    <a:solidFill>
+                      <a:schemeClr val="bg1"/>
+                    </a:solidFill>
+                  </a:tcPr>
+                </a:tc>
+                <a:tc>
+                  <a:txBody>
+                    <a:bodyPr/>
+                    <a:lstStyle/>
+                    <a:p>
+                      <a:r>
+                        <a:rPr lang="pt-BR" sz="1600" dirty="0" smtClean="0"/>
+                        <a:t>Finalizar sessão do usuário.</a:t>
+                      </a:r>
+                      <a:endParaRPr lang="pt-BR" sz="1600" dirty="0"/>
+                    </a:p>
+                  </a:txBody>
+                  <a:tcPr>
+                    <a:lnL w="12700" cap="flat" cmpd="sng" algn="ctr">
+                      <a:solidFill>
+                        <a:schemeClr val="tx1"/>
+                      </a:solidFill>
+                      <a:prstDash val="solid"/>
+                      <a:round/>
+                      <a:headEnd type="none" w="med" len="med"/>
+                      <a:tailEnd type="none" w="med" len="med"/>
+                    </a:lnL>
+                    <a:lnR w="12700" cap="flat" cmpd="sng" algn="ctr">
+                      <a:solidFill>
+                        <a:schemeClr val="tx1"/>
+                      </a:solidFill>
+                      <a:prstDash val="solid"/>
+                      <a:round/>
+                      <a:headEnd type="none" w="med" len="med"/>
+                      <a:tailEnd type="none" w="med" len="med"/>
+                    </a:lnR>
+                    <a:lnT w="12700" cap="flat" cmpd="sng" algn="ctr">
+                      <a:solidFill>
+                        <a:schemeClr val="tx1"/>
+                      </a:solidFill>
+                      <a:prstDash val="solid"/>
+                      <a:round/>
+                      <a:headEnd type="none" w="med" len="med"/>
+                      <a:tailEnd type="none" w="med" len="med"/>
+                    </a:lnT>
+                    <a:lnB w="12700" cap="flat" cmpd="sng" algn="ctr">
+                      <a:solidFill>
+                        <a:schemeClr val="tx1"/>
+                      </a:solidFill>
+                      <a:prstDash val="solid"/>
+                      <a:round/>
+                      <a:headEnd type="none" w="med" len="med"/>
+                      <a:tailEnd type="none" w="med" len="med"/>
+                    </a:lnB>
+                    <a:solidFill>
+                      <a:schemeClr val="bg1"/>
+                    </a:solidFill>
+                  </a:tcPr>
+                </a:tc>
+              </a:tr>
+              <a:tr h="347018">
+                <a:tc>
+                  <a:txBody>
+                    <a:bodyPr/>
+                    <a:lstStyle/>
+                    <a:p>
+                      <a:r>
+                        <a:rPr lang="pt-BR" sz="1600" dirty="0" smtClean="0"/>
+                        <a:t>UC11 – Cadastrar exames</a:t>
+                      </a:r>
+                      <a:endParaRPr lang="pt-BR" sz="1600" dirty="0"/>
+                    </a:p>
+                  </a:txBody>
+                  <a:tcPr>
+                    <a:lnL w="12700" cap="flat" cmpd="sng" algn="ctr">
+                      <a:solidFill>
+                        <a:schemeClr val="tx1"/>
+                      </a:solidFill>
+                      <a:prstDash val="solid"/>
+                      <a:round/>
+                      <a:headEnd type="none" w="med" len="med"/>
+                      <a:tailEnd type="none" w="med" len="med"/>
+                    </a:lnL>
+                    <a:lnR w="12700" cap="flat" cmpd="sng" algn="ctr">
+                      <a:solidFill>
+                        <a:schemeClr val="tx1"/>
+                      </a:solidFill>
+                      <a:prstDash val="solid"/>
+                      <a:round/>
+                      <a:headEnd type="none" w="med" len="med"/>
+                      <a:tailEnd type="none" w="med" len="med"/>
+                    </a:lnR>
+                    <a:lnT w="12700" cap="flat" cmpd="sng" algn="ctr">
+                      <a:solidFill>
+                        <a:schemeClr val="tx1"/>
+                      </a:solidFill>
+                      <a:prstDash val="solid"/>
+                      <a:round/>
+                      <a:headEnd type="none" w="med" len="med"/>
+                      <a:tailEnd type="none" w="med" len="med"/>
+                    </a:lnT>
+                    <a:lnB w="12700" cap="flat" cmpd="sng" algn="ctr">
+                      <a:solidFill>
+                        <a:schemeClr val="tx1"/>
+                      </a:solidFill>
+                      <a:prstDash val="solid"/>
+                      <a:round/>
+                      <a:headEnd type="none" w="med" len="med"/>
+                      <a:tailEnd type="none" w="med" len="med"/>
+                    </a:lnB>
+                    <a:solidFill>
+                      <a:schemeClr val="bg1"/>
+                    </a:solidFill>
+                  </a:tcPr>
+                </a:tc>
+                <a:tc>
+                  <a:txBody>
+                    <a:bodyPr/>
+                    <a:lstStyle/>
+                    <a:p>
+                      <a:r>
+                        <a:rPr lang="pt-BR" sz="1600" dirty="0" smtClean="0"/>
+                        <a:t>Permitir um controle de todos os exames que a clínica oferece.</a:t>
+                      </a:r>
+                      <a:endParaRPr lang="pt-BR" sz="1600" dirty="0"/>
+                    </a:p>
+                  </a:txBody>
+                  <a:tcPr>
+                    <a:lnL w="12700" cap="flat" cmpd="sng" algn="ctr">
+                      <a:solidFill>
+                        <a:schemeClr val="tx1"/>
+                      </a:solidFill>
+                      <a:prstDash val="solid"/>
+                      <a:round/>
+                      <a:headEnd type="none" w="med" len="med"/>
+                      <a:tailEnd type="none" w="med" len="med"/>
+                    </a:lnL>
+                    <a:lnR w="12700" cap="flat" cmpd="sng" algn="ctr">
+                      <a:solidFill>
+                        <a:schemeClr val="tx1"/>
+                      </a:solidFill>
+                      <a:prstDash val="solid"/>
+                      <a:round/>
+                      <a:headEnd type="none" w="med" len="med"/>
+                      <a:tailEnd type="none" w="med" len="med"/>
+                    </a:lnR>
+                    <a:lnT w="12700" cap="flat" cmpd="sng" algn="ctr">
+                      <a:solidFill>
+                        <a:schemeClr val="tx1"/>
+                      </a:solidFill>
+                      <a:prstDash val="solid"/>
+                      <a:round/>
+                      <a:headEnd type="none" w="med" len="med"/>
+                      <a:tailEnd type="none" w="med" len="med"/>
+                    </a:lnT>
+                    <a:lnB w="12700" cap="flat" cmpd="sng" algn="ctr">
+                      <a:solidFill>
+                        <a:schemeClr val="tx1"/>
+                      </a:solidFill>
+                      <a:prstDash val="solid"/>
+                      <a:round/>
+                      <a:headEnd type="none" w="med" len="med"/>
+                      <a:tailEnd type="none" w="med" len="med"/>
+                    </a:lnB>
+                    <a:solidFill>
+                      <a:schemeClr val="bg1"/>
+                    </a:solidFill>
+                  </a:tcPr>
+                </a:tc>
+              </a:tr>
+              <a:tr h="599394">
+                <a:tc>
+                  <a:txBody>
+                    <a:bodyPr/>
+                    <a:lstStyle/>
+                    <a:p>
+                      <a:r>
+                        <a:rPr lang="pt-BR" sz="1600" dirty="0" smtClean="0"/>
+                        <a:t>UC12 – Cadastrar resultado de exames realizados</a:t>
+                      </a:r>
+                      <a:endParaRPr lang="pt-BR" sz="1600" dirty="0"/>
+                    </a:p>
+                  </a:txBody>
+                  <a:tcPr>
+                    <a:lnL w="12700" cap="flat" cmpd="sng" algn="ctr">
+                      <a:solidFill>
+                        <a:schemeClr val="tx1"/>
+                      </a:solidFill>
+                      <a:prstDash val="solid"/>
+                      <a:round/>
+                      <a:headEnd type="none" w="med" len="med"/>
+                      <a:tailEnd type="none" w="med" len="med"/>
+                    </a:lnL>
+                    <a:lnR w="12700" cap="flat" cmpd="sng" algn="ctr">
+                      <a:solidFill>
+                        <a:schemeClr val="tx1"/>
+                      </a:solidFill>
+                      <a:prstDash val="solid"/>
+                      <a:round/>
+                      <a:headEnd type="none" w="med" len="med"/>
+                      <a:tailEnd type="none" w="med" len="med"/>
+                    </a:lnR>
+                    <a:lnT w="12700" cap="flat" cmpd="sng" algn="ctr">
+                      <a:solidFill>
+                        <a:schemeClr val="tx1"/>
+                      </a:solidFill>
+                      <a:prstDash val="solid"/>
+                      <a:round/>
+                      <a:headEnd type="none" w="med" len="med"/>
+                      <a:tailEnd type="none" w="med" len="med"/>
+                    </a:lnT>
+                    <a:lnB w="12700" cap="flat" cmpd="sng" algn="ctr">
+                      <a:solidFill>
+                        <a:schemeClr val="tx1"/>
+                      </a:solidFill>
+                      <a:prstDash val="solid"/>
+                      <a:round/>
+                      <a:headEnd type="none" w="med" len="med"/>
+                      <a:tailEnd type="none" w="med" len="med"/>
+                    </a:lnB>
+                    <a:solidFill>
+                      <a:schemeClr val="bg1"/>
+                    </a:solidFill>
+                  </a:tcPr>
+                </a:tc>
+                <a:tc>
+                  <a:txBody>
+                    <a:bodyPr/>
+                    <a:lstStyle/>
+                    <a:p>
+                      <a:r>
+                        <a:rPr lang="pt-BR" sz="1600" dirty="0" smtClean="0"/>
+                        <a:t>Permitir que o paciente visualize os resultados dos seus exames online.</a:t>
+                      </a:r>
+                      <a:endParaRPr lang="pt-BR" sz="1600" dirty="0"/>
+                    </a:p>
+                  </a:txBody>
+                  <a:tcPr>
+                    <a:lnL w="12700" cap="flat" cmpd="sng" algn="ctr">
+                      <a:solidFill>
+                        <a:schemeClr val="tx1"/>
+                      </a:solidFill>
+                      <a:prstDash val="solid"/>
+                      <a:round/>
+                      <a:headEnd type="none" w="med" len="med"/>
+                      <a:tailEnd type="none" w="med" len="med"/>
+                    </a:lnL>
+                    <a:lnR w="12700" cap="flat" cmpd="sng" algn="ctr">
+                      <a:solidFill>
+                        <a:schemeClr val="tx1"/>
+                      </a:solidFill>
+                      <a:prstDash val="solid"/>
+                      <a:round/>
+                      <a:headEnd type="none" w="med" len="med"/>
+                      <a:tailEnd type="none" w="med" len="med"/>
+                    </a:lnR>
+                    <a:lnT w="12700" cap="flat" cmpd="sng" algn="ctr">
+                      <a:solidFill>
+                        <a:schemeClr val="tx1"/>
+                      </a:solidFill>
+                      <a:prstDash val="solid"/>
+                      <a:round/>
+                      <a:headEnd type="none" w="med" len="med"/>
+                      <a:tailEnd type="none" w="med" len="med"/>
+                    </a:lnT>
+                    <a:lnB w="12700" cap="flat" cmpd="sng" algn="ctr">
+                      <a:solidFill>
+                        <a:schemeClr val="tx1"/>
+                      </a:solidFill>
+                      <a:prstDash val="solid"/>
+                      <a:round/>
+                      <a:headEnd type="none" w="med" len="med"/>
+                      <a:tailEnd type="none" w="med" len="med"/>
+                    </a:lnB>
+                    <a:solidFill>
+                      <a:schemeClr val="bg1"/>
+                    </a:solidFill>
+                  </a:tcPr>
+                </a:tc>
+              </a:tr>
+            </a:tbl>
+          </a:graphicData>
+        </a:graphic>
+      </p:graphicFrame>
     </p:spTree>
     <p:extLst>
       <p:ext uri="{BB962C8B-B14F-4D97-AF65-F5344CB8AC3E}">
-        <p14:creationId xmlns:p14="http://schemas.microsoft.com/office/powerpoint/2010/main" val="956289708"/>
+        <p14:creationId xmlns:p14="http://schemas.microsoft.com/office/powerpoint/2010/main" val="28993515"/>
       </p:ext>
     </p:extLst>
   </p:cSld>
@@ -2691,40 +3966,10 @@
           </a:p>
         </p:txBody>
       </p:sp>
-      <p:pic>
-        <p:nvPicPr>
-          <p:cNvPr id="4" name="Imagem 3"/>
-          <p:cNvPicPr>
-            <a:picLocks noChangeAspect="1"/>
-          </p:cNvPicPr>
-          <p:nvPr/>
-        </p:nvPicPr>
-        <p:blipFill>
-          <a:blip r:embed="rId2">
-            <a:extLst>
-              <a:ext uri="{28A0092B-C50C-407E-A947-70E740481C1C}">
-                <a14:useLocalDpi xmlns:a14="http://schemas.microsoft.com/office/drawing/2010/main" val="0"/>
-              </a:ext>
-            </a:extLst>
-          </a:blip>
-          <a:stretch>
-            <a:fillRect/>
-          </a:stretch>
-        </p:blipFill>
-        <p:spPr>
-          <a:xfrm>
-            <a:off x="0" y="1417638"/>
-            <a:ext cx="9144000" cy="4786793"/>
-          </a:xfrm>
-          <a:prstGeom prst="rect">
-            <a:avLst/>
-          </a:prstGeom>
-        </p:spPr>
-      </p:pic>
     </p:spTree>
     <p:extLst>
       <p:ext uri="{BB962C8B-B14F-4D97-AF65-F5344CB8AC3E}">
-        <p14:creationId xmlns:p14="http://schemas.microsoft.com/office/powerpoint/2010/main" val="3115689512"/>
+        <p14:creationId xmlns:p14="http://schemas.microsoft.com/office/powerpoint/2010/main" val="983737492"/>
       </p:ext>
     </p:extLst>
   </p:cSld>
@@ -2781,40 +4026,524 @@
           </a:p>
         </p:txBody>
       </p:sp>
-      <p:pic>
-        <p:nvPicPr>
-          <p:cNvPr id="3" name="Imagem 2"/>
-          <p:cNvPicPr>
-            <a:picLocks noChangeAspect="1"/>
-          </p:cNvPicPr>
+      <p:graphicFrame>
+        <p:nvGraphicFramePr>
+          <p:cNvPr id="3" name="Tabela 2"/>
+          <p:cNvGraphicFramePr>
+            <a:graphicFrameLocks noGrp="1"/>
+          </p:cNvGraphicFramePr>
+          <p:nvPr>
+            <p:extLst>
+              <p:ext uri="{D42A27DB-BD31-4B8C-83A1-F6EECF244321}">
+                <p14:modId xmlns:p14="http://schemas.microsoft.com/office/powerpoint/2010/main" val="265651784"/>
+              </p:ext>
+            </p:extLst>
+          </p:nvPr>
+        </p:nvGraphicFramePr>
+        <p:xfrm>
+          <a:off x="0" y="1916832"/>
+          <a:ext cx="9144000" cy="4225068"/>
+        </p:xfrm>
+        <a:graphic>
+          <a:graphicData uri="http://schemas.openxmlformats.org/drawingml/2006/table">
+            <a:tbl>
+              <a:tblPr firstRow="1" bandRow="1">
+                <a:tableStyleId>{7E9639D4-E3E2-4D34-9284-5A2195B3D0D7}</a:tableStyleId>
+              </a:tblPr>
+              <a:tblGrid>
+                <a:gridCol w="2915816"/>
+                <a:gridCol w="6228184"/>
+              </a:tblGrid>
+              <a:tr h="497066">
+                <a:tc>
+                  <a:txBody>
+                    <a:bodyPr/>
+                    <a:lstStyle/>
+                    <a:p>
+                      <a:r>
+                        <a:rPr lang="pt-BR" sz="2400" dirty="0" smtClean="0"/>
+                        <a:t>Guideline</a:t>
+                      </a:r>
+                      <a:r>
+                        <a:rPr lang="pt-BR" sz="2400" baseline="0" dirty="0" smtClean="0"/>
+                        <a:t> nr: 1</a:t>
+                      </a:r>
+                      <a:endParaRPr lang="pt-BR" sz="2400" dirty="0"/>
+                    </a:p>
+                  </a:txBody>
+                  <a:tcPr>
+                    <a:lnL w="12700" cap="flat" cmpd="sng" algn="ctr">
+                      <a:solidFill>
+                        <a:schemeClr val="tx1"/>
+                      </a:solidFill>
+                      <a:prstDash val="solid"/>
+                      <a:round/>
+                      <a:headEnd type="none" w="med" len="med"/>
+                      <a:tailEnd type="none" w="med" len="med"/>
+                    </a:lnL>
+                    <a:lnR w="12700" cap="flat" cmpd="sng" algn="ctr">
+                      <a:solidFill>
+                        <a:schemeClr val="tx1"/>
+                      </a:solidFill>
+                      <a:prstDash val="solid"/>
+                      <a:round/>
+                      <a:headEnd type="none" w="med" len="med"/>
+                      <a:tailEnd type="none" w="med" len="med"/>
+                    </a:lnR>
+                    <a:lnT w="12700" cap="flat" cmpd="sng" algn="ctr">
+                      <a:solidFill>
+                        <a:schemeClr val="tx1"/>
+                      </a:solidFill>
+                      <a:prstDash val="solid"/>
+                      <a:round/>
+                      <a:headEnd type="none" w="med" len="med"/>
+                      <a:tailEnd type="none" w="med" len="med"/>
+                    </a:lnT>
+                    <a:lnB w="12700" cap="flat" cmpd="sng" algn="ctr">
+                      <a:solidFill>
+                        <a:schemeClr val="tx1"/>
+                      </a:solidFill>
+                      <a:prstDash val="solid"/>
+                      <a:round/>
+                      <a:headEnd type="none" w="med" len="med"/>
+                      <a:tailEnd type="none" w="med" len="med"/>
+                    </a:lnB>
+                  </a:tcPr>
+                </a:tc>
+                <a:tc>
+                  <a:txBody>
+                    <a:bodyPr/>
+                    <a:lstStyle/>
+                    <a:p>
+                      <a:r>
+                        <a:rPr lang="pt-BR" sz="2400" dirty="0" smtClean="0"/>
+                        <a:t>Espaço</a:t>
+                      </a:r>
+                      <a:r>
+                        <a:rPr lang="pt-BR" sz="2400" baseline="0" dirty="0" smtClean="0"/>
+                        <a:t> Branco</a:t>
+                      </a:r>
+                      <a:endParaRPr lang="pt-BR" sz="2400" dirty="0"/>
+                    </a:p>
+                  </a:txBody>
+                  <a:tcPr>
+                    <a:lnL w="12700" cap="flat" cmpd="sng" algn="ctr">
+                      <a:solidFill>
+                        <a:schemeClr val="tx1"/>
+                      </a:solidFill>
+                      <a:prstDash val="solid"/>
+                      <a:round/>
+                      <a:headEnd type="none" w="med" len="med"/>
+                      <a:tailEnd type="none" w="med" len="med"/>
+                    </a:lnL>
+                    <a:lnR w="12700" cap="flat" cmpd="sng" algn="ctr">
+                      <a:solidFill>
+                        <a:schemeClr val="tx1"/>
+                      </a:solidFill>
+                      <a:prstDash val="solid"/>
+                      <a:round/>
+                      <a:headEnd type="none" w="med" len="med"/>
+                      <a:tailEnd type="none" w="med" len="med"/>
+                    </a:lnR>
+                    <a:lnT w="12700" cap="flat" cmpd="sng" algn="ctr">
+                      <a:solidFill>
+                        <a:schemeClr val="tx1"/>
+                      </a:solidFill>
+                      <a:prstDash val="solid"/>
+                      <a:round/>
+                      <a:headEnd type="none" w="med" len="med"/>
+                      <a:tailEnd type="none" w="med" len="med"/>
+                    </a:lnT>
+                    <a:lnB w="12700" cap="flat" cmpd="sng" algn="ctr">
+                      <a:solidFill>
+                        <a:schemeClr val="tx1"/>
+                      </a:solidFill>
+                      <a:prstDash val="solid"/>
+                      <a:round/>
+                      <a:headEnd type="none" w="med" len="med"/>
+                      <a:tailEnd type="none" w="med" len="med"/>
+                    </a:lnB>
+                  </a:tcPr>
+                </a:tc>
+              </a:tr>
+              <a:tr h="1242667">
+                <a:tc>
+                  <a:txBody>
+                    <a:bodyPr/>
+                    <a:lstStyle/>
+                    <a:p>
+                      <a:r>
+                        <a:rPr lang="pt-BR" sz="2400" dirty="0" smtClean="0"/>
+                        <a:t>Exemplo:</a:t>
+                      </a:r>
+                      <a:endParaRPr lang="pt-BR" sz="2400" dirty="0"/>
+                    </a:p>
+                  </a:txBody>
+                  <a:tcPr>
+                    <a:lnL w="12700" cap="flat" cmpd="sng" algn="ctr">
+                      <a:solidFill>
+                        <a:schemeClr val="tx1"/>
+                      </a:solidFill>
+                      <a:prstDash val="solid"/>
+                      <a:round/>
+                      <a:headEnd type="none" w="med" len="med"/>
+                      <a:tailEnd type="none" w="med" len="med"/>
+                    </a:lnL>
+                    <a:lnR w="12700" cap="flat" cmpd="sng" algn="ctr">
+                      <a:solidFill>
+                        <a:schemeClr val="tx1"/>
+                      </a:solidFill>
+                      <a:prstDash val="solid"/>
+                      <a:round/>
+                      <a:headEnd type="none" w="med" len="med"/>
+                      <a:tailEnd type="none" w="med" len="med"/>
+                    </a:lnR>
+                    <a:lnT w="12700" cap="flat" cmpd="sng" algn="ctr">
+                      <a:solidFill>
+                        <a:schemeClr val="tx1"/>
+                      </a:solidFill>
+                      <a:prstDash val="solid"/>
+                      <a:round/>
+                      <a:headEnd type="none" w="med" len="med"/>
+                      <a:tailEnd type="none" w="med" len="med"/>
+                    </a:lnT>
+                    <a:lnB w="12700" cap="flat" cmpd="sng" algn="ctr">
+                      <a:solidFill>
+                        <a:schemeClr val="tx1"/>
+                      </a:solidFill>
+                      <a:prstDash val="solid"/>
+                      <a:round/>
+                      <a:headEnd type="none" w="med" len="med"/>
+                      <a:tailEnd type="none" w="med" len="med"/>
+                    </a:lnB>
+                  </a:tcPr>
+                </a:tc>
+                <a:tc>
+                  <a:txBody>
+                    <a:bodyPr/>
+                    <a:lstStyle/>
+                    <a:p>
+                      <a:r>
+                        <a:rPr lang="pt-BR" sz="2400" dirty="0" smtClean="0"/>
+                        <a:t>Utilizado na maioria dos Websites, normalmente entre textos grandes (conteúdo</a:t>
+                      </a:r>
+                      <a:r>
+                        <a:rPr lang="pt-BR" sz="2400" baseline="0" dirty="0" smtClean="0"/>
+                        <a:t> principal na página) e/ou imagens.</a:t>
+                      </a:r>
+                      <a:endParaRPr lang="pt-BR" sz="2400" dirty="0"/>
+                    </a:p>
+                  </a:txBody>
+                  <a:tcPr>
+                    <a:lnL w="12700" cap="flat" cmpd="sng" algn="ctr">
+                      <a:solidFill>
+                        <a:schemeClr val="tx1"/>
+                      </a:solidFill>
+                      <a:prstDash val="solid"/>
+                      <a:round/>
+                      <a:headEnd type="none" w="med" len="med"/>
+                      <a:tailEnd type="none" w="med" len="med"/>
+                    </a:lnL>
+                    <a:lnR w="12700" cap="flat" cmpd="sng" algn="ctr">
+                      <a:solidFill>
+                        <a:schemeClr val="tx1"/>
+                      </a:solidFill>
+                      <a:prstDash val="solid"/>
+                      <a:round/>
+                      <a:headEnd type="none" w="med" len="med"/>
+                      <a:tailEnd type="none" w="med" len="med"/>
+                    </a:lnR>
+                    <a:lnT w="12700" cap="flat" cmpd="sng" algn="ctr">
+                      <a:solidFill>
+                        <a:schemeClr val="tx1"/>
+                      </a:solidFill>
+                      <a:prstDash val="solid"/>
+                      <a:round/>
+                      <a:headEnd type="none" w="med" len="med"/>
+                      <a:tailEnd type="none" w="med" len="med"/>
+                    </a:lnT>
+                    <a:lnB w="12700" cap="flat" cmpd="sng" algn="ctr">
+                      <a:solidFill>
+                        <a:schemeClr val="tx1"/>
+                      </a:solidFill>
+                      <a:prstDash val="solid"/>
+                      <a:round/>
+                      <a:headEnd type="none" w="med" len="med"/>
+                      <a:tailEnd type="none" w="med" len="med"/>
+                    </a:lnB>
+                  </a:tcPr>
+                </a:tc>
+              </a:tr>
+              <a:tr h="1615468">
+                <a:tc>
+                  <a:txBody>
+                    <a:bodyPr/>
+                    <a:lstStyle/>
+                    <a:p>
+                      <a:r>
+                        <a:rPr lang="pt-BR" sz="2400" dirty="0" smtClean="0"/>
+                        <a:t>Exceção (se</a:t>
+                      </a:r>
+                      <a:r>
+                        <a:rPr lang="pt-BR" sz="2400" baseline="0" dirty="0" smtClean="0"/>
+                        <a:t> houver):</a:t>
+                      </a:r>
+                      <a:endParaRPr lang="pt-BR" sz="2400" dirty="0"/>
+                    </a:p>
+                  </a:txBody>
+                  <a:tcPr>
+                    <a:lnL w="12700" cap="flat" cmpd="sng" algn="ctr">
+                      <a:solidFill>
+                        <a:schemeClr val="tx1"/>
+                      </a:solidFill>
+                      <a:prstDash val="solid"/>
+                      <a:round/>
+                      <a:headEnd type="none" w="med" len="med"/>
+                      <a:tailEnd type="none" w="med" len="med"/>
+                    </a:lnL>
+                    <a:lnR w="12700" cap="flat" cmpd="sng" algn="ctr">
+                      <a:solidFill>
+                        <a:schemeClr val="tx1"/>
+                      </a:solidFill>
+                      <a:prstDash val="solid"/>
+                      <a:round/>
+                      <a:headEnd type="none" w="med" len="med"/>
+                      <a:tailEnd type="none" w="med" len="med"/>
+                    </a:lnR>
+                    <a:lnT w="12700" cap="flat" cmpd="sng" algn="ctr">
+                      <a:solidFill>
+                        <a:schemeClr val="tx1"/>
+                      </a:solidFill>
+                      <a:prstDash val="solid"/>
+                      <a:round/>
+                      <a:headEnd type="none" w="med" len="med"/>
+                      <a:tailEnd type="none" w="med" len="med"/>
+                    </a:lnT>
+                    <a:lnB w="12700" cap="flat" cmpd="sng" algn="ctr">
+                      <a:solidFill>
+                        <a:schemeClr val="tx1"/>
+                      </a:solidFill>
+                      <a:prstDash val="solid"/>
+                      <a:round/>
+                      <a:headEnd type="none" w="med" len="med"/>
+                      <a:tailEnd type="none" w="med" len="med"/>
+                    </a:lnB>
+                  </a:tcPr>
+                </a:tc>
+                <a:tc>
+                  <a:txBody>
+                    <a:bodyPr/>
+                    <a:lstStyle/>
+                    <a:p>
+                      <a:r>
+                        <a:rPr lang="pt-BR" sz="2400" dirty="0" smtClean="0"/>
+                        <a:t>Caso o desenvolvedor web optar por este espaço</a:t>
+                      </a:r>
+                      <a:r>
+                        <a:rPr lang="pt-BR" sz="2400" baseline="0" dirty="0" smtClean="0"/>
+                        <a:t> de outra cor, ele deve utilizar uma cor de texto compatível, porém é sempre recomendado o branco.</a:t>
+                      </a:r>
+                      <a:endParaRPr lang="pt-BR" sz="2400" dirty="0"/>
+                    </a:p>
+                  </a:txBody>
+                  <a:tcPr>
+                    <a:lnL w="12700" cap="flat" cmpd="sng" algn="ctr">
+                      <a:solidFill>
+                        <a:schemeClr val="tx1"/>
+                      </a:solidFill>
+                      <a:prstDash val="solid"/>
+                      <a:round/>
+                      <a:headEnd type="none" w="med" len="med"/>
+                      <a:tailEnd type="none" w="med" len="med"/>
+                    </a:lnL>
+                    <a:lnR w="12700" cap="flat" cmpd="sng" algn="ctr">
+                      <a:solidFill>
+                        <a:schemeClr val="tx1"/>
+                      </a:solidFill>
+                      <a:prstDash val="solid"/>
+                      <a:round/>
+                      <a:headEnd type="none" w="med" len="med"/>
+                      <a:tailEnd type="none" w="med" len="med"/>
+                    </a:lnR>
+                    <a:lnT w="12700" cap="flat" cmpd="sng" algn="ctr">
+                      <a:solidFill>
+                        <a:schemeClr val="tx1"/>
+                      </a:solidFill>
+                      <a:prstDash val="solid"/>
+                      <a:round/>
+                      <a:headEnd type="none" w="med" len="med"/>
+                      <a:tailEnd type="none" w="med" len="med"/>
+                    </a:lnT>
+                    <a:lnB w="12700" cap="flat" cmpd="sng" algn="ctr">
+                      <a:solidFill>
+                        <a:schemeClr val="tx1"/>
+                      </a:solidFill>
+                      <a:prstDash val="solid"/>
+                      <a:round/>
+                      <a:headEnd type="none" w="med" len="med"/>
+                      <a:tailEnd type="none" w="med" len="med"/>
+                    </a:lnB>
+                  </a:tcPr>
+                </a:tc>
+              </a:tr>
+              <a:tr h="869867">
+                <a:tc>
+                  <a:txBody>
+                    <a:bodyPr/>
+                    <a:lstStyle/>
+                    <a:p>
+                      <a:r>
+                        <a:rPr lang="pt-BR" sz="2400" dirty="0" smtClean="0"/>
+                        <a:t>Justificativa:</a:t>
+                      </a:r>
+                      <a:endParaRPr lang="pt-BR" sz="2400" dirty="0"/>
+                    </a:p>
+                  </a:txBody>
+                  <a:tcPr>
+                    <a:lnL w="12700" cap="flat" cmpd="sng" algn="ctr">
+                      <a:solidFill>
+                        <a:schemeClr val="tx1"/>
+                      </a:solidFill>
+                      <a:prstDash val="solid"/>
+                      <a:round/>
+                      <a:headEnd type="none" w="med" len="med"/>
+                      <a:tailEnd type="none" w="med" len="med"/>
+                    </a:lnL>
+                    <a:lnR w="12700" cap="flat" cmpd="sng" algn="ctr">
+                      <a:solidFill>
+                        <a:schemeClr val="tx1"/>
+                      </a:solidFill>
+                      <a:prstDash val="solid"/>
+                      <a:round/>
+                      <a:headEnd type="none" w="med" len="med"/>
+                      <a:tailEnd type="none" w="med" len="med"/>
+                    </a:lnR>
+                    <a:lnT w="12700" cap="flat" cmpd="sng" algn="ctr">
+                      <a:solidFill>
+                        <a:schemeClr val="tx1"/>
+                      </a:solidFill>
+                      <a:prstDash val="solid"/>
+                      <a:round/>
+                      <a:headEnd type="none" w="med" len="med"/>
+                      <a:tailEnd type="none" w="med" len="med"/>
+                    </a:lnT>
+                    <a:lnB w="12700" cap="flat" cmpd="sng" algn="ctr">
+                      <a:solidFill>
+                        <a:schemeClr val="tx1"/>
+                      </a:solidFill>
+                      <a:prstDash val="solid"/>
+                      <a:round/>
+                      <a:headEnd type="none" w="med" len="med"/>
+                      <a:tailEnd type="none" w="med" len="med"/>
+                    </a:lnB>
+                  </a:tcPr>
+                </a:tc>
+                <a:tc>
+                  <a:txBody>
+                    <a:bodyPr/>
+                    <a:lstStyle/>
+                    <a:p>
+                      <a:r>
+                        <a:rPr lang="pt-BR" sz="2400" dirty="0" smtClean="0"/>
+                        <a:t>Para uma maior compreensão, buscando uma maior visibilidade do conteúdo</a:t>
+                      </a:r>
+                      <a:r>
+                        <a:rPr lang="pt-BR" sz="2400" baseline="0" dirty="0" smtClean="0"/>
+                        <a:t> pelo usuário.</a:t>
+                      </a:r>
+                      <a:endParaRPr lang="pt-BR" sz="2400" dirty="0"/>
+                    </a:p>
+                  </a:txBody>
+                  <a:tcPr>
+                    <a:lnL w="12700" cap="flat" cmpd="sng" algn="ctr">
+                      <a:solidFill>
+                        <a:schemeClr val="tx1"/>
+                      </a:solidFill>
+                      <a:prstDash val="solid"/>
+                      <a:round/>
+                      <a:headEnd type="none" w="med" len="med"/>
+                      <a:tailEnd type="none" w="med" len="med"/>
+                    </a:lnL>
+                    <a:lnR w="12700" cap="flat" cmpd="sng" algn="ctr">
+                      <a:solidFill>
+                        <a:schemeClr val="tx1"/>
+                      </a:solidFill>
+                      <a:prstDash val="solid"/>
+                      <a:round/>
+                      <a:headEnd type="none" w="med" len="med"/>
+                      <a:tailEnd type="none" w="med" len="med"/>
+                    </a:lnR>
+                    <a:lnT w="12700" cap="flat" cmpd="sng" algn="ctr">
+                      <a:solidFill>
+                        <a:schemeClr val="tx1"/>
+                      </a:solidFill>
+                      <a:prstDash val="solid"/>
+                      <a:round/>
+                      <a:headEnd type="none" w="med" len="med"/>
+                      <a:tailEnd type="none" w="med" len="med"/>
+                    </a:lnT>
+                    <a:lnB w="12700" cap="flat" cmpd="sng" algn="ctr">
+                      <a:solidFill>
+                        <a:schemeClr val="tx1"/>
+                      </a:solidFill>
+                      <a:prstDash val="solid"/>
+                      <a:round/>
+                      <a:headEnd type="none" w="med" len="med"/>
+                      <a:tailEnd type="none" w="med" len="med"/>
+                    </a:lnB>
+                  </a:tcPr>
+                </a:tc>
+              </a:tr>
+            </a:tbl>
+          </a:graphicData>
+        </a:graphic>
+      </p:graphicFrame>
+      <p:sp>
+        <p:nvSpPr>
+          <p:cNvPr id="6" name="Retângulo 5"/>
+          <p:cNvSpPr/>
           <p:nvPr/>
-        </p:nvPicPr>
-        <p:blipFill>
-          <a:blip r:embed="rId2">
-            <a:extLst>
-              <a:ext uri="{28A0092B-C50C-407E-A947-70E740481C1C}">
-                <a14:useLocalDpi xmlns:a14="http://schemas.microsoft.com/office/drawing/2010/main" val="0"/>
-              </a:ext>
-            </a:extLst>
-          </a:blip>
-          <a:stretch>
-            <a:fillRect/>
-          </a:stretch>
-        </p:blipFill>
+        </p:nvSpPr>
         <p:spPr>
           <a:xfrm>
-            <a:off x="0" y="1556792"/>
-            <a:ext cx="9132241" cy="4320960"/>
+            <a:off x="0" y="1052736"/>
+            <a:ext cx="4419456" cy="931242"/>
           </a:xfrm>
           <a:prstGeom prst="rect">
             <a:avLst/>
           </a:prstGeom>
         </p:spPr>
-      </p:pic>
+        <p:txBody>
+          <a:bodyPr vert="horz" lIns="91440" tIns="45720" rIns="91440" bIns="45720" rtlCol="0" anchor="ctr">
+            <a:noAutofit/>
+          </a:bodyPr>
+          <a:lstStyle/>
+          <a:p>
+            <a:pPr algn="ctr">
+              <a:spcBef>
+                <a:spcPct val="0"/>
+              </a:spcBef>
+            </a:pPr>
+            <a:r>
+              <a:rPr lang="pt-BR" sz="2400" dirty="0">
+                <a:latin typeface="+mj-lt"/>
+                <a:ea typeface="+mj-ea"/>
+                <a:cs typeface="+mj-cs"/>
+              </a:rPr>
+              <a:t>Uma das Guideline usadas</a:t>
+            </a:r>
+            <a:endParaRPr lang="pt-BR" sz="2400" dirty="0">
+              <a:latin typeface="+mj-lt"/>
+              <a:ea typeface="+mj-ea"/>
+              <a:cs typeface="+mj-cs"/>
+            </a:endParaRPr>
+          </a:p>
+        </p:txBody>
+      </p:sp>
     </p:spTree>
     <p:extLst>
       <p:ext uri="{BB962C8B-B14F-4D97-AF65-F5344CB8AC3E}">
-        <p14:creationId xmlns:p14="http://schemas.microsoft.com/office/powerpoint/2010/main" val="459547614"/>
+        <p14:creationId xmlns:p14="http://schemas.microsoft.com/office/powerpoint/2010/main" val="956289708"/>
       </p:ext>
     </p:extLst>
   </p:cSld>
@@ -4874,58 +6603,6 @@
               <a:rPr lang="pt-BR" dirty="0" smtClean="0"/>
               <a:t>Apresentação do Projeto</a:t>
             </a:r>
-            <a:endParaRPr lang="pt-BR" dirty="0"/>
-          </a:p>
-        </p:txBody>
-      </p:sp>
-      <p:sp>
-        <p:nvSpPr>
-          <p:cNvPr id="3" name="Content Placeholder 2"/>
-          <p:cNvSpPr>
-            <a:spLocks noGrp="1"/>
-          </p:cNvSpPr>
-          <p:nvPr>
-            <p:ph idx="1"/>
-          </p:nvPr>
-        </p:nvSpPr>
-        <p:spPr/>
-        <p:txBody>
-          <a:bodyPr>
-            <a:normAutofit/>
-          </a:bodyPr>
-          <a:lstStyle/>
-          <a:p>
-            <a:pPr marL="342900" lvl="2" indent="-342900"/>
-            <a:r>
-              <a:rPr lang="pt-BR" sz="2800" dirty="0" smtClean="0">
-                <a:ea typeface="Tahoma" panose="020B0604030504040204" pitchFamily="34" charset="0"/>
-                <a:cs typeface="Tahoma" panose="020B0604030504040204" pitchFamily="34" charset="0"/>
-              </a:rPr>
-              <a:t>Analisando </a:t>
-            </a:r>
-            <a:r>
-              <a:rPr lang="pt-BR" sz="2800" dirty="0">
-                <a:ea typeface="Tahoma" panose="020B0604030504040204" pitchFamily="34" charset="0"/>
-                <a:cs typeface="Tahoma" panose="020B0604030504040204" pitchFamily="34" charset="0"/>
-              </a:rPr>
-              <a:t>outros sistemas e interfaces (web) de gerenciamento de exames pudemos constatar que existem muitas falhas e </a:t>
-            </a:r>
-            <a:r>
-              <a:rPr lang="pt-BR" sz="2800" dirty="0" smtClean="0">
-                <a:ea typeface="Tahoma" panose="020B0604030504040204" pitchFamily="34" charset="0"/>
-                <a:cs typeface="Tahoma" panose="020B0604030504040204" pitchFamily="34" charset="0"/>
-              </a:rPr>
-              <a:t>com isso </a:t>
-            </a:r>
-            <a:r>
-              <a:rPr lang="pt-BR" sz="2800" dirty="0">
-                <a:ea typeface="Tahoma" panose="020B0604030504040204" pitchFamily="34" charset="0"/>
-                <a:cs typeface="Tahoma" panose="020B0604030504040204" pitchFamily="34" charset="0"/>
-              </a:rPr>
-              <a:t>resolvemos desenvolver um sistema que auxiliasse a resolução dessas falhas. O paciente poderá ter acesso ao sistema via website para verificar o andamento e resultado de exames.</a:t>
-            </a:r>
-          </a:p>
-          <a:p>
             <a:endParaRPr lang="pt-BR" dirty="0"/>
           </a:p>
         </p:txBody>
@@ -5787,6 +7464,13 @@
   <p:clrMapOvr>
     <a:masterClrMapping/>
   </p:clrMapOvr>
+  <p:timing>
+    <p:tnLst>
+      <p:par>
+        <p:cTn id="1" dur="indefinite" restart="never" nodeType="tmRoot"/>
+      </p:par>
+    </p:tnLst>
+  </p:timing>
 </p:sld>
 </file>
 
@@ -5970,6 +7654,13 @@
   <p:clrMapOvr>
     <a:masterClrMapping/>
   </p:clrMapOvr>
+  <p:timing>
+    <p:tnLst>
+      <p:par>
+        <p:cTn id="1" dur="indefinite" restart="never" nodeType="tmRoot"/>
+      </p:par>
+    </p:tnLst>
+  </p:timing>
 </p:sld>
 </file>
 
@@ -6079,6 +7770,13 @@
   <p:clrMapOvr>
     <a:masterClrMapping/>
   </p:clrMapOvr>
+  <p:timing>
+    <p:tnLst>
+      <p:par>
+        <p:cTn id="1" dur="indefinite" restart="never" nodeType="tmRoot"/>
+      </p:par>
+    </p:tnLst>
+  </p:timing>
 </p:sld>
 </file>
 
@@ -6132,20 +7830,43 @@
             <p:ph idx="1"/>
           </p:nvPr>
         </p:nvSpPr>
-        <p:spPr/>
-        <p:txBody>
-          <a:bodyPr/>
+        <p:spPr>
+          <a:xfrm>
+            <a:off x="457200" y="1422356"/>
+            <a:ext cx="8229600" cy="4525963"/>
+          </a:xfrm>
+        </p:spPr>
+        <p:txBody>
+          <a:bodyPr>
+            <a:normAutofit fontScale="92500" lnSpcReduction="10000"/>
+          </a:bodyPr>
           <a:lstStyle/>
           <a:p>
             <a:r>
-              <a:rPr lang="pt-BR" dirty="0"/>
-              <a:t>Usuários: Atendente do Balcão, Analista de exames e </a:t>
-            </a:r>
+              <a:rPr lang="pt-BR" dirty="0" smtClean="0"/>
+              <a:t>Usuários: </a:t>
+            </a:r>
+          </a:p>
+          <a:p>
+            <a:pPr lvl="1"/>
+            <a:r>
+              <a:rPr lang="pt-BR" dirty="0" smtClean="0"/>
+              <a:t>Atendente do Balcão.</a:t>
+            </a:r>
+          </a:p>
+          <a:p>
+            <a:pPr lvl="1"/>
+            <a:r>
+              <a:rPr lang="pt-BR" dirty="0" smtClean="0"/>
+              <a:t>Analista de exames.</a:t>
+            </a:r>
+          </a:p>
+          <a:p>
+            <a:pPr lvl="1"/>
             <a:r>
               <a:rPr lang="pt-BR" dirty="0" smtClean="0"/>
               <a:t>Executor de exames.</a:t>
             </a:r>
-            <a:endParaRPr lang="pt-BR" dirty="0"/>
           </a:p>
           <a:p>
             <a:r>
@@ -6156,7 +7877,11 @@
           <a:p>
             <a:r>
               <a:rPr lang="pt-BR" dirty="0" smtClean="0"/>
-              <a:t>Analista de exames: Analisa dos exames que são disponibilizados na clinica, armazena os resultados dos exames em um local da clinica</a:t>
+              <a:t>Analista </a:t>
+            </a:r>
+            <a:r>
+              <a:rPr lang="pt-BR" dirty="0" smtClean="0"/>
+              <a:t>de exames: Analisa dos exames que são disponibilizados na clinica, armazena os resultados dos exames em um local da clinica</a:t>
             </a:r>
             <a:endParaRPr lang="pt-BR" dirty="0"/>
           </a:p>
@@ -6175,6 +7900,13 @@
   <p:clrMapOvr>
     <a:masterClrMapping/>
   </p:clrMapOvr>
+  <p:timing>
+    <p:tnLst>
+      <p:par>
+        <p:cTn id="1" dur="indefinite" restart="never" nodeType="tmRoot"/>
+      </p:par>
+    </p:tnLst>
+  </p:timing>
 </p:sld>
 </file>
 
@@ -6272,6 +8004,13 @@
   <p:clrMapOvr>
     <a:masterClrMapping/>
   </p:clrMapOvr>
+  <p:timing>
+    <p:tnLst>
+      <p:par>
+        <p:cTn id="1" dur="indefinite" restart="never" nodeType="tmRoot"/>
+      </p:par>
+    </p:tnLst>
+  </p:timing>
 </p:sld>
 </file>
 
@@ -6332,6 +8071,103 @@
           </a:bodyPr>
           <a:lstStyle/>
           <a:p>
+            <a:pPr marL="342900" lvl="2" indent="-342900"/>
+            <a:r>
+              <a:rPr lang="pt-BR" sz="2800" dirty="0">
+                <a:ea typeface="Tahoma" panose="020B0604030504040204" pitchFamily="34" charset="0"/>
+                <a:cs typeface="Tahoma" panose="020B0604030504040204" pitchFamily="34" charset="0"/>
+              </a:rPr>
+              <a:t>Analisando outros sistemas e interfaces (web) de gerenciamento de exames pudemos constatar que existem muitas falhas e com isso resolvemos desenvolver um sistema que auxiliasse a resolução dessas falhas. O paciente poderá ter acesso ao sistema via website para verificar o andamento e resultado de exames.</a:t>
+            </a:r>
+          </a:p>
+          <a:p>
+            <a:pPr marL="0" lvl="0" indent="0">
+              <a:buNone/>
+            </a:pPr>
+            <a:endParaRPr lang="pt-BR" dirty="0"/>
+          </a:p>
+          <a:p>
+            <a:endParaRPr lang="pt-BR" dirty="0"/>
+          </a:p>
+        </p:txBody>
+      </p:sp>
+    </p:spTree>
+    <p:extLst>
+      <p:ext uri="{BB962C8B-B14F-4D97-AF65-F5344CB8AC3E}">
+        <p14:creationId xmlns:p14="http://schemas.microsoft.com/office/powerpoint/2010/main" val="2073483884"/>
+      </p:ext>
+    </p:extLst>
+  </p:cSld>
+  <p:clrMapOvr>
+    <a:masterClrMapping/>
+  </p:clrMapOvr>
+  <p:timing>
+    <p:tnLst>
+      <p:par>
+        <p:cTn id="1" dur="indefinite" restart="never" nodeType="tmRoot"/>
+      </p:par>
+    </p:tnLst>
+  </p:timing>
+</p:sld>
+</file>
+
+<file path=ppt/slides/slide7.xml><?xml version="1.0" encoding="utf-8"?>
+<p:sld xmlns:a="http://schemas.openxmlformats.org/drawingml/2006/main" xmlns:r="http://schemas.openxmlformats.org/officeDocument/2006/relationships" xmlns:p="http://schemas.openxmlformats.org/presentationml/2006/main">
+  <p:cSld>
+    <p:spTree>
+      <p:nvGrpSpPr>
+        <p:cNvPr id="1" name=""/>
+        <p:cNvGrpSpPr/>
+        <p:nvPr/>
+      </p:nvGrpSpPr>
+      <p:grpSpPr>
+        <a:xfrm>
+          <a:off x="0" y="0"/>
+          <a:ext cx="0" cy="0"/>
+          <a:chOff x="0" y="0"/>
+          <a:chExt cx="0" cy="0"/>
+        </a:xfrm>
+      </p:grpSpPr>
+      <p:sp>
+        <p:nvSpPr>
+          <p:cNvPr id="2" name="Title 1"/>
+          <p:cNvSpPr>
+            <a:spLocks noGrp="1"/>
+          </p:cNvSpPr>
+          <p:nvPr>
+            <p:ph type="title"/>
+          </p:nvPr>
+        </p:nvSpPr>
+        <p:spPr/>
+        <p:txBody>
+          <a:bodyPr/>
+          <a:lstStyle/>
+          <a:p>
+            <a:r>
+              <a:rPr lang="pt-BR" dirty="0" smtClean="0"/>
+              <a:t>Alternativas e Concorrências</a:t>
+            </a:r>
+            <a:endParaRPr lang="pt-BR" dirty="0"/>
+          </a:p>
+        </p:txBody>
+      </p:sp>
+      <p:sp>
+        <p:nvSpPr>
+          <p:cNvPr id="4" name="Espaço Reservado para Conteúdo 3"/>
+          <p:cNvSpPr>
+            <a:spLocks noGrp="1"/>
+          </p:cNvSpPr>
+          <p:nvPr>
+            <p:ph idx="1"/>
+          </p:nvPr>
+        </p:nvSpPr>
+        <p:spPr/>
+        <p:txBody>
+          <a:bodyPr>
+            <a:normAutofit/>
+          </a:bodyPr>
+          <a:lstStyle/>
+          <a:p>
             <a:pPr lvl="0"/>
             <a:r>
               <a:rPr lang="pt-BR" sz="2400" dirty="0"/>
@@ -6415,7 +8251,7 @@
 </p:sld>
 </file>
 
-<file path=ppt/slides/slide7.xml><?xml version="1.0" encoding="utf-8"?>
+<file path=ppt/slides/slide8.xml><?xml version="1.0" encoding="utf-8"?>
 <p:sld xmlns:a="http://schemas.openxmlformats.org/drawingml/2006/main" xmlns:r="http://schemas.openxmlformats.org/officeDocument/2006/relationships" xmlns:p="http://schemas.openxmlformats.org/presentationml/2006/main">
   <p:cSld>
     <p:spTree>
@@ -6505,7 +8341,7 @@
 </p:sld>
 </file>
 
-<file path=ppt/slides/slide8.xml><?xml version="1.0" encoding="utf-8"?>
+<file path=ppt/slides/slide9.xml><?xml version="1.0" encoding="utf-8"?>
 <p:sld xmlns:a="http://schemas.openxmlformats.org/drawingml/2006/main" xmlns:r="http://schemas.openxmlformats.org/officeDocument/2006/relationships" xmlns:p="http://schemas.openxmlformats.org/presentationml/2006/main">
   <p:cSld>
     <p:spTree>
@@ -6579,141 +8415,6 @@
     <p:extLst>
       <p:ext uri="{BB962C8B-B14F-4D97-AF65-F5344CB8AC3E}">
         <p14:creationId xmlns:p14="http://schemas.microsoft.com/office/powerpoint/2010/main" val="3047569295"/>
-      </p:ext>
-    </p:extLst>
-  </p:cSld>
-  <p:clrMapOvr>
-    <a:masterClrMapping/>
-  </p:clrMapOvr>
-  <p:timing>
-    <p:tnLst>
-      <p:par>
-        <p:cTn id="1" dur="indefinite" restart="never" nodeType="tmRoot"/>
-      </p:par>
-    </p:tnLst>
-  </p:timing>
-</p:sld>
-</file>
-
-<file path=ppt/slides/slide9.xml><?xml version="1.0" encoding="utf-8"?>
-<p:sld xmlns:a="http://schemas.openxmlformats.org/drawingml/2006/main" xmlns:r="http://schemas.openxmlformats.org/officeDocument/2006/relationships" xmlns:p="http://schemas.openxmlformats.org/presentationml/2006/main">
-  <p:cSld>
-    <p:spTree>
-      <p:nvGrpSpPr>
-        <p:cNvPr id="1" name=""/>
-        <p:cNvGrpSpPr/>
-        <p:nvPr/>
-      </p:nvGrpSpPr>
-      <p:grpSpPr>
-        <a:xfrm>
-          <a:off x="0" y="0"/>
-          <a:ext cx="0" cy="0"/>
-          <a:chOff x="0" y="0"/>
-          <a:chExt cx="0" cy="0"/>
-        </a:xfrm>
-      </p:grpSpPr>
-      <p:sp>
-        <p:nvSpPr>
-          <p:cNvPr id="2" name="Title 1"/>
-          <p:cNvSpPr>
-            <a:spLocks noGrp="1"/>
-          </p:cNvSpPr>
-          <p:nvPr>
-            <p:ph type="title"/>
-          </p:nvPr>
-        </p:nvSpPr>
-        <p:spPr/>
-        <p:txBody>
-          <a:bodyPr/>
-          <a:lstStyle/>
-          <a:p>
-            <a:r>
-              <a:rPr lang="pt-BR" dirty="0" smtClean="0"/>
-              <a:t>Casos de Uso</a:t>
-            </a:r>
-            <a:endParaRPr lang="pt-BR" dirty="0"/>
-          </a:p>
-        </p:txBody>
-      </p:sp>
-      <p:pic>
-        <p:nvPicPr>
-          <p:cNvPr id="4" name="Imagem 3"/>
-          <p:cNvPicPr>
-            <a:picLocks noChangeAspect="1"/>
-          </p:cNvPicPr>
-          <p:nvPr/>
-        </p:nvPicPr>
-        <p:blipFill>
-          <a:blip r:embed="rId2">
-            <a:extLst>
-              <a:ext uri="{28A0092B-C50C-407E-A947-70E740481C1C}">
-                <a14:useLocalDpi xmlns:a14="http://schemas.microsoft.com/office/drawing/2010/main" val="0"/>
-              </a:ext>
-            </a:extLst>
-          </a:blip>
-          <a:stretch>
-            <a:fillRect/>
-          </a:stretch>
-        </p:blipFill>
-        <p:spPr>
-          <a:xfrm>
-            <a:off x="0" y="1196752"/>
-            <a:ext cx="9144000" cy="4993722"/>
-          </a:xfrm>
-          <a:prstGeom prst="rect">
-            <a:avLst/>
-          </a:prstGeom>
-        </p:spPr>
-      </p:pic>
-      <p:sp>
-        <p:nvSpPr>
-          <p:cNvPr id="6" name="Retângulo 5"/>
-          <p:cNvSpPr/>
-          <p:nvPr/>
-        </p:nvSpPr>
-        <p:spPr>
-          <a:xfrm>
-            <a:off x="683568" y="6093296"/>
-            <a:ext cx="8136904" cy="461665"/>
-          </a:xfrm>
-          <a:prstGeom prst="rect">
-            <a:avLst/>
-          </a:prstGeom>
-        </p:spPr>
-        <p:txBody>
-          <a:bodyPr wrap="square">
-            <a:spAutoFit/>
-          </a:bodyPr>
-          <a:lstStyle/>
-          <a:p>
-            <a:pPr>
-              <a:buClr>
-                <a:schemeClr val="bg2"/>
-              </a:buClr>
-            </a:pPr>
-            <a:r>
-              <a:rPr lang="pt-BR" sz="2400" dirty="0" smtClean="0">
-                <a:solidFill>
-                  <a:srgbClr val="FF0000"/>
-                </a:solidFill>
-              </a:rPr>
-              <a:t>*Continuação </a:t>
-            </a:r>
-            <a:r>
-              <a:rPr lang="pt-BR" sz="2400" dirty="0">
-                <a:solidFill>
-                  <a:srgbClr val="FF0000"/>
-                </a:solidFill>
-              </a:rPr>
-              <a:t>da ligação de herança no slide seguinte</a:t>
-            </a:r>
-          </a:p>
-        </p:txBody>
-      </p:sp>
-    </p:spTree>
-    <p:extLst>
-      <p:ext uri="{BB962C8B-B14F-4D97-AF65-F5344CB8AC3E}">
-        <p14:creationId xmlns:p14="http://schemas.microsoft.com/office/powerpoint/2010/main" val="33625712"/>
       </p:ext>
     </p:extLst>
   </p:cSld>

</xml_diff>

<commit_message>
Ultima atualização do slide de Apresentação.
</commit_message>
<xml_diff>
--- a/documentacao/G4_Apresentacao2sem2014_Final.pptx
+++ b/documentacao/G4_Apresentacao2sem2014_Final.pptx
@@ -5,47 +5,63 @@
     <p:sldMasterId id="2147483648" r:id="rId1"/>
   </p:sldMasterIdLst>
   <p:notesMasterIdLst>
-    <p:notesMasterId r:id="rId40"/>
+    <p:notesMasterId r:id="rId56"/>
   </p:notesMasterIdLst>
   <p:sldIdLst>
     <p:sldId id="258" r:id="rId2"/>
     <p:sldId id="297" r:id="rId3"/>
-    <p:sldId id="405" r:id="rId4"/>
-    <p:sldId id="395" r:id="rId5"/>
-    <p:sldId id="423" r:id="rId6"/>
-    <p:sldId id="429" r:id="rId7"/>
-    <p:sldId id="403" r:id="rId8"/>
-    <p:sldId id="396" r:id="rId9"/>
-    <p:sldId id="397" r:id="rId10"/>
-    <p:sldId id="398" r:id="rId11"/>
-    <p:sldId id="399" r:id="rId12"/>
-    <p:sldId id="400" r:id="rId13"/>
-    <p:sldId id="428" r:id="rId14"/>
-    <p:sldId id="425" r:id="rId15"/>
-    <p:sldId id="406" r:id="rId16"/>
-    <p:sldId id="407" r:id="rId17"/>
-    <p:sldId id="408" r:id="rId18"/>
-    <p:sldId id="409" r:id="rId19"/>
-    <p:sldId id="410" r:id="rId20"/>
-    <p:sldId id="411" r:id="rId21"/>
-    <p:sldId id="412" r:id="rId22"/>
-    <p:sldId id="413" r:id="rId23"/>
-    <p:sldId id="414" r:id="rId24"/>
-    <p:sldId id="415" r:id="rId25"/>
-    <p:sldId id="416" r:id="rId26"/>
-    <p:sldId id="417" r:id="rId27"/>
-    <p:sldId id="418" r:id="rId28"/>
-    <p:sldId id="419" r:id="rId29"/>
-    <p:sldId id="420" r:id="rId30"/>
-    <p:sldId id="421" r:id="rId31"/>
-    <p:sldId id="422" r:id="rId32"/>
-    <p:sldId id="392" r:id="rId33"/>
-    <p:sldId id="401" r:id="rId34"/>
-    <p:sldId id="391" r:id="rId35"/>
-    <p:sldId id="402" r:id="rId36"/>
-    <p:sldId id="424" r:id="rId37"/>
-    <p:sldId id="384" r:id="rId38"/>
-    <p:sldId id="393" r:id="rId39"/>
+    <p:sldId id="395" r:id="rId4"/>
+    <p:sldId id="423" r:id="rId5"/>
+    <p:sldId id="429" r:id="rId6"/>
+    <p:sldId id="403" r:id="rId7"/>
+    <p:sldId id="396" r:id="rId8"/>
+    <p:sldId id="397" r:id="rId9"/>
+    <p:sldId id="398" r:id="rId10"/>
+    <p:sldId id="399" r:id="rId11"/>
+    <p:sldId id="400" r:id="rId12"/>
+    <p:sldId id="428" r:id="rId13"/>
+    <p:sldId id="425" r:id="rId14"/>
+    <p:sldId id="406" r:id="rId15"/>
+    <p:sldId id="433" r:id="rId16"/>
+    <p:sldId id="435" r:id="rId17"/>
+    <p:sldId id="436" r:id="rId18"/>
+    <p:sldId id="437" r:id="rId19"/>
+    <p:sldId id="438" r:id="rId20"/>
+    <p:sldId id="434" r:id="rId21"/>
+    <p:sldId id="439" r:id="rId22"/>
+    <p:sldId id="440" r:id="rId23"/>
+    <p:sldId id="441" r:id="rId24"/>
+    <p:sldId id="442" r:id="rId25"/>
+    <p:sldId id="443" r:id="rId26"/>
+    <p:sldId id="444" r:id="rId27"/>
+    <p:sldId id="445" r:id="rId28"/>
+    <p:sldId id="446" r:id="rId29"/>
+    <p:sldId id="432" r:id="rId30"/>
+    <p:sldId id="431" r:id="rId31"/>
+    <p:sldId id="447" r:id="rId32"/>
+    <p:sldId id="407" r:id="rId33"/>
+    <p:sldId id="408" r:id="rId34"/>
+    <p:sldId id="409" r:id="rId35"/>
+    <p:sldId id="410" r:id="rId36"/>
+    <p:sldId id="411" r:id="rId37"/>
+    <p:sldId id="412" r:id="rId38"/>
+    <p:sldId id="413" r:id="rId39"/>
+    <p:sldId id="414" r:id="rId40"/>
+    <p:sldId id="415" r:id="rId41"/>
+    <p:sldId id="416" r:id="rId42"/>
+    <p:sldId id="417" r:id="rId43"/>
+    <p:sldId id="418" r:id="rId44"/>
+    <p:sldId id="419" r:id="rId45"/>
+    <p:sldId id="420" r:id="rId46"/>
+    <p:sldId id="421" r:id="rId47"/>
+    <p:sldId id="422" r:id="rId48"/>
+    <p:sldId id="392" r:id="rId49"/>
+    <p:sldId id="401" r:id="rId50"/>
+    <p:sldId id="430" r:id="rId51"/>
+    <p:sldId id="402" r:id="rId52"/>
+    <p:sldId id="424" r:id="rId53"/>
+    <p:sldId id="384" r:id="rId54"/>
+    <p:sldId id="393" r:id="rId55"/>
   </p:sldIdLst>
   <p:sldSz cx="9144000" cy="6858000" type="screen4x3"/>
   <p:notesSz cx="6858000" cy="9144000"/>
@@ -151,7 +167,6 @@
           <p14:sldIdLst>
             <p14:sldId id="258"/>
             <p14:sldId id="297"/>
-            <p14:sldId id="405"/>
             <p14:sldId id="395"/>
             <p14:sldId id="423"/>
             <p14:sldId id="429"/>
@@ -164,6 +179,23 @@
             <p14:sldId id="428"/>
             <p14:sldId id="425"/>
             <p14:sldId id="406"/>
+            <p14:sldId id="433"/>
+            <p14:sldId id="435"/>
+            <p14:sldId id="436"/>
+            <p14:sldId id="437"/>
+            <p14:sldId id="438"/>
+            <p14:sldId id="434"/>
+            <p14:sldId id="439"/>
+            <p14:sldId id="440"/>
+            <p14:sldId id="441"/>
+            <p14:sldId id="442"/>
+            <p14:sldId id="443"/>
+            <p14:sldId id="444"/>
+            <p14:sldId id="445"/>
+            <p14:sldId id="446"/>
+            <p14:sldId id="432"/>
+            <p14:sldId id="431"/>
+            <p14:sldId id="447"/>
             <p14:sldId id="407"/>
             <p14:sldId id="408"/>
             <p14:sldId id="409"/>
@@ -182,7 +214,7 @@
             <p14:sldId id="422"/>
             <p14:sldId id="392"/>
             <p14:sldId id="401"/>
-            <p14:sldId id="391"/>
+            <p14:sldId id="430"/>
             <p14:sldId id="402"/>
             <p14:sldId id="424"/>
             <p14:sldId id="384"/>
@@ -215,55 +247,6 @@
 </p:cmAuthorLst>
 </file>
 
-<file path=ppt/comments/comment1.xml><?xml version="1.0" encoding="utf-8"?>
-<p:cmLst xmlns:a="http://schemas.openxmlformats.org/drawingml/2006/main" xmlns:r="http://schemas.openxmlformats.org/officeDocument/2006/relationships" xmlns:p="http://schemas.openxmlformats.org/presentationml/2006/main">
-  <p:cm authorId="0" dt="2014-11-16T14:53:18.669" idx="1">
-    <p:pos x="5210" y="1032"/>
-    <p:text>Isso aqui entra em Alternativas e Concorrências.
-Foque aqui no problema econtextualização além dis objetivos do trabalho.</p:text>
-  </p:cm>
-</p:cmLst>
-</file>
-
-<file path=ppt/comments/comment2.xml><?xml version="1.0" encoding="utf-8"?>
-<p:cmLst xmlns:a="http://schemas.openxmlformats.org/drawingml/2006/main" xmlns:r="http://schemas.openxmlformats.org/officeDocument/2006/relationships" xmlns:p="http://schemas.openxmlformats.org/presentationml/2006/main">
-  <p:cm authorId="0" dt="2014-11-16T14:52:08.782" idx="2">
-    <p:pos x="4170" y="318"/>
-    <p:text>Atendente de Balcão, analsita de exames e executor podem ser sub-tens de usuários:
-Lembrar de na apresentação falar od ambiente do usuário. Se preferir, pode citar aspectos do ambiente do usuário num formato de lista não numerada</p:text>
-  </p:cm>
-</p:cmLst>
-</file>
-
-<file path=ppt/comments/comment3.xml><?xml version="1.0" encoding="utf-8"?>
-<p:cmLst xmlns:a="http://schemas.openxmlformats.org/drawingml/2006/main" xmlns:r="http://schemas.openxmlformats.org/officeDocument/2006/relationships" xmlns:p="http://schemas.openxmlformats.org/presentationml/2006/main">
-  <p:cm authorId="0" dt="2014-11-16T14:55:02.790" idx="4">
-    <p:pos x="4419" y="318"/>
-    <p:text>Aqui só colocar os guidelines de forma geral e não toda a tabela.
-Os detalhes estão no documento e também vocês podem falar na apresentação.
-Use uma tabela PowerPoint mesmo.</p:text>
-  </p:cm>
-</p:cmLst>
-</file>
-
-<file path=ppt/comments/comment4.xml><?xml version="1.0" encoding="utf-8"?>
-<p:cmLst xmlns:a="http://schemas.openxmlformats.org/drawingml/2006/main" xmlns:r="http://schemas.openxmlformats.org/officeDocument/2006/relationships" xmlns:p="http://schemas.openxmlformats.org/presentationml/2006/main">
-  <p:cm authorId="0" dt="2014-11-16T14:55:29.392" idx="5">
-    <p:pos x="1118" y="791"/>
-    <p:text>COlocar como subtitulo</p:text>
-  </p:cm>
-</p:cmLst>
-</file>
-
-<file path=ppt/comments/comment5.xml><?xml version="1.0" encoding="utf-8"?>
-<p:cmLst xmlns:a="http://schemas.openxmlformats.org/drawingml/2006/main" xmlns:r="http://schemas.openxmlformats.org/officeDocument/2006/relationships" xmlns:p="http://schemas.openxmlformats.org/presentationml/2006/main">
-  <p:cm authorId="0" dt="2014-11-16T14:57:06.708" idx="6">
-    <p:pos x="4101" y="1032"/>
-    <p:text>Colocar de forma geral e não tão detalhado. Mostrar em pontos principais.</p:text>
-  </p:cm>
-</p:cmLst>
-</file>
-
 <file path=ppt/notesMasters/notesMaster1.xml><?xml version="1.0" encoding="utf-8"?>
 <p:notesMaster xmlns:a="http://schemas.openxmlformats.org/drawingml/2006/main" xmlns:r="http://schemas.openxmlformats.org/officeDocument/2006/relationships" xmlns:p="http://schemas.openxmlformats.org/presentationml/2006/main">
   <p:cSld>
@@ -347,7 +330,7 @@
             <a:fld id="{44372743-0C2A-4DA9-BF19-A9026375E57C}" type="datetimeFigureOut">
               <a:rPr lang="pt-BR" smtClean="0"/>
               <a:pPr/>
-              <a:t>21/11/2014</a:t>
+              <a:t>03/12/2014</a:t>
             </a:fld>
             <a:endParaRPr lang="pt-BR"/>
           </a:p>
@@ -682,7 +665,7 @@
             <a:fld id="{2C938334-6292-4E5A-8061-BB795ABB3EFC}" type="slidenum">
               <a:rPr lang="pt-BR" smtClean="0"/>
               <a:pPr/>
-              <a:t>37</a:t>
+              <a:t>53</a:t>
             </a:fld>
             <a:endParaRPr lang="pt-BR"/>
           </a:p>
@@ -913,7 +896,7 @@
             <a:fld id="{94CDC042-039A-4E80-A826-4614F83E09D2}" type="datetimeFigureOut">
               <a:rPr lang="pt-BR" smtClean="0"/>
               <a:pPr/>
-              <a:t>21/11/2014</a:t>
+              <a:t>03/12/2014</a:t>
             </a:fld>
             <a:endParaRPr lang="pt-BR"/>
           </a:p>
@@ -1126,7 +1109,7 @@
             <a:fld id="{94CDC042-039A-4E80-A826-4614F83E09D2}" type="datetimeFigureOut">
               <a:rPr lang="pt-BR" smtClean="0"/>
               <a:pPr/>
-              <a:t>21/11/2014</a:t>
+              <a:t>03/12/2014</a:t>
             </a:fld>
             <a:endParaRPr lang="pt-BR"/>
           </a:p>
@@ -1849,7 +1832,7 @@
             <a:fld id="{94CDC042-039A-4E80-A826-4614F83E09D2}" type="datetimeFigureOut">
               <a:rPr lang="pt-BR" smtClean="0"/>
               <a:pPr/>
-              <a:t>21/11/2014</a:t>
+              <a:t>03/12/2014</a:t>
             </a:fld>
             <a:endParaRPr lang="pt-BR"/>
           </a:p>
@@ -2374,141 +2357,6 @@
       </p:sp>
       <p:pic>
         <p:nvPicPr>
-          <p:cNvPr id="4" name="Imagem 3"/>
-          <p:cNvPicPr>
-            <a:picLocks noChangeAspect="1"/>
-          </p:cNvPicPr>
-          <p:nvPr/>
-        </p:nvPicPr>
-        <p:blipFill>
-          <a:blip r:embed="rId2">
-            <a:extLst>
-              <a:ext uri="{28A0092B-C50C-407E-A947-70E740481C1C}">
-                <a14:useLocalDpi xmlns:a14="http://schemas.microsoft.com/office/drawing/2010/main" val="0"/>
-              </a:ext>
-            </a:extLst>
-          </a:blip>
-          <a:stretch>
-            <a:fillRect/>
-          </a:stretch>
-        </p:blipFill>
-        <p:spPr>
-          <a:xfrm>
-            <a:off x="0" y="1196752"/>
-            <a:ext cx="9144000" cy="4993722"/>
-          </a:xfrm>
-          <a:prstGeom prst="rect">
-            <a:avLst/>
-          </a:prstGeom>
-        </p:spPr>
-      </p:pic>
-      <p:sp>
-        <p:nvSpPr>
-          <p:cNvPr id="6" name="Retângulo 5"/>
-          <p:cNvSpPr/>
-          <p:nvPr/>
-        </p:nvSpPr>
-        <p:spPr>
-          <a:xfrm>
-            <a:off x="683568" y="6093296"/>
-            <a:ext cx="8136904" cy="461665"/>
-          </a:xfrm>
-          <a:prstGeom prst="rect">
-            <a:avLst/>
-          </a:prstGeom>
-        </p:spPr>
-        <p:txBody>
-          <a:bodyPr wrap="square">
-            <a:spAutoFit/>
-          </a:bodyPr>
-          <a:lstStyle/>
-          <a:p>
-            <a:pPr>
-              <a:buClr>
-                <a:schemeClr val="bg2"/>
-              </a:buClr>
-            </a:pPr>
-            <a:r>
-              <a:rPr lang="pt-BR" sz="2400" dirty="0" smtClean="0">
-                <a:solidFill>
-                  <a:srgbClr val="FF0000"/>
-                </a:solidFill>
-              </a:rPr>
-              <a:t>*Continuação </a:t>
-            </a:r>
-            <a:r>
-              <a:rPr lang="pt-BR" sz="2400" dirty="0">
-                <a:solidFill>
-                  <a:srgbClr val="FF0000"/>
-                </a:solidFill>
-              </a:rPr>
-              <a:t>da ligação de herança no slide seguinte</a:t>
-            </a:r>
-          </a:p>
-        </p:txBody>
-      </p:sp>
-    </p:spTree>
-    <p:extLst>
-      <p:ext uri="{BB962C8B-B14F-4D97-AF65-F5344CB8AC3E}">
-        <p14:creationId xmlns:p14="http://schemas.microsoft.com/office/powerpoint/2010/main" val="33625712"/>
-      </p:ext>
-    </p:extLst>
-  </p:cSld>
-  <p:clrMapOvr>
-    <a:masterClrMapping/>
-  </p:clrMapOvr>
-  <p:timing>
-    <p:tnLst>
-      <p:par>
-        <p:cTn id="1" dur="indefinite" restart="never" nodeType="tmRoot"/>
-      </p:par>
-    </p:tnLst>
-  </p:timing>
-</p:sld>
-</file>
-
-<file path=ppt/slides/slide11.xml><?xml version="1.0" encoding="utf-8"?>
-<p:sld xmlns:a="http://schemas.openxmlformats.org/drawingml/2006/main" xmlns:r="http://schemas.openxmlformats.org/officeDocument/2006/relationships" xmlns:p="http://schemas.openxmlformats.org/presentationml/2006/main">
-  <p:cSld>
-    <p:spTree>
-      <p:nvGrpSpPr>
-        <p:cNvPr id="1" name=""/>
-        <p:cNvGrpSpPr/>
-        <p:nvPr/>
-      </p:nvGrpSpPr>
-      <p:grpSpPr>
-        <a:xfrm>
-          <a:off x="0" y="0"/>
-          <a:ext cx="0" cy="0"/>
-          <a:chOff x="0" y="0"/>
-          <a:chExt cx="0" cy="0"/>
-        </a:xfrm>
-      </p:grpSpPr>
-      <p:sp>
-        <p:nvSpPr>
-          <p:cNvPr id="2" name="Title 1"/>
-          <p:cNvSpPr>
-            <a:spLocks noGrp="1"/>
-          </p:cNvSpPr>
-          <p:nvPr>
-            <p:ph type="title"/>
-          </p:nvPr>
-        </p:nvSpPr>
-        <p:spPr/>
-        <p:txBody>
-          <a:bodyPr/>
-          <a:lstStyle/>
-          <a:p>
-            <a:r>
-              <a:rPr lang="pt-BR" dirty="0" smtClean="0"/>
-              <a:t>Casos de Uso</a:t>
-            </a:r>
-            <a:endParaRPr lang="pt-BR" dirty="0"/>
-          </a:p>
-        </p:txBody>
-      </p:sp>
-      <p:pic>
-        <p:nvPicPr>
           <p:cNvPr id="5" name="Imagem 4"/>
           <p:cNvPicPr>
             <a:picLocks noChangeAspect="1"/>
@@ -2610,7 +2458,7 @@
 </p:sld>
 </file>
 
-<file path=ppt/slides/slide12.xml><?xml version="1.0" encoding="utf-8"?>
+<file path=ppt/slides/slide11.xml><?xml version="1.0" encoding="utf-8"?>
 <p:sld xmlns:a="http://schemas.openxmlformats.org/drawingml/2006/main" xmlns:r="http://schemas.openxmlformats.org/officeDocument/2006/relationships" xmlns:p="http://schemas.openxmlformats.org/presentationml/2006/main">
   <p:cSld>
     <p:spTree>
@@ -3926,7 +3774,7 @@
 </p:sld>
 </file>
 
-<file path=ppt/slides/slide13.xml><?xml version="1.0" encoding="utf-8"?>
+<file path=ppt/slides/slide12.xml><?xml version="1.0" encoding="utf-8"?>
 <p:sld xmlns:a="http://schemas.openxmlformats.org/drawingml/2006/main" xmlns:r="http://schemas.openxmlformats.org/officeDocument/2006/relationships" xmlns:p="http://schemas.openxmlformats.org/presentationml/2006/main">
   <p:cSld>
     <p:spTree>
@@ -3963,6 +3811,218 @@
               <a:t>Interface do Usuário</a:t>
             </a:r>
             <a:endParaRPr lang="pt-BR" dirty="0"/>
+          </a:p>
+        </p:txBody>
+      </p:sp>
+      <p:sp>
+        <p:nvSpPr>
+          <p:cNvPr id="3" name="Retângulo 2"/>
+          <p:cNvSpPr/>
+          <p:nvPr/>
+        </p:nvSpPr>
+        <p:spPr>
+          <a:xfrm>
+            <a:off x="971600" y="1939705"/>
+            <a:ext cx="8460432" cy="1200329"/>
+          </a:xfrm>
+          <a:prstGeom prst="rect">
+            <a:avLst/>
+          </a:prstGeom>
+        </p:spPr>
+        <p:txBody>
+          <a:bodyPr wrap="square">
+            <a:spAutoFit/>
+          </a:bodyPr>
+          <a:lstStyle/>
+          <a:p>
+            <a:pPr marL="342900" indent="-342900">
+              <a:buFont typeface="Arial" panose="020B0604020202020204" pitchFamily="34" charset="0"/>
+              <a:buChar char="•"/>
+            </a:pPr>
+            <a:r>
+              <a:rPr lang="pt-BR" sz="2400" dirty="0" smtClean="0"/>
+              <a:t>Uma </a:t>
+            </a:r>
+            <a:r>
+              <a:rPr lang="pt-BR" sz="2400" dirty="0" err="1"/>
+              <a:t>guideline</a:t>
+            </a:r>
+            <a:r>
+              <a:rPr lang="pt-BR" sz="2400" dirty="0"/>
+              <a:t> é uma regra ou </a:t>
+            </a:r>
+            <a:r>
+              <a:rPr lang="pt-BR" sz="2400" dirty="0" smtClean="0"/>
+              <a:t>princípio validado </a:t>
+            </a:r>
+            <a:r>
+              <a:rPr lang="pt-BR" sz="2400" dirty="0"/>
+              <a:t>ou já </a:t>
+            </a:r>
+            <a:endParaRPr lang="pt-BR" sz="2400" dirty="0" smtClean="0"/>
+          </a:p>
+          <a:p>
+            <a:r>
+              <a:rPr lang="pt-BR" sz="2400" dirty="0" smtClean="0"/>
+              <a:t>testado</a:t>
+            </a:r>
+            <a:endParaRPr lang="pt-BR" sz="2400" dirty="0"/>
+          </a:p>
+          <a:p>
+            <a:pPr marL="342900" indent="-342900">
+              <a:buFont typeface="Arial" panose="020B0604020202020204" pitchFamily="34" charset="0"/>
+              <a:buChar char="•"/>
+            </a:pPr>
+            <a:r>
+              <a:rPr lang="pt-BR" sz="2400" dirty="0" err="1" smtClean="0"/>
+              <a:t>Guideline</a:t>
+            </a:r>
+            <a:r>
+              <a:rPr lang="pt-BR" sz="2400" dirty="0" smtClean="0"/>
+              <a:t> </a:t>
+            </a:r>
+            <a:r>
+              <a:rPr lang="pt-BR" sz="2400" dirty="0"/>
+              <a:t>= recomendação ergonômica</a:t>
+            </a:r>
+          </a:p>
+        </p:txBody>
+      </p:sp>
+      <p:sp>
+        <p:nvSpPr>
+          <p:cNvPr id="4" name="Retângulo 3"/>
+          <p:cNvSpPr/>
+          <p:nvPr/>
+        </p:nvSpPr>
+        <p:spPr>
+          <a:xfrm>
+            <a:off x="971600" y="3429000"/>
+            <a:ext cx="8460432" cy="2308324"/>
+          </a:xfrm>
+          <a:prstGeom prst="rect">
+            <a:avLst/>
+          </a:prstGeom>
+        </p:spPr>
+        <p:txBody>
+          <a:bodyPr wrap="square">
+            <a:spAutoFit/>
+          </a:bodyPr>
+          <a:lstStyle/>
+          <a:p>
+            <a:pPr marL="285750" indent="-285750">
+              <a:buFont typeface="Arial" panose="020B0604020202020204" pitchFamily="34" charset="0"/>
+              <a:buChar char="•"/>
+            </a:pPr>
+            <a:r>
+              <a:rPr lang="pt-BR" sz="2400" dirty="0"/>
+              <a:t>Do ponto de vista do </a:t>
+            </a:r>
+            <a:r>
+              <a:rPr lang="pt-BR" sz="2400" b="1" dirty="0"/>
+              <a:t>usuário</a:t>
+            </a:r>
+            <a:r>
+              <a:rPr lang="pt-BR" sz="2400" dirty="0"/>
+              <a:t>:</a:t>
+            </a:r>
+          </a:p>
+          <a:p>
+            <a:pPr lvl="1"/>
+            <a:r>
+              <a:rPr lang="pt-BR" sz="2400" dirty="0"/>
+              <a:t>– Asseguram um nível de </a:t>
+            </a:r>
+            <a:r>
+              <a:rPr lang="pt-BR" sz="2400" dirty="0" smtClean="0"/>
+              <a:t>qualidade/usabilidade aceitável</a:t>
+            </a:r>
+            <a:endParaRPr lang="pt-BR" sz="2400" dirty="0"/>
+          </a:p>
+          <a:p>
+            <a:pPr marL="285750" indent="-285750">
+              <a:buFont typeface="Arial" panose="020B0604020202020204" pitchFamily="34" charset="0"/>
+              <a:buChar char="•"/>
+            </a:pPr>
+            <a:r>
+              <a:rPr lang="pt-BR" sz="2400" dirty="0" smtClean="0"/>
+              <a:t>Do </a:t>
+            </a:r>
+            <a:r>
+              <a:rPr lang="pt-BR" sz="2400" dirty="0"/>
+              <a:t>ponto de vista do </a:t>
+            </a:r>
+            <a:r>
+              <a:rPr lang="pt-BR" sz="2400" b="1" dirty="0"/>
+              <a:t>designer/desenvolvedor</a:t>
+            </a:r>
+            <a:r>
+              <a:rPr lang="pt-BR" sz="2400" dirty="0"/>
+              <a:t>:</a:t>
+            </a:r>
+          </a:p>
+          <a:p>
+            <a:pPr lvl="1"/>
+            <a:r>
+              <a:rPr lang="pt-BR" sz="2400" dirty="0"/>
+              <a:t>– Reduz custos, pois não é preciso pesquisa </a:t>
+            </a:r>
+            <a:r>
+              <a:rPr lang="pt-BR" sz="2400" dirty="0" smtClean="0"/>
+              <a:t>extensa sobre </a:t>
+            </a:r>
+          </a:p>
+          <a:p>
+            <a:r>
+              <a:rPr lang="pt-BR" sz="2400" dirty="0" smtClean="0"/>
+              <a:t>como </a:t>
+            </a:r>
+            <a:r>
+              <a:rPr lang="pt-BR" sz="2400" dirty="0"/>
+              <a:t>desenvolver (ou gastar </a:t>
+            </a:r>
+            <a:r>
+              <a:rPr lang="pt-BR" sz="2400" dirty="0" smtClean="0"/>
+              <a:t>recursos resolvendo problemas</a:t>
+            </a:r>
+          </a:p>
+          <a:p>
+            <a:r>
+              <a:rPr lang="pt-BR" sz="2400" dirty="0" smtClean="0"/>
+              <a:t>de </a:t>
+            </a:r>
+            <a:r>
+              <a:rPr lang="pt-BR" sz="2400" dirty="0"/>
+              <a:t>usabilidade) </a:t>
+            </a:r>
+          </a:p>
+        </p:txBody>
+      </p:sp>
+      <p:sp>
+        <p:nvSpPr>
+          <p:cNvPr id="5" name="Retângulo 4"/>
+          <p:cNvSpPr/>
+          <p:nvPr/>
+        </p:nvSpPr>
+        <p:spPr>
+          <a:xfrm>
+            <a:off x="683568" y="1417638"/>
+            <a:ext cx="1760418" cy="523220"/>
+          </a:xfrm>
+          <a:prstGeom prst="rect">
+            <a:avLst/>
+          </a:prstGeom>
+        </p:spPr>
+        <p:txBody>
+          <a:bodyPr wrap="none">
+            <a:spAutoFit/>
+          </a:bodyPr>
+          <a:lstStyle/>
+          <a:p>
+            <a:r>
+              <a:rPr lang="pt-BR" sz="2800" b="1" dirty="0" err="1" smtClean="0"/>
+              <a:t>Guidelines</a:t>
+            </a:r>
+            <a:endParaRPr lang="pt-BR" sz="2800" b="1" dirty="0"/>
           </a:p>
         </p:txBody>
       </p:sp>
@@ -3986,7 +4046,7 @@
 </p:sld>
 </file>
 
-<file path=ppt/slides/slide14.xml><?xml version="1.0" encoding="utf-8"?>
+<file path=ppt/slides/slide13.xml><?xml version="1.0" encoding="utf-8"?>
 <p:sld xmlns:a="http://schemas.openxmlformats.org/drawingml/2006/main" xmlns:r="http://schemas.openxmlformats.org/officeDocument/2006/relationships" xmlns:p="http://schemas.openxmlformats.org/presentationml/2006/main">
   <p:cSld>
     <p:spTree>
@@ -4507,7 +4567,7 @@
         <p:spPr>
           <a:xfrm>
             <a:off x="0" y="1052736"/>
-            <a:ext cx="4419456" cy="931242"/>
+            <a:ext cx="8172400" cy="931242"/>
           </a:xfrm>
           <a:prstGeom prst="rect">
             <a:avLst/>
@@ -4519,10 +4579,12 @@
           </a:bodyPr>
           <a:lstStyle/>
           <a:p>
-            <a:pPr algn="ctr">
+            <a:pPr marL="342900" indent="-342900">
               <a:spcBef>
                 <a:spcPct val="0"/>
               </a:spcBef>
+              <a:buFont typeface="Arial" panose="020B0604020202020204" pitchFamily="34" charset="0"/>
+              <a:buChar char="•"/>
             </a:pPr>
             <a:r>
               <a:rPr lang="pt-BR" sz="2400" dirty="0">
@@ -4530,7 +4592,23 @@
                 <a:ea typeface="+mj-ea"/>
                 <a:cs typeface="+mj-cs"/>
               </a:rPr>
-              <a:t>Uma das Guideline usadas</a:t>
+              <a:t>Uma das </a:t>
+            </a:r>
+            <a:r>
+              <a:rPr lang="pt-BR" sz="2400" dirty="0" err="1" smtClean="0">
+                <a:latin typeface="+mj-lt"/>
+                <a:ea typeface="+mj-ea"/>
+                <a:cs typeface="+mj-cs"/>
+              </a:rPr>
+              <a:t>Guidelines</a:t>
+            </a:r>
+            <a:r>
+              <a:rPr lang="pt-BR" sz="2400" dirty="0" smtClean="0">
+                <a:latin typeface="+mj-lt"/>
+                <a:ea typeface="+mj-ea"/>
+                <a:cs typeface="+mj-cs"/>
+              </a:rPr>
+              <a:t> usadas no desenvolvimento</a:t>
             </a:r>
             <a:endParaRPr lang="pt-BR" sz="2400" dirty="0">
               <a:latin typeface="+mj-lt"/>
@@ -4544,6 +4622,129 @@
     <p:extLst>
       <p:ext uri="{BB962C8B-B14F-4D97-AF65-F5344CB8AC3E}">
         <p14:creationId xmlns:p14="http://schemas.microsoft.com/office/powerpoint/2010/main" val="956289708"/>
+      </p:ext>
+    </p:extLst>
+  </p:cSld>
+  <p:clrMapOvr>
+    <a:masterClrMapping/>
+  </p:clrMapOvr>
+  <p:timing>
+    <p:tnLst>
+      <p:par>
+        <p:cTn id="1" dur="indefinite" restart="never" nodeType="tmRoot"/>
+      </p:par>
+    </p:tnLst>
+  </p:timing>
+</p:sld>
+</file>
+
+<file path=ppt/slides/slide14.xml><?xml version="1.0" encoding="utf-8"?>
+<p:sld xmlns:a="http://schemas.openxmlformats.org/drawingml/2006/main" xmlns:r="http://schemas.openxmlformats.org/officeDocument/2006/relationships" xmlns:p="http://schemas.openxmlformats.org/presentationml/2006/main">
+  <p:cSld>
+    <p:spTree>
+      <p:nvGrpSpPr>
+        <p:cNvPr id="1" name=""/>
+        <p:cNvGrpSpPr/>
+        <p:nvPr/>
+      </p:nvGrpSpPr>
+      <p:grpSpPr>
+        <a:xfrm>
+          <a:off x="0" y="0"/>
+          <a:ext cx="0" cy="0"/>
+          <a:chOff x="0" y="0"/>
+          <a:chExt cx="0" cy="0"/>
+        </a:xfrm>
+      </p:grpSpPr>
+      <p:sp>
+        <p:nvSpPr>
+          <p:cNvPr id="2" name="Title 1"/>
+          <p:cNvSpPr>
+            <a:spLocks noGrp="1"/>
+          </p:cNvSpPr>
+          <p:nvPr>
+            <p:ph type="title"/>
+          </p:nvPr>
+        </p:nvSpPr>
+        <p:spPr/>
+        <p:txBody>
+          <a:bodyPr/>
+          <a:lstStyle/>
+          <a:p>
+            <a:r>
+              <a:rPr lang="pt-BR" dirty="0" smtClean="0"/>
+              <a:t>Interface do Usuário</a:t>
+            </a:r>
+            <a:endParaRPr lang="pt-BR" dirty="0"/>
+          </a:p>
+        </p:txBody>
+      </p:sp>
+      <p:sp>
+        <p:nvSpPr>
+          <p:cNvPr id="5" name="Retângulo 4"/>
+          <p:cNvSpPr/>
+          <p:nvPr/>
+        </p:nvSpPr>
+        <p:spPr>
+          <a:xfrm>
+            <a:off x="457200" y="1124744"/>
+            <a:ext cx="2339752" cy="461665"/>
+          </a:xfrm>
+          <a:prstGeom prst="rect">
+            <a:avLst/>
+          </a:prstGeom>
+        </p:spPr>
+        <p:txBody>
+          <a:bodyPr wrap="square">
+            <a:spAutoFit/>
+          </a:bodyPr>
+          <a:lstStyle/>
+          <a:p>
+            <a:r>
+              <a:rPr lang="pt-BR" sz="2400" b="1" dirty="0" smtClean="0"/>
+              <a:t>Visão </a:t>
+            </a:r>
+            <a:r>
+              <a:rPr lang="pt-BR" sz="2400" b="1" dirty="0" smtClean="0"/>
+              <a:t>Paciente</a:t>
+            </a:r>
+            <a:endParaRPr lang="pt-BR" sz="2800" b="1" dirty="0"/>
+          </a:p>
+        </p:txBody>
+      </p:sp>
+      <p:pic>
+        <p:nvPicPr>
+          <p:cNvPr id="7" name="Imagem 6"/>
+          <p:cNvPicPr>
+            <a:picLocks noChangeAspect="1"/>
+          </p:cNvPicPr>
+          <p:nvPr/>
+        </p:nvPicPr>
+        <p:blipFill>
+          <a:blip r:embed="rId2">
+            <a:extLst>
+              <a:ext uri="{28A0092B-C50C-407E-A947-70E740481C1C}">
+                <a14:useLocalDpi xmlns:a14="http://schemas.microsoft.com/office/drawing/2010/main" val="0"/>
+              </a:ext>
+            </a:extLst>
+          </a:blip>
+          <a:stretch>
+            <a:fillRect/>
+          </a:stretch>
+        </p:blipFill>
+        <p:spPr>
+          <a:xfrm>
+            <a:off x="1684330" y="1417638"/>
+            <a:ext cx="5775340" cy="5379769"/>
+          </a:xfrm>
+          <a:prstGeom prst="rect">
+            <a:avLst/>
+          </a:prstGeom>
+        </p:spPr>
+      </p:pic>
+    </p:spTree>
+    <p:extLst>
+      <p:ext uri="{BB962C8B-B14F-4D97-AF65-F5344CB8AC3E}">
+        <p14:creationId xmlns:p14="http://schemas.microsoft.com/office/powerpoint/2010/main" val="3768844573"/>
       </p:ext>
     </p:extLst>
   </p:cSld>
@@ -4602,7 +4803,7 @@
       </p:sp>
       <p:pic>
         <p:nvPicPr>
-          <p:cNvPr id="4" name="Imagem 3"/>
+          <p:cNvPr id="3" name="Imagem 2"/>
           <p:cNvPicPr>
             <a:picLocks noChangeAspect="1"/>
           </p:cNvPicPr>
@@ -4622,8 +4823,8 @@
         </p:blipFill>
         <p:spPr>
           <a:xfrm>
-            <a:off x="1292575" y="1124744"/>
-            <a:ext cx="6558849" cy="5105940"/>
+            <a:off x="1685064" y="1417638"/>
+            <a:ext cx="5773871" cy="5378400"/>
           </a:xfrm>
           <a:prstGeom prst="rect">
             <a:avLst/>
@@ -4632,14 +4833,14 @@
       </p:pic>
       <p:sp>
         <p:nvSpPr>
-          <p:cNvPr id="5" name="Retângulo 4"/>
+          <p:cNvPr id="6" name="Retângulo 5"/>
           <p:cNvSpPr/>
           <p:nvPr/>
         </p:nvSpPr>
         <p:spPr>
           <a:xfrm>
-            <a:off x="0" y="1217583"/>
-            <a:ext cx="1872208" cy="400110"/>
+            <a:off x="457200" y="1124744"/>
+            <a:ext cx="2339752" cy="461665"/>
           </a:xfrm>
           <a:prstGeom prst="rect">
             <a:avLst/>
@@ -4652,25 +4853,21 @@
           <a:lstStyle/>
           <a:p>
             <a:r>
-              <a:rPr lang="pt-BR" sz="2000" dirty="0" smtClean="0">
-                <a:solidFill>
-                  <a:srgbClr val="FF0000"/>
-                </a:solidFill>
-              </a:rPr>
-              <a:t>*Visão Paciente</a:t>
-            </a:r>
-            <a:endParaRPr lang="pt-BR" sz="2400" dirty="0">
-              <a:solidFill>
-                <a:srgbClr val="FF0000"/>
-              </a:solidFill>
-            </a:endParaRPr>
+              <a:rPr lang="pt-BR" sz="2400" b="1" dirty="0" smtClean="0"/>
+              <a:t>Visão </a:t>
+            </a:r>
+            <a:r>
+              <a:rPr lang="pt-BR" sz="2400" b="1" dirty="0" smtClean="0"/>
+              <a:t>Paciente</a:t>
+            </a:r>
+            <a:endParaRPr lang="pt-BR" sz="2800" b="1" dirty="0"/>
           </a:p>
         </p:txBody>
       </p:sp>
     </p:spTree>
     <p:extLst>
       <p:ext uri="{BB962C8B-B14F-4D97-AF65-F5344CB8AC3E}">
-        <p14:creationId xmlns:p14="http://schemas.microsoft.com/office/powerpoint/2010/main" val="3768844573"/>
+        <p14:creationId xmlns:p14="http://schemas.microsoft.com/office/powerpoint/2010/main" val="31999503"/>
       </p:ext>
     </p:extLst>
   </p:cSld>
@@ -4729,7 +4926,7 @@
       </p:sp>
       <p:pic>
         <p:nvPicPr>
-          <p:cNvPr id="3" name="Imagem 2"/>
+          <p:cNvPr id="6" name="Imagem 5"/>
           <p:cNvPicPr>
             <a:picLocks noChangeAspect="1"/>
           </p:cNvPicPr>
@@ -4749,8 +4946,8 @@
         </p:blipFill>
         <p:spPr>
           <a:xfrm>
-            <a:off x="1293307" y="1124744"/>
-            <a:ext cx="6557385" cy="5104800"/>
+            <a:off x="1685064" y="1417638"/>
+            <a:ext cx="5773871" cy="5378400"/>
           </a:xfrm>
           <a:prstGeom prst="rect">
             <a:avLst/>
@@ -4759,14 +4956,14 @@
       </p:pic>
       <p:sp>
         <p:nvSpPr>
-          <p:cNvPr id="5" name="Retângulo 4"/>
+          <p:cNvPr id="7" name="Retângulo 6"/>
           <p:cNvSpPr/>
           <p:nvPr/>
         </p:nvSpPr>
         <p:spPr>
           <a:xfrm>
-            <a:off x="0" y="1217583"/>
-            <a:ext cx="1872208" cy="400110"/>
+            <a:off x="457200" y="1124744"/>
+            <a:ext cx="2339752" cy="461665"/>
           </a:xfrm>
           <a:prstGeom prst="rect">
             <a:avLst/>
@@ -4779,25 +4976,21 @@
           <a:lstStyle/>
           <a:p>
             <a:r>
-              <a:rPr lang="pt-BR" sz="2000" dirty="0" smtClean="0">
-                <a:solidFill>
-                  <a:srgbClr val="FF0000"/>
-                </a:solidFill>
-              </a:rPr>
-              <a:t>*Visão Paciente</a:t>
-            </a:r>
-            <a:endParaRPr lang="pt-BR" sz="2400" dirty="0">
-              <a:solidFill>
-                <a:srgbClr val="FF0000"/>
-              </a:solidFill>
-            </a:endParaRPr>
+              <a:rPr lang="pt-BR" sz="2400" b="1" dirty="0" smtClean="0"/>
+              <a:t>Visão </a:t>
+            </a:r>
+            <a:r>
+              <a:rPr lang="pt-BR" sz="2400" b="1" dirty="0" smtClean="0"/>
+              <a:t>Paciente</a:t>
+            </a:r>
+            <a:endParaRPr lang="pt-BR" sz="2800" b="1" dirty="0"/>
           </a:p>
         </p:txBody>
       </p:sp>
     </p:spTree>
     <p:extLst>
       <p:ext uri="{BB962C8B-B14F-4D97-AF65-F5344CB8AC3E}">
-        <p14:creationId xmlns:p14="http://schemas.microsoft.com/office/powerpoint/2010/main" val="3573421326"/>
+        <p14:creationId xmlns:p14="http://schemas.microsoft.com/office/powerpoint/2010/main" val="645901081"/>
       </p:ext>
     </p:extLst>
   </p:cSld>
@@ -4856,7 +5049,7 @@
       </p:sp>
       <p:pic>
         <p:nvPicPr>
-          <p:cNvPr id="4" name="Imagem 3"/>
+          <p:cNvPr id="6" name="Imagem 5"/>
           <p:cNvPicPr>
             <a:picLocks noChangeAspect="1"/>
           </p:cNvPicPr>
@@ -4876,8 +5069,8 @@
         </p:blipFill>
         <p:spPr>
           <a:xfrm>
-            <a:off x="1293307" y="1124744"/>
-            <a:ext cx="6557385" cy="5104800"/>
+            <a:off x="1685064" y="1417638"/>
+            <a:ext cx="5773871" cy="5378400"/>
           </a:xfrm>
           <a:prstGeom prst="rect">
             <a:avLst/>
@@ -4886,14 +5079,14 @@
       </p:pic>
       <p:sp>
         <p:nvSpPr>
-          <p:cNvPr id="5" name="Retângulo 4"/>
+          <p:cNvPr id="7" name="Retângulo 6"/>
           <p:cNvSpPr/>
           <p:nvPr/>
         </p:nvSpPr>
         <p:spPr>
           <a:xfrm>
-            <a:off x="0" y="1217583"/>
-            <a:ext cx="1872208" cy="400110"/>
+            <a:off x="457200" y="1124744"/>
+            <a:ext cx="2339752" cy="461665"/>
           </a:xfrm>
           <a:prstGeom prst="rect">
             <a:avLst/>
@@ -4906,25 +5099,21 @@
           <a:lstStyle/>
           <a:p>
             <a:r>
-              <a:rPr lang="pt-BR" sz="2000" dirty="0" smtClean="0">
-                <a:solidFill>
-                  <a:srgbClr val="FF0000"/>
-                </a:solidFill>
-              </a:rPr>
-              <a:t>*Visão Paciente</a:t>
-            </a:r>
-            <a:endParaRPr lang="pt-BR" sz="2400" dirty="0">
-              <a:solidFill>
-                <a:srgbClr val="FF0000"/>
-              </a:solidFill>
-            </a:endParaRPr>
+              <a:rPr lang="pt-BR" sz="2400" b="1" dirty="0" smtClean="0"/>
+              <a:t>Visão </a:t>
+            </a:r>
+            <a:r>
+              <a:rPr lang="pt-BR" sz="2400" b="1" dirty="0" smtClean="0"/>
+              <a:t>Paciente</a:t>
+            </a:r>
+            <a:endParaRPr lang="pt-BR" sz="2800" b="1" dirty="0"/>
           </a:p>
         </p:txBody>
       </p:sp>
     </p:spTree>
     <p:extLst>
       <p:ext uri="{BB962C8B-B14F-4D97-AF65-F5344CB8AC3E}">
-        <p14:creationId xmlns:p14="http://schemas.microsoft.com/office/powerpoint/2010/main" val="2342771231"/>
+        <p14:creationId xmlns:p14="http://schemas.microsoft.com/office/powerpoint/2010/main" val="1550595444"/>
       </p:ext>
     </p:extLst>
   </p:cSld>
@@ -4983,7 +5172,7 @@
       </p:sp>
       <p:pic>
         <p:nvPicPr>
-          <p:cNvPr id="3" name="Imagem 2"/>
+          <p:cNvPr id="4" name="Imagem 3"/>
           <p:cNvPicPr>
             <a:picLocks noChangeAspect="1"/>
           </p:cNvPicPr>
@@ -5003,8 +5192,8 @@
         </p:blipFill>
         <p:spPr>
           <a:xfrm>
-            <a:off x="1293307" y="1124744"/>
-            <a:ext cx="6557385" cy="5104800"/>
+            <a:off x="1685064" y="1417638"/>
+            <a:ext cx="5773871" cy="5378400"/>
           </a:xfrm>
           <a:prstGeom prst="rect">
             <a:avLst/>
@@ -5013,14 +5202,14 @@
       </p:pic>
       <p:sp>
         <p:nvSpPr>
-          <p:cNvPr id="5" name="Retângulo 4"/>
+          <p:cNvPr id="6" name="Retângulo 5"/>
           <p:cNvSpPr/>
           <p:nvPr/>
         </p:nvSpPr>
         <p:spPr>
           <a:xfrm>
-            <a:off x="0" y="1217583"/>
-            <a:ext cx="1872208" cy="400110"/>
+            <a:off x="457200" y="1124744"/>
+            <a:ext cx="2339752" cy="461665"/>
           </a:xfrm>
           <a:prstGeom prst="rect">
             <a:avLst/>
@@ -5033,25 +5222,21 @@
           <a:lstStyle/>
           <a:p>
             <a:r>
-              <a:rPr lang="pt-BR" sz="2000" dirty="0" smtClean="0">
-                <a:solidFill>
-                  <a:srgbClr val="FF0000"/>
-                </a:solidFill>
-              </a:rPr>
-              <a:t>*Visão Paciente</a:t>
-            </a:r>
-            <a:endParaRPr lang="pt-BR" sz="2400" dirty="0">
-              <a:solidFill>
-                <a:srgbClr val="FF0000"/>
-              </a:solidFill>
-            </a:endParaRPr>
+              <a:rPr lang="pt-BR" sz="2400" b="1" dirty="0" smtClean="0"/>
+              <a:t>Visão </a:t>
+            </a:r>
+            <a:r>
+              <a:rPr lang="pt-BR" sz="2400" b="1" dirty="0" smtClean="0"/>
+              <a:t>Paciente</a:t>
+            </a:r>
+            <a:endParaRPr lang="pt-BR" sz="2800" b="1" dirty="0"/>
           </a:p>
         </p:txBody>
       </p:sp>
     </p:spTree>
     <p:extLst>
       <p:ext uri="{BB962C8B-B14F-4D97-AF65-F5344CB8AC3E}">
-        <p14:creationId xmlns:p14="http://schemas.microsoft.com/office/powerpoint/2010/main" val="3781886261"/>
+        <p14:creationId xmlns:p14="http://schemas.microsoft.com/office/powerpoint/2010/main" val="3086328501"/>
       </p:ext>
     </p:extLst>
   </p:cSld>
@@ -5110,7 +5295,7 @@
       </p:sp>
       <p:pic>
         <p:nvPicPr>
-          <p:cNvPr id="4" name="Imagem 3"/>
+          <p:cNvPr id="3" name="Imagem 2"/>
           <p:cNvPicPr>
             <a:picLocks noChangeAspect="1"/>
           </p:cNvPicPr>
@@ -5130,8 +5315,8 @@
         </p:blipFill>
         <p:spPr>
           <a:xfrm>
-            <a:off x="1293307" y="1124744"/>
-            <a:ext cx="6557385" cy="5104800"/>
+            <a:off x="1685064" y="1417638"/>
+            <a:ext cx="5773871" cy="5378400"/>
           </a:xfrm>
           <a:prstGeom prst="rect">
             <a:avLst/>
@@ -5140,14 +5325,14 @@
       </p:pic>
       <p:sp>
         <p:nvSpPr>
-          <p:cNvPr id="5" name="Retângulo 4"/>
+          <p:cNvPr id="6" name="Retângulo 5"/>
           <p:cNvSpPr/>
           <p:nvPr/>
         </p:nvSpPr>
         <p:spPr>
           <a:xfrm>
-            <a:off x="0" y="1217583"/>
-            <a:ext cx="1872208" cy="400110"/>
+            <a:off x="457200" y="1124744"/>
+            <a:ext cx="2339752" cy="461665"/>
           </a:xfrm>
           <a:prstGeom prst="rect">
             <a:avLst/>
@@ -5160,25 +5345,21 @@
           <a:lstStyle/>
           <a:p>
             <a:r>
-              <a:rPr lang="pt-BR" sz="2000" dirty="0" smtClean="0">
-                <a:solidFill>
-                  <a:srgbClr val="FF0000"/>
-                </a:solidFill>
-              </a:rPr>
-              <a:t>*Visão Paciente</a:t>
-            </a:r>
-            <a:endParaRPr lang="pt-BR" sz="2400" dirty="0">
-              <a:solidFill>
-                <a:srgbClr val="FF0000"/>
-              </a:solidFill>
-            </a:endParaRPr>
+              <a:rPr lang="pt-BR" sz="2400" b="1" dirty="0" smtClean="0"/>
+              <a:t>Visão </a:t>
+            </a:r>
+            <a:r>
+              <a:rPr lang="pt-BR" sz="2400" b="1" dirty="0" smtClean="0"/>
+              <a:t>Paciente</a:t>
+            </a:r>
+            <a:endParaRPr lang="pt-BR" sz="2800" b="1" dirty="0"/>
           </a:p>
         </p:txBody>
       </p:sp>
     </p:spTree>
     <p:extLst>
       <p:ext uri="{BB962C8B-B14F-4D97-AF65-F5344CB8AC3E}">
-        <p14:creationId xmlns:p14="http://schemas.microsoft.com/office/powerpoint/2010/main" val="193298628"/>
+        <p14:creationId xmlns:p14="http://schemas.microsoft.com/office/powerpoint/2010/main" val="1659953475"/>
       </p:ext>
     </p:extLst>
   </p:cSld>
@@ -5339,7 +5520,7 @@
       </p:sp>
       <p:pic>
         <p:nvPicPr>
-          <p:cNvPr id="3" name="Imagem 2"/>
+          <p:cNvPr id="4" name="Imagem 3"/>
           <p:cNvPicPr>
             <a:picLocks noChangeAspect="1"/>
           </p:cNvPicPr>
@@ -5359,8 +5540,8 @@
         </p:blipFill>
         <p:spPr>
           <a:xfrm>
-            <a:off x="1293307" y="1124744"/>
-            <a:ext cx="6557385" cy="5104800"/>
+            <a:off x="1685064" y="1417638"/>
+            <a:ext cx="5773871" cy="5378400"/>
           </a:xfrm>
           <a:prstGeom prst="rect">
             <a:avLst/>
@@ -5369,14 +5550,14 @@
       </p:pic>
       <p:sp>
         <p:nvSpPr>
-          <p:cNvPr id="5" name="Retângulo 4"/>
+          <p:cNvPr id="6" name="Retângulo 5"/>
           <p:cNvSpPr/>
           <p:nvPr/>
         </p:nvSpPr>
         <p:spPr>
           <a:xfrm>
-            <a:off x="0" y="1217583"/>
-            <a:ext cx="1872208" cy="400110"/>
+            <a:off x="457200" y="1124744"/>
+            <a:ext cx="2339752" cy="461665"/>
           </a:xfrm>
           <a:prstGeom prst="rect">
             <a:avLst/>
@@ -5389,25 +5570,21 @@
           <a:lstStyle/>
           <a:p>
             <a:r>
-              <a:rPr lang="pt-BR" sz="2000" dirty="0" smtClean="0">
-                <a:solidFill>
-                  <a:srgbClr val="FF0000"/>
-                </a:solidFill>
-              </a:rPr>
-              <a:t>*Visão Paciente</a:t>
-            </a:r>
-            <a:endParaRPr lang="pt-BR" sz="2400" dirty="0">
-              <a:solidFill>
-                <a:srgbClr val="FF0000"/>
-              </a:solidFill>
-            </a:endParaRPr>
+              <a:rPr lang="pt-BR" sz="2400" b="1" dirty="0" smtClean="0"/>
+              <a:t>Visão </a:t>
+            </a:r>
+            <a:r>
+              <a:rPr lang="pt-BR" sz="2400" b="1" dirty="0" smtClean="0"/>
+              <a:t>Paciente</a:t>
+            </a:r>
+            <a:endParaRPr lang="pt-BR" sz="2800" b="1" dirty="0"/>
           </a:p>
         </p:txBody>
       </p:sp>
     </p:spTree>
     <p:extLst>
       <p:ext uri="{BB962C8B-B14F-4D97-AF65-F5344CB8AC3E}">
-        <p14:creationId xmlns:p14="http://schemas.microsoft.com/office/powerpoint/2010/main" val="2235056424"/>
+        <p14:creationId xmlns:p14="http://schemas.microsoft.com/office/powerpoint/2010/main" val="2722380437"/>
       </p:ext>
     </p:extLst>
   </p:cSld>
@@ -5466,7 +5643,7 @@
       </p:sp>
       <p:pic>
         <p:nvPicPr>
-          <p:cNvPr id="4" name="Imagem 3"/>
+          <p:cNvPr id="3" name="Imagem 2"/>
           <p:cNvPicPr>
             <a:picLocks noChangeAspect="1"/>
           </p:cNvPicPr>
@@ -5486,8 +5663,8 @@
         </p:blipFill>
         <p:spPr>
           <a:xfrm>
-            <a:off x="1293307" y="1124744"/>
-            <a:ext cx="6557385" cy="5104800"/>
+            <a:off x="1685064" y="1417638"/>
+            <a:ext cx="5773871" cy="5378400"/>
           </a:xfrm>
           <a:prstGeom prst="rect">
             <a:avLst/>
@@ -5496,14 +5673,14 @@
       </p:pic>
       <p:sp>
         <p:nvSpPr>
-          <p:cNvPr id="6" name="Retângulo 5"/>
+          <p:cNvPr id="7" name="Retângulo 6"/>
           <p:cNvSpPr/>
           <p:nvPr/>
         </p:nvSpPr>
         <p:spPr>
           <a:xfrm>
-            <a:off x="0" y="1217583"/>
-            <a:ext cx="1872208" cy="400110"/>
+            <a:off x="457200" y="1124744"/>
+            <a:ext cx="2339752" cy="461665"/>
           </a:xfrm>
           <a:prstGeom prst="rect">
             <a:avLst/>
@@ -5516,25 +5693,17 @@
           <a:lstStyle/>
           <a:p>
             <a:r>
-              <a:rPr lang="pt-BR" sz="2000" dirty="0" smtClean="0">
-                <a:solidFill>
-                  <a:srgbClr val="FF0000"/>
-                </a:solidFill>
-              </a:rPr>
-              <a:t>*Visão Gestor</a:t>
-            </a:r>
-            <a:endParaRPr lang="pt-BR" sz="2400" dirty="0">
-              <a:solidFill>
-                <a:srgbClr val="FF0000"/>
-              </a:solidFill>
-            </a:endParaRPr>
+              <a:rPr lang="pt-BR" sz="2400" b="1" dirty="0" smtClean="0"/>
+              <a:t>Visão Gestor</a:t>
+            </a:r>
+            <a:endParaRPr lang="pt-BR" sz="2800" b="1" dirty="0"/>
           </a:p>
         </p:txBody>
       </p:sp>
     </p:spTree>
     <p:extLst>
       <p:ext uri="{BB962C8B-B14F-4D97-AF65-F5344CB8AC3E}">
-        <p14:creationId xmlns:p14="http://schemas.microsoft.com/office/powerpoint/2010/main" val="3316813918"/>
+        <p14:creationId xmlns:p14="http://schemas.microsoft.com/office/powerpoint/2010/main" val="3360585226"/>
       </p:ext>
     </p:extLst>
   </p:cSld>
@@ -5593,7 +5762,7 @@
       </p:sp>
       <p:pic>
         <p:nvPicPr>
-          <p:cNvPr id="3" name="Imagem 2"/>
+          <p:cNvPr id="4" name="Imagem 3"/>
           <p:cNvPicPr>
             <a:picLocks noChangeAspect="1"/>
           </p:cNvPicPr>
@@ -5613,8 +5782,8 @@
         </p:blipFill>
         <p:spPr>
           <a:xfrm>
-            <a:off x="1293307" y="1124744"/>
-            <a:ext cx="6557385" cy="5104800"/>
+            <a:off x="1685064" y="1417638"/>
+            <a:ext cx="5773871" cy="5378400"/>
           </a:xfrm>
           <a:prstGeom prst="rect">
             <a:avLst/>
@@ -5629,8 +5798,8 @@
         </p:nvSpPr>
         <p:spPr>
           <a:xfrm>
-            <a:off x="0" y="1217583"/>
-            <a:ext cx="1872208" cy="400110"/>
+            <a:off x="457200" y="1124744"/>
+            <a:ext cx="2339752" cy="461665"/>
           </a:xfrm>
           <a:prstGeom prst="rect">
             <a:avLst/>
@@ -5643,25 +5812,17 @@
           <a:lstStyle/>
           <a:p>
             <a:r>
-              <a:rPr lang="pt-BR" sz="2000" dirty="0" smtClean="0">
-                <a:solidFill>
-                  <a:srgbClr val="FF0000"/>
-                </a:solidFill>
-              </a:rPr>
-              <a:t>*Visão Gestor</a:t>
-            </a:r>
-            <a:endParaRPr lang="pt-BR" sz="2400" dirty="0">
-              <a:solidFill>
-                <a:srgbClr val="FF0000"/>
-              </a:solidFill>
-            </a:endParaRPr>
+              <a:rPr lang="pt-BR" sz="2400" b="1" dirty="0" smtClean="0"/>
+              <a:t>Visão Gestor</a:t>
+            </a:r>
+            <a:endParaRPr lang="pt-BR" sz="2800" b="1" dirty="0"/>
           </a:p>
         </p:txBody>
       </p:sp>
     </p:spTree>
     <p:extLst>
       <p:ext uri="{BB962C8B-B14F-4D97-AF65-F5344CB8AC3E}">
-        <p14:creationId xmlns:p14="http://schemas.microsoft.com/office/powerpoint/2010/main" val="576134621"/>
+        <p14:creationId xmlns:p14="http://schemas.microsoft.com/office/powerpoint/2010/main" val="3898225197"/>
       </p:ext>
     </p:extLst>
   </p:cSld>
@@ -5720,7 +5881,7 @@
       </p:sp>
       <p:pic>
         <p:nvPicPr>
-          <p:cNvPr id="4" name="Imagem 3"/>
+          <p:cNvPr id="6" name="Imagem 5"/>
           <p:cNvPicPr>
             <a:picLocks noChangeAspect="1"/>
           </p:cNvPicPr>
@@ -5740,8 +5901,8 @@
         </p:blipFill>
         <p:spPr>
           <a:xfrm>
-            <a:off x="1293307" y="1124744"/>
-            <a:ext cx="6557385" cy="5104800"/>
+            <a:off x="1685064" y="1417638"/>
+            <a:ext cx="5773871" cy="5378400"/>
           </a:xfrm>
           <a:prstGeom prst="rect">
             <a:avLst/>
@@ -5750,14 +5911,14 @@
       </p:pic>
       <p:sp>
         <p:nvSpPr>
-          <p:cNvPr id="5" name="Retângulo 4"/>
+          <p:cNvPr id="7" name="Retângulo 6"/>
           <p:cNvSpPr/>
           <p:nvPr/>
         </p:nvSpPr>
         <p:spPr>
           <a:xfrm>
-            <a:off x="0" y="1217583"/>
-            <a:ext cx="1872208" cy="400110"/>
+            <a:off x="457200" y="1124744"/>
+            <a:ext cx="2339752" cy="461665"/>
           </a:xfrm>
           <a:prstGeom prst="rect">
             <a:avLst/>
@@ -5770,25 +5931,17 @@
           <a:lstStyle/>
           <a:p>
             <a:r>
-              <a:rPr lang="pt-BR" sz="2000" dirty="0" smtClean="0">
-                <a:solidFill>
-                  <a:srgbClr val="FF0000"/>
-                </a:solidFill>
-              </a:rPr>
-              <a:t>*Visão Gestor</a:t>
-            </a:r>
-            <a:endParaRPr lang="pt-BR" sz="2400" dirty="0">
-              <a:solidFill>
-                <a:srgbClr val="FF0000"/>
-              </a:solidFill>
-            </a:endParaRPr>
+              <a:rPr lang="pt-BR" sz="2400" b="1" dirty="0" smtClean="0"/>
+              <a:t>Visão Gestor</a:t>
+            </a:r>
+            <a:endParaRPr lang="pt-BR" sz="2800" b="1" dirty="0"/>
           </a:p>
         </p:txBody>
       </p:sp>
     </p:spTree>
     <p:extLst>
       <p:ext uri="{BB962C8B-B14F-4D97-AF65-F5344CB8AC3E}">
-        <p14:creationId xmlns:p14="http://schemas.microsoft.com/office/powerpoint/2010/main" val="2122406983"/>
+        <p14:creationId xmlns:p14="http://schemas.microsoft.com/office/powerpoint/2010/main" val="2208741740"/>
       </p:ext>
     </p:extLst>
   </p:cSld>
@@ -5867,8 +6020,8 @@
         </p:blipFill>
         <p:spPr>
           <a:xfrm>
-            <a:off x="1293307" y="1124744"/>
-            <a:ext cx="6557385" cy="5104800"/>
+            <a:off x="1685064" y="1415853"/>
+            <a:ext cx="5773871" cy="5378400"/>
           </a:xfrm>
           <a:prstGeom prst="rect">
             <a:avLst/>
@@ -5877,14 +6030,14 @@
       </p:pic>
       <p:sp>
         <p:nvSpPr>
-          <p:cNvPr id="5" name="Retângulo 4"/>
+          <p:cNvPr id="7" name="Retângulo 6"/>
           <p:cNvSpPr/>
           <p:nvPr/>
         </p:nvSpPr>
         <p:spPr>
           <a:xfrm>
-            <a:off x="0" y="1217583"/>
-            <a:ext cx="1872208" cy="400110"/>
+            <a:off x="457200" y="1124744"/>
+            <a:ext cx="2339752" cy="461665"/>
           </a:xfrm>
           <a:prstGeom prst="rect">
             <a:avLst/>
@@ -5897,25 +6050,17 @@
           <a:lstStyle/>
           <a:p>
             <a:r>
-              <a:rPr lang="pt-BR" sz="2000" dirty="0" smtClean="0">
-                <a:solidFill>
-                  <a:srgbClr val="FF0000"/>
-                </a:solidFill>
-              </a:rPr>
-              <a:t>*Visão Gestor</a:t>
-            </a:r>
-            <a:endParaRPr lang="pt-BR" sz="2400" dirty="0">
-              <a:solidFill>
-                <a:srgbClr val="FF0000"/>
-              </a:solidFill>
-            </a:endParaRPr>
+              <a:rPr lang="pt-BR" sz="2400" b="1" dirty="0" smtClean="0"/>
+              <a:t>Visão Gestor</a:t>
+            </a:r>
+            <a:endParaRPr lang="pt-BR" sz="2800" b="1" dirty="0"/>
           </a:p>
         </p:txBody>
       </p:sp>
     </p:spTree>
     <p:extLst>
       <p:ext uri="{BB962C8B-B14F-4D97-AF65-F5344CB8AC3E}">
-        <p14:creationId xmlns:p14="http://schemas.microsoft.com/office/powerpoint/2010/main" val="2598367640"/>
+        <p14:creationId xmlns:p14="http://schemas.microsoft.com/office/powerpoint/2010/main" val="2577867764"/>
       </p:ext>
     </p:extLst>
   </p:cSld>
@@ -5994,8 +6139,8 @@
         </p:blipFill>
         <p:spPr>
           <a:xfrm>
-            <a:off x="1293307" y="1124744"/>
-            <a:ext cx="6557385" cy="5104800"/>
+            <a:off x="1685064" y="1417638"/>
+            <a:ext cx="5773871" cy="5378400"/>
           </a:xfrm>
           <a:prstGeom prst="rect">
             <a:avLst/>
@@ -6004,14 +6149,14 @@
       </p:pic>
       <p:sp>
         <p:nvSpPr>
-          <p:cNvPr id="5" name="Retângulo 4"/>
+          <p:cNvPr id="7" name="Retângulo 6"/>
           <p:cNvSpPr/>
           <p:nvPr/>
         </p:nvSpPr>
         <p:spPr>
           <a:xfrm>
-            <a:off x="0" y="1217583"/>
-            <a:ext cx="1872208" cy="400110"/>
+            <a:off x="457200" y="1124744"/>
+            <a:ext cx="2339752" cy="461665"/>
           </a:xfrm>
           <a:prstGeom prst="rect">
             <a:avLst/>
@@ -6024,25 +6169,17 @@
           <a:lstStyle/>
           <a:p>
             <a:r>
-              <a:rPr lang="pt-BR" sz="2000" dirty="0" smtClean="0">
-                <a:solidFill>
-                  <a:srgbClr val="FF0000"/>
-                </a:solidFill>
-              </a:rPr>
-              <a:t>*Visão Gestor</a:t>
-            </a:r>
-            <a:endParaRPr lang="pt-BR" sz="2400" dirty="0">
-              <a:solidFill>
-                <a:srgbClr val="FF0000"/>
-              </a:solidFill>
-            </a:endParaRPr>
+              <a:rPr lang="pt-BR" sz="2400" b="1" dirty="0" smtClean="0"/>
+              <a:t>Visão Gestor</a:t>
+            </a:r>
+            <a:endParaRPr lang="pt-BR" sz="2800" b="1" dirty="0"/>
           </a:p>
         </p:txBody>
       </p:sp>
     </p:spTree>
     <p:extLst>
       <p:ext uri="{BB962C8B-B14F-4D97-AF65-F5344CB8AC3E}">
-        <p14:creationId xmlns:p14="http://schemas.microsoft.com/office/powerpoint/2010/main" val="2510664707"/>
+        <p14:creationId xmlns:p14="http://schemas.microsoft.com/office/powerpoint/2010/main" val="3815602828"/>
       </p:ext>
     </p:extLst>
   </p:cSld>
@@ -6121,8 +6258,8 @@
         </p:blipFill>
         <p:spPr>
           <a:xfrm>
-            <a:off x="1293307" y="1124744"/>
-            <a:ext cx="6557385" cy="5104800"/>
+            <a:off x="1685064" y="1417638"/>
+            <a:ext cx="5773871" cy="5378400"/>
           </a:xfrm>
           <a:prstGeom prst="rect">
             <a:avLst/>
@@ -6131,14 +6268,14 @@
       </p:pic>
       <p:sp>
         <p:nvSpPr>
-          <p:cNvPr id="5" name="Retângulo 4"/>
+          <p:cNvPr id="7" name="Retângulo 6"/>
           <p:cNvSpPr/>
           <p:nvPr/>
         </p:nvSpPr>
         <p:spPr>
           <a:xfrm>
-            <a:off x="0" y="1217583"/>
-            <a:ext cx="1872208" cy="400110"/>
+            <a:off x="457200" y="1124744"/>
+            <a:ext cx="2339752" cy="461665"/>
           </a:xfrm>
           <a:prstGeom prst="rect">
             <a:avLst/>
@@ -6151,25 +6288,17 @@
           <a:lstStyle/>
           <a:p>
             <a:r>
-              <a:rPr lang="pt-BR" sz="2000" dirty="0" smtClean="0">
-                <a:solidFill>
-                  <a:srgbClr val="FF0000"/>
-                </a:solidFill>
-              </a:rPr>
-              <a:t>*Visão Gestor</a:t>
-            </a:r>
-            <a:endParaRPr lang="pt-BR" sz="2400" dirty="0">
-              <a:solidFill>
-                <a:srgbClr val="FF0000"/>
-              </a:solidFill>
-            </a:endParaRPr>
+              <a:rPr lang="pt-BR" sz="2400" b="1" dirty="0" smtClean="0"/>
+              <a:t>Visão Gestor</a:t>
+            </a:r>
+            <a:endParaRPr lang="pt-BR" sz="2800" b="1" dirty="0"/>
           </a:p>
         </p:txBody>
       </p:sp>
     </p:spTree>
     <p:extLst>
       <p:ext uri="{BB962C8B-B14F-4D97-AF65-F5344CB8AC3E}">
-        <p14:creationId xmlns:p14="http://schemas.microsoft.com/office/powerpoint/2010/main" val="3784726794"/>
+        <p14:creationId xmlns:p14="http://schemas.microsoft.com/office/powerpoint/2010/main" val="218998157"/>
       </p:ext>
     </p:extLst>
   </p:cSld>
@@ -6228,7 +6357,7 @@
       </p:sp>
       <p:pic>
         <p:nvPicPr>
-          <p:cNvPr id="5" name="Imagem 4"/>
+          <p:cNvPr id="4" name="Imagem 3"/>
           <p:cNvPicPr>
             <a:picLocks noChangeAspect="1"/>
           </p:cNvPicPr>
@@ -6248,8 +6377,8 @@
         </p:blipFill>
         <p:spPr>
           <a:xfrm>
-            <a:off x="1293307" y="1124744"/>
-            <a:ext cx="6557385" cy="5104800"/>
+            <a:off x="1685064" y="1417638"/>
+            <a:ext cx="5773871" cy="5378400"/>
           </a:xfrm>
           <a:prstGeom prst="rect">
             <a:avLst/>
@@ -6264,8 +6393,8 @@
         </p:nvSpPr>
         <p:spPr>
           <a:xfrm>
-            <a:off x="0" y="1217583"/>
-            <a:ext cx="1872208" cy="400110"/>
+            <a:off x="457200" y="1124744"/>
+            <a:ext cx="2339752" cy="461665"/>
           </a:xfrm>
           <a:prstGeom prst="rect">
             <a:avLst/>
@@ -6278,25 +6407,17 @@
           <a:lstStyle/>
           <a:p>
             <a:r>
-              <a:rPr lang="pt-BR" sz="2000" dirty="0" smtClean="0">
-                <a:solidFill>
-                  <a:srgbClr val="FF0000"/>
-                </a:solidFill>
-              </a:rPr>
-              <a:t>*Visão Gestor</a:t>
-            </a:r>
-            <a:endParaRPr lang="pt-BR" sz="2400" dirty="0">
-              <a:solidFill>
-                <a:srgbClr val="FF0000"/>
-              </a:solidFill>
-            </a:endParaRPr>
+              <a:rPr lang="pt-BR" sz="2400" b="1" dirty="0" smtClean="0"/>
+              <a:t>Visão ADM</a:t>
+            </a:r>
+            <a:endParaRPr lang="pt-BR" sz="2800" b="1" dirty="0"/>
           </a:p>
         </p:txBody>
       </p:sp>
     </p:spTree>
     <p:extLst>
       <p:ext uri="{BB962C8B-B14F-4D97-AF65-F5344CB8AC3E}">
-        <p14:creationId xmlns:p14="http://schemas.microsoft.com/office/powerpoint/2010/main" val="2428608338"/>
+        <p14:creationId xmlns:p14="http://schemas.microsoft.com/office/powerpoint/2010/main" val="1625161018"/>
       </p:ext>
     </p:extLst>
   </p:cSld>
@@ -6355,7 +6476,7 @@
       </p:sp>
       <p:pic>
         <p:nvPicPr>
-          <p:cNvPr id="5" name="Imagem 4"/>
+          <p:cNvPr id="3" name="Imagem 2"/>
           <p:cNvPicPr>
             <a:picLocks noChangeAspect="1"/>
           </p:cNvPicPr>
@@ -6375,8 +6496,8 @@
         </p:blipFill>
         <p:spPr>
           <a:xfrm>
-            <a:off x="1293307" y="1124744"/>
-            <a:ext cx="6557385" cy="5104800"/>
+            <a:off x="1685064" y="1417638"/>
+            <a:ext cx="5773871" cy="5378400"/>
           </a:xfrm>
           <a:prstGeom prst="rect">
             <a:avLst/>
@@ -6385,14 +6506,14 @@
       </p:pic>
       <p:sp>
         <p:nvSpPr>
-          <p:cNvPr id="6" name="Retângulo 5"/>
+          <p:cNvPr id="7" name="Retângulo 6"/>
           <p:cNvSpPr/>
           <p:nvPr/>
         </p:nvSpPr>
         <p:spPr>
           <a:xfrm>
-            <a:off x="0" y="1217583"/>
-            <a:ext cx="1872208" cy="400110"/>
+            <a:off x="457200" y="1124744"/>
+            <a:ext cx="2339752" cy="461665"/>
           </a:xfrm>
           <a:prstGeom prst="rect">
             <a:avLst/>
@@ -6405,25 +6526,17 @@
           <a:lstStyle/>
           <a:p>
             <a:r>
-              <a:rPr lang="pt-BR" sz="2000" dirty="0" smtClean="0">
-                <a:solidFill>
-                  <a:srgbClr val="FF0000"/>
-                </a:solidFill>
-              </a:rPr>
-              <a:t>*Visão Gestor</a:t>
-            </a:r>
-            <a:endParaRPr lang="pt-BR" sz="2400" dirty="0">
-              <a:solidFill>
-                <a:srgbClr val="FF0000"/>
-              </a:solidFill>
-            </a:endParaRPr>
+              <a:rPr lang="pt-BR" sz="2400" b="1" dirty="0" smtClean="0"/>
+              <a:t>Visão ADM</a:t>
+            </a:r>
+            <a:endParaRPr lang="pt-BR" sz="2800" b="1" dirty="0"/>
           </a:p>
         </p:txBody>
       </p:sp>
     </p:spTree>
     <p:extLst>
       <p:ext uri="{BB962C8B-B14F-4D97-AF65-F5344CB8AC3E}">
-        <p14:creationId xmlns:p14="http://schemas.microsoft.com/office/powerpoint/2010/main" val="172973721"/>
+        <p14:creationId xmlns:p14="http://schemas.microsoft.com/office/powerpoint/2010/main" val="889633162"/>
       </p:ext>
     </p:extLst>
   </p:cSld>
@@ -6502,8 +6615,8 @@
         </p:blipFill>
         <p:spPr>
           <a:xfrm>
-            <a:off x="1293307" y="1124744"/>
-            <a:ext cx="6557385" cy="5104800"/>
+            <a:off x="1297947" y="1196752"/>
+            <a:ext cx="6548106" cy="5104800"/>
           </a:xfrm>
           <a:prstGeom prst="rect">
             <a:avLst/>
@@ -6512,14 +6625,14 @@
       </p:pic>
       <p:sp>
         <p:nvSpPr>
-          <p:cNvPr id="9" name="Retângulo 8"/>
+          <p:cNvPr id="6" name="Retângulo 5"/>
           <p:cNvSpPr/>
           <p:nvPr/>
         </p:nvSpPr>
         <p:spPr>
           <a:xfrm>
-            <a:off x="0" y="1217583"/>
-            <a:ext cx="1872208" cy="400110"/>
+            <a:off x="72008" y="1052736"/>
+            <a:ext cx="2339752" cy="461665"/>
           </a:xfrm>
           <a:prstGeom prst="rect">
             <a:avLst/>
@@ -6532,25 +6645,17 @@
           <a:lstStyle/>
           <a:p>
             <a:r>
-              <a:rPr lang="pt-BR" sz="2000" dirty="0" smtClean="0">
-                <a:solidFill>
-                  <a:srgbClr val="FF0000"/>
-                </a:solidFill>
-              </a:rPr>
-              <a:t>*Visão ADM</a:t>
-            </a:r>
-            <a:endParaRPr lang="pt-BR" sz="2400" dirty="0">
-              <a:solidFill>
-                <a:srgbClr val="FF0000"/>
-              </a:solidFill>
-            </a:endParaRPr>
+              <a:rPr lang="pt-BR" sz="2400" b="1" dirty="0" smtClean="0"/>
+              <a:t>Visão Paciente</a:t>
+            </a:r>
+            <a:endParaRPr lang="pt-BR" sz="2800" b="1" dirty="0"/>
           </a:p>
         </p:txBody>
       </p:sp>
     </p:spTree>
     <p:extLst>
       <p:ext uri="{BB962C8B-B14F-4D97-AF65-F5344CB8AC3E}">
-        <p14:creationId xmlns:p14="http://schemas.microsoft.com/office/powerpoint/2010/main" val="227153128"/>
+        <p14:creationId xmlns:p14="http://schemas.microsoft.com/office/powerpoint/2010/main" val="47450157"/>
       </p:ext>
     </p:extLst>
   </p:cSld>
@@ -6586,7 +6691,7 @@
       </p:grpSpPr>
       <p:sp>
         <p:nvSpPr>
-          <p:cNvPr id="2" name="Title 1"/>
+          <p:cNvPr id="2" name="Título 1"/>
           <p:cNvSpPr>
             <a:spLocks noGrp="1"/>
           </p:cNvSpPr>
@@ -6601,8 +6706,74 @@
           <a:p>
             <a:r>
               <a:rPr lang="pt-BR" dirty="0" smtClean="0"/>
-              <a:t>Apresentação do Projeto</a:t>
-            </a:r>
+              <a:t>Visão do Sistema</a:t>
+            </a:r>
+            <a:endParaRPr lang="pt-BR" dirty="0"/>
+          </a:p>
+        </p:txBody>
+      </p:sp>
+      <p:sp>
+        <p:nvSpPr>
+          <p:cNvPr id="3" name="Marcador de Posição de Conteúdo 2"/>
+          <p:cNvSpPr>
+            <a:spLocks noGrp="1"/>
+          </p:cNvSpPr>
+          <p:nvPr>
+            <p:ph idx="1"/>
+          </p:nvPr>
+        </p:nvSpPr>
+        <p:spPr>
+          <a:xfrm>
+            <a:off x="457200" y="1422356"/>
+            <a:ext cx="8229600" cy="4525963"/>
+          </a:xfrm>
+        </p:spPr>
+        <p:txBody>
+          <a:bodyPr>
+            <a:normAutofit fontScale="92500" lnSpcReduction="10000"/>
+          </a:bodyPr>
+          <a:lstStyle/>
+          <a:p>
+            <a:r>
+              <a:rPr lang="pt-BR" dirty="0" smtClean="0"/>
+              <a:t>Usuários: </a:t>
+            </a:r>
+          </a:p>
+          <a:p>
+            <a:pPr lvl="1"/>
+            <a:r>
+              <a:rPr lang="pt-BR" dirty="0" smtClean="0"/>
+              <a:t>Atendente do Balcão.</a:t>
+            </a:r>
+          </a:p>
+          <a:p>
+            <a:pPr lvl="1"/>
+            <a:r>
+              <a:rPr lang="pt-BR" dirty="0" smtClean="0"/>
+              <a:t>Analista de exames.</a:t>
+            </a:r>
+          </a:p>
+          <a:p>
+            <a:pPr lvl="1"/>
+            <a:r>
+              <a:rPr lang="pt-BR" dirty="0" smtClean="0"/>
+              <a:t>Executor de exames.</a:t>
+            </a:r>
+          </a:p>
+          <a:p>
+            <a:r>
+              <a:rPr lang="pt-BR" dirty="0" smtClean="0"/>
+              <a:t>Atendente de Balcão: Atende pacientes, coleta exames que serão analisados, atendimento do telefone.</a:t>
+            </a:r>
+          </a:p>
+          <a:p>
+            <a:r>
+              <a:rPr lang="pt-BR" dirty="0" smtClean="0"/>
+              <a:t>Analista de exames: Analisa dos exames que são disponibilizados na clinica, armazena os resultados dos exames em um local da clinica</a:t>
+            </a:r>
+            <a:endParaRPr lang="pt-BR" dirty="0"/>
+          </a:p>
+          <a:p>
             <a:endParaRPr lang="pt-BR" dirty="0"/>
           </a:p>
         </p:txBody>
@@ -6610,7 +6781,7 @@
     </p:spTree>
     <p:extLst>
       <p:ext uri="{BB962C8B-B14F-4D97-AF65-F5344CB8AC3E}">
-        <p14:creationId xmlns:p14="http://schemas.microsoft.com/office/powerpoint/2010/main" val="4094789528"/>
+        <p14:creationId xmlns:p14="http://schemas.microsoft.com/office/powerpoint/2010/main" val="183051565"/>
       </p:ext>
     </p:extLst>
   </p:cSld>
@@ -6669,7 +6840,7 @@
       </p:sp>
       <p:pic>
         <p:nvPicPr>
-          <p:cNvPr id="4" name="Imagem 3"/>
+          <p:cNvPr id="7" name="Imagem 6"/>
           <p:cNvPicPr>
             <a:picLocks noChangeAspect="1"/>
           </p:cNvPicPr>
@@ -6689,8 +6860,8 @@
         </p:blipFill>
         <p:spPr>
           <a:xfrm>
-            <a:off x="1293307" y="1124744"/>
-            <a:ext cx="6557385" cy="5104800"/>
+            <a:off x="1297948" y="1196752"/>
+            <a:ext cx="6548104" cy="5104800"/>
           </a:xfrm>
           <a:prstGeom prst="rect">
             <a:avLst/>
@@ -6699,14 +6870,14 @@
       </p:pic>
       <p:sp>
         <p:nvSpPr>
-          <p:cNvPr id="8" name="Retângulo 7"/>
+          <p:cNvPr id="9" name="Retângulo 8"/>
           <p:cNvSpPr/>
           <p:nvPr/>
         </p:nvSpPr>
         <p:spPr>
           <a:xfrm>
-            <a:off x="0" y="1217583"/>
-            <a:ext cx="1872208" cy="400110"/>
+            <a:off x="72008" y="1052736"/>
+            <a:ext cx="2339752" cy="461665"/>
           </a:xfrm>
           <a:prstGeom prst="rect">
             <a:avLst/>
@@ -6719,25 +6890,17 @@
           <a:lstStyle/>
           <a:p>
             <a:r>
-              <a:rPr lang="pt-BR" sz="2000" dirty="0" smtClean="0">
-                <a:solidFill>
-                  <a:srgbClr val="FF0000"/>
-                </a:solidFill>
-              </a:rPr>
-              <a:t>*Visão ADM</a:t>
-            </a:r>
-            <a:endParaRPr lang="pt-BR" sz="2400" dirty="0">
-              <a:solidFill>
-                <a:srgbClr val="FF0000"/>
-              </a:solidFill>
-            </a:endParaRPr>
+              <a:rPr lang="pt-BR" sz="2400" b="1" dirty="0" smtClean="0"/>
+              <a:t>Visão Paciente</a:t>
+            </a:r>
+            <a:endParaRPr lang="pt-BR" sz="2800" b="1" dirty="0"/>
           </a:p>
         </p:txBody>
       </p:sp>
     </p:spTree>
     <p:extLst>
       <p:ext uri="{BB962C8B-B14F-4D97-AF65-F5344CB8AC3E}">
-        <p14:creationId xmlns:p14="http://schemas.microsoft.com/office/powerpoint/2010/main" val="38583560"/>
+        <p14:creationId xmlns:p14="http://schemas.microsoft.com/office/powerpoint/2010/main" val="1922573673"/>
       </p:ext>
     </p:extLst>
   </p:cSld>
@@ -6816,8 +6979,8 @@
         </p:blipFill>
         <p:spPr>
           <a:xfrm>
-            <a:off x="1293307" y="1124744"/>
-            <a:ext cx="6557385" cy="5104800"/>
+            <a:off x="1297948" y="1196752"/>
+            <a:ext cx="6548104" cy="5104800"/>
           </a:xfrm>
           <a:prstGeom prst="rect">
             <a:avLst/>
@@ -6826,14 +6989,14 @@
       </p:pic>
       <p:sp>
         <p:nvSpPr>
-          <p:cNvPr id="8" name="Retângulo 7"/>
+          <p:cNvPr id="6" name="Retângulo 5"/>
           <p:cNvSpPr/>
           <p:nvPr/>
         </p:nvSpPr>
         <p:spPr>
           <a:xfrm>
-            <a:off x="0" y="1217583"/>
-            <a:ext cx="1835696" cy="400110"/>
+            <a:off x="72008" y="1052736"/>
+            <a:ext cx="2339752" cy="461665"/>
           </a:xfrm>
           <a:prstGeom prst="rect">
             <a:avLst/>
@@ -6846,25 +7009,17 @@
           <a:lstStyle/>
           <a:p>
             <a:r>
-              <a:rPr lang="pt-BR" sz="2000" dirty="0" smtClean="0">
-                <a:solidFill>
-                  <a:srgbClr val="FF0000"/>
-                </a:solidFill>
-              </a:rPr>
-              <a:t>*Visão ADM</a:t>
-            </a:r>
-            <a:endParaRPr lang="pt-BR" sz="2400" dirty="0">
-              <a:solidFill>
-                <a:srgbClr val="FF0000"/>
-              </a:solidFill>
-            </a:endParaRPr>
+              <a:rPr lang="pt-BR" sz="2400" b="1" dirty="0" smtClean="0"/>
+              <a:t>Visão Paciente</a:t>
+            </a:r>
+            <a:endParaRPr lang="pt-BR" sz="2800" b="1" dirty="0"/>
           </a:p>
         </p:txBody>
       </p:sp>
     </p:spTree>
     <p:extLst>
       <p:ext uri="{BB962C8B-B14F-4D97-AF65-F5344CB8AC3E}">
-        <p14:creationId xmlns:p14="http://schemas.microsoft.com/office/powerpoint/2010/main" val="1225680612"/>
+        <p14:creationId xmlns:p14="http://schemas.microsoft.com/office/powerpoint/2010/main" val="724080865"/>
       </p:ext>
     </p:extLst>
   </p:cSld>
@@ -6915,7 +7070,7 @@
           <a:p>
             <a:r>
               <a:rPr lang="pt-BR" dirty="0" smtClean="0"/>
-              <a:t>Banco de Dados</a:t>
+              <a:t>Interface do Usuário</a:t>
             </a:r>
             <a:endParaRPr lang="pt-BR" dirty="0"/>
           </a:p>
@@ -6923,7 +7078,7 @@
       </p:sp>
       <p:pic>
         <p:nvPicPr>
-          <p:cNvPr id="5" name="Imagem 4"/>
+          <p:cNvPr id="3" name="Imagem 2"/>
           <p:cNvPicPr>
             <a:picLocks noChangeAspect="1"/>
           </p:cNvPicPr>
@@ -6943,18 +7098,47 @@
         </p:blipFill>
         <p:spPr>
           <a:xfrm>
-            <a:off x="0" y="1417638"/>
-            <a:ext cx="9144000" cy="4691790"/>
+            <a:off x="1293307" y="1204520"/>
+            <a:ext cx="6557385" cy="5104800"/>
           </a:xfrm>
           <a:prstGeom prst="rect">
             <a:avLst/>
           </a:prstGeom>
         </p:spPr>
       </p:pic>
+      <p:sp>
+        <p:nvSpPr>
+          <p:cNvPr id="6" name="Retângulo 5"/>
+          <p:cNvSpPr/>
+          <p:nvPr/>
+        </p:nvSpPr>
+        <p:spPr>
+          <a:xfrm>
+            <a:off x="72008" y="1052736"/>
+            <a:ext cx="2339752" cy="461665"/>
+          </a:xfrm>
+          <a:prstGeom prst="rect">
+            <a:avLst/>
+          </a:prstGeom>
+        </p:spPr>
+        <p:txBody>
+          <a:bodyPr wrap="square">
+            <a:spAutoFit/>
+          </a:bodyPr>
+          <a:lstStyle/>
+          <a:p>
+            <a:r>
+              <a:rPr lang="pt-BR" sz="2400" b="1" dirty="0" smtClean="0"/>
+              <a:t>Visão Paciente</a:t>
+            </a:r>
+            <a:endParaRPr lang="pt-BR" sz="2800" b="1" dirty="0"/>
+          </a:p>
+        </p:txBody>
+      </p:sp>
     </p:spTree>
     <p:extLst>
       <p:ext uri="{BB962C8B-B14F-4D97-AF65-F5344CB8AC3E}">
-        <p14:creationId xmlns:p14="http://schemas.microsoft.com/office/powerpoint/2010/main" val="3218491669"/>
+        <p14:creationId xmlns:p14="http://schemas.microsoft.com/office/powerpoint/2010/main" val="3573421326"/>
       </p:ext>
     </p:extLst>
   </p:cSld>
@@ -7005,7 +7189,7 @@
           <a:p>
             <a:r>
               <a:rPr lang="pt-BR" dirty="0" smtClean="0"/>
-              <a:t>Banco de Dados</a:t>
+              <a:t>Interface do Usuário</a:t>
             </a:r>
             <a:endParaRPr lang="pt-BR" dirty="0"/>
           </a:p>
@@ -7033,18 +7217,47 @@
         </p:blipFill>
         <p:spPr>
           <a:xfrm>
-            <a:off x="0" y="1241612"/>
-            <a:ext cx="9144000" cy="4923692"/>
+            <a:off x="1292400" y="1195870"/>
+            <a:ext cx="6559200" cy="5113450"/>
           </a:xfrm>
           <a:prstGeom prst="rect">
             <a:avLst/>
           </a:prstGeom>
         </p:spPr>
       </p:pic>
+      <p:sp>
+        <p:nvSpPr>
+          <p:cNvPr id="6" name="Retângulo 5"/>
+          <p:cNvSpPr/>
+          <p:nvPr/>
+        </p:nvSpPr>
+        <p:spPr>
+          <a:xfrm>
+            <a:off x="72008" y="1052736"/>
+            <a:ext cx="2339752" cy="461665"/>
+          </a:xfrm>
+          <a:prstGeom prst="rect">
+            <a:avLst/>
+          </a:prstGeom>
+        </p:spPr>
+        <p:txBody>
+          <a:bodyPr wrap="square">
+            <a:spAutoFit/>
+          </a:bodyPr>
+          <a:lstStyle/>
+          <a:p>
+            <a:r>
+              <a:rPr lang="pt-BR" sz="2400" b="1" dirty="0" smtClean="0"/>
+              <a:t>Visão Paciente</a:t>
+            </a:r>
+            <a:endParaRPr lang="pt-BR" sz="2800" b="1" dirty="0"/>
+          </a:p>
+        </p:txBody>
+      </p:sp>
     </p:spTree>
     <p:extLst>
       <p:ext uri="{BB962C8B-B14F-4D97-AF65-F5344CB8AC3E}">
-        <p14:creationId xmlns:p14="http://schemas.microsoft.com/office/powerpoint/2010/main" val="3016240961"/>
+        <p14:creationId xmlns:p14="http://schemas.microsoft.com/office/powerpoint/2010/main" val="2342771231"/>
       </p:ext>
     </p:extLst>
   </p:cSld>
@@ -7095,6 +7308,2053 @@
           <a:p>
             <a:r>
               <a:rPr lang="pt-BR" dirty="0" smtClean="0"/>
+              <a:t>Interface do Usuário</a:t>
+            </a:r>
+            <a:endParaRPr lang="pt-BR" dirty="0"/>
+          </a:p>
+        </p:txBody>
+      </p:sp>
+      <p:pic>
+        <p:nvPicPr>
+          <p:cNvPr id="4" name="Imagem 3"/>
+          <p:cNvPicPr>
+            <a:picLocks noChangeAspect="1"/>
+          </p:cNvPicPr>
+          <p:nvPr/>
+        </p:nvPicPr>
+        <p:blipFill>
+          <a:blip r:embed="rId2">
+            <a:extLst>
+              <a:ext uri="{28A0092B-C50C-407E-A947-70E740481C1C}">
+                <a14:useLocalDpi xmlns:a14="http://schemas.microsoft.com/office/drawing/2010/main" val="0"/>
+              </a:ext>
+            </a:extLst>
+          </a:blip>
+          <a:stretch>
+            <a:fillRect/>
+          </a:stretch>
+        </p:blipFill>
+        <p:spPr>
+          <a:xfrm>
+            <a:off x="1293307" y="1204520"/>
+            <a:ext cx="6557385" cy="5104800"/>
+          </a:xfrm>
+          <a:prstGeom prst="rect">
+            <a:avLst/>
+          </a:prstGeom>
+        </p:spPr>
+      </p:pic>
+      <p:sp>
+        <p:nvSpPr>
+          <p:cNvPr id="6" name="Retângulo 5"/>
+          <p:cNvSpPr/>
+          <p:nvPr/>
+        </p:nvSpPr>
+        <p:spPr>
+          <a:xfrm>
+            <a:off x="72008" y="1052736"/>
+            <a:ext cx="2339752" cy="461665"/>
+          </a:xfrm>
+          <a:prstGeom prst="rect">
+            <a:avLst/>
+          </a:prstGeom>
+        </p:spPr>
+        <p:txBody>
+          <a:bodyPr wrap="square">
+            <a:spAutoFit/>
+          </a:bodyPr>
+          <a:lstStyle/>
+          <a:p>
+            <a:r>
+              <a:rPr lang="pt-BR" sz="2400" b="1" dirty="0" smtClean="0"/>
+              <a:t>Visão Paciente</a:t>
+            </a:r>
+            <a:endParaRPr lang="pt-BR" sz="2800" b="1" dirty="0"/>
+          </a:p>
+        </p:txBody>
+      </p:sp>
+    </p:spTree>
+    <p:extLst>
+      <p:ext uri="{BB962C8B-B14F-4D97-AF65-F5344CB8AC3E}">
+        <p14:creationId xmlns:p14="http://schemas.microsoft.com/office/powerpoint/2010/main" val="3781886261"/>
+      </p:ext>
+    </p:extLst>
+  </p:cSld>
+  <p:clrMapOvr>
+    <a:masterClrMapping/>
+  </p:clrMapOvr>
+  <p:timing>
+    <p:tnLst>
+      <p:par>
+        <p:cTn id="1" dur="indefinite" restart="never" nodeType="tmRoot"/>
+      </p:par>
+    </p:tnLst>
+  </p:timing>
+</p:sld>
+</file>
+
+<file path=ppt/slides/slide35.xml><?xml version="1.0" encoding="utf-8"?>
+<p:sld xmlns:a="http://schemas.openxmlformats.org/drawingml/2006/main" xmlns:r="http://schemas.openxmlformats.org/officeDocument/2006/relationships" xmlns:p="http://schemas.openxmlformats.org/presentationml/2006/main">
+  <p:cSld>
+    <p:spTree>
+      <p:nvGrpSpPr>
+        <p:cNvPr id="1" name=""/>
+        <p:cNvGrpSpPr/>
+        <p:nvPr/>
+      </p:nvGrpSpPr>
+      <p:grpSpPr>
+        <a:xfrm>
+          <a:off x="0" y="0"/>
+          <a:ext cx="0" cy="0"/>
+          <a:chOff x="0" y="0"/>
+          <a:chExt cx="0" cy="0"/>
+        </a:xfrm>
+      </p:grpSpPr>
+      <p:sp>
+        <p:nvSpPr>
+          <p:cNvPr id="2" name="Title 1"/>
+          <p:cNvSpPr>
+            <a:spLocks noGrp="1"/>
+          </p:cNvSpPr>
+          <p:nvPr>
+            <p:ph type="title"/>
+          </p:nvPr>
+        </p:nvSpPr>
+        <p:spPr/>
+        <p:txBody>
+          <a:bodyPr/>
+          <a:lstStyle/>
+          <a:p>
+            <a:r>
+              <a:rPr lang="pt-BR" dirty="0" smtClean="0"/>
+              <a:t>Interface do Usuário</a:t>
+            </a:r>
+            <a:endParaRPr lang="pt-BR" dirty="0"/>
+          </a:p>
+        </p:txBody>
+      </p:sp>
+      <p:pic>
+        <p:nvPicPr>
+          <p:cNvPr id="4" name="Imagem 3"/>
+          <p:cNvPicPr>
+            <a:picLocks noChangeAspect="1"/>
+          </p:cNvPicPr>
+          <p:nvPr/>
+        </p:nvPicPr>
+        <p:blipFill>
+          <a:blip r:embed="rId2">
+            <a:extLst>
+              <a:ext uri="{28A0092B-C50C-407E-A947-70E740481C1C}">
+                <a14:useLocalDpi xmlns:a14="http://schemas.microsoft.com/office/drawing/2010/main" val="0"/>
+              </a:ext>
+            </a:extLst>
+          </a:blip>
+          <a:stretch>
+            <a:fillRect/>
+          </a:stretch>
+        </p:blipFill>
+        <p:spPr>
+          <a:xfrm>
+            <a:off x="1293307" y="1204520"/>
+            <a:ext cx="6557385" cy="5104800"/>
+          </a:xfrm>
+          <a:prstGeom prst="rect">
+            <a:avLst/>
+          </a:prstGeom>
+        </p:spPr>
+      </p:pic>
+      <p:sp>
+        <p:nvSpPr>
+          <p:cNvPr id="6" name="Retângulo 5"/>
+          <p:cNvSpPr/>
+          <p:nvPr/>
+        </p:nvSpPr>
+        <p:spPr>
+          <a:xfrm>
+            <a:off x="72008" y="1052736"/>
+            <a:ext cx="2339752" cy="461665"/>
+          </a:xfrm>
+          <a:prstGeom prst="rect">
+            <a:avLst/>
+          </a:prstGeom>
+        </p:spPr>
+        <p:txBody>
+          <a:bodyPr wrap="square">
+            <a:spAutoFit/>
+          </a:bodyPr>
+          <a:lstStyle/>
+          <a:p>
+            <a:r>
+              <a:rPr lang="pt-BR" sz="2400" b="1" dirty="0" smtClean="0"/>
+              <a:t>Visão Paciente</a:t>
+            </a:r>
+            <a:endParaRPr lang="pt-BR" sz="2800" b="1" dirty="0"/>
+          </a:p>
+        </p:txBody>
+      </p:sp>
+    </p:spTree>
+    <p:extLst>
+      <p:ext uri="{BB962C8B-B14F-4D97-AF65-F5344CB8AC3E}">
+        <p14:creationId xmlns:p14="http://schemas.microsoft.com/office/powerpoint/2010/main" val="193298628"/>
+      </p:ext>
+    </p:extLst>
+  </p:cSld>
+  <p:clrMapOvr>
+    <a:masterClrMapping/>
+  </p:clrMapOvr>
+  <p:timing>
+    <p:tnLst>
+      <p:par>
+        <p:cTn id="1" dur="indefinite" restart="never" nodeType="tmRoot"/>
+      </p:par>
+    </p:tnLst>
+  </p:timing>
+</p:sld>
+</file>
+
+<file path=ppt/slides/slide36.xml><?xml version="1.0" encoding="utf-8"?>
+<p:sld xmlns:a="http://schemas.openxmlformats.org/drawingml/2006/main" xmlns:r="http://schemas.openxmlformats.org/officeDocument/2006/relationships" xmlns:p="http://schemas.openxmlformats.org/presentationml/2006/main">
+  <p:cSld>
+    <p:spTree>
+      <p:nvGrpSpPr>
+        <p:cNvPr id="1" name=""/>
+        <p:cNvGrpSpPr/>
+        <p:nvPr/>
+      </p:nvGrpSpPr>
+      <p:grpSpPr>
+        <a:xfrm>
+          <a:off x="0" y="0"/>
+          <a:ext cx="0" cy="0"/>
+          <a:chOff x="0" y="0"/>
+          <a:chExt cx="0" cy="0"/>
+        </a:xfrm>
+      </p:grpSpPr>
+      <p:sp>
+        <p:nvSpPr>
+          <p:cNvPr id="2" name="Title 1"/>
+          <p:cNvSpPr>
+            <a:spLocks noGrp="1"/>
+          </p:cNvSpPr>
+          <p:nvPr>
+            <p:ph type="title"/>
+          </p:nvPr>
+        </p:nvSpPr>
+        <p:spPr/>
+        <p:txBody>
+          <a:bodyPr/>
+          <a:lstStyle/>
+          <a:p>
+            <a:r>
+              <a:rPr lang="pt-BR" dirty="0" smtClean="0"/>
+              <a:t>Interface do Usuário</a:t>
+            </a:r>
+            <a:endParaRPr lang="pt-BR" dirty="0"/>
+          </a:p>
+        </p:txBody>
+      </p:sp>
+      <p:pic>
+        <p:nvPicPr>
+          <p:cNvPr id="4" name="Imagem 3"/>
+          <p:cNvPicPr>
+            <a:picLocks noChangeAspect="1"/>
+          </p:cNvPicPr>
+          <p:nvPr/>
+        </p:nvPicPr>
+        <p:blipFill>
+          <a:blip r:embed="rId2">
+            <a:extLst>
+              <a:ext uri="{28A0092B-C50C-407E-A947-70E740481C1C}">
+                <a14:useLocalDpi xmlns:a14="http://schemas.microsoft.com/office/drawing/2010/main" val="0"/>
+              </a:ext>
+            </a:extLst>
+          </a:blip>
+          <a:stretch>
+            <a:fillRect/>
+          </a:stretch>
+        </p:blipFill>
+        <p:spPr>
+          <a:xfrm>
+            <a:off x="1293307" y="1204520"/>
+            <a:ext cx="6557385" cy="5104800"/>
+          </a:xfrm>
+          <a:prstGeom prst="rect">
+            <a:avLst/>
+          </a:prstGeom>
+        </p:spPr>
+      </p:pic>
+      <p:sp>
+        <p:nvSpPr>
+          <p:cNvPr id="6" name="Retângulo 5"/>
+          <p:cNvSpPr/>
+          <p:nvPr/>
+        </p:nvSpPr>
+        <p:spPr>
+          <a:xfrm>
+            <a:off x="72008" y="1052736"/>
+            <a:ext cx="2339752" cy="461665"/>
+          </a:xfrm>
+          <a:prstGeom prst="rect">
+            <a:avLst/>
+          </a:prstGeom>
+        </p:spPr>
+        <p:txBody>
+          <a:bodyPr wrap="square">
+            <a:spAutoFit/>
+          </a:bodyPr>
+          <a:lstStyle/>
+          <a:p>
+            <a:r>
+              <a:rPr lang="pt-BR" sz="2400" b="1" dirty="0" smtClean="0"/>
+              <a:t>Visão Paciente</a:t>
+            </a:r>
+            <a:endParaRPr lang="pt-BR" sz="2800" b="1" dirty="0"/>
+          </a:p>
+        </p:txBody>
+      </p:sp>
+    </p:spTree>
+    <p:extLst>
+      <p:ext uri="{BB962C8B-B14F-4D97-AF65-F5344CB8AC3E}">
+        <p14:creationId xmlns:p14="http://schemas.microsoft.com/office/powerpoint/2010/main" val="2235056424"/>
+      </p:ext>
+    </p:extLst>
+  </p:cSld>
+  <p:clrMapOvr>
+    <a:masterClrMapping/>
+  </p:clrMapOvr>
+  <p:timing>
+    <p:tnLst>
+      <p:par>
+        <p:cTn id="1" dur="indefinite" restart="never" nodeType="tmRoot"/>
+      </p:par>
+    </p:tnLst>
+  </p:timing>
+</p:sld>
+</file>
+
+<file path=ppt/slides/slide37.xml><?xml version="1.0" encoding="utf-8"?>
+<p:sld xmlns:a="http://schemas.openxmlformats.org/drawingml/2006/main" xmlns:r="http://schemas.openxmlformats.org/officeDocument/2006/relationships" xmlns:p="http://schemas.openxmlformats.org/presentationml/2006/main">
+  <p:cSld>
+    <p:spTree>
+      <p:nvGrpSpPr>
+        <p:cNvPr id="1" name=""/>
+        <p:cNvGrpSpPr/>
+        <p:nvPr/>
+      </p:nvGrpSpPr>
+      <p:grpSpPr>
+        <a:xfrm>
+          <a:off x="0" y="0"/>
+          <a:ext cx="0" cy="0"/>
+          <a:chOff x="0" y="0"/>
+          <a:chExt cx="0" cy="0"/>
+        </a:xfrm>
+      </p:grpSpPr>
+      <p:sp>
+        <p:nvSpPr>
+          <p:cNvPr id="2" name="Title 1"/>
+          <p:cNvSpPr>
+            <a:spLocks noGrp="1"/>
+          </p:cNvSpPr>
+          <p:nvPr>
+            <p:ph type="title"/>
+          </p:nvPr>
+        </p:nvSpPr>
+        <p:spPr/>
+        <p:txBody>
+          <a:bodyPr/>
+          <a:lstStyle/>
+          <a:p>
+            <a:r>
+              <a:rPr lang="pt-BR" dirty="0" smtClean="0"/>
+              <a:t>Interface do Usuário</a:t>
+            </a:r>
+            <a:endParaRPr lang="pt-BR" dirty="0"/>
+          </a:p>
+        </p:txBody>
+      </p:sp>
+      <p:pic>
+        <p:nvPicPr>
+          <p:cNvPr id="3" name="Imagem 2"/>
+          <p:cNvPicPr>
+            <a:picLocks noChangeAspect="1"/>
+          </p:cNvPicPr>
+          <p:nvPr/>
+        </p:nvPicPr>
+        <p:blipFill>
+          <a:blip r:embed="rId2">
+            <a:extLst>
+              <a:ext uri="{28A0092B-C50C-407E-A947-70E740481C1C}">
+                <a14:useLocalDpi xmlns:a14="http://schemas.microsoft.com/office/drawing/2010/main" val="0"/>
+              </a:ext>
+            </a:extLst>
+          </a:blip>
+          <a:stretch>
+            <a:fillRect/>
+          </a:stretch>
+        </p:blipFill>
+        <p:spPr>
+          <a:xfrm>
+            <a:off x="1292400" y="1195871"/>
+            <a:ext cx="6559200" cy="5113449"/>
+          </a:xfrm>
+          <a:prstGeom prst="rect">
+            <a:avLst/>
+          </a:prstGeom>
+        </p:spPr>
+      </p:pic>
+      <p:sp>
+        <p:nvSpPr>
+          <p:cNvPr id="7" name="Retângulo 6"/>
+          <p:cNvSpPr/>
+          <p:nvPr/>
+        </p:nvSpPr>
+        <p:spPr>
+          <a:xfrm>
+            <a:off x="72008" y="1052736"/>
+            <a:ext cx="2339752" cy="461665"/>
+          </a:xfrm>
+          <a:prstGeom prst="rect">
+            <a:avLst/>
+          </a:prstGeom>
+        </p:spPr>
+        <p:txBody>
+          <a:bodyPr wrap="square">
+            <a:spAutoFit/>
+          </a:bodyPr>
+          <a:lstStyle/>
+          <a:p>
+            <a:r>
+              <a:rPr lang="pt-BR" sz="2400" b="1" dirty="0" smtClean="0"/>
+              <a:t>Visão Gestor</a:t>
+            </a:r>
+            <a:endParaRPr lang="pt-BR" sz="2800" b="1" dirty="0"/>
+          </a:p>
+        </p:txBody>
+      </p:sp>
+    </p:spTree>
+    <p:extLst>
+      <p:ext uri="{BB962C8B-B14F-4D97-AF65-F5344CB8AC3E}">
+        <p14:creationId xmlns:p14="http://schemas.microsoft.com/office/powerpoint/2010/main" val="3316813918"/>
+      </p:ext>
+    </p:extLst>
+  </p:cSld>
+  <p:clrMapOvr>
+    <a:masterClrMapping/>
+  </p:clrMapOvr>
+  <p:timing>
+    <p:tnLst>
+      <p:par>
+        <p:cTn id="1" dur="indefinite" restart="never" nodeType="tmRoot"/>
+      </p:par>
+    </p:tnLst>
+  </p:timing>
+</p:sld>
+</file>
+
+<file path=ppt/slides/slide38.xml><?xml version="1.0" encoding="utf-8"?>
+<p:sld xmlns:a="http://schemas.openxmlformats.org/drawingml/2006/main" xmlns:r="http://schemas.openxmlformats.org/officeDocument/2006/relationships" xmlns:p="http://schemas.openxmlformats.org/presentationml/2006/main">
+  <p:cSld>
+    <p:spTree>
+      <p:nvGrpSpPr>
+        <p:cNvPr id="1" name=""/>
+        <p:cNvGrpSpPr/>
+        <p:nvPr/>
+      </p:nvGrpSpPr>
+      <p:grpSpPr>
+        <a:xfrm>
+          <a:off x="0" y="0"/>
+          <a:ext cx="0" cy="0"/>
+          <a:chOff x="0" y="0"/>
+          <a:chExt cx="0" cy="0"/>
+        </a:xfrm>
+      </p:grpSpPr>
+      <p:sp>
+        <p:nvSpPr>
+          <p:cNvPr id="2" name="Title 1"/>
+          <p:cNvSpPr>
+            <a:spLocks noGrp="1"/>
+          </p:cNvSpPr>
+          <p:nvPr>
+            <p:ph type="title"/>
+          </p:nvPr>
+        </p:nvSpPr>
+        <p:spPr/>
+        <p:txBody>
+          <a:bodyPr/>
+          <a:lstStyle/>
+          <a:p>
+            <a:r>
+              <a:rPr lang="pt-BR" dirty="0" smtClean="0"/>
+              <a:t>Interface do Usuário</a:t>
+            </a:r>
+            <a:endParaRPr lang="pt-BR" dirty="0"/>
+          </a:p>
+        </p:txBody>
+      </p:sp>
+      <p:pic>
+        <p:nvPicPr>
+          <p:cNvPr id="3" name="Imagem 2"/>
+          <p:cNvPicPr>
+            <a:picLocks noChangeAspect="1"/>
+          </p:cNvPicPr>
+          <p:nvPr/>
+        </p:nvPicPr>
+        <p:blipFill>
+          <a:blip r:embed="rId2">
+            <a:extLst>
+              <a:ext uri="{28A0092B-C50C-407E-A947-70E740481C1C}">
+                <a14:useLocalDpi xmlns:a14="http://schemas.microsoft.com/office/drawing/2010/main" val="0"/>
+              </a:ext>
+            </a:extLst>
+          </a:blip>
+          <a:stretch>
+            <a:fillRect/>
+          </a:stretch>
+        </p:blipFill>
+        <p:spPr>
+          <a:xfrm>
+            <a:off x="1293307" y="1204520"/>
+            <a:ext cx="6557385" cy="5104800"/>
+          </a:xfrm>
+          <a:prstGeom prst="rect">
+            <a:avLst/>
+          </a:prstGeom>
+        </p:spPr>
+      </p:pic>
+      <p:sp>
+        <p:nvSpPr>
+          <p:cNvPr id="5" name="Retângulo 4"/>
+          <p:cNvSpPr/>
+          <p:nvPr/>
+        </p:nvSpPr>
+        <p:spPr>
+          <a:xfrm>
+            <a:off x="72008" y="1052736"/>
+            <a:ext cx="2339752" cy="461665"/>
+          </a:xfrm>
+          <a:prstGeom prst="rect">
+            <a:avLst/>
+          </a:prstGeom>
+        </p:spPr>
+        <p:txBody>
+          <a:bodyPr wrap="square">
+            <a:spAutoFit/>
+          </a:bodyPr>
+          <a:lstStyle/>
+          <a:p>
+            <a:r>
+              <a:rPr lang="pt-BR" sz="2400" b="1" dirty="0" smtClean="0"/>
+              <a:t>Visão Gestor</a:t>
+            </a:r>
+            <a:endParaRPr lang="pt-BR" sz="2800" b="1" dirty="0"/>
+          </a:p>
+        </p:txBody>
+      </p:sp>
+    </p:spTree>
+    <p:extLst>
+      <p:ext uri="{BB962C8B-B14F-4D97-AF65-F5344CB8AC3E}">
+        <p14:creationId xmlns:p14="http://schemas.microsoft.com/office/powerpoint/2010/main" val="576134621"/>
+      </p:ext>
+    </p:extLst>
+  </p:cSld>
+  <p:clrMapOvr>
+    <a:masterClrMapping/>
+  </p:clrMapOvr>
+  <p:timing>
+    <p:tnLst>
+      <p:par>
+        <p:cTn id="1" dur="indefinite" restart="never" nodeType="tmRoot"/>
+      </p:par>
+    </p:tnLst>
+  </p:timing>
+</p:sld>
+</file>
+
+<file path=ppt/slides/slide39.xml><?xml version="1.0" encoding="utf-8"?>
+<p:sld xmlns:a="http://schemas.openxmlformats.org/drawingml/2006/main" xmlns:r="http://schemas.openxmlformats.org/officeDocument/2006/relationships" xmlns:p="http://schemas.openxmlformats.org/presentationml/2006/main">
+  <p:cSld>
+    <p:spTree>
+      <p:nvGrpSpPr>
+        <p:cNvPr id="1" name=""/>
+        <p:cNvGrpSpPr/>
+        <p:nvPr/>
+      </p:nvGrpSpPr>
+      <p:grpSpPr>
+        <a:xfrm>
+          <a:off x="0" y="0"/>
+          <a:ext cx="0" cy="0"/>
+          <a:chOff x="0" y="0"/>
+          <a:chExt cx="0" cy="0"/>
+        </a:xfrm>
+      </p:grpSpPr>
+      <p:sp>
+        <p:nvSpPr>
+          <p:cNvPr id="2" name="Title 1"/>
+          <p:cNvSpPr>
+            <a:spLocks noGrp="1"/>
+          </p:cNvSpPr>
+          <p:nvPr>
+            <p:ph type="title"/>
+          </p:nvPr>
+        </p:nvSpPr>
+        <p:spPr/>
+        <p:txBody>
+          <a:bodyPr/>
+          <a:lstStyle/>
+          <a:p>
+            <a:r>
+              <a:rPr lang="pt-BR" dirty="0" smtClean="0"/>
+              <a:t>Interface do Usuário</a:t>
+            </a:r>
+            <a:endParaRPr lang="pt-BR" dirty="0"/>
+          </a:p>
+        </p:txBody>
+      </p:sp>
+      <p:pic>
+        <p:nvPicPr>
+          <p:cNvPr id="3" name="Imagem 2"/>
+          <p:cNvPicPr>
+            <a:picLocks noChangeAspect="1"/>
+          </p:cNvPicPr>
+          <p:nvPr/>
+        </p:nvPicPr>
+        <p:blipFill>
+          <a:blip r:embed="rId2">
+            <a:extLst>
+              <a:ext uri="{28A0092B-C50C-407E-A947-70E740481C1C}">
+                <a14:useLocalDpi xmlns:a14="http://schemas.microsoft.com/office/drawing/2010/main" val="0"/>
+              </a:ext>
+            </a:extLst>
+          </a:blip>
+          <a:stretch>
+            <a:fillRect/>
+          </a:stretch>
+        </p:blipFill>
+        <p:spPr>
+          <a:xfrm>
+            <a:off x="1292400" y="1195870"/>
+            <a:ext cx="6559200" cy="5113450"/>
+          </a:xfrm>
+          <a:prstGeom prst="rect">
+            <a:avLst/>
+          </a:prstGeom>
+        </p:spPr>
+      </p:pic>
+      <p:sp>
+        <p:nvSpPr>
+          <p:cNvPr id="6" name="Retângulo 5"/>
+          <p:cNvSpPr/>
+          <p:nvPr/>
+        </p:nvSpPr>
+        <p:spPr>
+          <a:xfrm>
+            <a:off x="72008" y="1052736"/>
+            <a:ext cx="2339752" cy="461665"/>
+          </a:xfrm>
+          <a:prstGeom prst="rect">
+            <a:avLst/>
+          </a:prstGeom>
+        </p:spPr>
+        <p:txBody>
+          <a:bodyPr wrap="square">
+            <a:spAutoFit/>
+          </a:bodyPr>
+          <a:lstStyle/>
+          <a:p>
+            <a:r>
+              <a:rPr lang="pt-BR" sz="2400" b="1" dirty="0" smtClean="0"/>
+              <a:t>Visão Gestor</a:t>
+            </a:r>
+            <a:endParaRPr lang="pt-BR" sz="2800" b="1" dirty="0"/>
+          </a:p>
+        </p:txBody>
+      </p:sp>
+    </p:spTree>
+    <p:extLst>
+      <p:ext uri="{BB962C8B-B14F-4D97-AF65-F5344CB8AC3E}">
+        <p14:creationId xmlns:p14="http://schemas.microsoft.com/office/powerpoint/2010/main" val="2122406983"/>
+      </p:ext>
+    </p:extLst>
+  </p:cSld>
+  <p:clrMapOvr>
+    <a:masterClrMapping/>
+  </p:clrMapOvr>
+  <p:timing>
+    <p:tnLst>
+      <p:par>
+        <p:cTn id="1" dur="indefinite" restart="never" nodeType="tmRoot"/>
+      </p:par>
+    </p:tnLst>
+  </p:timing>
+</p:sld>
+</file>
+
+<file path=ppt/slides/slide4.xml><?xml version="1.0" encoding="utf-8"?>
+<p:sld xmlns:a="http://schemas.openxmlformats.org/drawingml/2006/main" xmlns:r="http://schemas.openxmlformats.org/officeDocument/2006/relationships" xmlns:p="http://schemas.openxmlformats.org/presentationml/2006/main">
+  <p:cSld>
+    <p:spTree>
+      <p:nvGrpSpPr>
+        <p:cNvPr id="1" name=""/>
+        <p:cNvGrpSpPr/>
+        <p:nvPr/>
+      </p:nvGrpSpPr>
+      <p:grpSpPr>
+        <a:xfrm>
+          <a:off x="0" y="0"/>
+          <a:ext cx="0" cy="0"/>
+          <a:chOff x="0" y="0"/>
+          <a:chExt cx="0" cy="0"/>
+        </a:xfrm>
+      </p:grpSpPr>
+      <p:sp>
+        <p:nvSpPr>
+          <p:cNvPr id="2" name="Título 1"/>
+          <p:cNvSpPr>
+            <a:spLocks noGrp="1"/>
+          </p:cNvSpPr>
+          <p:nvPr>
+            <p:ph type="title"/>
+          </p:nvPr>
+        </p:nvSpPr>
+        <p:spPr/>
+        <p:txBody>
+          <a:bodyPr/>
+          <a:lstStyle/>
+          <a:p>
+            <a:r>
+              <a:rPr lang="pt-BR" dirty="0" smtClean="0"/>
+              <a:t>Visão do Sistema</a:t>
+            </a:r>
+            <a:endParaRPr lang="pt-BR" dirty="0"/>
+          </a:p>
+        </p:txBody>
+      </p:sp>
+      <p:sp>
+        <p:nvSpPr>
+          <p:cNvPr id="3" name="Marcador de Posição de Conteúdo 2"/>
+          <p:cNvSpPr>
+            <a:spLocks noGrp="1"/>
+          </p:cNvSpPr>
+          <p:nvPr>
+            <p:ph idx="1"/>
+          </p:nvPr>
+        </p:nvSpPr>
+        <p:spPr/>
+        <p:txBody>
+          <a:bodyPr/>
+          <a:lstStyle/>
+          <a:p>
+            <a:r>
+              <a:rPr lang="pt-BR" dirty="0" smtClean="0"/>
+              <a:t>Executor de exames: Realiza os exames, armazena os exames no local adequado.</a:t>
+            </a:r>
+          </a:p>
+          <a:p>
+            <a:pPr marL="0" indent="0">
+              <a:buNone/>
+            </a:pPr>
+            <a:endParaRPr lang="pt-BR" dirty="0" smtClean="0"/>
+          </a:p>
+          <a:p>
+            <a:r>
+              <a:rPr lang="pt-BR" dirty="0" smtClean="0"/>
+              <a:t>Tendo em vista todo o ambiente atual que estamos analisando para propor nosso sistema, iremos realizar somente o gerenciamento de exames e não da clínica como um todo.</a:t>
+            </a:r>
+            <a:endParaRPr lang="pt-BR" dirty="0"/>
+          </a:p>
+          <a:p>
+            <a:endParaRPr lang="pt-BR" dirty="0" smtClean="0"/>
+          </a:p>
+          <a:p>
+            <a:endParaRPr lang="pt-BR" dirty="0"/>
+          </a:p>
+          <a:p>
+            <a:endParaRPr lang="pt-BR" dirty="0"/>
+          </a:p>
+        </p:txBody>
+      </p:sp>
+    </p:spTree>
+    <p:extLst>
+      <p:ext uri="{BB962C8B-B14F-4D97-AF65-F5344CB8AC3E}">
+        <p14:creationId xmlns:p14="http://schemas.microsoft.com/office/powerpoint/2010/main" val="1059535570"/>
+      </p:ext>
+    </p:extLst>
+  </p:cSld>
+  <p:clrMapOvr>
+    <a:masterClrMapping/>
+  </p:clrMapOvr>
+  <p:timing>
+    <p:tnLst>
+      <p:par>
+        <p:cTn id="1" dur="indefinite" restart="never" nodeType="tmRoot"/>
+      </p:par>
+    </p:tnLst>
+  </p:timing>
+</p:sld>
+</file>
+
+<file path=ppt/slides/slide40.xml><?xml version="1.0" encoding="utf-8"?>
+<p:sld xmlns:a="http://schemas.openxmlformats.org/drawingml/2006/main" xmlns:r="http://schemas.openxmlformats.org/officeDocument/2006/relationships" xmlns:p="http://schemas.openxmlformats.org/presentationml/2006/main">
+  <p:cSld>
+    <p:spTree>
+      <p:nvGrpSpPr>
+        <p:cNvPr id="1" name=""/>
+        <p:cNvGrpSpPr/>
+        <p:nvPr/>
+      </p:nvGrpSpPr>
+      <p:grpSpPr>
+        <a:xfrm>
+          <a:off x="0" y="0"/>
+          <a:ext cx="0" cy="0"/>
+          <a:chOff x="0" y="0"/>
+          <a:chExt cx="0" cy="0"/>
+        </a:xfrm>
+      </p:grpSpPr>
+      <p:sp>
+        <p:nvSpPr>
+          <p:cNvPr id="2" name="Title 1"/>
+          <p:cNvSpPr>
+            <a:spLocks noGrp="1"/>
+          </p:cNvSpPr>
+          <p:nvPr>
+            <p:ph type="title"/>
+          </p:nvPr>
+        </p:nvSpPr>
+        <p:spPr/>
+        <p:txBody>
+          <a:bodyPr/>
+          <a:lstStyle/>
+          <a:p>
+            <a:r>
+              <a:rPr lang="pt-BR" dirty="0" smtClean="0"/>
+              <a:t>Interface do Usuário</a:t>
+            </a:r>
+            <a:endParaRPr lang="pt-BR" dirty="0"/>
+          </a:p>
+        </p:txBody>
+      </p:sp>
+      <p:pic>
+        <p:nvPicPr>
+          <p:cNvPr id="4" name="Imagem 3"/>
+          <p:cNvPicPr>
+            <a:picLocks noChangeAspect="1"/>
+          </p:cNvPicPr>
+          <p:nvPr/>
+        </p:nvPicPr>
+        <p:blipFill>
+          <a:blip r:embed="rId2">
+            <a:extLst>
+              <a:ext uri="{28A0092B-C50C-407E-A947-70E740481C1C}">
+                <a14:useLocalDpi xmlns:a14="http://schemas.microsoft.com/office/drawing/2010/main" val="0"/>
+              </a:ext>
+            </a:extLst>
+          </a:blip>
+          <a:stretch>
+            <a:fillRect/>
+          </a:stretch>
+        </p:blipFill>
+        <p:spPr>
+          <a:xfrm>
+            <a:off x="1293307" y="1204520"/>
+            <a:ext cx="6557385" cy="5104800"/>
+          </a:xfrm>
+          <a:prstGeom prst="rect">
+            <a:avLst/>
+          </a:prstGeom>
+        </p:spPr>
+      </p:pic>
+      <p:sp>
+        <p:nvSpPr>
+          <p:cNvPr id="6" name="Retângulo 5"/>
+          <p:cNvSpPr/>
+          <p:nvPr/>
+        </p:nvSpPr>
+        <p:spPr>
+          <a:xfrm>
+            <a:off x="72008" y="1052736"/>
+            <a:ext cx="2339752" cy="461665"/>
+          </a:xfrm>
+          <a:prstGeom prst="rect">
+            <a:avLst/>
+          </a:prstGeom>
+        </p:spPr>
+        <p:txBody>
+          <a:bodyPr wrap="square">
+            <a:spAutoFit/>
+          </a:bodyPr>
+          <a:lstStyle/>
+          <a:p>
+            <a:r>
+              <a:rPr lang="pt-BR" sz="2400" b="1" dirty="0" smtClean="0"/>
+              <a:t>Visão Gestor</a:t>
+            </a:r>
+            <a:endParaRPr lang="pt-BR" sz="2800" b="1" dirty="0"/>
+          </a:p>
+        </p:txBody>
+      </p:sp>
+    </p:spTree>
+    <p:extLst>
+      <p:ext uri="{BB962C8B-B14F-4D97-AF65-F5344CB8AC3E}">
+        <p14:creationId xmlns:p14="http://schemas.microsoft.com/office/powerpoint/2010/main" val="2598367640"/>
+      </p:ext>
+    </p:extLst>
+  </p:cSld>
+  <p:clrMapOvr>
+    <a:masterClrMapping/>
+  </p:clrMapOvr>
+  <p:timing>
+    <p:tnLst>
+      <p:par>
+        <p:cTn id="1" dur="indefinite" restart="never" nodeType="tmRoot"/>
+      </p:par>
+    </p:tnLst>
+  </p:timing>
+</p:sld>
+</file>
+
+<file path=ppt/slides/slide41.xml><?xml version="1.0" encoding="utf-8"?>
+<p:sld xmlns:a="http://schemas.openxmlformats.org/drawingml/2006/main" xmlns:r="http://schemas.openxmlformats.org/officeDocument/2006/relationships" xmlns:p="http://schemas.openxmlformats.org/presentationml/2006/main">
+  <p:cSld>
+    <p:spTree>
+      <p:nvGrpSpPr>
+        <p:cNvPr id="1" name=""/>
+        <p:cNvGrpSpPr/>
+        <p:nvPr/>
+      </p:nvGrpSpPr>
+      <p:grpSpPr>
+        <a:xfrm>
+          <a:off x="0" y="0"/>
+          <a:ext cx="0" cy="0"/>
+          <a:chOff x="0" y="0"/>
+          <a:chExt cx="0" cy="0"/>
+        </a:xfrm>
+      </p:grpSpPr>
+      <p:sp>
+        <p:nvSpPr>
+          <p:cNvPr id="2" name="Title 1"/>
+          <p:cNvSpPr>
+            <a:spLocks noGrp="1"/>
+          </p:cNvSpPr>
+          <p:nvPr>
+            <p:ph type="title"/>
+          </p:nvPr>
+        </p:nvSpPr>
+        <p:spPr/>
+        <p:txBody>
+          <a:bodyPr/>
+          <a:lstStyle/>
+          <a:p>
+            <a:r>
+              <a:rPr lang="pt-BR" dirty="0" smtClean="0"/>
+              <a:t>Interface do Usuário</a:t>
+            </a:r>
+            <a:endParaRPr lang="pt-BR" dirty="0"/>
+          </a:p>
+        </p:txBody>
+      </p:sp>
+      <p:pic>
+        <p:nvPicPr>
+          <p:cNvPr id="4" name="Imagem 3"/>
+          <p:cNvPicPr>
+            <a:picLocks noChangeAspect="1"/>
+          </p:cNvPicPr>
+          <p:nvPr/>
+        </p:nvPicPr>
+        <p:blipFill>
+          <a:blip r:embed="rId2">
+            <a:extLst>
+              <a:ext uri="{28A0092B-C50C-407E-A947-70E740481C1C}">
+                <a14:useLocalDpi xmlns:a14="http://schemas.microsoft.com/office/drawing/2010/main" val="0"/>
+              </a:ext>
+            </a:extLst>
+          </a:blip>
+          <a:stretch>
+            <a:fillRect/>
+          </a:stretch>
+        </p:blipFill>
+        <p:spPr>
+          <a:xfrm>
+            <a:off x="1293307" y="1204520"/>
+            <a:ext cx="6557385" cy="5104800"/>
+          </a:xfrm>
+          <a:prstGeom prst="rect">
+            <a:avLst/>
+          </a:prstGeom>
+        </p:spPr>
+      </p:pic>
+      <p:sp>
+        <p:nvSpPr>
+          <p:cNvPr id="6" name="Retângulo 5"/>
+          <p:cNvSpPr/>
+          <p:nvPr/>
+        </p:nvSpPr>
+        <p:spPr>
+          <a:xfrm>
+            <a:off x="72008" y="1052736"/>
+            <a:ext cx="2339752" cy="461665"/>
+          </a:xfrm>
+          <a:prstGeom prst="rect">
+            <a:avLst/>
+          </a:prstGeom>
+        </p:spPr>
+        <p:txBody>
+          <a:bodyPr wrap="square">
+            <a:spAutoFit/>
+          </a:bodyPr>
+          <a:lstStyle/>
+          <a:p>
+            <a:r>
+              <a:rPr lang="pt-BR" sz="2400" b="1" dirty="0" smtClean="0"/>
+              <a:t>Visão Gestor</a:t>
+            </a:r>
+            <a:endParaRPr lang="pt-BR" sz="2800" b="1" dirty="0"/>
+          </a:p>
+        </p:txBody>
+      </p:sp>
+    </p:spTree>
+    <p:extLst>
+      <p:ext uri="{BB962C8B-B14F-4D97-AF65-F5344CB8AC3E}">
+        <p14:creationId xmlns:p14="http://schemas.microsoft.com/office/powerpoint/2010/main" val="2510664707"/>
+      </p:ext>
+    </p:extLst>
+  </p:cSld>
+  <p:clrMapOvr>
+    <a:masterClrMapping/>
+  </p:clrMapOvr>
+  <p:timing>
+    <p:tnLst>
+      <p:par>
+        <p:cTn id="1" dur="indefinite" restart="never" nodeType="tmRoot"/>
+      </p:par>
+    </p:tnLst>
+  </p:timing>
+</p:sld>
+</file>
+
+<file path=ppt/slides/slide42.xml><?xml version="1.0" encoding="utf-8"?>
+<p:sld xmlns:a="http://schemas.openxmlformats.org/drawingml/2006/main" xmlns:r="http://schemas.openxmlformats.org/officeDocument/2006/relationships" xmlns:p="http://schemas.openxmlformats.org/presentationml/2006/main">
+  <p:cSld>
+    <p:spTree>
+      <p:nvGrpSpPr>
+        <p:cNvPr id="1" name=""/>
+        <p:cNvGrpSpPr/>
+        <p:nvPr/>
+      </p:nvGrpSpPr>
+      <p:grpSpPr>
+        <a:xfrm>
+          <a:off x="0" y="0"/>
+          <a:ext cx="0" cy="0"/>
+          <a:chOff x="0" y="0"/>
+          <a:chExt cx="0" cy="0"/>
+        </a:xfrm>
+      </p:grpSpPr>
+      <p:sp>
+        <p:nvSpPr>
+          <p:cNvPr id="2" name="Title 1"/>
+          <p:cNvSpPr>
+            <a:spLocks noGrp="1"/>
+          </p:cNvSpPr>
+          <p:nvPr>
+            <p:ph type="title"/>
+          </p:nvPr>
+        </p:nvSpPr>
+        <p:spPr/>
+        <p:txBody>
+          <a:bodyPr/>
+          <a:lstStyle/>
+          <a:p>
+            <a:r>
+              <a:rPr lang="pt-BR" dirty="0" smtClean="0"/>
+              <a:t>Interface do Usuário</a:t>
+            </a:r>
+            <a:endParaRPr lang="pt-BR" dirty="0"/>
+          </a:p>
+        </p:txBody>
+      </p:sp>
+      <p:pic>
+        <p:nvPicPr>
+          <p:cNvPr id="4" name="Imagem 3"/>
+          <p:cNvPicPr>
+            <a:picLocks noChangeAspect="1"/>
+          </p:cNvPicPr>
+          <p:nvPr/>
+        </p:nvPicPr>
+        <p:blipFill>
+          <a:blip r:embed="rId2">
+            <a:extLst>
+              <a:ext uri="{28A0092B-C50C-407E-A947-70E740481C1C}">
+                <a14:useLocalDpi xmlns:a14="http://schemas.microsoft.com/office/drawing/2010/main" val="0"/>
+              </a:ext>
+            </a:extLst>
+          </a:blip>
+          <a:stretch>
+            <a:fillRect/>
+          </a:stretch>
+        </p:blipFill>
+        <p:spPr>
+          <a:xfrm>
+            <a:off x="1297948" y="1204520"/>
+            <a:ext cx="6548104" cy="5104800"/>
+          </a:xfrm>
+          <a:prstGeom prst="rect">
+            <a:avLst/>
+          </a:prstGeom>
+        </p:spPr>
+      </p:pic>
+      <p:sp>
+        <p:nvSpPr>
+          <p:cNvPr id="6" name="Retângulo 5"/>
+          <p:cNvSpPr/>
+          <p:nvPr/>
+        </p:nvSpPr>
+        <p:spPr>
+          <a:xfrm>
+            <a:off x="72008" y="1052736"/>
+            <a:ext cx="2339752" cy="461665"/>
+          </a:xfrm>
+          <a:prstGeom prst="rect">
+            <a:avLst/>
+          </a:prstGeom>
+        </p:spPr>
+        <p:txBody>
+          <a:bodyPr wrap="square">
+            <a:spAutoFit/>
+          </a:bodyPr>
+          <a:lstStyle/>
+          <a:p>
+            <a:r>
+              <a:rPr lang="pt-BR" sz="2400" b="1" dirty="0" smtClean="0"/>
+              <a:t>Visão Gestor</a:t>
+            </a:r>
+            <a:endParaRPr lang="pt-BR" sz="2800" b="1" dirty="0"/>
+          </a:p>
+        </p:txBody>
+      </p:sp>
+    </p:spTree>
+    <p:extLst>
+      <p:ext uri="{BB962C8B-B14F-4D97-AF65-F5344CB8AC3E}">
+        <p14:creationId xmlns:p14="http://schemas.microsoft.com/office/powerpoint/2010/main" val="3784726794"/>
+      </p:ext>
+    </p:extLst>
+  </p:cSld>
+  <p:clrMapOvr>
+    <a:masterClrMapping/>
+  </p:clrMapOvr>
+  <p:timing>
+    <p:tnLst>
+      <p:par>
+        <p:cTn id="1" dur="indefinite" restart="never" nodeType="tmRoot"/>
+      </p:par>
+    </p:tnLst>
+  </p:timing>
+</p:sld>
+</file>
+
+<file path=ppt/slides/slide43.xml><?xml version="1.0" encoding="utf-8"?>
+<p:sld xmlns:a="http://schemas.openxmlformats.org/drawingml/2006/main" xmlns:r="http://schemas.openxmlformats.org/officeDocument/2006/relationships" xmlns:p="http://schemas.openxmlformats.org/presentationml/2006/main">
+  <p:cSld>
+    <p:spTree>
+      <p:nvGrpSpPr>
+        <p:cNvPr id="1" name=""/>
+        <p:cNvGrpSpPr/>
+        <p:nvPr/>
+      </p:nvGrpSpPr>
+      <p:grpSpPr>
+        <a:xfrm>
+          <a:off x="0" y="0"/>
+          <a:ext cx="0" cy="0"/>
+          <a:chOff x="0" y="0"/>
+          <a:chExt cx="0" cy="0"/>
+        </a:xfrm>
+      </p:grpSpPr>
+      <p:sp>
+        <p:nvSpPr>
+          <p:cNvPr id="2" name="Title 1"/>
+          <p:cNvSpPr>
+            <a:spLocks noGrp="1"/>
+          </p:cNvSpPr>
+          <p:nvPr>
+            <p:ph type="title"/>
+          </p:nvPr>
+        </p:nvSpPr>
+        <p:spPr/>
+        <p:txBody>
+          <a:bodyPr/>
+          <a:lstStyle/>
+          <a:p>
+            <a:r>
+              <a:rPr lang="pt-BR" dirty="0" smtClean="0"/>
+              <a:t>Interface do Usuário</a:t>
+            </a:r>
+            <a:endParaRPr lang="pt-BR" dirty="0"/>
+          </a:p>
+        </p:txBody>
+      </p:sp>
+      <p:pic>
+        <p:nvPicPr>
+          <p:cNvPr id="5" name="Imagem 4"/>
+          <p:cNvPicPr>
+            <a:picLocks noChangeAspect="1"/>
+          </p:cNvPicPr>
+          <p:nvPr/>
+        </p:nvPicPr>
+        <p:blipFill>
+          <a:blip r:embed="rId2">
+            <a:extLst>
+              <a:ext uri="{28A0092B-C50C-407E-A947-70E740481C1C}">
+                <a14:useLocalDpi xmlns:a14="http://schemas.microsoft.com/office/drawing/2010/main" val="0"/>
+              </a:ext>
+            </a:extLst>
+          </a:blip>
+          <a:stretch>
+            <a:fillRect/>
+          </a:stretch>
+        </p:blipFill>
+        <p:spPr>
+          <a:xfrm>
+            <a:off x="1293307" y="1204520"/>
+            <a:ext cx="6557385" cy="5104800"/>
+          </a:xfrm>
+          <a:prstGeom prst="rect">
+            <a:avLst/>
+          </a:prstGeom>
+        </p:spPr>
+      </p:pic>
+      <p:sp>
+        <p:nvSpPr>
+          <p:cNvPr id="7" name="Retângulo 6"/>
+          <p:cNvSpPr/>
+          <p:nvPr/>
+        </p:nvSpPr>
+        <p:spPr>
+          <a:xfrm>
+            <a:off x="72008" y="1052736"/>
+            <a:ext cx="2339752" cy="461665"/>
+          </a:xfrm>
+          <a:prstGeom prst="rect">
+            <a:avLst/>
+          </a:prstGeom>
+        </p:spPr>
+        <p:txBody>
+          <a:bodyPr wrap="square">
+            <a:spAutoFit/>
+          </a:bodyPr>
+          <a:lstStyle/>
+          <a:p>
+            <a:r>
+              <a:rPr lang="pt-BR" sz="2400" b="1" dirty="0" smtClean="0"/>
+              <a:t>Visão Gestor</a:t>
+            </a:r>
+            <a:endParaRPr lang="pt-BR" sz="2800" b="1" dirty="0"/>
+          </a:p>
+        </p:txBody>
+      </p:sp>
+    </p:spTree>
+    <p:extLst>
+      <p:ext uri="{BB962C8B-B14F-4D97-AF65-F5344CB8AC3E}">
+        <p14:creationId xmlns:p14="http://schemas.microsoft.com/office/powerpoint/2010/main" val="2428608338"/>
+      </p:ext>
+    </p:extLst>
+  </p:cSld>
+  <p:clrMapOvr>
+    <a:masterClrMapping/>
+  </p:clrMapOvr>
+  <p:timing>
+    <p:tnLst>
+      <p:par>
+        <p:cTn id="1" dur="indefinite" restart="never" nodeType="tmRoot"/>
+      </p:par>
+    </p:tnLst>
+  </p:timing>
+</p:sld>
+</file>
+
+<file path=ppt/slides/slide44.xml><?xml version="1.0" encoding="utf-8"?>
+<p:sld xmlns:a="http://schemas.openxmlformats.org/drawingml/2006/main" xmlns:r="http://schemas.openxmlformats.org/officeDocument/2006/relationships" xmlns:p="http://schemas.openxmlformats.org/presentationml/2006/main">
+  <p:cSld>
+    <p:spTree>
+      <p:nvGrpSpPr>
+        <p:cNvPr id="1" name=""/>
+        <p:cNvGrpSpPr/>
+        <p:nvPr/>
+      </p:nvGrpSpPr>
+      <p:grpSpPr>
+        <a:xfrm>
+          <a:off x="0" y="0"/>
+          <a:ext cx="0" cy="0"/>
+          <a:chOff x="0" y="0"/>
+          <a:chExt cx="0" cy="0"/>
+        </a:xfrm>
+      </p:grpSpPr>
+      <p:sp>
+        <p:nvSpPr>
+          <p:cNvPr id="2" name="Title 1"/>
+          <p:cNvSpPr>
+            <a:spLocks noGrp="1"/>
+          </p:cNvSpPr>
+          <p:nvPr>
+            <p:ph type="title"/>
+          </p:nvPr>
+        </p:nvSpPr>
+        <p:spPr/>
+        <p:txBody>
+          <a:bodyPr/>
+          <a:lstStyle/>
+          <a:p>
+            <a:r>
+              <a:rPr lang="pt-BR" dirty="0" smtClean="0"/>
+              <a:t>Interface do Usuário</a:t>
+            </a:r>
+            <a:endParaRPr lang="pt-BR" dirty="0"/>
+          </a:p>
+        </p:txBody>
+      </p:sp>
+      <p:pic>
+        <p:nvPicPr>
+          <p:cNvPr id="5" name="Imagem 4"/>
+          <p:cNvPicPr>
+            <a:picLocks noChangeAspect="1"/>
+          </p:cNvPicPr>
+          <p:nvPr/>
+        </p:nvPicPr>
+        <p:blipFill>
+          <a:blip r:embed="rId2">
+            <a:extLst>
+              <a:ext uri="{28A0092B-C50C-407E-A947-70E740481C1C}">
+                <a14:useLocalDpi xmlns:a14="http://schemas.microsoft.com/office/drawing/2010/main" val="0"/>
+              </a:ext>
+            </a:extLst>
+          </a:blip>
+          <a:stretch>
+            <a:fillRect/>
+          </a:stretch>
+        </p:blipFill>
+        <p:spPr>
+          <a:xfrm>
+            <a:off x="1293307" y="1204520"/>
+            <a:ext cx="6557385" cy="5104800"/>
+          </a:xfrm>
+          <a:prstGeom prst="rect">
+            <a:avLst/>
+          </a:prstGeom>
+        </p:spPr>
+      </p:pic>
+      <p:sp>
+        <p:nvSpPr>
+          <p:cNvPr id="7" name="Retângulo 6"/>
+          <p:cNvSpPr/>
+          <p:nvPr/>
+        </p:nvSpPr>
+        <p:spPr>
+          <a:xfrm>
+            <a:off x="72008" y="1052736"/>
+            <a:ext cx="2339752" cy="461665"/>
+          </a:xfrm>
+          <a:prstGeom prst="rect">
+            <a:avLst/>
+          </a:prstGeom>
+        </p:spPr>
+        <p:txBody>
+          <a:bodyPr wrap="square">
+            <a:spAutoFit/>
+          </a:bodyPr>
+          <a:lstStyle/>
+          <a:p>
+            <a:r>
+              <a:rPr lang="pt-BR" sz="2400" b="1" dirty="0" smtClean="0"/>
+              <a:t>Visão Gestor</a:t>
+            </a:r>
+            <a:endParaRPr lang="pt-BR" sz="2800" b="1" dirty="0"/>
+          </a:p>
+        </p:txBody>
+      </p:sp>
+    </p:spTree>
+    <p:extLst>
+      <p:ext uri="{BB962C8B-B14F-4D97-AF65-F5344CB8AC3E}">
+        <p14:creationId xmlns:p14="http://schemas.microsoft.com/office/powerpoint/2010/main" val="172973721"/>
+      </p:ext>
+    </p:extLst>
+  </p:cSld>
+  <p:clrMapOvr>
+    <a:masterClrMapping/>
+  </p:clrMapOvr>
+  <p:timing>
+    <p:tnLst>
+      <p:par>
+        <p:cTn id="1" dur="indefinite" restart="never" nodeType="tmRoot"/>
+      </p:par>
+    </p:tnLst>
+  </p:timing>
+</p:sld>
+</file>
+
+<file path=ppt/slides/slide45.xml><?xml version="1.0" encoding="utf-8"?>
+<p:sld xmlns:a="http://schemas.openxmlformats.org/drawingml/2006/main" xmlns:r="http://schemas.openxmlformats.org/officeDocument/2006/relationships" xmlns:p="http://schemas.openxmlformats.org/presentationml/2006/main">
+  <p:cSld>
+    <p:spTree>
+      <p:nvGrpSpPr>
+        <p:cNvPr id="1" name=""/>
+        <p:cNvGrpSpPr/>
+        <p:nvPr/>
+      </p:nvGrpSpPr>
+      <p:grpSpPr>
+        <a:xfrm>
+          <a:off x="0" y="0"/>
+          <a:ext cx="0" cy="0"/>
+          <a:chOff x="0" y="0"/>
+          <a:chExt cx="0" cy="0"/>
+        </a:xfrm>
+      </p:grpSpPr>
+      <p:sp>
+        <p:nvSpPr>
+          <p:cNvPr id="2" name="Title 1"/>
+          <p:cNvSpPr>
+            <a:spLocks noGrp="1"/>
+          </p:cNvSpPr>
+          <p:nvPr>
+            <p:ph type="title"/>
+          </p:nvPr>
+        </p:nvSpPr>
+        <p:spPr/>
+        <p:txBody>
+          <a:bodyPr/>
+          <a:lstStyle/>
+          <a:p>
+            <a:r>
+              <a:rPr lang="pt-BR" dirty="0" smtClean="0"/>
+              <a:t>Interface do Usuário</a:t>
+            </a:r>
+            <a:endParaRPr lang="pt-BR" dirty="0"/>
+          </a:p>
+        </p:txBody>
+      </p:sp>
+      <p:pic>
+        <p:nvPicPr>
+          <p:cNvPr id="4" name="Imagem 3"/>
+          <p:cNvPicPr>
+            <a:picLocks noChangeAspect="1"/>
+          </p:cNvPicPr>
+          <p:nvPr/>
+        </p:nvPicPr>
+        <p:blipFill>
+          <a:blip r:embed="rId2">
+            <a:extLst>
+              <a:ext uri="{28A0092B-C50C-407E-A947-70E740481C1C}">
+                <a14:useLocalDpi xmlns:a14="http://schemas.microsoft.com/office/drawing/2010/main" val="0"/>
+              </a:ext>
+            </a:extLst>
+          </a:blip>
+          <a:stretch>
+            <a:fillRect/>
+          </a:stretch>
+        </p:blipFill>
+        <p:spPr>
+          <a:xfrm>
+            <a:off x="1297948" y="1204520"/>
+            <a:ext cx="6548104" cy="5104800"/>
+          </a:xfrm>
+          <a:prstGeom prst="rect">
+            <a:avLst/>
+          </a:prstGeom>
+        </p:spPr>
+      </p:pic>
+      <p:sp>
+        <p:nvSpPr>
+          <p:cNvPr id="6" name="Retângulo 5"/>
+          <p:cNvSpPr/>
+          <p:nvPr/>
+        </p:nvSpPr>
+        <p:spPr>
+          <a:xfrm>
+            <a:off x="72008" y="1052736"/>
+            <a:ext cx="2339752" cy="461665"/>
+          </a:xfrm>
+          <a:prstGeom prst="rect">
+            <a:avLst/>
+          </a:prstGeom>
+        </p:spPr>
+        <p:txBody>
+          <a:bodyPr wrap="square">
+            <a:spAutoFit/>
+          </a:bodyPr>
+          <a:lstStyle/>
+          <a:p>
+            <a:r>
+              <a:rPr lang="pt-BR" sz="2400" b="1" dirty="0" smtClean="0"/>
+              <a:t>Visão ADM</a:t>
+            </a:r>
+            <a:endParaRPr lang="pt-BR" sz="2800" b="1" dirty="0"/>
+          </a:p>
+        </p:txBody>
+      </p:sp>
+    </p:spTree>
+    <p:extLst>
+      <p:ext uri="{BB962C8B-B14F-4D97-AF65-F5344CB8AC3E}">
+        <p14:creationId xmlns:p14="http://schemas.microsoft.com/office/powerpoint/2010/main" val="227153128"/>
+      </p:ext>
+    </p:extLst>
+  </p:cSld>
+  <p:clrMapOvr>
+    <a:masterClrMapping/>
+  </p:clrMapOvr>
+  <p:timing>
+    <p:tnLst>
+      <p:par>
+        <p:cTn id="1" dur="indefinite" restart="never" nodeType="tmRoot"/>
+      </p:par>
+    </p:tnLst>
+  </p:timing>
+</p:sld>
+</file>
+
+<file path=ppt/slides/slide46.xml><?xml version="1.0" encoding="utf-8"?>
+<p:sld xmlns:a="http://schemas.openxmlformats.org/drawingml/2006/main" xmlns:r="http://schemas.openxmlformats.org/officeDocument/2006/relationships" xmlns:p="http://schemas.openxmlformats.org/presentationml/2006/main">
+  <p:cSld>
+    <p:spTree>
+      <p:nvGrpSpPr>
+        <p:cNvPr id="1" name=""/>
+        <p:cNvGrpSpPr/>
+        <p:nvPr/>
+      </p:nvGrpSpPr>
+      <p:grpSpPr>
+        <a:xfrm>
+          <a:off x="0" y="0"/>
+          <a:ext cx="0" cy="0"/>
+          <a:chOff x="0" y="0"/>
+          <a:chExt cx="0" cy="0"/>
+        </a:xfrm>
+      </p:grpSpPr>
+      <p:sp>
+        <p:nvSpPr>
+          <p:cNvPr id="2" name="Title 1"/>
+          <p:cNvSpPr>
+            <a:spLocks noGrp="1"/>
+          </p:cNvSpPr>
+          <p:nvPr>
+            <p:ph type="title"/>
+          </p:nvPr>
+        </p:nvSpPr>
+        <p:spPr/>
+        <p:txBody>
+          <a:bodyPr/>
+          <a:lstStyle/>
+          <a:p>
+            <a:r>
+              <a:rPr lang="pt-BR" dirty="0" smtClean="0"/>
+              <a:t>Interface do Usuário</a:t>
+            </a:r>
+            <a:endParaRPr lang="pt-BR" dirty="0"/>
+          </a:p>
+        </p:txBody>
+      </p:sp>
+      <p:pic>
+        <p:nvPicPr>
+          <p:cNvPr id="4" name="Imagem 3"/>
+          <p:cNvPicPr>
+            <a:picLocks noChangeAspect="1"/>
+          </p:cNvPicPr>
+          <p:nvPr/>
+        </p:nvPicPr>
+        <p:blipFill>
+          <a:blip r:embed="rId2">
+            <a:extLst>
+              <a:ext uri="{28A0092B-C50C-407E-A947-70E740481C1C}">
+                <a14:useLocalDpi xmlns:a14="http://schemas.microsoft.com/office/drawing/2010/main" val="0"/>
+              </a:ext>
+            </a:extLst>
+          </a:blip>
+          <a:stretch>
+            <a:fillRect/>
+          </a:stretch>
+        </p:blipFill>
+        <p:spPr>
+          <a:xfrm>
+            <a:off x="1293307" y="1204520"/>
+            <a:ext cx="6557385" cy="5104800"/>
+          </a:xfrm>
+          <a:prstGeom prst="rect">
+            <a:avLst/>
+          </a:prstGeom>
+        </p:spPr>
+      </p:pic>
+      <p:sp>
+        <p:nvSpPr>
+          <p:cNvPr id="5" name="Retângulo 4"/>
+          <p:cNvSpPr/>
+          <p:nvPr/>
+        </p:nvSpPr>
+        <p:spPr>
+          <a:xfrm>
+            <a:off x="72008" y="1052736"/>
+            <a:ext cx="2339752" cy="461665"/>
+          </a:xfrm>
+          <a:prstGeom prst="rect">
+            <a:avLst/>
+          </a:prstGeom>
+        </p:spPr>
+        <p:txBody>
+          <a:bodyPr wrap="square">
+            <a:spAutoFit/>
+          </a:bodyPr>
+          <a:lstStyle/>
+          <a:p>
+            <a:r>
+              <a:rPr lang="pt-BR" sz="2400" b="1" dirty="0" smtClean="0"/>
+              <a:t>Visão ADM</a:t>
+            </a:r>
+            <a:endParaRPr lang="pt-BR" sz="2800" b="1" dirty="0"/>
+          </a:p>
+        </p:txBody>
+      </p:sp>
+    </p:spTree>
+    <p:extLst>
+      <p:ext uri="{BB962C8B-B14F-4D97-AF65-F5344CB8AC3E}">
+        <p14:creationId xmlns:p14="http://schemas.microsoft.com/office/powerpoint/2010/main" val="38583560"/>
+      </p:ext>
+    </p:extLst>
+  </p:cSld>
+  <p:clrMapOvr>
+    <a:masterClrMapping/>
+  </p:clrMapOvr>
+  <p:timing>
+    <p:tnLst>
+      <p:par>
+        <p:cTn id="1" dur="indefinite" restart="never" nodeType="tmRoot"/>
+      </p:par>
+    </p:tnLst>
+  </p:timing>
+</p:sld>
+</file>
+
+<file path=ppt/slides/slide47.xml><?xml version="1.0" encoding="utf-8"?>
+<p:sld xmlns:a="http://schemas.openxmlformats.org/drawingml/2006/main" xmlns:r="http://schemas.openxmlformats.org/officeDocument/2006/relationships" xmlns:p="http://schemas.openxmlformats.org/presentationml/2006/main">
+  <p:cSld>
+    <p:spTree>
+      <p:nvGrpSpPr>
+        <p:cNvPr id="1" name=""/>
+        <p:cNvGrpSpPr/>
+        <p:nvPr/>
+      </p:nvGrpSpPr>
+      <p:grpSpPr>
+        <a:xfrm>
+          <a:off x="0" y="0"/>
+          <a:ext cx="0" cy="0"/>
+          <a:chOff x="0" y="0"/>
+          <a:chExt cx="0" cy="0"/>
+        </a:xfrm>
+      </p:grpSpPr>
+      <p:sp>
+        <p:nvSpPr>
+          <p:cNvPr id="2" name="Title 1"/>
+          <p:cNvSpPr>
+            <a:spLocks noGrp="1"/>
+          </p:cNvSpPr>
+          <p:nvPr>
+            <p:ph type="title"/>
+          </p:nvPr>
+        </p:nvSpPr>
+        <p:spPr/>
+        <p:txBody>
+          <a:bodyPr/>
+          <a:lstStyle/>
+          <a:p>
+            <a:r>
+              <a:rPr lang="pt-BR" dirty="0" smtClean="0"/>
+              <a:t>Interface do Usuário</a:t>
+            </a:r>
+            <a:endParaRPr lang="pt-BR" dirty="0"/>
+          </a:p>
+        </p:txBody>
+      </p:sp>
+      <p:pic>
+        <p:nvPicPr>
+          <p:cNvPr id="4" name="Imagem 3"/>
+          <p:cNvPicPr>
+            <a:picLocks noChangeAspect="1"/>
+          </p:cNvPicPr>
+          <p:nvPr/>
+        </p:nvPicPr>
+        <p:blipFill>
+          <a:blip r:embed="rId2">
+            <a:extLst>
+              <a:ext uri="{28A0092B-C50C-407E-A947-70E740481C1C}">
+                <a14:useLocalDpi xmlns:a14="http://schemas.microsoft.com/office/drawing/2010/main" val="0"/>
+              </a:ext>
+            </a:extLst>
+          </a:blip>
+          <a:stretch>
+            <a:fillRect/>
+          </a:stretch>
+        </p:blipFill>
+        <p:spPr>
+          <a:xfrm>
+            <a:off x="1297948" y="1204520"/>
+            <a:ext cx="6548104" cy="5104800"/>
+          </a:xfrm>
+          <a:prstGeom prst="rect">
+            <a:avLst/>
+          </a:prstGeom>
+        </p:spPr>
+      </p:pic>
+      <p:sp>
+        <p:nvSpPr>
+          <p:cNvPr id="6" name="Retângulo 5"/>
+          <p:cNvSpPr/>
+          <p:nvPr/>
+        </p:nvSpPr>
+        <p:spPr>
+          <a:xfrm>
+            <a:off x="72008" y="1052736"/>
+            <a:ext cx="2339752" cy="461665"/>
+          </a:xfrm>
+          <a:prstGeom prst="rect">
+            <a:avLst/>
+          </a:prstGeom>
+        </p:spPr>
+        <p:txBody>
+          <a:bodyPr wrap="square">
+            <a:spAutoFit/>
+          </a:bodyPr>
+          <a:lstStyle/>
+          <a:p>
+            <a:r>
+              <a:rPr lang="pt-BR" sz="2400" b="1" dirty="0" smtClean="0"/>
+              <a:t>Visão ADM</a:t>
+            </a:r>
+            <a:endParaRPr lang="pt-BR" sz="2800" b="1" dirty="0"/>
+          </a:p>
+        </p:txBody>
+      </p:sp>
+    </p:spTree>
+    <p:extLst>
+      <p:ext uri="{BB962C8B-B14F-4D97-AF65-F5344CB8AC3E}">
+        <p14:creationId xmlns:p14="http://schemas.microsoft.com/office/powerpoint/2010/main" val="1225680612"/>
+      </p:ext>
+    </p:extLst>
+  </p:cSld>
+  <p:clrMapOvr>
+    <a:masterClrMapping/>
+  </p:clrMapOvr>
+  <p:timing>
+    <p:tnLst>
+      <p:par>
+        <p:cTn id="1" dur="indefinite" restart="never" nodeType="tmRoot"/>
+      </p:par>
+    </p:tnLst>
+  </p:timing>
+</p:sld>
+</file>
+
+<file path=ppt/slides/slide48.xml><?xml version="1.0" encoding="utf-8"?>
+<p:sld xmlns:a="http://schemas.openxmlformats.org/drawingml/2006/main" xmlns:r="http://schemas.openxmlformats.org/officeDocument/2006/relationships" xmlns:p="http://schemas.openxmlformats.org/presentationml/2006/main">
+  <p:cSld>
+    <p:spTree>
+      <p:nvGrpSpPr>
+        <p:cNvPr id="1" name=""/>
+        <p:cNvGrpSpPr/>
+        <p:nvPr/>
+      </p:nvGrpSpPr>
+      <p:grpSpPr>
+        <a:xfrm>
+          <a:off x="0" y="0"/>
+          <a:ext cx="0" cy="0"/>
+          <a:chOff x="0" y="0"/>
+          <a:chExt cx="0" cy="0"/>
+        </a:xfrm>
+      </p:grpSpPr>
+      <p:sp>
+        <p:nvSpPr>
+          <p:cNvPr id="2" name="Title 1"/>
+          <p:cNvSpPr>
+            <a:spLocks noGrp="1"/>
+          </p:cNvSpPr>
+          <p:nvPr>
+            <p:ph type="title"/>
+          </p:nvPr>
+        </p:nvSpPr>
+        <p:spPr/>
+        <p:txBody>
+          <a:bodyPr/>
+          <a:lstStyle/>
+          <a:p>
+            <a:r>
+              <a:rPr lang="pt-BR" dirty="0" smtClean="0"/>
+              <a:t>Banco de Dados</a:t>
+            </a:r>
+            <a:endParaRPr lang="pt-BR" dirty="0"/>
+          </a:p>
+        </p:txBody>
+      </p:sp>
+      <p:pic>
+        <p:nvPicPr>
+          <p:cNvPr id="3" name="Imagem 2"/>
+          <p:cNvPicPr>
+            <a:picLocks noChangeAspect="1"/>
+          </p:cNvPicPr>
+          <p:nvPr/>
+        </p:nvPicPr>
+        <p:blipFill>
+          <a:blip r:embed="rId2">
+            <a:extLst>
+              <a:ext uri="{28A0092B-C50C-407E-A947-70E740481C1C}">
+                <a14:useLocalDpi xmlns:a14="http://schemas.microsoft.com/office/drawing/2010/main" val="0"/>
+              </a:ext>
+            </a:extLst>
+          </a:blip>
+          <a:stretch>
+            <a:fillRect/>
+          </a:stretch>
+        </p:blipFill>
+        <p:spPr>
+          <a:xfrm>
+            <a:off x="0" y="1417638"/>
+            <a:ext cx="9144000" cy="4694418"/>
+          </a:xfrm>
+          <a:prstGeom prst="rect">
+            <a:avLst/>
+          </a:prstGeom>
+        </p:spPr>
+      </p:pic>
+    </p:spTree>
+    <p:extLst>
+      <p:ext uri="{BB962C8B-B14F-4D97-AF65-F5344CB8AC3E}">
+        <p14:creationId xmlns:p14="http://schemas.microsoft.com/office/powerpoint/2010/main" val="3218491669"/>
+      </p:ext>
+    </p:extLst>
+  </p:cSld>
+  <p:clrMapOvr>
+    <a:masterClrMapping/>
+  </p:clrMapOvr>
+  <p:timing>
+    <p:tnLst>
+      <p:par>
+        <p:cTn id="1" dur="indefinite" restart="never" nodeType="tmRoot"/>
+      </p:par>
+    </p:tnLst>
+  </p:timing>
+</p:sld>
+</file>
+
+<file path=ppt/slides/slide49.xml><?xml version="1.0" encoding="utf-8"?>
+<p:sld xmlns:a="http://schemas.openxmlformats.org/drawingml/2006/main" xmlns:r="http://schemas.openxmlformats.org/officeDocument/2006/relationships" xmlns:p="http://schemas.openxmlformats.org/presentationml/2006/main">
+  <p:cSld>
+    <p:spTree>
+      <p:nvGrpSpPr>
+        <p:cNvPr id="1" name=""/>
+        <p:cNvGrpSpPr/>
+        <p:nvPr/>
+      </p:nvGrpSpPr>
+      <p:grpSpPr>
+        <a:xfrm>
+          <a:off x="0" y="0"/>
+          <a:ext cx="0" cy="0"/>
+          <a:chOff x="0" y="0"/>
+          <a:chExt cx="0" cy="0"/>
+        </a:xfrm>
+      </p:grpSpPr>
+      <p:sp>
+        <p:nvSpPr>
+          <p:cNvPr id="2" name="Title 1"/>
+          <p:cNvSpPr>
+            <a:spLocks noGrp="1"/>
+          </p:cNvSpPr>
+          <p:nvPr>
+            <p:ph type="title"/>
+          </p:nvPr>
+        </p:nvSpPr>
+        <p:spPr/>
+        <p:txBody>
+          <a:bodyPr/>
+          <a:lstStyle/>
+          <a:p>
+            <a:r>
+              <a:rPr lang="pt-BR" dirty="0" smtClean="0"/>
+              <a:t>Banco de Dados</a:t>
+            </a:r>
+            <a:endParaRPr lang="pt-BR" dirty="0"/>
+          </a:p>
+        </p:txBody>
+      </p:sp>
+      <p:pic>
+        <p:nvPicPr>
+          <p:cNvPr id="4" name="Imagem 3"/>
+          <p:cNvPicPr>
+            <a:picLocks noChangeAspect="1"/>
+          </p:cNvPicPr>
+          <p:nvPr/>
+        </p:nvPicPr>
+        <p:blipFill>
+          <a:blip r:embed="rId2">
+            <a:extLst>
+              <a:ext uri="{28A0092B-C50C-407E-A947-70E740481C1C}">
+                <a14:useLocalDpi xmlns:a14="http://schemas.microsoft.com/office/drawing/2010/main" val="0"/>
+              </a:ext>
+            </a:extLst>
+          </a:blip>
+          <a:stretch>
+            <a:fillRect/>
+          </a:stretch>
+        </p:blipFill>
+        <p:spPr>
+          <a:xfrm>
+            <a:off x="714697" y="1196752"/>
+            <a:ext cx="7956376" cy="4981695"/>
+          </a:xfrm>
+          <a:prstGeom prst="rect">
+            <a:avLst/>
+          </a:prstGeom>
+        </p:spPr>
+      </p:pic>
+    </p:spTree>
+    <p:extLst>
+      <p:ext uri="{BB962C8B-B14F-4D97-AF65-F5344CB8AC3E}">
+        <p14:creationId xmlns:p14="http://schemas.microsoft.com/office/powerpoint/2010/main" val="3016240961"/>
+      </p:ext>
+    </p:extLst>
+  </p:cSld>
+  <p:clrMapOvr>
+    <a:masterClrMapping/>
+  </p:clrMapOvr>
+  <p:timing>
+    <p:tnLst>
+      <p:par>
+        <p:cTn id="1" dur="indefinite" restart="never" nodeType="tmRoot"/>
+      </p:par>
+    </p:tnLst>
+  </p:timing>
+</p:sld>
+</file>
+
+<file path=ppt/slides/slide5.xml><?xml version="1.0" encoding="utf-8"?>
+<p:sld xmlns:a="http://schemas.openxmlformats.org/drawingml/2006/main" xmlns:r="http://schemas.openxmlformats.org/officeDocument/2006/relationships" xmlns:p="http://schemas.openxmlformats.org/presentationml/2006/main">
+  <p:cSld>
+    <p:spTree>
+      <p:nvGrpSpPr>
+        <p:cNvPr id="1" name=""/>
+        <p:cNvGrpSpPr/>
+        <p:nvPr/>
+      </p:nvGrpSpPr>
+      <p:grpSpPr>
+        <a:xfrm>
+          <a:off x="0" y="0"/>
+          <a:ext cx="0" cy="0"/>
+          <a:chOff x="0" y="0"/>
+          <a:chExt cx="0" cy="0"/>
+        </a:xfrm>
+      </p:grpSpPr>
+      <p:sp>
+        <p:nvSpPr>
+          <p:cNvPr id="2" name="Title 1"/>
+          <p:cNvSpPr>
+            <a:spLocks noGrp="1"/>
+          </p:cNvSpPr>
+          <p:nvPr>
+            <p:ph type="title"/>
+          </p:nvPr>
+        </p:nvSpPr>
+        <p:spPr/>
+        <p:txBody>
+          <a:bodyPr/>
+          <a:lstStyle/>
+          <a:p>
+            <a:r>
+              <a:rPr lang="pt-BR" dirty="0" smtClean="0"/>
+              <a:t>Alternativas e Concorrências</a:t>
+            </a:r>
+            <a:endParaRPr lang="pt-BR" dirty="0"/>
+          </a:p>
+        </p:txBody>
+      </p:sp>
+      <p:sp>
+        <p:nvSpPr>
+          <p:cNvPr id="4" name="Espaço Reservado para Conteúdo 3"/>
+          <p:cNvSpPr>
+            <a:spLocks noGrp="1"/>
+          </p:cNvSpPr>
+          <p:nvPr>
+            <p:ph idx="1"/>
+          </p:nvPr>
+        </p:nvSpPr>
+        <p:spPr/>
+        <p:txBody>
+          <a:bodyPr>
+            <a:normAutofit/>
+          </a:bodyPr>
+          <a:lstStyle/>
+          <a:p>
+            <a:pPr marL="342900" lvl="2" indent="-342900"/>
+            <a:r>
+              <a:rPr lang="pt-BR" sz="2800" dirty="0">
+                <a:ea typeface="Tahoma" panose="020B0604030504040204" pitchFamily="34" charset="0"/>
+                <a:cs typeface="Tahoma" panose="020B0604030504040204" pitchFamily="34" charset="0"/>
+              </a:rPr>
+              <a:t>Analisando outros sistemas e interfaces (web) de gerenciamento de exames pudemos constatar que existem muitas falhas e com isso resolvemos desenvolver um sistema que auxiliasse a resolução dessas falhas. O paciente poderá ter acesso ao sistema via website para verificar o andamento e resultado de exames.</a:t>
+            </a:r>
+          </a:p>
+          <a:p>
+            <a:pPr marL="0" lvl="0" indent="0">
+              <a:buNone/>
+            </a:pPr>
+            <a:endParaRPr lang="pt-BR" dirty="0"/>
+          </a:p>
+          <a:p>
+            <a:endParaRPr lang="pt-BR" dirty="0"/>
+          </a:p>
+        </p:txBody>
+      </p:sp>
+    </p:spTree>
+    <p:extLst>
+      <p:ext uri="{BB962C8B-B14F-4D97-AF65-F5344CB8AC3E}">
+        <p14:creationId xmlns:p14="http://schemas.microsoft.com/office/powerpoint/2010/main" val="2073483884"/>
+      </p:ext>
+    </p:extLst>
+  </p:cSld>
+  <p:clrMapOvr>
+    <a:masterClrMapping/>
+  </p:clrMapOvr>
+  <p:timing>
+    <p:tnLst>
+      <p:par>
+        <p:cTn id="1" dur="indefinite" restart="never" nodeType="tmRoot"/>
+      </p:par>
+    </p:tnLst>
+  </p:timing>
+</p:sld>
+</file>
+
+<file path=ppt/slides/slide50.xml><?xml version="1.0" encoding="utf-8"?>
+<p:sld xmlns:a="http://schemas.openxmlformats.org/drawingml/2006/main" xmlns:r="http://schemas.openxmlformats.org/officeDocument/2006/relationships" xmlns:p="http://schemas.openxmlformats.org/presentationml/2006/main">
+  <p:cSld>
+    <p:spTree>
+      <p:nvGrpSpPr>
+        <p:cNvPr id="1" name=""/>
+        <p:cNvGrpSpPr/>
+        <p:nvPr/>
+      </p:nvGrpSpPr>
+      <p:grpSpPr>
+        <a:xfrm>
+          <a:off x="0" y="0"/>
+          <a:ext cx="0" cy="0"/>
+          <a:chOff x="0" y="0"/>
+          <a:chExt cx="0" cy="0"/>
+        </a:xfrm>
+      </p:grpSpPr>
+      <p:sp>
+        <p:nvSpPr>
+          <p:cNvPr id="2" name="Title 1"/>
+          <p:cNvSpPr>
+            <a:spLocks noGrp="1"/>
+          </p:cNvSpPr>
+          <p:nvPr>
+            <p:ph type="title"/>
+          </p:nvPr>
+        </p:nvSpPr>
+        <p:spPr/>
+        <p:txBody>
+          <a:bodyPr/>
+          <a:lstStyle/>
+          <a:p>
+            <a:r>
+              <a:rPr lang="pt-BR" dirty="0" smtClean="0"/>
               <a:t>Arquitetura do Software</a:t>
             </a:r>
             <a:endParaRPr lang="pt-BR" dirty="0"/>
@@ -7119,19 +9379,37 @@
         </p:spPr>
         <p:txBody>
           <a:bodyPr>
-            <a:normAutofit fontScale="92500"/>
+            <a:normAutofit/>
           </a:bodyPr>
           <a:lstStyle/>
           <a:p>
-            <a:pPr algn="just"/>
             <a:r>
               <a:rPr lang="pt-BR" sz="2800" dirty="0" smtClean="0"/>
-              <a:t>A aplicação é iniciada com uma pagina JSP para montar o layout juntamente com as paginas HTML. </a:t>
-            </a:r>
-            <a:r>
-              <a:rPr lang="pt-BR" sz="2800" dirty="0"/>
-              <a:t>Com o surgimento de uma requisição de dados os SERVLET’S são chamados para atender os processos, utilizando os dados presentes no VO, que armazenam as informações contidas no Banco de Dados e as transportam, para atender as requisições solicitadas, enviando novamente às páginas JSP para ser exibida ao cliente.</a:t>
-            </a:r>
+              <a:t>Aplicação iniciada com o JSP</a:t>
+            </a:r>
+          </a:p>
+          <a:p>
+            <a:r>
+              <a:rPr lang="pt-BR" sz="2800" dirty="0" smtClean="0"/>
+              <a:t>Layout é montado juntamente com o HTML</a:t>
+            </a:r>
+          </a:p>
+          <a:p>
+            <a:r>
+              <a:rPr lang="pt-BR" sz="2800" dirty="0" err="1" smtClean="0"/>
+              <a:t>Servlets</a:t>
+            </a:r>
+            <a:r>
+              <a:rPr lang="pt-BR" sz="2800" dirty="0" smtClean="0"/>
+              <a:t> são chamados para o atendimento dos processos utilizando dados do VO</a:t>
+            </a:r>
+          </a:p>
+          <a:p>
+            <a:r>
+              <a:rPr lang="pt-BR" sz="2800" dirty="0" smtClean="0"/>
+              <a:t>VO traz informações que são armazenadas no banco de dados para atender a solicitação desejada</a:t>
+            </a:r>
+            <a:endParaRPr lang="pt-BR" sz="2800" dirty="0"/>
           </a:p>
           <a:p>
             <a:endParaRPr lang="pt-BR" dirty="0"/>
@@ -7224,7 +9502,7 @@
         </p:blipFill>
         <p:spPr bwMode="auto">
           <a:xfrm>
-            <a:off x="6853039" y="2203946"/>
+            <a:off x="6526560" y="2203946"/>
             <a:ext cx="2290961" cy="3318468"/>
           </a:xfrm>
           <a:prstGeom prst="rect">
@@ -7245,7 +9523,7 @@
     </p:spTree>
     <p:extLst>
       <p:ext uri="{BB962C8B-B14F-4D97-AF65-F5344CB8AC3E}">
-        <p14:creationId xmlns:p14="http://schemas.microsoft.com/office/powerpoint/2010/main" val="2341494487"/>
+        <p14:creationId xmlns:p14="http://schemas.microsoft.com/office/powerpoint/2010/main" val="1805652469"/>
       </p:ext>
     </p:extLst>
   </p:cSld>
@@ -7262,7 +9540,7 @@
 </p:sld>
 </file>
 
-<file path=ppt/slides/slide35.xml><?xml version="1.0" encoding="utf-8"?>
+<file path=ppt/slides/slide51.xml><?xml version="1.0" encoding="utf-8"?>
 <p:sld xmlns:a="http://schemas.openxmlformats.org/drawingml/2006/main" xmlns:r="http://schemas.openxmlformats.org/officeDocument/2006/relationships" xmlns:p="http://schemas.openxmlformats.org/presentationml/2006/main">
   <p:cSld>
     <p:spTree>
@@ -7382,7 +9660,7 @@
 </p:sld>
 </file>
 
-<file path=ppt/slides/slide36.xml><?xml version="1.0" encoding="utf-8"?>
+<file path=ppt/slides/slide52.xml><?xml version="1.0" encoding="utf-8"?>
 <p:sld xmlns:a="http://schemas.openxmlformats.org/drawingml/2006/main" xmlns:r="http://schemas.openxmlformats.org/officeDocument/2006/relationships" xmlns:p="http://schemas.openxmlformats.org/presentationml/2006/main">
   <p:cSld>
     <p:spTree>
@@ -7474,7 +9752,7 @@
 </p:sld>
 </file>
 
-<file path=ppt/slides/slide37.xml><?xml version="1.0" encoding="utf-8"?>
+<file path=ppt/slides/slide53.xml><?xml version="1.0" encoding="utf-8"?>
 <p:sld xmlns:a="http://schemas.openxmlformats.org/drawingml/2006/main" xmlns:r="http://schemas.openxmlformats.org/officeDocument/2006/relationships" xmlns:p="http://schemas.openxmlformats.org/presentationml/2006/main">
   <p:cSld>
     <p:spTree>
@@ -7529,7 +9807,7 @@
         <p:spPr>
           <a:xfrm>
             <a:off x="308153" y="1340768"/>
-            <a:ext cx="8527694" cy="4027586"/>
+            <a:ext cx="8527694" cy="4680520"/>
           </a:xfrm>
         </p:spPr>
         <p:txBody>
@@ -7538,24 +9816,27 @@
           </a:bodyPr>
           <a:lstStyle/>
           <a:p>
-            <a:r>
-              <a:rPr lang="pt-BR" sz="8000" dirty="0" smtClean="0"/>
+            <a:pPr marL="400050" lvl="1" indent="0">
+              <a:buNone/>
+            </a:pPr>
+            <a:r>
+              <a:rPr lang="pt-BR" sz="7600" dirty="0" smtClean="0"/>
               <a:t>3 - </a:t>
             </a:r>
             <a:r>
-              <a:rPr lang="pt-BR" sz="8000" dirty="0"/>
+              <a:rPr lang="pt-BR" sz="7600" dirty="0"/>
               <a:t>Controle do usuário e </a:t>
             </a:r>
             <a:r>
-              <a:rPr lang="pt-BR" sz="8000" dirty="0" smtClean="0"/>
+              <a:rPr lang="pt-BR" sz="7600" dirty="0" smtClean="0"/>
               <a:t>liberdade: </a:t>
             </a:r>
             <a:r>
-              <a:rPr lang="pt-BR" sz="8000" dirty="0"/>
+              <a:rPr lang="pt-BR" sz="7600" dirty="0"/>
               <a:t>Os usuários podem escolher funções do sistema por engano e precisarão de uma "saída de emergência" bem marcada para deixar o estado não desejado sem ter que passar por um extenso diálogo</a:t>
             </a:r>
             <a:r>
-              <a:rPr lang="pt-BR" sz="8000" dirty="0" smtClean="0"/>
+              <a:rPr lang="pt-BR" sz="7600" dirty="0" smtClean="0"/>
               <a:t>.</a:t>
             </a:r>
           </a:p>
@@ -7563,32 +9844,35 @@
             <a:endParaRPr lang="pt-BR" sz="8000" dirty="0" smtClean="0"/>
           </a:p>
           <a:p>
-            <a:r>
-              <a:rPr lang="pt-BR" sz="8000" dirty="0" smtClean="0"/>
+            <a:pPr marL="400050" lvl="1" indent="0">
+              <a:buNone/>
+            </a:pPr>
+            <a:r>
+              <a:rPr lang="pt-BR" sz="7600" dirty="0" smtClean="0"/>
               <a:t>4 - Consistência </a:t>
             </a:r>
             <a:r>
-              <a:rPr lang="pt-BR" sz="8000" dirty="0"/>
+              <a:rPr lang="pt-BR" sz="7600" dirty="0"/>
               <a:t>e </a:t>
             </a:r>
             <a:r>
-              <a:rPr lang="pt-BR" sz="8000" dirty="0" smtClean="0"/>
+              <a:rPr lang="pt-BR" sz="7600" dirty="0" smtClean="0"/>
               <a:t>padrões: </a:t>
             </a:r>
             <a:r>
-              <a:rPr lang="pt-BR" sz="8000" dirty="0"/>
+              <a:rPr lang="pt-BR" sz="7600" dirty="0"/>
               <a:t>Usuários não devem ter que imaginar se palavras, situações, ou ações diferentes significam a mesma coisa. Devem se seguir as convenções da plataforma. Usar palavras de forma consistente no conteúdo e nos botões. Deve-se verificar os </a:t>
             </a:r>
             <a:r>
-              <a:rPr lang="pt-BR" sz="8000" dirty="0" smtClean="0"/>
+              <a:rPr lang="pt-BR" sz="7600" dirty="0" smtClean="0"/>
               <a:t>títulos e </a:t>
             </a:r>
             <a:r>
-              <a:rPr lang="pt-BR" sz="8000" dirty="0"/>
+              <a:rPr lang="pt-BR" sz="7600" dirty="0"/>
               <a:t>cabeçalhos das páginas confrontando-os com os links que apontam para eles</a:t>
             </a:r>
             <a:r>
-              <a:rPr lang="pt-BR" sz="8000" dirty="0" smtClean="0"/>
+              <a:rPr lang="pt-BR" sz="7600" dirty="0" smtClean="0"/>
               <a:t>.</a:t>
             </a:r>
           </a:p>
@@ -7596,24 +9880,27 @@
             <a:endParaRPr lang="pt-BR" sz="8000" dirty="0" smtClean="0"/>
           </a:p>
           <a:p>
-            <a:r>
-              <a:rPr lang="pt-BR" sz="8000" dirty="0" smtClean="0"/>
+            <a:pPr marL="400050" lvl="1" indent="0">
+              <a:buNone/>
+            </a:pPr>
+            <a:r>
+              <a:rPr lang="pt-BR" sz="7600" dirty="0" smtClean="0"/>
               <a:t>5 - </a:t>
             </a:r>
             <a:r>
-              <a:rPr lang="pt-BR" sz="8000" dirty="0"/>
+              <a:rPr lang="pt-BR" sz="7600" dirty="0"/>
               <a:t>Prevenção de </a:t>
             </a:r>
             <a:r>
-              <a:rPr lang="pt-BR" sz="8000" dirty="0" smtClean="0"/>
+              <a:rPr lang="pt-BR" sz="7600" dirty="0" smtClean="0"/>
               <a:t>erro: </a:t>
             </a:r>
             <a:r>
-              <a:rPr lang="pt-BR" sz="8000" dirty="0"/>
+              <a:rPr lang="pt-BR" sz="7600" dirty="0"/>
               <a:t>Muito melhor que boas mensagens de erro é um projeto cuidadoso que, em primeiro lugar, previna a ocorrência de problemas através de orientação e apresentação de recursos que facilitem a navegação</a:t>
             </a:r>
             <a:r>
-              <a:rPr lang="pt-BR" sz="8000" dirty="0" smtClean="0"/>
+              <a:rPr lang="pt-BR" sz="7600" dirty="0" smtClean="0"/>
               <a:t>.</a:t>
             </a:r>
           </a:p>
@@ -7621,23 +9908,26 @@
             <a:endParaRPr lang="pt-BR" sz="8000" dirty="0" smtClean="0"/>
           </a:p>
           <a:p>
-            <a:r>
-              <a:rPr lang="pt-BR" sz="8000" dirty="0" smtClean="0"/>
+            <a:pPr marL="400050" lvl="1" indent="0">
+              <a:buNone/>
+            </a:pPr>
+            <a:r>
+              <a:rPr lang="pt-BR" sz="7600" dirty="0" smtClean="0"/>
               <a:t>9 - </a:t>
             </a:r>
             <a:r>
-              <a:rPr lang="pt-BR" sz="8000" dirty="0"/>
+              <a:rPr lang="pt-BR" sz="7600" dirty="0"/>
               <a:t>Auxiliar usuários a reconhecer, diagnosticar e recuperar ações </a:t>
             </a:r>
             <a:r>
-              <a:rPr lang="pt-BR" sz="8000" dirty="0" smtClean="0"/>
+              <a:rPr lang="pt-BR" sz="7600" dirty="0" smtClean="0"/>
               <a:t>erradas: Mensagens </a:t>
             </a:r>
             <a:r>
-              <a:rPr lang="pt-BR" sz="8000" dirty="0"/>
+              <a:rPr lang="pt-BR" sz="7600" dirty="0"/>
               <a:t>de erro devem ser expressas em linguagem clara (sem códigos), indicar precisamente o problema, e sugerir construtivamente uma solução.</a:t>
             </a:r>
-            <a:endParaRPr lang="pt-BR" sz="8000" dirty="0" smtClean="0"/>
+            <a:endParaRPr lang="pt-BR" sz="7600" dirty="0" smtClean="0"/>
           </a:p>
           <a:p>
             <a:endParaRPr lang="pt-BR" sz="1800" dirty="0"/>
@@ -7664,7 +9954,7 @@
 </p:sld>
 </file>
 
-<file path=ppt/slides/slide38.xml><?xml version="1.0" encoding="utf-8"?>
+<file path=ppt/slides/slide54.xml><?xml version="1.0" encoding="utf-8"?>
 <p:sld xmlns:a="http://schemas.openxmlformats.org/drawingml/2006/main" xmlns:r="http://schemas.openxmlformats.org/officeDocument/2006/relationships" xmlns:p="http://schemas.openxmlformats.org/presentationml/2006/main">
   <p:cSld>
     <p:spTree>
@@ -7764,240 +10054,6 @@
     <p:extLst>
       <p:ext uri="{BB962C8B-B14F-4D97-AF65-F5344CB8AC3E}">
         <p14:creationId xmlns:p14="http://schemas.microsoft.com/office/powerpoint/2010/main" val="3284284668"/>
-      </p:ext>
-    </p:extLst>
-  </p:cSld>
-  <p:clrMapOvr>
-    <a:masterClrMapping/>
-  </p:clrMapOvr>
-  <p:timing>
-    <p:tnLst>
-      <p:par>
-        <p:cTn id="1" dur="indefinite" restart="never" nodeType="tmRoot"/>
-      </p:par>
-    </p:tnLst>
-  </p:timing>
-</p:sld>
-</file>
-
-<file path=ppt/slides/slide4.xml><?xml version="1.0" encoding="utf-8"?>
-<p:sld xmlns:a="http://schemas.openxmlformats.org/drawingml/2006/main" xmlns:r="http://schemas.openxmlformats.org/officeDocument/2006/relationships" xmlns:p="http://schemas.openxmlformats.org/presentationml/2006/main">
-  <p:cSld>
-    <p:spTree>
-      <p:nvGrpSpPr>
-        <p:cNvPr id="1" name=""/>
-        <p:cNvGrpSpPr/>
-        <p:nvPr/>
-      </p:nvGrpSpPr>
-      <p:grpSpPr>
-        <a:xfrm>
-          <a:off x="0" y="0"/>
-          <a:ext cx="0" cy="0"/>
-          <a:chOff x="0" y="0"/>
-          <a:chExt cx="0" cy="0"/>
-        </a:xfrm>
-      </p:grpSpPr>
-      <p:sp>
-        <p:nvSpPr>
-          <p:cNvPr id="2" name="Título 1"/>
-          <p:cNvSpPr>
-            <a:spLocks noGrp="1"/>
-          </p:cNvSpPr>
-          <p:nvPr>
-            <p:ph type="title"/>
-          </p:nvPr>
-        </p:nvSpPr>
-        <p:spPr/>
-        <p:txBody>
-          <a:bodyPr/>
-          <a:lstStyle/>
-          <a:p>
-            <a:r>
-              <a:rPr lang="pt-BR" dirty="0" smtClean="0"/>
-              <a:t>Visão do Sistema</a:t>
-            </a:r>
-            <a:endParaRPr lang="pt-BR" dirty="0"/>
-          </a:p>
-        </p:txBody>
-      </p:sp>
-      <p:sp>
-        <p:nvSpPr>
-          <p:cNvPr id="3" name="Marcador de Posição de Conteúdo 2"/>
-          <p:cNvSpPr>
-            <a:spLocks noGrp="1"/>
-          </p:cNvSpPr>
-          <p:nvPr>
-            <p:ph idx="1"/>
-          </p:nvPr>
-        </p:nvSpPr>
-        <p:spPr>
-          <a:xfrm>
-            <a:off x="457200" y="1422356"/>
-            <a:ext cx="8229600" cy="4525963"/>
-          </a:xfrm>
-        </p:spPr>
-        <p:txBody>
-          <a:bodyPr>
-            <a:normAutofit fontScale="92500" lnSpcReduction="10000"/>
-          </a:bodyPr>
-          <a:lstStyle/>
-          <a:p>
-            <a:r>
-              <a:rPr lang="pt-BR" dirty="0" smtClean="0"/>
-              <a:t>Usuários: </a:t>
-            </a:r>
-          </a:p>
-          <a:p>
-            <a:pPr lvl="1"/>
-            <a:r>
-              <a:rPr lang="pt-BR" dirty="0" smtClean="0"/>
-              <a:t>Atendente do Balcão.</a:t>
-            </a:r>
-          </a:p>
-          <a:p>
-            <a:pPr lvl="1"/>
-            <a:r>
-              <a:rPr lang="pt-BR" dirty="0" smtClean="0"/>
-              <a:t>Analista de exames.</a:t>
-            </a:r>
-          </a:p>
-          <a:p>
-            <a:pPr lvl="1"/>
-            <a:r>
-              <a:rPr lang="pt-BR" dirty="0" smtClean="0"/>
-              <a:t>Executor de exames.</a:t>
-            </a:r>
-          </a:p>
-          <a:p>
-            <a:r>
-              <a:rPr lang="pt-BR" dirty="0" smtClean="0"/>
-              <a:t>Atendente de Balcão: Atende pacientes, coleta exames que serão analisados, atendimento do telefone.</a:t>
-            </a:r>
-          </a:p>
-          <a:p>
-            <a:r>
-              <a:rPr lang="pt-BR" dirty="0" smtClean="0"/>
-              <a:t>Analista </a:t>
-            </a:r>
-            <a:r>
-              <a:rPr lang="pt-BR" dirty="0" smtClean="0"/>
-              <a:t>de exames: Analisa dos exames que são disponibilizados na clinica, armazena os resultados dos exames em um local da clinica</a:t>
-            </a:r>
-            <a:endParaRPr lang="pt-BR" dirty="0"/>
-          </a:p>
-          <a:p>
-            <a:endParaRPr lang="pt-BR" dirty="0"/>
-          </a:p>
-        </p:txBody>
-      </p:sp>
-    </p:spTree>
-    <p:extLst>
-      <p:ext uri="{BB962C8B-B14F-4D97-AF65-F5344CB8AC3E}">
-        <p14:creationId xmlns:p14="http://schemas.microsoft.com/office/powerpoint/2010/main" val="183051565"/>
-      </p:ext>
-    </p:extLst>
-  </p:cSld>
-  <p:clrMapOvr>
-    <a:masterClrMapping/>
-  </p:clrMapOvr>
-  <p:timing>
-    <p:tnLst>
-      <p:par>
-        <p:cTn id="1" dur="indefinite" restart="never" nodeType="tmRoot"/>
-      </p:par>
-    </p:tnLst>
-  </p:timing>
-</p:sld>
-</file>
-
-<file path=ppt/slides/slide5.xml><?xml version="1.0" encoding="utf-8"?>
-<p:sld xmlns:a="http://schemas.openxmlformats.org/drawingml/2006/main" xmlns:r="http://schemas.openxmlformats.org/officeDocument/2006/relationships" xmlns:p="http://schemas.openxmlformats.org/presentationml/2006/main">
-  <p:cSld>
-    <p:spTree>
-      <p:nvGrpSpPr>
-        <p:cNvPr id="1" name=""/>
-        <p:cNvGrpSpPr/>
-        <p:nvPr/>
-      </p:nvGrpSpPr>
-      <p:grpSpPr>
-        <a:xfrm>
-          <a:off x="0" y="0"/>
-          <a:ext cx="0" cy="0"/>
-          <a:chOff x="0" y="0"/>
-          <a:chExt cx="0" cy="0"/>
-        </a:xfrm>
-      </p:grpSpPr>
-      <p:sp>
-        <p:nvSpPr>
-          <p:cNvPr id="2" name="Título 1"/>
-          <p:cNvSpPr>
-            <a:spLocks noGrp="1"/>
-          </p:cNvSpPr>
-          <p:nvPr>
-            <p:ph type="title"/>
-          </p:nvPr>
-        </p:nvSpPr>
-        <p:spPr/>
-        <p:txBody>
-          <a:bodyPr/>
-          <a:lstStyle/>
-          <a:p>
-            <a:r>
-              <a:rPr lang="pt-BR" dirty="0" smtClean="0"/>
-              <a:t>Visão do Sistema</a:t>
-            </a:r>
-            <a:endParaRPr lang="pt-BR" dirty="0"/>
-          </a:p>
-        </p:txBody>
-      </p:sp>
-      <p:sp>
-        <p:nvSpPr>
-          <p:cNvPr id="3" name="Marcador de Posição de Conteúdo 2"/>
-          <p:cNvSpPr>
-            <a:spLocks noGrp="1"/>
-          </p:cNvSpPr>
-          <p:nvPr>
-            <p:ph idx="1"/>
-          </p:nvPr>
-        </p:nvSpPr>
-        <p:spPr/>
-        <p:txBody>
-          <a:bodyPr/>
-          <a:lstStyle/>
-          <a:p>
-            <a:r>
-              <a:rPr lang="pt-BR" dirty="0" smtClean="0"/>
-              <a:t>Executor de exames: Realiza os exames, armazena os exames no local adequado.</a:t>
-            </a:r>
-          </a:p>
-          <a:p>
-            <a:pPr marL="0" indent="0">
-              <a:buNone/>
-            </a:pPr>
-            <a:endParaRPr lang="pt-BR" dirty="0" smtClean="0"/>
-          </a:p>
-          <a:p>
-            <a:r>
-              <a:rPr lang="pt-BR" dirty="0" smtClean="0"/>
-              <a:t>Tendo em vista todo o ambiente atual que estamos analisando para propor nosso sistema, iremos realizar somente o gerenciamento de exames e não da clínica como um todo.</a:t>
-            </a:r>
-            <a:endParaRPr lang="pt-BR" dirty="0"/>
-          </a:p>
-          <a:p>
-            <a:endParaRPr lang="pt-BR" dirty="0" smtClean="0"/>
-          </a:p>
-          <a:p>
-            <a:endParaRPr lang="pt-BR" dirty="0"/>
-          </a:p>
-          <a:p>
-            <a:endParaRPr lang="pt-BR" dirty="0"/>
-          </a:p>
-        </p:txBody>
-      </p:sp>
-    </p:spTree>
-    <p:extLst>
-      <p:ext uri="{BB962C8B-B14F-4D97-AF65-F5344CB8AC3E}">
-        <p14:creationId xmlns:p14="http://schemas.microsoft.com/office/powerpoint/2010/main" val="1059535570"/>
       </p:ext>
     </p:extLst>
   </p:cSld>
@@ -8064,104 +10120,12 @@
             <p:ph idx="1"/>
           </p:nvPr>
         </p:nvSpPr>
-        <p:spPr/>
-        <p:txBody>
-          <a:bodyPr>
-            <a:normAutofit/>
-          </a:bodyPr>
-          <a:lstStyle/>
-          <a:p>
-            <a:pPr marL="342900" lvl="2" indent="-342900"/>
-            <a:r>
-              <a:rPr lang="pt-BR" sz="2800" dirty="0">
-                <a:ea typeface="Tahoma" panose="020B0604030504040204" pitchFamily="34" charset="0"/>
-                <a:cs typeface="Tahoma" panose="020B0604030504040204" pitchFamily="34" charset="0"/>
-              </a:rPr>
-              <a:t>Analisando outros sistemas e interfaces (web) de gerenciamento de exames pudemos constatar que existem muitas falhas e com isso resolvemos desenvolver um sistema que auxiliasse a resolução dessas falhas. O paciente poderá ter acesso ao sistema via website para verificar o andamento e resultado de exames.</a:t>
-            </a:r>
-          </a:p>
-          <a:p>
-            <a:pPr marL="0" lvl="0" indent="0">
-              <a:buNone/>
-            </a:pPr>
-            <a:endParaRPr lang="pt-BR" dirty="0"/>
-          </a:p>
-          <a:p>
-            <a:endParaRPr lang="pt-BR" dirty="0"/>
-          </a:p>
-        </p:txBody>
-      </p:sp>
-    </p:spTree>
-    <p:extLst>
-      <p:ext uri="{BB962C8B-B14F-4D97-AF65-F5344CB8AC3E}">
-        <p14:creationId xmlns:p14="http://schemas.microsoft.com/office/powerpoint/2010/main" val="2073483884"/>
-      </p:ext>
-    </p:extLst>
-  </p:cSld>
-  <p:clrMapOvr>
-    <a:masterClrMapping/>
-  </p:clrMapOvr>
-  <p:timing>
-    <p:tnLst>
-      <p:par>
-        <p:cTn id="1" dur="indefinite" restart="never" nodeType="tmRoot"/>
-      </p:par>
-    </p:tnLst>
-  </p:timing>
-</p:sld>
-</file>
-
-<file path=ppt/slides/slide7.xml><?xml version="1.0" encoding="utf-8"?>
-<p:sld xmlns:a="http://schemas.openxmlformats.org/drawingml/2006/main" xmlns:r="http://schemas.openxmlformats.org/officeDocument/2006/relationships" xmlns:p="http://schemas.openxmlformats.org/presentationml/2006/main">
-  <p:cSld>
-    <p:spTree>
-      <p:nvGrpSpPr>
-        <p:cNvPr id="1" name=""/>
-        <p:cNvGrpSpPr/>
-        <p:nvPr/>
-      </p:nvGrpSpPr>
-      <p:grpSpPr>
-        <a:xfrm>
-          <a:off x="0" y="0"/>
-          <a:ext cx="0" cy="0"/>
-          <a:chOff x="0" y="0"/>
-          <a:chExt cx="0" cy="0"/>
-        </a:xfrm>
-      </p:grpSpPr>
-      <p:sp>
-        <p:nvSpPr>
-          <p:cNvPr id="2" name="Title 1"/>
-          <p:cNvSpPr>
-            <a:spLocks noGrp="1"/>
-          </p:cNvSpPr>
-          <p:nvPr>
-            <p:ph type="title"/>
-          </p:nvPr>
-        </p:nvSpPr>
-        <p:spPr/>
-        <p:txBody>
-          <a:bodyPr/>
-          <a:lstStyle/>
-          <a:p>
-            <a:r>
-              <a:rPr lang="pt-BR" dirty="0" smtClean="0"/>
-              <a:t>Alternativas e Concorrências</a:t>
-            </a:r>
-            <a:endParaRPr lang="pt-BR" dirty="0"/>
-          </a:p>
-        </p:txBody>
-      </p:sp>
-      <p:sp>
-        <p:nvSpPr>
-          <p:cNvPr id="4" name="Espaço Reservado para Conteúdo 3"/>
-          <p:cNvSpPr>
-            <a:spLocks noGrp="1"/>
-          </p:cNvSpPr>
-          <p:nvPr>
-            <p:ph idx="1"/>
-          </p:nvPr>
-        </p:nvSpPr>
-        <p:spPr/>
+        <p:spPr>
+          <a:xfrm>
+            <a:off x="457200" y="1628800"/>
+            <a:ext cx="8229600" cy="4525963"/>
+          </a:xfrm>
+        </p:spPr>
         <p:txBody>
           <a:bodyPr>
             <a:normAutofit/>
@@ -8251,7 +10215,7 @@
 </p:sld>
 </file>
 
-<file path=ppt/slides/slide8.xml><?xml version="1.0" encoding="utf-8"?>
+<file path=ppt/slides/slide7.xml><?xml version="1.0" encoding="utf-8"?>
 <p:sld xmlns:a="http://schemas.openxmlformats.org/drawingml/2006/main" xmlns:r="http://schemas.openxmlformats.org/officeDocument/2006/relationships" xmlns:p="http://schemas.openxmlformats.org/presentationml/2006/main">
   <p:cSld>
     <p:spTree>
@@ -8341,7 +10305,7 @@
 </p:sld>
 </file>
 
-<file path=ppt/slides/slide9.xml><?xml version="1.0" encoding="utf-8"?>
+<file path=ppt/slides/slide8.xml><?xml version="1.0" encoding="utf-8"?>
 <p:sld xmlns:a="http://schemas.openxmlformats.org/drawingml/2006/main" xmlns:r="http://schemas.openxmlformats.org/officeDocument/2006/relationships" xmlns:p="http://schemas.openxmlformats.org/presentationml/2006/main">
   <p:cSld>
     <p:spTree>
@@ -8415,6 +10379,141 @@
     <p:extLst>
       <p:ext uri="{BB962C8B-B14F-4D97-AF65-F5344CB8AC3E}">
         <p14:creationId xmlns:p14="http://schemas.microsoft.com/office/powerpoint/2010/main" val="3047569295"/>
+      </p:ext>
+    </p:extLst>
+  </p:cSld>
+  <p:clrMapOvr>
+    <a:masterClrMapping/>
+  </p:clrMapOvr>
+  <p:timing>
+    <p:tnLst>
+      <p:par>
+        <p:cTn id="1" dur="indefinite" restart="never" nodeType="tmRoot"/>
+      </p:par>
+    </p:tnLst>
+  </p:timing>
+</p:sld>
+</file>
+
+<file path=ppt/slides/slide9.xml><?xml version="1.0" encoding="utf-8"?>
+<p:sld xmlns:a="http://schemas.openxmlformats.org/drawingml/2006/main" xmlns:r="http://schemas.openxmlformats.org/officeDocument/2006/relationships" xmlns:p="http://schemas.openxmlformats.org/presentationml/2006/main">
+  <p:cSld>
+    <p:spTree>
+      <p:nvGrpSpPr>
+        <p:cNvPr id="1" name=""/>
+        <p:cNvGrpSpPr/>
+        <p:nvPr/>
+      </p:nvGrpSpPr>
+      <p:grpSpPr>
+        <a:xfrm>
+          <a:off x="0" y="0"/>
+          <a:ext cx="0" cy="0"/>
+          <a:chOff x="0" y="0"/>
+          <a:chExt cx="0" cy="0"/>
+        </a:xfrm>
+      </p:grpSpPr>
+      <p:sp>
+        <p:nvSpPr>
+          <p:cNvPr id="2" name="Title 1"/>
+          <p:cNvSpPr>
+            <a:spLocks noGrp="1"/>
+          </p:cNvSpPr>
+          <p:nvPr>
+            <p:ph type="title"/>
+          </p:nvPr>
+        </p:nvSpPr>
+        <p:spPr/>
+        <p:txBody>
+          <a:bodyPr/>
+          <a:lstStyle/>
+          <a:p>
+            <a:r>
+              <a:rPr lang="pt-BR" dirty="0" smtClean="0"/>
+              <a:t>Casos de Uso</a:t>
+            </a:r>
+            <a:endParaRPr lang="pt-BR" dirty="0"/>
+          </a:p>
+        </p:txBody>
+      </p:sp>
+      <p:pic>
+        <p:nvPicPr>
+          <p:cNvPr id="4" name="Imagem 3"/>
+          <p:cNvPicPr>
+            <a:picLocks noChangeAspect="1"/>
+          </p:cNvPicPr>
+          <p:nvPr/>
+        </p:nvPicPr>
+        <p:blipFill>
+          <a:blip r:embed="rId2">
+            <a:extLst>
+              <a:ext uri="{28A0092B-C50C-407E-A947-70E740481C1C}">
+                <a14:useLocalDpi xmlns:a14="http://schemas.microsoft.com/office/drawing/2010/main" val="0"/>
+              </a:ext>
+            </a:extLst>
+          </a:blip>
+          <a:stretch>
+            <a:fillRect/>
+          </a:stretch>
+        </p:blipFill>
+        <p:spPr>
+          <a:xfrm>
+            <a:off x="0" y="1196752"/>
+            <a:ext cx="9144000" cy="4993722"/>
+          </a:xfrm>
+          <a:prstGeom prst="rect">
+            <a:avLst/>
+          </a:prstGeom>
+        </p:spPr>
+      </p:pic>
+      <p:sp>
+        <p:nvSpPr>
+          <p:cNvPr id="6" name="Retângulo 5"/>
+          <p:cNvSpPr/>
+          <p:nvPr/>
+        </p:nvSpPr>
+        <p:spPr>
+          <a:xfrm>
+            <a:off x="683568" y="6093296"/>
+            <a:ext cx="8136904" cy="461665"/>
+          </a:xfrm>
+          <a:prstGeom prst="rect">
+            <a:avLst/>
+          </a:prstGeom>
+        </p:spPr>
+        <p:txBody>
+          <a:bodyPr wrap="square">
+            <a:spAutoFit/>
+          </a:bodyPr>
+          <a:lstStyle/>
+          <a:p>
+            <a:pPr>
+              <a:buClr>
+                <a:schemeClr val="bg2"/>
+              </a:buClr>
+            </a:pPr>
+            <a:r>
+              <a:rPr lang="pt-BR" sz="2400" dirty="0" smtClean="0">
+                <a:solidFill>
+                  <a:srgbClr val="FF0000"/>
+                </a:solidFill>
+              </a:rPr>
+              <a:t>*Continuação </a:t>
+            </a:r>
+            <a:r>
+              <a:rPr lang="pt-BR" sz="2400" dirty="0">
+                <a:solidFill>
+                  <a:srgbClr val="FF0000"/>
+                </a:solidFill>
+              </a:rPr>
+              <a:t>da ligação de herança no slide seguinte</a:t>
+            </a:r>
+          </a:p>
+        </p:txBody>
+      </p:sp>
+    </p:spTree>
+    <p:extLst>
+      <p:ext uri="{BB962C8B-B14F-4D97-AF65-F5344CB8AC3E}">
+        <p14:creationId xmlns:p14="http://schemas.microsoft.com/office/powerpoint/2010/main" val="33625712"/>
       </p:ext>
     </p:extLst>
   </p:cSld>

</xml_diff>